<commit_message>
(+) Completata servlet dell'autenticazione a due fattori
</commit_message>
<xml_diff>
--- a/Documentazione e cose così/Slide_concettuali_Luca.pptx
+++ b/Documentazione e cose così/Slide_concettuali_Luca.pptx
@@ -6,6 +6,15 @@
   </p:sldMasterIdLst>
   <p:sldIdLst>
     <p:sldId id="256" r:id="rId2"/>
+    <p:sldId id="257" r:id="rId3"/>
+    <p:sldId id="260" r:id="rId4"/>
+    <p:sldId id="261" r:id="rId5"/>
+    <p:sldId id="258" r:id="rId6"/>
+    <p:sldId id="259" r:id="rId7"/>
+    <p:sldId id="263" r:id="rId8"/>
+    <p:sldId id="262" r:id="rId9"/>
+    <p:sldId id="264" r:id="rId10"/>
+    <p:sldId id="265" r:id="rId11"/>
   </p:sldIdLst>
   <p:sldSz cx="12192000" cy="6858000"/>
   <p:notesSz cx="6858000" cy="9144000"/>
@@ -104,6 +113,11 @@
       </a:defRPr>
     </a:lvl9pPr>
   </p:defaultTextStyle>
+  <p:extLst>
+    <p:ext uri="{EFAFB233-063F-42B5-8137-9DF3F51BA10A}">
+      <p15:sldGuideLst xmlns:p15="http://schemas.microsoft.com/office/powerpoint/2012/main"/>
+    </p:ext>
+  </p:extLst>
 </p:presentation>
 </file>
 
@@ -3394,6 +3408,797 @@
 </p:sld>
 </file>
 
+<file path=ppt/slides/slide10.xml><?xml version="1.0" encoding="utf-8"?>
+<p:sld xmlns:a="http://schemas.openxmlformats.org/drawingml/2006/main" xmlns:r="http://schemas.openxmlformats.org/officeDocument/2006/relationships" xmlns:p="http://schemas.openxmlformats.org/presentationml/2006/main">
+  <p:cSld>
+    <p:spTree>
+      <p:nvGrpSpPr>
+        <p:cNvPr id="1" name=""/>
+        <p:cNvGrpSpPr/>
+        <p:nvPr/>
+      </p:nvGrpSpPr>
+      <p:grpSpPr>
+        <a:xfrm>
+          <a:off x="0" y="0"/>
+          <a:ext cx="0" cy="0"/>
+          <a:chOff x="0" y="0"/>
+          <a:chExt cx="0" cy="0"/>
+        </a:xfrm>
+      </p:grpSpPr>
+      <p:sp>
+        <p:nvSpPr>
+          <p:cNvPr id="2" name="Titolo 1">
+            <a:extLst>
+              <a:ext uri="{FF2B5EF4-FFF2-40B4-BE49-F238E27FC236}">
+                <a16:creationId xmlns:a16="http://schemas.microsoft.com/office/drawing/2014/main" id="{A067CE87-7A60-4DFB-8B71-6EC9C173906C}"/>
+              </a:ext>
+            </a:extLst>
+          </p:cNvPr>
+          <p:cNvSpPr>
+            <a:spLocks noGrp="1"/>
+          </p:cNvSpPr>
+          <p:nvPr>
+            <p:ph type="title"/>
+          </p:nvPr>
+        </p:nvSpPr>
+        <p:spPr/>
+        <p:txBody>
+          <a:bodyPr/>
+          <a:lstStyle/>
+          <a:p>
+            <a:r>
+              <a:rPr lang="it-IT" dirty="0" err="1"/>
+              <a:t>Implicit</a:t>
+            </a:r>
+            <a:r>
+              <a:rPr lang="it-IT" dirty="0"/>
+              <a:t> </a:t>
+            </a:r>
+            <a:r>
+              <a:rPr lang="it-IT" dirty="0" err="1"/>
+              <a:t>weaknesses</a:t>
+            </a:r>
+            <a:endParaRPr lang="it-IT" dirty="0"/>
+          </a:p>
+        </p:txBody>
+      </p:sp>
+      <p:sp>
+        <p:nvSpPr>
+          <p:cNvPr id="3" name="Segnaposto contenuto 2">
+            <a:extLst>
+              <a:ext uri="{FF2B5EF4-FFF2-40B4-BE49-F238E27FC236}">
+                <a16:creationId xmlns:a16="http://schemas.microsoft.com/office/drawing/2014/main" id="{F36FD6CB-DA10-49AA-AC33-97037567E37C}"/>
+              </a:ext>
+            </a:extLst>
+          </p:cNvPr>
+          <p:cNvSpPr>
+            <a:spLocks noGrp="1"/>
+          </p:cNvSpPr>
+          <p:nvPr>
+            <p:ph idx="1"/>
+          </p:nvPr>
+        </p:nvSpPr>
+        <p:spPr/>
+        <p:txBody>
+          <a:bodyPr/>
+          <a:lstStyle/>
+          <a:p>
+            <a:endParaRPr lang="it-IT"/>
+          </a:p>
+        </p:txBody>
+      </p:sp>
+    </p:spTree>
+    <p:extLst>
+      <p:ext uri="{BB962C8B-B14F-4D97-AF65-F5344CB8AC3E}">
+        <p14:creationId xmlns:p14="http://schemas.microsoft.com/office/powerpoint/2010/main" val="2278474667"/>
+      </p:ext>
+    </p:extLst>
+  </p:cSld>
+  <p:clrMapOvr>
+    <a:masterClrMapping/>
+  </p:clrMapOvr>
+</p:sld>
+</file>
+
+<file path=ppt/slides/slide2.xml><?xml version="1.0" encoding="utf-8"?>
+<p:sld xmlns:a="http://schemas.openxmlformats.org/drawingml/2006/main" xmlns:r="http://schemas.openxmlformats.org/officeDocument/2006/relationships" xmlns:p="http://schemas.openxmlformats.org/presentationml/2006/main">
+  <p:cSld>
+    <p:spTree>
+      <p:nvGrpSpPr>
+        <p:cNvPr id="1" name=""/>
+        <p:cNvGrpSpPr/>
+        <p:nvPr/>
+      </p:nvGrpSpPr>
+      <p:grpSpPr>
+        <a:xfrm>
+          <a:off x="0" y="0"/>
+          <a:ext cx="0" cy="0"/>
+          <a:chOff x="0" y="0"/>
+          <a:chExt cx="0" cy="0"/>
+        </a:xfrm>
+      </p:grpSpPr>
+      <p:sp>
+        <p:nvSpPr>
+          <p:cNvPr id="2" name="Titolo 1">
+            <a:extLst>
+              <a:ext uri="{FF2B5EF4-FFF2-40B4-BE49-F238E27FC236}">
+                <a16:creationId xmlns:a16="http://schemas.microsoft.com/office/drawing/2014/main" id="{5CD6C40B-86C1-403F-86AE-4F1BE0282E2A}"/>
+              </a:ext>
+            </a:extLst>
+          </p:cNvPr>
+          <p:cNvSpPr>
+            <a:spLocks noGrp="1"/>
+          </p:cNvSpPr>
+          <p:nvPr>
+            <p:ph type="ctrTitle"/>
+          </p:nvPr>
+        </p:nvSpPr>
+        <p:spPr/>
+        <p:txBody>
+          <a:bodyPr/>
+          <a:lstStyle/>
+          <a:p>
+            <a:r>
+              <a:rPr lang="it-IT" dirty="0"/>
+              <a:t>SERVER FEATURES</a:t>
+            </a:r>
+          </a:p>
+        </p:txBody>
+      </p:sp>
+      <p:sp>
+        <p:nvSpPr>
+          <p:cNvPr id="3" name="Sottotitolo 2">
+            <a:extLst>
+              <a:ext uri="{FF2B5EF4-FFF2-40B4-BE49-F238E27FC236}">
+                <a16:creationId xmlns:a16="http://schemas.microsoft.com/office/drawing/2014/main" id="{4B634A2A-7FE2-47D7-ABB2-30A9C641DBA4}"/>
+              </a:ext>
+            </a:extLst>
+          </p:cNvPr>
+          <p:cNvSpPr>
+            <a:spLocks noGrp="1"/>
+          </p:cNvSpPr>
+          <p:nvPr>
+            <p:ph type="subTitle" idx="1"/>
+          </p:nvPr>
+        </p:nvSpPr>
+        <p:spPr/>
+        <p:txBody>
+          <a:bodyPr/>
+          <a:lstStyle/>
+          <a:p>
+            <a:r>
+              <a:rPr lang="it-IT" dirty="0"/>
+              <a:t>Certificate server</a:t>
+            </a:r>
+          </a:p>
+        </p:txBody>
+      </p:sp>
+    </p:spTree>
+    <p:extLst>
+      <p:ext uri="{BB962C8B-B14F-4D97-AF65-F5344CB8AC3E}">
+        <p14:creationId xmlns:p14="http://schemas.microsoft.com/office/powerpoint/2010/main" val="1609170951"/>
+      </p:ext>
+    </p:extLst>
+  </p:cSld>
+  <p:clrMapOvr>
+    <a:masterClrMapping/>
+  </p:clrMapOvr>
+</p:sld>
+</file>
+
+<file path=ppt/slides/slide3.xml><?xml version="1.0" encoding="utf-8"?>
+<p:sld xmlns:a="http://schemas.openxmlformats.org/drawingml/2006/main" xmlns:r="http://schemas.openxmlformats.org/officeDocument/2006/relationships" xmlns:p="http://schemas.openxmlformats.org/presentationml/2006/main">
+  <p:cSld>
+    <p:spTree>
+      <p:nvGrpSpPr>
+        <p:cNvPr id="1" name=""/>
+        <p:cNvGrpSpPr/>
+        <p:nvPr/>
+      </p:nvGrpSpPr>
+      <p:grpSpPr>
+        <a:xfrm>
+          <a:off x="0" y="0"/>
+          <a:ext cx="0" cy="0"/>
+          <a:chOff x="0" y="0"/>
+          <a:chExt cx="0" cy="0"/>
+        </a:xfrm>
+      </p:grpSpPr>
+      <p:sp>
+        <p:nvSpPr>
+          <p:cNvPr id="2" name="Titolo 1">
+            <a:extLst>
+              <a:ext uri="{FF2B5EF4-FFF2-40B4-BE49-F238E27FC236}">
+                <a16:creationId xmlns:a16="http://schemas.microsoft.com/office/drawing/2014/main" id="{29ECC94F-CD55-472E-BBAD-EA5D9387F9F8}"/>
+              </a:ext>
+            </a:extLst>
+          </p:cNvPr>
+          <p:cNvSpPr>
+            <a:spLocks noGrp="1"/>
+          </p:cNvSpPr>
+          <p:nvPr>
+            <p:ph type="ctrTitle"/>
+          </p:nvPr>
+        </p:nvSpPr>
+        <p:spPr/>
+        <p:txBody>
+          <a:bodyPr/>
+          <a:lstStyle/>
+          <a:p>
+            <a:r>
+              <a:rPr lang="it-IT" dirty="0"/>
+              <a:t>GENERAL PROGRAMMING TECHNIQUES</a:t>
+            </a:r>
+          </a:p>
+        </p:txBody>
+      </p:sp>
+      <p:sp>
+        <p:nvSpPr>
+          <p:cNvPr id="3" name="Sottotitolo 2">
+            <a:extLst>
+              <a:ext uri="{FF2B5EF4-FFF2-40B4-BE49-F238E27FC236}">
+                <a16:creationId xmlns:a16="http://schemas.microsoft.com/office/drawing/2014/main" id="{3D1B3825-8169-45AD-B788-66B8EA98CA99}"/>
+              </a:ext>
+            </a:extLst>
+          </p:cNvPr>
+          <p:cNvSpPr>
+            <a:spLocks noGrp="1"/>
+          </p:cNvSpPr>
+          <p:nvPr>
+            <p:ph type="subTitle" idx="1"/>
+          </p:nvPr>
+        </p:nvSpPr>
+        <p:spPr/>
+        <p:txBody>
+          <a:bodyPr/>
+          <a:lstStyle/>
+          <a:p>
+            <a:endParaRPr lang="it-IT"/>
+          </a:p>
+        </p:txBody>
+      </p:sp>
+    </p:spTree>
+    <p:extLst>
+      <p:ext uri="{BB962C8B-B14F-4D97-AF65-F5344CB8AC3E}">
+        <p14:creationId xmlns:p14="http://schemas.microsoft.com/office/powerpoint/2010/main" val="3729025551"/>
+      </p:ext>
+    </p:extLst>
+  </p:cSld>
+  <p:clrMapOvr>
+    <a:masterClrMapping/>
+  </p:clrMapOvr>
+</p:sld>
+</file>
+
+<file path=ppt/slides/slide4.xml><?xml version="1.0" encoding="utf-8"?>
+<p:sld xmlns:a="http://schemas.openxmlformats.org/drawingml/2006/main" xmlns:r="http://schemas.openxmlformats.org/officeDocument/2006/relationships" xmlns:p="http://schemas.openxmlformats.org/presentationml/2006/main">
+  <p:cSld>
+    <p:spTree>
+      <p:nvGrpSpPr>
+        <p:cNvPr id="1" name=""/>
+        <p:cNvGrpSpPr/>
+        <p:nvPr/>
+      </p:nvGrpSpPr>
+      <p:grpSpPr>
+        <a:xfrm>
+          <a:off x="0" y="0"/>
+          <a:ext cx="0" cy="0"/>
+          <a:chOff x="0" y="0"/>
+          <a:chExt cx="0" cy="0"/>
+        </a:xfrm>
+      </p:grpSpPr>
+      <p:sp>
+        <p:nvSpPr>
+          <p:cNvPr id="2" name="Titolo 1">
+            <a:extLst>
+              <a:ext uri="{FF2B5EF4-FFF2-40B4-BE49-F238E27FC236}">
+                <a16:creationId xmlns:a16="http://schemas.microsoft.com/office/drawing/2014/main" id="{0447D4BB-6529-4710-8705-90488E3EFB1B}"/>
+              </a:ext>
+            </a:extLst>
+          </p:cNvPr>
+          <p:cNvSpPr>
+            <a:spLocks noGrp="1"/>
+          </p:cNvSpPr>
+          <p:nvPr>
+            <p:ph type="title"/>
+          </p:nvPr>
+        </p:nvSpPr>
+        <p:spPr/>
+        <p:txBody>
+          <a:bodyPr/>
+          <a:lstStyle/>
+          <a:p>
+            <a:r>
+              <a:rPr lang="it-IT" dirty="0"/>
+              <a:t>No </a:t>
+            </a:r>
+            <a:r>
+              <a:rPr lang="it-IT" dirty="0" err="1"/>
+              <a:t>hardcoded</a:t>
+            </a:r>
+            <a:r>
+              <a:rPr lang="it-IT" dirty="0"/>
+              <a:t> password</a:t>
+            </a:r>
+          </a:p>
+        </p:txBody>
+      </p:sp>
+      <p:sp>
+        <p:nvSpPr>
+          <p:cNvPr id="3" name="Segnaposto contenuto 2">
+            <a:extLst>
+              <a:ext uri="{FF2B5EF4-FFF2-40B4-BE49-F238E27FC236}">
+                <a16:creationId xmlns:a16="http://schemas.microsoft.com/office/drawing/2014/main" id="{A2D3F60E-8942-48DD-9307-04056E0A6F35}"/>
+              </a:ext>
+            </a:extLst>
+          </p:cNvPr>
+          <p:cNvSpPr>
+            <a:spLocks noGrp="1"/>
+          </p:cNvSpPr>
+          <p:nvPr>
+            <p:ph idx="1"/>
+          </p:nvPr>
+        </p:nvSpPr>
+        <p:spPr/>
+        <p:txBody>
+          <a:bodyPr/>
+          <a:lstStyle/>
+          <a:p>
+            <a:endParaRPr lang="it-IT" dirty="0"/>
+          </a:p>
+        </p:txBody>
+      </p:sp>
+    </p:spTree>
+    <p:extLst>
+      <p:ext uri="{BB962C8B-B14F-4D97-AF65-F5344CB8AC3E}">
+        <p14:creationId xmlns:p14="http://schemas.microsoft.com/office/powerpoint/2010/main" val="1294985633"/>
+      </p:ext>
+    </p:extLst>
+  </p:cSld>
+  <p:clrMapOvr>
+    <a:masterClrMapping/>
+  </p:clrMapOvr>
+</p:sld>
+</file>
+
+<file path=ppt/slides/slide5.xml><?xml version="1.0" encoding="utf-8"?>
+<p:sld xmlns:a="http://schemas.openxmlformats.org/drawingml/2006/main" xmlns:r="http://schemas.openxmlformats.org/officeDocument/2006/relationships" xmlns:p="http://schemas.openxmlformats.org/presentationml/2006/main">
+  <p:cSld>
+    <p:spTree>
+      <p:nvGrpSpPr>
+        <p:cNvPr id="1" name=""/>
+        <p:cNvGrpSpPr/>
+        <p:nvPr/>
+      </p:nvGrpSpPr>
+      <p:grpSpPr>
+        <a:xfrm>
+          <a:off x="0" y="0"/>
+          <a:ext cx="0" cy="0"/>
+          <a:chOff x="0" y="0"/>
+          <a:chExt cx="0" cy="0"/>
+        </a:xfrm>
+      </p:grpSpPr>
+      <p:sp>
+        <p:nvSpPr>
+          <p:cNvPr id="2" name="Titolo 1">
+            <a:extLst>
+              <a:ext uri="{FF2B5EF4-FFF2-40B4-BE49-F238E27FC236}">
+                <a16:creationId xmlns:a16="http://schemas.microsoft.com/office/drawing/2014/main" id="{AF0CB0CF-B89A-4803-B903-F1DF454B0F50}"/>
+              </a:ext>
+            </a:extLst>
+          </p:cNvPr>
+          <p:cNvSpPr>
+            <a:spLocks noGrp="1"/>
+          </p:cNvSpPr>
+          <p:nvPr>
+            <p:ph type="title"/>
+          </p:nvPr>
+        </p:nvSpPr>
+        <p:spPr/>
+        <p:txBody>
+          <a:bodyPr/>
+          <a:lstStyle/>
+          <a:p>
+            <a:r>
+              <a:rPr lang="it-IT" dirty="0"/>
+              <a:t>SQL </a:t>
+            </a:r>
+            <a:r>
+              <a:rPr lang="it-IT" dirty="0" err="1"/>
+              <a:t>Injection</a:t>
+            </a:r>
+            <a:r>
+              <a:rPr lang="it-IT" dirty="0"/>
+              <a:t> </a:t>
+            </a:r>
+            <a:r>
+              <a:rPr lang="it-IT" dirty="0" err="1"/>
+              <a:t>Prevention</a:t>
+            </a:r>
+            <a:endParaRPr lang="it-IT" dirty="0"/>
+          </a:p>
+        </p:txBody>
+      </p:sp>
+      <p:sp>
+        <p:nvSpPr>
+          <p:cNvPr id="3" name="Segnaposto contenuto 2">
+            <a:extLst>
+              <a:ext uri="{FF2B5EF4-FFF2-40B4-BE49-F238E27FC236}">
+                <a16:creationId xmlns:a16="http://schemas.microsoft.com/office/drawing/2014/main" id="{962D3A82-B8F3-4A9D-B7FE-A246D898B7C3}"/>
+              </a:ext>
+            </a:extLst>
+          </p:cNvPr>
+          <p:cNvSpPr>
+            <a:spLocks noGrp="1"/>
+          </p:cNvSpPr>
+          <p:nvPr>
+            <p:ph idx="1"/>
+          </p:nvPr>
+        </p:nvSpPr>
+        <p:spPr/>
+        <p:txBody>
+          <a:bodyPr/>
+          <a:lstStyle/>
+          <a:p>
+            <a:endParaRPr lang="it-IT"/>
+          </a:p>
+        </p:txBody>
+      </p:sp>
+    </p:spTree>
+    <p:extLst>
+      <p:ext uri="{BB962C8B-B14F-4D97-AF65-F5344CB8AC3E}">
+        <p14:creationId xmlns:p14="http://schemas.microsoft.com/office/powerpoint/2010/main" val="3332312053"/>
+      </p:ext>
+    </p:extLst>
+  </p:cSld>
+  <p:clrMapOvr>
+    <a:masterClrMapping/>
+  </p:clrMapOvr>
+</p:sld>
+</file>
+
+<file path=ppt/slides/slide6.xml><?xml version="1.0" encoding="utf-8"?>
+<p:sld xmlns:a="http://schemas.openxmlformats.org/drawingml/2006/main" xmlns:r="http://schemas.openxmlformats.org/officeDocument/2006/relationships" xmlns:p="http://schemas.openxmlformats.org/presentationml/2006/main">
+  <p:cSld>
+    <p:spTree>
+      <p:nvGrpSpPr>
+        <p:cNvPr id="1" name=""/>
+        <p:cNvGrpSpPr/>
+        <p:nvPr/>
+      </p:nvGrpSpPr>
+      <p:grpSpPr>
+        <a:xfrm>
+          <a:off x="0" y="0"/>
+          <a:ext cx="0" cy="0"/>
+          <a:chOff x="0" y="0"/>
+          <a:chExt cx="0" cy="0"/>
+        </a:xfrm>
+      </p:grpSpPr>
+      <p:sp>
+        <p:nvSpPr>
+          <p:cNvPr id="2" name="Titolo 1">
+            <a:extLst>
+              <a:ext uri="{FF2B5EF4-FFF2-40B4-BE49-F238E27FC236}">
+                <a16:creationId xmlns:a16="http://schemas.microsoft.com/office/drawing/2014/main" id="{4576E730-FB43-429D-8482-5F52964B3452}"/>
+              </a:ext>
+            </a:extLst>
+          </p:cNvPr>
+          <p:cNvSpPr>
+            <a:spLocks noGrp="1"/>
+          </p:cNvSpPr>
+          <p:nvPr>
+            <p:ph type="ctrTitle"/>
+          </p:nvPr>
+        </p:nvSpPr>
+        <p:spPr/>
+        <p:txBody>
+          <a:bodyPr/>
+          <a:lstStyle/>
+          <a:p>
+            <a:r>
+              <a:rPr lang="it-IT" dirty="0"/>
+              <a:t>Password Management</a:t>
+            </a:r>
+          </a:p>
+        </p:txBody>
+      </p:sp>
+      <p:sp>
+        <p:nvSpPr>
+          <p:cNvPr id="3" name="Sottotitolo 2">
+            <a:extLst>
+              <a:ext uri="{FF2B5EF4-FFF2-40B4-BE49-F238E27FC236}">
+                <a16:creationId xmlns:a16="http://schemas.microsoft.com/office/drawing/2014/main" id="{8FB6FD50-6889-47AA-9FF4-ED8CB2899864}"/>
+              </a:ext>
+            </a:extLst>
+          </p:cNvPr>
+          <p:cNvSpPr>
+            <a:spLocks noGrp="1"/>
+          </p:cNvSpPr>
+          <p:nvPr>
+            <p:ph type="subTitle" idx="1"/>
+          </p:nvPr>
+        </p:nvSpPr>
+        <p:spPr/>
+        <p:txBody>
+          <a:bodyPr/>
+          <a:lstStyle/>
+          <a:p>
+            <a:endParaRPr lang="it-IT"/>
+          </a:p>
+        </p:txBody>
+      </p:sp>
+    </p:spTree>
+    <p:extLst>
+      <p:ext uri="{BB962C8B-B14F-4D97-AF65-F5344CB8AC3E}">
+        <p14:creationId xmlns:p14="http://schemas.microsoft.com/office/powerpoint/2010/main" val="1111496185"/>
+      </p:ext>
+    </p:extLst>
+  </p:cSld>
+  <p:clrMapOvr>
+    <a:masterClrMapping/>
+  </p:clrMapOvr>
+</p:sld>
+</file>
+
+<file path=ppt/slides/slide7.xml><?xml version="1.0" encoding="utf-8"?>
+<p:sld xmlns:a="http://schemas.openxmlformats.org/drawingml/2006/main" xmlns:r="http://schemas.openxmlformats.org/officeDocument/2006/relationships" xmlns:p="http://schemas.openxmlformats.org/presentationml/2006/main">
+  <p:cSld>
+    <p:spTree>
+      <p:nvGrpSpPr>
+        <p:cNvPr id="1" name=""/>
+        <p:cNvGrpSpPr/>
+        <p:nvPr/>
+      </p:nvGrpSpPr>
+      <p:grpSpPr>
+        <a:xfrm>
+          <a:off x="0" y="0"/>
+          <a:ext cx="0" cy="0"/>
+          <a:chOff x="0" y="0"/>
+          <a:chExt cx="0" cy="0"/>
+        </a:xfrm>
+      </p:grpSpPr>
+      <p:sp>
+        <p:nvSpPr>
+          <p:cNvPr id="2" name="Titolo 1">
+            <a:extLst>
+              <a:ext uri="{FF2B5EF4-FFF2-40B4-BE49-F238E27FC236}">
+                <a16:creationId xmlns:a16="http://schemas.microsoft.com/office/drawing/2014/main" id="{55A6B881-99C6-4A53-9887-C4CF7F81C98C}"/>
+              </a:ext>
+            </a:extLst>
+          </p:cNvPr>
+          <p:cNvSpPr>
+            <a:spLocks noGrp="1"/>
+          </p:cNvSpPr>
+          <p:nvPr>
+            <p:ph type="ctrTitle"/>
+          </p:nvPr>
+        </p:nvSpPr>
+        <p:spPr/>
+        <p:txBody>
+          <a:bodyPr/>
+          <a:lstStyle/>
+          <a:p>
+            <a:r>
+              <a:rPr lang="it-IT" dirty="0" err="1"/>
+              <a:t>Authentication</a:t>
+            </a:r>
+            <a:endParaRPr lang="it-IT" dirty="0"/>
+          </a:p>
+        </p:txBody>
+      </p:sp>
+      <p:sp>
+        <p:nvSpPr>
+          <p:cNvPr id="3" name="Sottotitolo 2">
+            <a:extLst>
+              <a:ext uri="{FF2B5EF4-FFF2-40B4-BE49-F238E27FC236}">
+                <a16:creationId xmlns:a16="http://schemas.microsoft.com/office/drawing/2014/main" id="{8D40AB1A-1C75-4E7E-B2F6-E36092B5E52F}"/>
+              </a:ext>
+            </a:extLst>
+          </p:cNvPr>
+          <p:cNvSpPr>
+            <a:spLocks noGrp="1"/>
+          </p:cNvSpPr>
+          <p:nvPr>
+            <p:ph type="subTitle" idx="1"/>
+          </p:nvPr>
+        </p:nvSpPr>
+        <p:spPr/>
+        <p:txBody>
+          <a:bodyPr/>
+          <a:lstStyle/>
+          <a:p>
+            <a:endParaRPr lang="it-IT"/>
+          </a:p>
+        </p:txBody>
+      </p:sp>
+    </p:spTree>
+    <p:extLst>
+      <p:ext uri="{BB962C8B-B14F-4D97-AF65-F5344CB8AC3E}">
+        <p14:creationId xmlns:p14="http://schemas.microsoft.com/office/powerpoint/2010/main" val="2828430958"/>
+      </p:ext>
+    </p:extLst>
+  </p:cSld>
+  <p:clrMapOvr>
+    <a:masterClrMapping/>
+  </p:clrMapOvr>
+</p:sld>
+</file>
+
+<file path=ppt/slides/slide8.xml><?xml version="1.0" encoding="utf-8"?>
+<p:sld xmlns:a="http://schemas.openxmlformats.org/drawingml/2006/main" xmlns:r="http://schemas.openxmlformats.org/officeDocument/2006/relationships" xmlns:p="http://schemas.openxmlformats.org/presentationml/2006/main">
+  <p:cSld>
+    <p:spTree>
+      <p:nvGrpSpPr>
+        <p:cNvPr id="1" name=""/>
+        <p:cNvGrpSpPr/>
+        <p:nvPr/>
+      </p:nvGrpSpPr>
+      <p:grpSpPr>
+        <a:xfrm>
+          <a:off x="0" y="0"/>
+          <a:ext cx="0" cy="0"/>
+          <a:chOff x="0" y="0"/>
+          <a:chExt cx="0" cy="0"/>
+        </a:xfrm>
+      </p:grpSpPr>
+      <p:sp>
+        <p:nvSpPr>
+          <p:cNvPr id="2" name="Titolo 1">
+            <a:extLst>
+              <a:ext uri="{FF2B5EF4-FFF2-40B4-BE49-F238E27FC236}">
+                <a16:creationId xmlns:a16="http://schemas.microsoft.com/office/drawing/2014/main" id="{46C691D0-7338-46F2-8ADD-28A06C048950}"/>
+              </a:ext>
+            </a:extLst>
+          </p:cNvPr>
+          <p:cNvSpPr>
+            <a:spLocks noGrp="1"/>
+          </p:cNvSpPr>
+          <p:nvPr>
+            <p:ph type="title"/>
+          </p:nvPr>
+        </p:nvSpPr>
+        <p:spPr/>
+        <p:txBody>
+          <a:bodyPr/>
+          <a:lstStyle/>
+          <a:p>
+            <a:r>
+              <a:rPr lang="it-IT" dirty="0" err="1"/>
+              <a:t>Authentication</a:t>
+            </a:r>
+            <a:endParaRPr lang="it-IT" dirty="0"/>
+          </a:p>
+        </p:txBody>
+      </p:sp>
+      <p:sp>
+        <p:nvSpPr>
+          <p:cNvPr id="3" name="Segnaposto contenuto 2">
+            <a:extLst>
+              <a:ext uri="{FF2B5EF4-FFF2-40B4-BE49-F238E27FC236}">
+                <a16:creationId xmlns:a16="http://schemas.microsoft.com/office/drawing/2014/main" id="{08C787D0-B8AB-4FE5-887B-27D8C44837BC}"/>
+              </a:ext>
+            </a:extLst>
+          </p:cNvPr>
+          <p:cNvSpPr>
+            <a:spLocks noGrp="1"/>
+          </p:cNvSpPr>
+          <p:nvPr>
+            <p:ph idx="1"/>
+          </p:nvPr>
+        </p:nvSpPr>
+        <p:spPr/>
+        <p:txBody>
+          <a:bodyPr/>
+          <a:lstStyle/>
+          <a:p>
+            <a:endParaRPr lang="it-IT"/>
+          </a:p>
+        </p:txBody>
+      </p:sp>
+    </p:spTree>
+    <p:extLst>
+      <p:ext uri="{BB962C8B-B14F-4D97-AF65-F5344CB8AC3E}">
+        <p14:creationId xmlns:p14="http://schemas.microsoft.com/office/powerpoint/2010/main" val="2618927754"/>
+      </p:ext>
+    </p:extLst>
+  </p:cSld>
+  <p:clrMapOvr>
+    <a:masterClrMapping/>
+  </p:clrMapOvr>
+</p:sld>
+</file>
+
+<file path=ppt/slides/slide9.xml><?xml version="1.0" encoding="utf-8"?>
+<p:sld xmlns:a="http://schemas.openxmlformats.org/drawingml/2006/main" xmlns:r="http://schemas.openxmlformats.org/officeDocument/2006/relationships" xmlns:p="http://schemas.openxmlformats.org/presentationml/2006/main">
+  <p:cSld>
+    <p:spTree>
+      <p:nvGrpSpPr>
+        <p:cNvPr id="1" name=""/>
+        <p:cNvGrpSpPr/>
+        <p:nvPr/>
+      </p:nvGrpSpPr>
+      <p:grpSpPr>
+        <a:xfrm>
+          <a:off x="0" y="0"/>
+          <a:ext cx="0" cy="0"/>
+          <a:chOff x="0" y="0"/>
+          <a:chExt cx="0" cy="0"/>
+        </a:xfrm>
+      </p:grpSpPr>
+      <p:sp>
+        <p:nvSpPr>
+          <p:cNvPr id="2" name="Titolo 1">
+            <a:extLst>
+              <a:ext uri="{FF2B5EF4-FFF2-40B4-BE49-F238E27FC236}">
+                <a16:creationId xmlns:a16="http://schemas.microsoft.com/office/drawing/2014/main" id="{B59E6DEA-D7A1-44D2-8559-89B730CE3681}"/>
+              </a:ext>
+            </a:extLst>
+          </p:cNvPr>
+          <p:cNvSpPr>
+            <a:spLocks noGrp="1"/>
+          </p:cNvSpPr>
+          <p:nvPr>
+            <p:ph type="ctrTitle"/>
+          </p:nvPr>
+        </p:nvSpPr>
+        <p:spPr/>
+        <p:txBody>
+          <a:bodyPr/>
+          <a:lstStyle/>
+          <a:p>
+            <a:r>
+              <a:rPr lang="it-IT" dirty="0" err="1"/>
+              <a:t>Final</a:t>
+            </a:r>
+            <a:r>
+              <a:rPr lang="it-IT" dirty="0"/>
+              <a:t> </a:t>
+            </a:r>
+            <a:r>
+              <a:rPr lang="it-IT" dirty="0" err="1"/>
+              <a:t>thoughts</a:t>
+            </a:r>
+            <a:endParaRPr lang="it-IT" dirty="0"/>
+          </a:p>
+        </p:txBody>
+      </p:sp>
+      <p:sp>
+        <p:nvSpPr>
+          <p:cNvPr id="3" name="Sottotitolo 2">
+            <a:extLst>
+              <a:ext uri="{FF2B5EF4-FFF2-40B4-BE49-F238E27FC236}">
+                <a16:creationId xmlns:a16="http://schemas.microsoft.com/office/drawing/2014/main" id="{83A8CAC3-1E41-4E08-84F1-50D0906D1288}"/>
+              </a:ext>
+            </a:extLst>
+          </p:cNvPr>
+          <p:cNvSpPr>
+            <a:spLocks noGrp="1"/>
+          </p:cNvSpPr>
+          <p:nvPr>
+            <p:ph type="subTitle" idx="1"/>
+          </p:nvPr>
+        </p:nvSpPr>
+        <p:spPr/>
+        <p:txBody>
+          <a:bodyPr/>
+          <a:lstStyle/>
+          <a:p>
+            <a:endParaRPr lang="it-IT"/>
+          </a:p>
+        </p:txBody>
+      </p:sp>
+    </p:spTree>
+    <p:extLst>
+      <p:ext uri="{BB962C8B-B14F-4D97-AF65-F5344CB8AC3E}">
+        <p14:creationId xmlns:p14="http://schemas.microsoft.com/office/powerpoint/2010/main" val="3978280543"/>
+      </p:ext>
+    </p:extLst>
+  </p:cSld>
+  <p:clrMapOvr>
+    <a:masterClrMapping/>
+  </p:clrMapOvr>
+</p:sld>
+</file>
+
 <file path=ppt/theme/theme1.xml><?xml version="1.0" encoding="utf-8"?>
 <a:theme xmlns:a="http://schemas.openxmlformats.org/drawingml/2006/main" name="Tema di Office">
   <a:themeElements>

</xml_diff>

<commit_message>
(+) Modifiche Path per macOS
</commit_message>
<xml_diff>
--- a/Documentazione e cose così/Slide_concettuali_Luca.pptx
+++ b/Documentazione e cose così/Slide_concettuali_Luca.pptx
@@ -147,7 +147,7 @@
           <p:cNvPr id="2" name="Titolo 1">
             <a:extLst>
               <a:ext uri="{FF2B5EF4-FFF2-40B4-BE49-F238E27FC236}">
-                <a16:creationId xmlns:a16="http://schemas.microsoft.com/office/drawing/2014/main" id="{408CE704-CEA2-4907-B072-425DC997E633}"/>
+                <a16:creationId xmlns:a16="http://schemas.microsoft.com/office/drawing/2014/main" xmlns="" id="{408CE704-CEA2-4907-B072-425DC997E633}"/>
               </a:ext>
             </a:extLst>
           </p:cNvPr>
@@ -184,7 +184,7 @@
           <p:cNvPr id="3" name="Sottotitolo 2">
             <a:extLst>
               <a:ext uri="{FF2B5EF4-FFF2-40B4-BE49-F238E27FC236}">
-                <a16:creationId xmlns:a16="http://schemas.microsoft.com/office/drawing/2014/main" id="{72334AFA-37D4-4C0A-BC0D-55D89FDB6098}"/>
+                <a16:creationId xmlns:a16="http://schemas.microsoft.com/office/drawing/2014/main" xmlns="" id="{72334AFA-37D4-4C0A-BC0D-55D89FDB6098}"/>
               </a:ext>
             </a:extLst>
           </p:cNvPr>
@@ -254,7 +254,7 @@
           <p:cNvPr id="4" name="Segnaposto data 3">
             <a:extLst>
               <a:ext uri="{FF2B5EF4-FFF2-40B4-BE49-F238E27FC236}">
-                <a16:creationId xmlns:a16="http://schemas.microsoft.com/office/drawing/2014/main" id="{496E04DE-41F8-4EB2-9CB1-C80C4F238181}"/>
+                <a16:creationId xmlns:a16="http://schemas.microsoft.com/office/drawing/2014/main" xmlns="" id="{496E04DE-41F8-4EB2-9CB1-C80C4F238181}"/>
               </a:ext>
             </a:extLst>
           </p:cNvPr>
@@ -272,7 +272,7 @@
           <a:p>
             <a:fld id="{957CAE98-D902-491D-97AE-B55C550A56C1}" type="datetimeFigureOut">
               <a:rPr lang="it-IT" smtClean="0"/>
-              <a:t>15/12/2017</a:t>
+              <a:t>15/12/17</a:t>
             </a:fld>
             <a:endParaRPr lang="it-IT"/>
           </a:p>
@@ -283,7 +283,7 @@
           <p:cNvPr id="5" name="Segnaposto piè di pagina 4">
             <a:extLst>
               <a:ext uri="{FF2B5EF4-FFF2-40B4-BE49-F238E27FC236}">
-                <a16:creationId xmlns:a16="http://schemas.microsoft.com/office/drawing/2014/main" id="{467C7F2E-B387-4E79-86D0-E4DD37897B24}"/>
+                <a16:creationId xmlns:a16="http://schemas.microsoft.com/office/drawing/2014/main" xmlns="" id="{467C7F2E-B387-4E79-86D0-E4DD37897B24}"/>
               </a:ext>
             </a:extLst>
           </p:cNvPr>
@@ -308,7 +308,7 @@
           <p:cNvPr id="6" name="Segnaposto numero diapositiva 5">
             <a:extLst>
               <a:ext uri="{FF2B5EF4-FFF2-40B4-BE49-F238E27FC236}">
-                <a16:creationId xmlns:a16="http://schemas.microsoft.com/office/drawing/2014/main" id="{19DBD51A-1616-4F84-959C-FBB4B03D0635}"/>
+                <a16:creationId xmlns:a16="http://schemas.microsoft.com/office/drawing/2014/main" xmlns="" id="{19DBD51A-1616-4F84-959C-FBB4B03D0635}"/>
               </a:ext>
             </a:extLst>
           </p:cNvPr>
@@ -326,7 +326,7 @@
           <a:p>
             <a:fld id="{AC948D56-5260-455E-99A3-8F552261A327}" type="slidenum">
               <a:rPr lang="it-IT" smtClean="0"/>
-              <a:t>‹N›</a:t>
+              <a:t>‹n.›</a:t>
             </a:fld>
             <a:endParaRPr lang="it-IT"/>
           </a:p>
@@ -367,7 +367,7 @@
           <p:cNvPr id="2" name="Titolo 1">
             <a:extLst>
               <a:ext uri="{FF2B5EF4-FFF2-40B4-BE49-F238E27FC236}">
-                <a16:creationId xmlns:a16="http://schemas.microsoft.com/office/drawing/2014/main" id="{5B7A822F-C7A8-4506-8970-5B7BCB5FF54C}"/>
+                <a16:creationId xmlns:a16="http://schemas.microsoft.com/office/drawing/2014/main" xmlns="" id="{5B7A822F-C7A8-4506-8970-5B7BCB5FF54C}"/>
               </a:ext>
             </a:extLst>
           </p:cNvPr>
@@ -395,7 +395,7 @@
           <p:cNvPr id="3" name="Segnaposto testo verticale 2">
             <a:extLst>
               <a:ext uri="{FF2B5EF4-FFF2-40B4-BE49-F238E27FC236}">
-                <a16:creationId xmlns:a16="http://schemas.microsoft.com/office/drawing/2014/main" id="{98CCDC1C-0622-43C7-A51B-9EF899887930}"/>
+                <a16:creationId xmlns:a16="http://schemas.microsoft.com/office/drawing/2014/main" xmlns="" id="{98CCDC1C-0622-43C7-A51B-9EF899887930}"/>
               </a:ext>
             </a:extLst>
           </p:cNvPr>
@@ -452,7 +452,7 @@
           <p:cNvPr id="4" name="Segnaposto data 3">
             <a:extLst>
               <a:ext uri="{FF2B5EF4-FFF2-40B4-BE49-F238E27FC236}">
-                <a16:creationId xmlns:a16="http://schemas.microsoft.com/office/drawing/2014/main" id="{C0048B42-BF74-4B7A-A3C9-06A13DE342C7}"/>
+                <a16:creationId xmlns:a16="http://schemas.microsoft.com/office/drawing/2014/main" xmlns="" id="{C0048B42-BF74-4B7A-A3C9-06A13DE342C7}"/>
               </a:ext>
             </a:extLst>
           </p:cNvPr>
@@ -470,7 +470,7 @@
           <a:p>
             <a:fld id="{957CAE98-D902-491D-97AE-B55C550A56C1}" type="datetimeFigureOut">
               <a:rPr lang="it-IT" smtClean="0"/>
-              <a:t>15/12/2017</a:t>
+              <a:t>15/12/17</a:t>
             </a:fld>
             <a:endParaRPr lang="it-IT"/>
           </a:p>
@@ -481,7 +481,7 @@
           <p:cNvPr id="5" name="Segnaposto piè di pagina 4">
             <a:extLst>
               <a:ext uri="{FF2B5EF4-FFF2-40B4-BE49-F238E27FC236}">
-                <a16:creationId xmlns:a16="http://schemas.microsoft.com/office/drawing/2014/main" id="{443C1878-EC48-4349-AE2F-D3F939C91C0D}"/>
+                <a16:creationId xmlns:a16="http://schemas.microsoft.com/office/drawing/2014/main" xmlns="" id="{443C1878-EC48-4349-AE2F-D3F939C91C0D}"/>
               </a:ext>
             </a:extLst>
           </p:cNvPr>
@@ -506,7 +506,7 @@
           <p:cNvPr id="6" name="Segnaposto numero diapositiva 5">
             <a:extLst>
               <a:ext uri="{FF2B5EF4-FFF2-40B4-BE49-F238E27FC236}">
-                <a16:creationId xmlns:a16="http://schemas.microsoft.com/office/drawing/2014/main" id="{4D143ABD-C8B5-4DC2-958E-6EBF0D7B5054}"/>
+                <a16:creationId xmlns:a16="http://schemas.microsoft.com/office/drawing/2014/main" xmlns="" id="{4D143ABD-C8B5-4DC2-958E-6EBF0D7B5054}"/>
               </a:ext>
             </a:extLst>
           </p:cNvPr>
@@ -524,7 +524,7 @@
           <a:p>
             <a:fld id="{AC948D56-5260-455E-99A3-8F552261A327}" type="slidenum">
               <a:rPr lang="it-IT" smtClean="0"/>
-              <a:t>‹N›</a:t>
+              <a:t>‹n.›</a:t>
             </a:fld>
             <a:endParaRPr lang="it-IT"/>
           </a:p>
@@ -565,7 +565,7 @@
           <p:cNvPr id="2" name="Titolo verticale 1">
             <a:extLst>
               <a:ext uri="{FF2B5EF4-FFF2-40B4-BE49-F238E27FC236}">
-                <a16:creationId xmlns:a16="http://schemas.microsoft.com/office/drawing/2014/main" id="{3E653602-85A6-4A12-8C24-F1BAF11E2932}"/>
+                <a16:creationId xmlns:a16="http://schemas.microsoft.com/office/drawing/2014/main" xmlns="" id="{3E653602-85A6-4A12-8C24-F1BAF11E2932}"/>
               </a:ext>
             </a:extLst>
           </p:cNvPr>
@@ -598,7 +598,7 @@
           <p:cNvPr id="3" name="Segnaposto testo verticale 2">
             <a:extLst>
               <a:ext uri="{FF2B5EF4-FFF2-40B4-BE49-F238E27FC236}">
-                <a16:creationId xmlns:a16="http://schemas.microsoft.com/office/drawing/2014/main" id="{950161B2-B371-4978-B8E8-5C1F55C7693A}"/>
+                <a16:creationId xmlns:a16="http://schemas.microsoft.com/office/drawing/2014/main" xmlns="" id="{950161B2-B371-4978-B8E8-5C1F55C7693A}"/>
               </a:ext>
             </a:extLst>
           </p:cNvPr>
@@ -660,7 +660,7 @@
           <p:cNvPr id="4" name="Segnaposto data 3">
             <a:extLst>
               <a:ext uri="{FF2B5EF4-FFF2-40B4-BE49-F238E27FC236}">
-                <a16:creationId xmlns:a16="http://schemas.microsoft.com/office/drawing/2014/main" id="{DBA71A77-3992-453B-A49A-1318AC41C819}"/>
+                <a16:creationId xmlns:a16="http://schemas.microsoft.com/office/drawing/2014/main" xmlns="" id="{DBA71A77-3992-453B-A49A-1318AC41C819}"/>
               </a:ext>
             </a:extLst>
           </p:cNvPr>
@@ -678,7 +678,7 @@
           <a:p>
             <a:fld id="{957CAE98-D902-491D-97AE-B55C550A56C1}" type="datetimeFigureOut">
               <a:rPr lang="it-IT" smtClean="0"/>
-              <a:t>15/12/2017</a:t>
+              <a:t>15/12/17</a:t>
             </a:fld>
             <a:endParaRPr lang="it-IT"/>
           </a:p>
@@ -689,7 +689,7 @@
           <p:cNvPr id="5" name="Segnaposto piè di pagina 4">
             <a:extLst>
               <a:ext uri="{FF2B5EF4-FFF2-40B4-BE49-F238E27FC236}">
-                <a16:creationId xmlns:a16="http://schemas.microsoft.com/office/drawing/2014/main" id="{B9BF0AA1-4105-40C5-A57C-15E5C3962CBA}"/>
+                <a16:creationId xmlns:a16="http://schemas.microsoft.com/office/drawing/2014/main" xmlns="" id="{B9BF0AA1-4105-40C5-A57C-15E5C3962CBA}"/>
               </a:ext>
             </a:extLst>
           </p:cNvPr>
@@ -714,7 +714,7 @@
           <p:cNvPr id="6" name="Segnaposto numero diapositiva 5">
             <a:extLst>
               <a:ext uri="{FF2B5EF4-FFF2-40B4-BE49-F238E27FC236}">
-                <a16:creationId xmlns:a16="http://schemas.microsoft.com/office/drawing/2014/main" id="{BE6759FA-9E8F-405F-83E4-A034EAD233DF}"/>
+                <a16:creationId xmlns:a16="http://schemas.microsoft.com/office/drawing/2014/main" xmlns="" id="{BE6759FA-9E8F-405F-83E4-A034EAD233DF}"/>
               </a:ext>
             </a:extLst>
           </p:cNvPr>
@@ -732,7 +732,7 @@
           <a:p>
             <a:fld id="{AC948D56-5260-455E-99A3-8F552261A327}" type="slidenum">
               <a:rPr lang="it-IT" smtClean="0"/>
-              <a:t>‹N›</a:t>
+              <a:t>‹n.›</a:t>
             </a:fld>
             <a:endParaRPr lang="it-IT"/>
           </a:p>
@@ -773,7 +773,7 @@
           <p:cNvPr id="2" name="Titolo 1">
             <a:extLst>
               <a:ext uri="{FF2B5EF4-FFF2-40B4-BE49-F238E27FC236}">
-                <a16:creationId xmlns:a16="http://schemas.microsoft.com/office/drawing/2014/main" id="{11090758-0F68-4D05-AA3C-5F7F69C7C75B}"/>
+                <a16:creationId xmlns:a16="http://schemas.microsoft.com/office/drawing/2014/main" xmlns="" id="{11090758-0F68-4D05-AA3C-5F7F69C7C75B}"/>
               </a:ext>
             </a:extLst>
           </p:cNvPr>
@@ -801,7 +801,7 @@
           <p:cNvPr id="3" name="Segnaposto contenuto 2">
             <a:extLst>
               <a:ext uri="{FF2B5EF4-FFF2-40B4-BE49-F238E27FC236}">
-                <a16:creationId xmlns:a16="http://schemas.microsoft.com/office/drawing/2014/main" id="{00C8272A-BC87-42F1-93F4-4945468D8D6E}"/>
+                <a16:creationId xmlns:a16="http://schemas.microsoft.com/office/drawing/2014/main" xmlns="" id="{00C8272A-BC87-42F1-93F4-4945468D8D6E}"/>
               </a:ext>
             </a:extLst>
           </p:cNvPr>
@@ -858,7 +858,7 @@
           <p:cNvPr id="4" name="Segnaposto data 3">
             <a:extLst>
               <a:ext uri="{FF2B5EF4-FFF2-40B4-BE49-F238E27FC236}">
-                <a16:creationId xmlns:a16="http://schemas.microsoft.com/office/drawing/2014/main" id="{6C084C2D-1FC6-4B00-BC18-4AC3A840FFF3}"/>
+                <a16:creationId xmlns:a16="http://schemas.microsoft.com/office/drawing/2014/main" xmlns="" id="{6C084C2D-1FC6-4B00-BC18-4AC3A840FFF3}"/>
               </a:ext>
             </a:extLst>
           </p:cNvPr>
@@ -876,7 +876,7 @@
           <a:p>
             <a:fld id="{957CAE98-D902-491D-97AE-B55C550A56C1}" type="datetimeFigureOut">
               <a:rPr lang="it-IT" smtClean="0"/>
-              <a:t>15/12/2017</a:t>
+              <a:t>15/12/17</a:t>
             </a:fld>
             <a:endParaRPr lang="it-IT"/>
           </a:p>
@@ -887,7 +887,7 @@
           <p:cNvPr id="5" name="Segnaposto piè di pagina 4">
             <a:extLst>
               <a:ext uri="{FF2B5EF4-FFF2-40B4-BE49-F238E27FC236}">
-                <a16:creationId xmlns:a16="http://schemas.microsoft.com/office/drawing/2014/main" id="{277E0060-FC1C-43F9-957C-3FF51AFD771C}"/>
+                <a16:creationId xmlns:a16="http://schemas.microsoft.com/office/drawing/2014/main" xmlns="" id="{277E0060-FC1C-43F9-957C-3FF51AFD771C}"/>
               </a:ext>
             </a:extLst>
           </p:cNvPr>
@@ -912,7 +912,7 @@
           <p:cNvPr id="6" name="Segnaposto numero diapositiva 5">
             <a:extLst>
               <a:ext uri="{FF2B5EF4-FFF2-40B4-BE49-F238E27FC236}">
-                <a16:creationId xmlns:a16="http://schemas.microsoft.com/office/drawing/2014/main" id="{F67F36EA-2F4A-4C6D-884D-805FEB4F9FFB}"/>
+                <a16:creationId xmlns:a16="http://schemas.microsoft.com/office/drawing/2014/main" xmlns="" id="{F67F36EA-2F4A-4C6D-884D-805FEB4F9FFB}"/>
               </a:ext>
             </a:extLst>
           </p:cNvPr>
@@ -930,7 +930,7 @@
           <a:p>
             <a:fld id="{AC948D56-5260-455E-99A3-8F552261A327}" type="slidenum">
               <a:rPr lang="it-IT" smtClean="0"/>
-              <a:t>‹N›</a:t>
+              <a:t>‹n.›</a:t>
             </a:fld>
             <a:endParaRPr lang="it-IT"/>
           </a:p>
@@ -971,7 +971,7 @@
           <p:cNvPr id="2" name="Titolo 1">
             <a:extLst>
               <a:ext uri="{FF2B5EF4-FFF2-40B4-BE49-F238E27FC236}">
-                <a16:creationId xmlns:a16="http://schemas.microsoft.com/office/drawing/2014/main" id="{E5587115-300C-4B7D-847C-14E2FEAFD9D1}"/>
+                <a16:creationId xmlns:a16="http://schemas.microsoft.com/office/drawing/2014/main" xmlns="" id="{E5587115-300C-4B7D-847C-14E2FEAFD9D1}"/>
               </a:ext>
             </a:extLst>
           </p:cNvPr>
@@ -1008,7 +1008,7 @@
           <p:cNvPr id="3" name="Segnaposto testo 2">
             <a:extLst>
               <a:ext uri="{FF2B5EF4-FFF2-40B4-BE49-F238E27FC236}">
-                <a16:creationId xmlns:a16="http://schemas.microsoft.com/office/drawing/2014/main" id="{725EB242-80EF-4122-A179-4324A3653B77}"/>
+                <a16:creationId xmlns:a16="http://schemas.microsoft.com/office/drawing/2014/main" xmlns="" id="{725EB242-80EF-4122-A179-4324A3653B77}"/>
               </a:ext>
             </a:extLst>
           </p:cNvPr>
@@ -1133,7 +1133,7 @@
           <p:cNvPr id="4" name="Segnaposto data 3">
             <a:extLst>
               <a:ext uri="{FF2B5EF4-FFF2-40B4-BE49-F238E27FC236}">
-                <a16:creationId xmlns:a16="http://schemas.microsoft.com/office/drawing/2014/main" id="{35981CD2-A37A-4AC9-8EDD-1E27C29FA5C5}"/>
+                <a16:creationId xmlns:a16="http://schemas.microsoft.com/office/drawing/2014/main" xmlns="" id="{35981CD2-A37A-4AC9-8EDD-1E27C29FA5C5}"/>
               </a:ext>
             </a:extLst>
           </p:cNvPr>
@@ -1151,7 +1151,7 @@
           <a:p>
             <a:fld id="{957CAE98-D902-491D-97AE-B55C550A56C1}" type="datetimeFigureOut">
               <a:rPr lang="it-IT" smtClean="0"/>
-              <a:t>15/12/2017</a:t>
+              <a:t>15/12/17</a:t>
             </a:fld>
             <a:endParaRPr lang="it-IT"/>
           </a:p>
@@ -1162,7 +1162,7 @@
           <p:cNvPr id="5" name="Segnaposto piè di pagina 4">
             <a:extLst>
               <a:ext uri="{FF2B5EF4-FFF2-40B4-BE49-F238E27FC236}">
-                <a16:creationId xmlns:a16="http://schemas.microsoft.com/office/drawing/2014/main" id="{47FD5418-B0F7-4F0D-8B91-19944E238B71}"/>
+                <a16:creationId xmlns:a16="http://schemas.microsoft.com/office/drawing/2014/main" xmlns="" id="{47FD5418-B0F7-4F0D-8B91-19944E238B71}"/>
               </a:ext>
             </a:extLst>
           </p:cNvPr>
@@ -1187,7 +1187,7 @@
           <p:cNvPr id="6" name="Segnaposto numero diapositiva 5">
             <a:extLst>
               <a:ext uri="{FF2B5EF4-FFF2-40B4-BE49-F238E27FC236}">
-                <a16:creationId xmlns:a16="http://schemas.microsoft.com/office/drawing/2014/main" id="{746E9461-A128-4D90-89A8-EEFBDA80D4F3}"/>
+                <a16:creationId xmlns:a16="http://schemas.microsoft.com/office/drawing/2014/main" xmlns="" id="{746E9461-A128-4D90-89A8-EEFBDA80D4F3}"/>
               </a:ext>
             </a:extLst>
           </p:cNvPr>
@@ -1205,7 +1205,7 @@
           <a:p>
             <a:fld id="{AC948D56-5260-455E-99A3-8F552261A327}" type="slidenum">
               <a:rPr lang="it-IT" smtClean="0"/>
-              <a:t>‹N›</a:t>
+              <a:t>‹n.›</a:t>
             </a:fld>
             <a:endParaRPr lang="it-IT"/>
           </a:p>
@@ -1246,7 +1246,7 @@
           <p:cNvPr id="2" name="Titolo 1">
             <a:extLst>
               <a:ext uri="{FF2B5EF4-FFF2-40B4-BE49-F238E27FC236}">
-                <a16:creationId xmlns:a16="http://schemas.microsoft.com/office/drawing/2014/main" id="{98B10222-626C-4CA2-91D9-081649DCF63A}"/>
+                <a16:creationId xmlns:a16="http://schemas.microsoft.com/office/drawing/2014/main" xmlns="" id="{98B10222-626C-4CA2-91D9-081649DCF63A}"/>
               </a:ext>
             </a:extLst>
           </p:cNvPr>
@@ -1274,7 +1274,7 @@
           <p:cNvPr id="3" name="Segnaposto contenuto 2">
             <a:extLst>
               <a:ext uri="{FF2B5EF4-FFF2-40B4-BE49-F238E27FC236}">
-                <a16:creationId xmlns:a16="http://schemas.microsoft.com/office/drawing/2014/main" id="{35F72902-799B-4BA9-9A61-7D1D2C05EAF6}"/>
+                <a16:creationId xmlns:a16="http://schemas.microsoft.com/office/drawing/2014/main" xmlns="" id="{35F72902-799B-4BA9-9A61-7D1D2C05EAF6}"/>
               </a:ext>
             </a:extLst>
           </p:cNvPr>
@@ -1336,7 +1336,7 @@
           <p:cNvPr id="4" name="Segnaposto contenuto 3">
             <a:extLst>
               <a:ext uri="{FF2B5EF4-FFF2-40B4-BE49-F238E27FC236}">
-                <a16:creationId xmlns:a16="http://schemas.microsoft.com/office/drawing/2014/main" id="{802279B6-4D8B-4845-A91B-420AD569796C}"/>
+                <a16:creationId xmlns:a16="http://schemas.microsoft.com/office/drawing/2014/main" xmlns="" id="{802279B6-4D8B-4845-A91B-420AD569796C}"/>
               </a:ext>
             </a:extLst>
           </p:cNvPr>
@@ -1398,7 +1398,7 @@
           <p:cNvPr id="5" name="Segnaposto data 4">
             <a:extLst>
               <a:ext uri="{FF2B5EF4-FFF2-40B4-BE49-F238E27FC236}">
-                <a16:creationId xmlns:a16="http://schemas.microsoft.com/office/drawing/2014/main" id="{2A909587-A500-40E1-BFDC-8200DF559BB4}"/>
+                <a16:creationId xmlns:a16="http://schemas.microsoft.com/office/drawing/2014/main" xmlns="" id="{2A909587-A500-40E1-BFDC-8200DF559BB4}"/>
               </a:ext>
             </a:extLst>
           </p:cNvPr>
@@ -1416,7 +1416,7 @@
           <a:p>
             <a:fld id="{957CAE98-D902-491D-97AE-B55C550A56C1}" type="datetimeFigureOut">
               <a:rPr lang="it-IT" smtClean="0"/>
-              <a:t>15/12/2017</a:t>
+              <a:t>15/12/17</a:t>
             </a:fld>
             <a:endParaRPr lang="it-IT"/>
           </a:p>
@@ -1427,7 +1427,7 @@
           <p:cNvPr id="6" name="Segnaposto piè di pagina 5">
             <a:extLst>
               <a:ext uri="{FF2B5EF4-FFF2-40B4-BE49-F238E27FC236}">
-                <a16:creationId xmlns:a16="http://schemas.microsoft.com/office/drawing/2014/main" id="{C889707F-A631-4BB0-BB75-53116E8D51B9}"/>
+                <a16:creationId xmlns:a16="http://schemas.microsoft.com/office/drawing/2014/main" xmlns="" id="{C889707F-A631-4BB0-BB75-53116E8D51B9}"/>
               </a:ext>
             </a:extLst>
           </p:cNvPr>
@@ -1452,7 +1452,7 @@
           <p:cNvPr id="7" name="Segnaposto numero diapositiva 6">
             <a:extLst>
               <a:ext uri="{FF2B5EF4-FFF2-40B4-BE49-F238E27FC236}">
-                <a16:creationId xmlns:a16="http://schemas.microsoft.com/office/drawing/2014/main" id="{2AF2DBE7-4B61-4F64-9E21-30E321C62193}"/>
+                <a16:creationId xmlns:a16="http://schemas.microsoft.com/office/drawing/2014/main" xmlns="" id="{2AF2DBE7-4B61-4F64-9E21-30E321C62193}"/>
               </a:ext>
             </a:extLst>
           </p:cNvPr>
@@ -1470,7 +1470,7 @@
           <a:p>
             <a:fld id="{AC948D56-5260-455E-99A3-8F552261A327}" type="slidenum">
               <a:rPr lang="it-IT" smtClean="0"/>
-              <a:t>‹N›</a:t>
+              <a:t>‹n.›</a:t>
             </a:fld>
             <a:endParaRPr lang="it-IT"/>
           </a:p>
@@ -1511,7 +1511,7 @@
           <p:cNvPr id="2" name="Titolo 1">
             <a:extLst>
               <a:ext uri="{FF2B5EF4-FFF2-40B4-BE49-F238E27FC236}">
-                <a16:creationId xmlns:a16="http://schemas.microsoft.com/office/drawing/2014/main" id="{ECBD310A-5ECC-4BE1-AF4F-FCBAF843A391}"/>
+                <a16:creationId xmlns:a16="http://schemas.microsoft.com/office/drawing/2014/main" xmlns="" id="{ECBD310A-5ECC-4BE1-AF4F-FCBAF843A391}"/>
               </a:ext>
             </a:extLst>
           </p:cNvPr>
@@ -1544,7 +1544,7 @@
           <p:cNvPr id="3" name="Segnaposto testo 2">
             <a:extLst>
               <a:ext uri="{FF2B5EF4-FFF2-40B4-BE49-F238E27FC236}">
-                <a16:creationId xmlns:a16="http://schemas.microsoft.com/office/drawing/2014/main" id="{B699B9B4-ED7D-4970-95BF-D4A325C1136D}"/>
+                <a16:creationId xmlns:a16="http://schemas.microsoft.com/office/drawing/2014/main" xmlns="" id="{B699B9B4-ED7D-4970-95BF-D4A325C1136D}"/>
               </a:ext>
             </a:extLst>
           </p:cNvPr>
@@ -1615,7 +1615,7 @@
           <p:cNvPr id="4" name="Segnaposto contenuto 3">
             <a:extLst>
               <a:ext uri="{FF2B5EF4-FFF2-40B4-BE49-F238E27FC236}">
-                <a16:creationId xmlns:a16="http://schemas.microsoft.com/office/drawing/2014/main" id="{14D8FBE6-363F-43E1-8E41-483C2F8B4A14}"/>
+                <a16:creationId xmlns:a16="http://schemas.microsoft.com/office/drawing/2014/main" xmlns="" id="{14D8FBE6-363F-43E1-8E41-483C2F8B4A14}"/>
               </a:ext>
             </a:extLst>
           </p:cNvPr>
@@ -1677,7 +1677,7 @@
           <p:cNvPr id="5" name="Segnaposto testo 4">
             <a:extLst>
               <a:ext uri="{FF2B5EF4-FFF2-40B4-BE49-F238E27FC236}">
-                <a16:creationId xmlns:a16="http://schemas.microsoft.com/office/drawing/2014/main" id="{B4B3F3AE-1421-475A-B754-761FC6AC15FA}"/>
+                <a16:creationId xmlns:a16="http://schemas.microsoft.com/office/drawing/2014/main" xmlns="" id="{B4B3F3AE-1421-475A-B754-761FC6AC15FA}"/>
               </a:ext>
             </a:extLst>
           </p:cNvPr>
@@ -1748,7 +1748,7 @@
           <p:cNvPr id="6" name="Segnaposto contenuto 5">
             <a:extLst>
               <a:ext uri="{FF2B5EF4-FFF2-40B4-BE49-F238E27FC236}">
-                <a16:creationId xmlns:a16="http://schemas.microsoft.com/office/drawing/2014/main" id="{6ED66CBC-2785-457C-B197-F2F83EF200C8}"/>
+                <a16:creationId xmlns:a16="http://schemas.microsoft.com/office/drawing/2014/main" xmlns="" id="{6ED66CBC-2785-457C-B197-F2F83EF200C8}"/>
               </a:ext>
             </a:extLst>
           </p:cNvPr>
@@ -1810,7 +1810,7 @@
           <p:cNvPr id="7" name="Segnaposto data 6">
             <a:extLst>
               <a:ext uri="{FF2B5EF4-FFF2-40B4-BE49-F238E27FC236}">
-                <a16:creationId xmlns:a16="http://schemas.microsoft.com/office/drawing/2014/main" id="{1E5D5D63-44D3-4F0F-854A-DFAC7DDFBCA9}"/>
+                <a16:creationId xmlns:a16="http://schemas.microsoft.com/office/drawing/2014/main" xmlns="" id="{1E5D5D63-44D3-4F0F-854A-DFAC7DDFBCA9}"/>
               </a:ext>
             </a:extLst>
           </p:cNvPr>
@@ -1828,7 +1828,7 @@
           <a:p>
             <a:fld id="{957CAE98-D902-491D-97AE-B55C550A56C1}" type="datetimeFigureOut">
               <a:rPr lang="it-IT" smtClean="0"/>
-              <a:t>15/12/2017</a:t>
+              <a:t>15/12/17</a:t>
             </a:fld>
             <a:endParaRPr lang="it-IT"/>
           </a:p>
@@ -1839,7 +1839,7 @@
           <p:cNvPr id="8" name="Segnaposto piè di pagina 7">
             <a:extLst>
               <a:ext uri="{FF2B5EF4-FFF2-40B4-BE49-F238E27FC236}">
-                <a16:creationId xmlns:a16="http://schemas.microsoft.com/office/drawing/2014/main" id="{CFDEB6BC-6FB5-48E4-AA64-5C4B0C3E04FA}"/>
+                <a16:creationId xmlns:a16="http://schemas.microsoft.com/office/drawing/2014/main" xmlns="" id="{CFDEB6BC-6FB5-48E4-AA64-5C4B0C3E04FA}"/>
               </a:ext>
             </a:extLst>
           </p:cNvPr>
@@ -1864,7 +1864,7 @@
           <p:cNvPr id="9" name="Segnaposto numero diapositiva 8">
             <a:extLst>
               <a:ext uri="{FF2B5EF4-FFF2-40B4-BE49-F238E27FC236}">
-                <a16:creationId xmlns:a16="http://schemas.microsoft.com/office/drawing/2014/main" id="{6C331661-429F-466E-82C4-DBF79966C347}"/>
+                <a16:creationId xmlns:a16="http://schemas.microsoft.com/office/drawing/2014/main" xmlns="" id="{6C331661-429F-466E-82C4-DBF79966C347}"/>
               </a:ext>
             </a:extLst>
           </p:cNvPr>
@@ -1882,7 +1882,7 @@
           <a:p>
             <a:fld id="{AC948D56-5260-455E-99A3-8F552261A327}" type="slidenum">
               <a:rPr lang="it-IT" smtClean="0"/>
-              <a:t>‹N›</a:t>
+              <a:t>‹n.›</a:t>
             </a:fld>
             <a:endParaRPr lang="it-IT"/>
           </a:p>
@@ -1923,7 +1923,7 @@
           <p:cNvPr id="2" name="Titolo 1">
             <a:extLst>
               <a:ext uri="{FF2B5EF4-FFF2-40B4-BE49-F238E27FC236}">
-                <a16:creationId xmlns:a16="http://schemas.microsoft.com/office/drawing/2014/main" id="{475C54C2-4386-487B-B15A-6F7F55B81C0A}"/>
+                <a16:creationId xmlns:a16="http://schemas.microsoft.com/office/drawing/2014/main" xmlns="" id="{475C54C2-4386-487B-B15A-6F7F55B81C0A}"/>
               </a:ext>
             </a:extLst>
           </p:cNvPr>
@@ -1951,7 +1951,7 @@
           <p:cNvPr id="3" name="Segnaposto data 2">
             <a:extLst>
               <a:ext uri="{FF2B5EF4-FFF2-40B4-BE49-F238E27FC236}">
-                <a16:creationId xmlns:a16="http://schemas.microsoft.com/office/drawing/2014/main" id="{56EE0983-3580-4261-A373-362E962174D1}"/>
+                <a16:creationId xmlns:a16="http://schemas.microsoft.com/office/drawing/2014/main" xmlns="" id="{56EE0983-3580-4261-A373-362E962174D1}"/>
               </a:ext>
             </a:extLst>
           </p:cNvPr>
@@ -1969,7 +1969,7 @@
           <a:p>
             <a:fld id="{957CAE98-D902-491D-97AE-B55C550A56C1}" type="datetimeFigureOut">
               <a:rPr lang="it-IT" smtClean="0"/>
-              <a:t>15/12/2017</a:t>
+              <a:t>15/12/17</a:t>
             </a:fld>
             <a:endParaRPr lang="it-IT"/>
           </a:p>
@@ -1980,7 +1980,7 @@
           <p:cNvPr id="4" name="Segnaposto piè di pagina 3">
             <a:extLst>
               <a:ext uri="{FF2B5EF4-FFF2-40B4-BE49-F238E27FC236}">
-                <a16:creationId xmlns:a16="http://schemas.microsoft.com/office/drawing/2014/main" id="{1192DBE1-33FB-4D4C-8941-EB8A7979DE63}"/>
+                <a16:creationId xmlns:a16="http://schemas.microsoft.com/office/drawing/2014/main" xmlns="" id="{1192DBE1-33FB-4D4C-8941-EB8A7979DE63}"/>
               </a:ext>
             </a:extLst>
           </p:cNvPr>
@@ -2005,7 +2005,7 @@
           <p:cNvPr id="5" name="Segnaposto numero diapositiva 4">
             <a:extLst>
               <a:ext uri="{FF2B5EF4-FFF2-40B4-BE49-F238E27FC236}">
-                <a16:creationId xmlns:a16="http://schemas.microsoft.com/office/drawing/2014/main" id="{C4E2EA13-87D6-4661-A831-D5A85D6BF627}"/>
+                <a16:creationId xmlns:a16="http://schemas.microsoft.com/office/drawing/2014/main" xmlns="" id="{C4E2EA13-87D6-4661-A831-D5A85D6BF627}"/>
               </a:ext>
             </a:extLst>
           </p:cNvPr>
@@ -2023,7 +2023,7 @@
           <a:p>
             <a:fld id="{AC948D56-5260-455E-99A3-8F552261A327}" type="slidenum">
               <a:rPr lang="it-IT" smtClean="0"/>
-              <a:t>‹N›</a:t>
+              <a:t>‹n.›</a:t>
             </a:fld>
             <a:endParaRPr lang="it-IT"/>
           </a:p>
@@ -2064,7 +2064,7 @@
           <p:cNvPr id="2" name="Segnaposto data 1">
             <a:extLst>
               <a:ext uri="{FF2B5EF4-FFF2-40B4-BE49-F238E27FC236}">
-                <a16:creationId xmlns:a16="http://schemas.microsoft.com/office/drawing/2014/main" id="{001DA838-00E6-4B87-91DC-AAA800A3B64F}"/>
+                <a16:creationId xmlns:a16="http://schemas.microsoft.com/office/drawing/2014/main" xmlns="" id="{001DA838-00E6-4B87-91DC-AAA800A3B64F}"/>
               </a:ext>
             </a:extLst>
           </p:cNvPr>
@@ -2082,7 +2082,7 @@
           <a:p>
             <a:fld id="{957CAE98-D902-491D-97AE-B55C550A56C1}" type="datetimeFigureOut">
               <a:rPr lang="it-IT" smtClean="0"/>
-              <a:t>15/12/2017</a:t>
+              <a:t>15/12/17</a:t>
             </a:fld>
             <a:endParaRPr lang="it-IT"/>
           </a:p>
@@ -2093,7 +2093,7 @@
           <p:cNvPr id="3" name="Segnaposto piè di pagina 2">
             <a:extLst>
               <a:ext uri="{FF2B5EF4-FFF2-40B4-BE49-F238E27FC236}">
-                <a16:creationId xmlns:a16="http://schemas.microsoft.com/office/drawing/2014/main" id="{081E0345-54D2-41EE-9A63-9918C4BF37BE}"/>
+                <a16:creationId xmlns:a16="http://schemas.microsoft.com/office/drawing/2014/main" xmlns="" id="{081E0345-54D2-41EE-9A63-9918C4BF37BE}"/>
               </a:ext>
             </a:extLst>
           </p:cNvPr>
@@ -2118,7 +2118,7 @@
           <p:cNvPr id="4" name="Segnaposto numero diapositiva 3">
             <a:extLst>
               <a:ext uri="{FF2B5EF4-FFF2-40B4-BE49-F238E27FC236}">
-                <a16:creationId xmlns:a16="http://schemas.microsoft.com/office/drawing/2014/main" id="{C539DBB5-CDA8-4030-B49B-9600D2D1FACE}"/>
+                <a16:creationId xmlns:a16="http://schemas.microsoft.com/office/drawing/2014/main" xmlns="" id="{C539DBB5-CDA8-4030-B49B-9600D2D1FACE}"/>
               </a:ext>
             </a:extLst>
           </p:cNvPr>
@@ -2136,7 +2136,7 @@
           <a:p>
             <a:fld id="{AC948D56-5260-455E-99A3-8F552261A327}" type="slidenum">
               <a:rPr lang="it-IT" smtClean="0"/>
-              <a:t>‹N›</a:t>
+              <a:t>‹n.›</a:t>
             </a:fld>
             <a:endParaRPr lang="it-IT"/>
           </a:p>
@@ -2177,7 +2177,7 @@
           <p:cNvPr id="2" name="Titolo 1">
             <a:extLst>
               <a:ext uri="{FF2B5EF4-FFF2-40B4-BE49-F238E27FC236}">
-                <a16:creationId xmlns:a16="http://schemas.microsoft.com/office/drawing/2014/main" id="{6E8F959E-D111-47BE-A79A-AE3C01FD48E4}"/>
+                <a16:creationId xmlns:a16="http://schemas.microsoft.com/office/drawing/2014/main" xmlns="" id="{6E8F959E-D111-47BE-A79A-AE3C01FD48E4}"/>
               </a:ext>
             </a:extLst>
           </p:cNvPr>
@@ -2214,7 +2214,7 @@
           <p:cNvPr id="3" name="Segnaposto contenuto 2">
             <a:extLst>
               <a:ext uri="{FF2B5EF4-FFF2-40B4-BE49-F238E27FC236}">
-                <a16:creationId xmlns:a16="http://schemas.microsoft.com/office/drawing/2014/main" id="{705144FF-85B1-46A0-97B8-A92B54BA0DC9}"/>
+                <a16:creationId xmlns:a16="http://schemas.microsoft.com/office/drawing/2014/main" xmlns="" id="{705144FF-85B1-46A0-97B8-A92B54BA0DC9}"/>
               </a:ext>
             </a:extLst>
           </p:cNvPr>
@@ -2304,7 +2304,7 @@
           <p:cNvPr id="4" name="Segnaposto testo 3">
             <a:extLst>
               <a:ext uri="{FF2B5EF4-FFF2-40B4-BE49-F238E27FC236}">
-                <a16:creationId xmlns:a16="http://schemas.microsoft.com/office/drawing/2014/main" id="{0013F04B-62F5-4A98-8DC8-43D34CF7F901}"/>
+                <a16:creationId xmlns:a16="http://schemas.microsoft.com/office/drawing/2014/main" xmlns="" id="{0013F04B-62F5-4A98-8DC8-43D34CF7F901}"/>
               </a:ext>
             </a:extLst>
           </p:cNvPr>
@@ -2375,7 +2375,7 @@
           <p:cNvPr id="5" name="Segnaposto data 4">
             <a:extLst>
               <a:ext uri="{FF2B5EF4-FFF2-40B4-BE49-F238E27FC236}">
-                <a16:creationId xmlns:a16="http://schemas.microsoft.com/office/drawing/2014/main" id="{A1957757-4D8E-4F10-B793-0C5DE337205F}"/>
+                <a16:creationId xmlns:a16="http://schemas.microsoft.com/office/drawing/2014/main" xmlns="" id="{A1957757-4D8E-4F10-B793-0C5DE337205F}"/>
               </a:ext>
             </a:extLst>
           </p:cNvPr>
@@ -2393,7 +2393,7 @@
           <a:p>
             <a:fld id="{957CAE98-D902-491D-97AE-B55C550A56C1}" type="datetimeFigureOut">
               <a:rPr lang="it-IT" smtClean="0"/>
-              <a:t>15/12/2017</a:t>
+              <a:t>15/12/17</a:t>
             </a:fld>
             <a:endParaRPr lang="it-IT"/>
           </a:p>
@@ -2404,7 +2404,7 @@
           <p:cNvPr id="6" name="Segnaposto piè di pagina 5">
             <a:extLst>
               <a:ext uri="{FF2B5EF4-FFF2-40B4-BE49-F238E27FC236}">
-                <a16:creationId xmlns:a16="http://schemas.microsoft.com/office/drawing/2014/main" id="{E36D242A-0AD8-4CA4-BEAA-64E64CAC08A9}"/>
+                <a16:creationId xmlns:a16="http://schemas.microsoft.com/office/drawing/2014/main" xmlns="" id="{E36D242A-0AD8-4CA4-BEAA-64E64CAC08A9}"/>
               </a:ext>
             </a:extLst>
           </p:cNvPr>
@@ -2429,7 +2429,7 @@
           <p:cNvPr id="7" name="Segnaposto numero diapositiva 6">
             <a:extLst>
               <a:ext uri="{FF2B5EF4-FFF2-40B4-BE49-F238E27FC236}">
-                <a16:creationId xmlns:a16="http://schemas.microsoft.com/office/drawing/2014/main" id="{C30061C3-D0E6-4BE9-876A-81ECDF4D46E9}"/>
+                <a16:creationId xmlns:a16="http://schemas.microsoft.com/office/drawing/2014/main" xmlns="" id="{C30061C3-D0E6-4BE9-876A-81ECDF4D46E9}"/>
               </a:ext>
             </a:extLst>
           </p:cNvPr>
@@ -2447,7 +2447,7 @@
           <a:p>
             <a:fld id="{AC948D56-5260-455E-99A3-8F552261A327}" type="slidenum">
               <a:rPr lang="it-IT" smtClean="0"/>
-              <a:t>‹N›</a:t>
+              <a:t>‹n.›</a:t>
             </a:fld>
             <a:endParaRPr lang="it-IT"/>
           </a:p>
@@ -2488,7 +2488,7 @@
           <p:cNvPr id="2" name="Titolo 1">
             <a:extLst>
               <a:ext uri="{FF2B5EF4-FFF2-40B4-BE49-F238E27FC236}">
-                <a16:creationId xmlns:a16="http://schemas.microsoft.com/office/drawing/2014/main" id="{4F898EA6-6E9F-4CE0-AD30-AB810A90C3E2}"/>
+                <a16:creationId xmlns:a16="http://schemas.microsoft.com/office/drawing/2014/main" xmlns="" id="{4F898EA6-6E9F-4CE0-AD30-AB810A90C3E2}"/>
               </a:ext>
             </a:extLst>
           </p:cNvPr>
@@ -2525,7 +2525,7 @@
           <p:cNvPr id="3" name="Segnaposto immagine 2">
             <a:extLst>
               <a:ext uri="{FF2B5EF4-FFF2-40B4-BE49-F238E27FC236}">
-                <a16:creationId xmlns:a16="http://schemas.microsoft.com/office/drawing/2014/main" id="{05D967C3-1DA5-4618-8BFD-B9008C46A13D}"/>
+                <a16:creationId xmlns:a16="http://schemas.microsoft.com/office/drawing/2014/main" xmlns="" id="{05D967C3-1DA5-4618-8BFD-B9008C46A13D}"/>
               </a:ext>
             </a:extLst>
           </p:cNvPr>
@@ -2592,7 +2592,7 @@
           <p:cNvPr id="4" name="Segnaposto testo 3">
             <a:extLst>
               <a:ext uri="{FF2B5EF4-FFF2-40B4-BE49-F238E27FC236}">
-                <a16:creationId xmlns:a16="http://schemas.microsoft.com/office/drawing/2014/main" id="{01472597-371F-4745-8C05-4FFFE8B54809}"/>
+                <a16:creationId xmlns:a16="http://schemas.microsoft.com/office/drawing/2014/main" xmlns="" id="{01472597-371F-4745-8C05-4FFFE8B54809}"/>
               </a:ext>
             </a:extLst>
           </p:cNvPr>
@@ -2663,7 +2663,7 @@
           <p:cNvPr id="5" name="Segnaposto data 4">
             <a:extLst>
               <a:ext uri="{FF2B5EF4-FFF2-40B4-BE49-F238E27FC236}">
-                <a16:creationId xmlns:a16="http://schemas.microsoft.com/office/drawing/2014/main" id="{6543FB01-C979-4E69-AE86-071BCA06C8AC}"/>
+                <a16:creationId xmlns:a16="http://schemas.microsoft.com/office/drawing/2014/main" xmlns="" id="{6543FB01-C979-4E69-AE86-071BCA06C8AC}"/>
               </a:ext>
             </a:extLst>
           </p:cNvPr>
@@ -2681,7 +2681,7 @@
           <a:p>
             <a:fld id="{957CAE98-D902-491D-97AE-B55C550A56C1}" type="datetimeFigureOut">
               <a:rPr lang="it-IT" smtClean="0"/>
-              <a:t>15/12/2017</a:t>
+              <a:t>15/12/17</a:t>
             </a:fld>
             <a:endParaRPr lang="it-IT"/>
           </a:p>
@@ -2692,7 +2692,7 @@
           <p:cNvPr id="6" name="Segnaposto piè di pagina 5">
             <a:extLst>
               <a:ext uri="{FF2B5EF4-FFF2-40B4-BE49-F238E27FC236}">
-                <a16:creationId xmlns:a16="http://schemas.microsoft.com/office/drawing/2014/main" id="{7697C9A6-4429-4376-8018-37BDD4BC69AF}"/>
+                <a16:creationId xmlns:a16="http://schemas.microsoft.com/office/drawing/2014/main" xmlns="" id="{7697C9A6-4429-4376-8018-37BDD4BC69AF}"/>
               </a:ext>
             </a:extLst>
           </p:cNvPr>
@@ -2717,7 +2717,7 @@
           <p:cNvPr id="7" name="Segnaposto numero diapositiva 6">
             <a:extLst>
               <a:ext uri="{FF2B5EF4-FFF2-40B4-BE49-F238E27FC236}">
-                <a16:creationId xmlns:a16="http://schemas.microsoft.com/office/drawing/2014/main" id="{7C034E9D-0444-4800-821F-AA201F287341}"/>
+                <a16:creationId xmlns:a16="http://schemas.microsoft.com/office/drawing/2014/main" xmlns="" id="{7C034E9D-0444-4800-821F-AA201F287341}"/>
               </a:ext>
             </a:extLst>
           </p:cNvPr>
@@ -2735,7 +2735,7 @@
           <a:p>
             <a:fld id="{AC948D56-5260-455E-99A3-8F552261A327}" type="slidenum">
               <a:rPr lang="it-IT" smtClean="0"/>
-              <a:t>‹N›</a:t>
+              <a:t>‹n.›</a:t>
             </a:fld>
             <a:endParaRPr lang="it-IT"/>
           </a:p>
@@ -2781,7 +2781,7 @@
           <p:cNvPr id="2" name="Segnaposto titolo 1">
             <a:extLst>
               <a:ext uri="{FF2B5EF4-FFF2-40B4-BE49-F238E27FC236}">
-                <a16:creationId xmlns:a16="http://schemas.microsoft.com/office/drawing/2014/main" id="{C4B2E365-C201-4783-B0D1-3A65E90F6CB9}"/>
+                <a16:creationId xmlns:a16="http://schemas.microsoft.com/office/drawing/2014/main" xmlns="" id="{C4B2E365-C201-4783-B0D1-3A65E90F6CB9}"/>
               </a:ext>
             </a:extLst>
           </p:cNvPr>
@@ -2819,7 +2819,7 @@
           <p:cNvPr id="3" name="Segnaposto testo 2">
             <a:extLst>
               <a:ext uri="{FF2B5EF4-FFF2-40B4-BE49-F238E27FC236}">
-                <a16:creationId xmlns:a16="http://schemas.microsoft.com/office/drawing/2014/main" id="{0A07CC3F-8D9D-4987-9691-1F2D4B271B41}"/>
+                <a16:creationId xmlns:a16="http://schemas.microsoft.com/office/drawing/2014/main" xmlns="" id="{0A07CC3F-8D9D-4987-9691-1F2D4B271B41}"/>
               </a:ext>
             </a:extLst>
           </p:cNvPr>
@@ -2886,7 +2886,7 @@
           <p:cNvPr id="4" name="Segnaposto data 3">
             <a:extLst>
               <a:ext uri="{FF2B5EF4-FFF2-40B4-BE49-F238E27FC236}">
-                <a16:creationId xmlns:a16="http://schemas.microsoft.com/office/drawing/2014/main" id="{3610614C-94AF-48FE-82C1-4431BDCE322E}"/>
+                <a16:creationId xmlns:a16="http://schemas.microsoft.com/office/drawing/2014/main" xmlns="" id="{3610614C-94AF-48FE-82C1-4431BDCE322E}"/>
               </a:ext>
             </a:extLst>
           </p:cNvPr>
@@ -2922,7 +2922,7 @@
           <a:p>
             <a:fld id="{957CAE98-D902-491D-97AE-B55C550A56C1}" type="datetimeFigureOut">
               <a:rPr lang="it-IT" smtClean="0"/>
-              <a:t>15/12/2017</a:t>
+              <a:t>15/12/17</a:t>
             </a:fld>
             <a:endParaRPr lang="it-IT"/>
           </a:p>
@@ -2933,7 +2933,7 @@
           <p:cNvPr id="5" name="Segnaposto piè di pagina 4">
             <a:extLst>
               <a:ext uri="{FF2B5EF4-FFF2-40B4-BE49-F238E27FC236}">
-                <a16:creationId xmlns:a16="http://schemas.microsoft.com/office/drawing/2014/main" id="{43C6CBA9-DCE8-4607-A140-DE217C12B758}"/>
+                <a16:creationId xmlns:a16="http://schemas.microsoft.com/office/drawing/2014/main" xmlns="" id="{43C6CBA9-DCE8-4607-A140-DE217C12B758}"/>
               </a:ext>
             </a:extLst>
           </p:cNvPr>
@@ -2976,7 +2976,7 @@
           <p:cNvPr id="6" name="Segnaposto numero diapositiva 5">
             <a:extLst>
               <a:ext uri="{FF2B5EF4-FFF2-40B4-BE49-F238E27FC236}">
-                <a16:creationId xmlns:a16="http://schemas.microsoft.com/office/drawing/2014/main" id="{0A5A5D25-7CCB-4ABF-AB91-12E2A1EA1D82}"/>
+                <a16:creationId xmlns:a16="http://schemas.microsoft.com/office/drawing/2014/main" xmlns="" id="{0A5A5D25-7CCB-4ABF-AB91-12E2A1EA1D82}"/>
               </a:ext>
             </a:extLst>
           </p:cNvPr>
@@ -3012,7 +3012,7 @@
           <a:p>
             <a:fld id="{AC948D56-5260-455E-99A3-8F552261A327}" type="slidenum">
               <a:rPr lang="it-IT" smtClean="0"/>
-              <a:t>‹N›</a:t>
+              <a:t>‹n.›</a:t>
             </a:fld>
             <a:endParaRPr lang="it-IT"/>
           </a:p>
@@ -3344,7 +3344,7 @@
           <p:cNvPr id="2" name="Titolo 1">
             <a:extLst>
               <a:ext uri="{FF2B5EF4-FFF2-40B4-BE49-F238E27FC236}">
-                <a16:creationId xmlns:a16="http://schemas.microsoft.com/office/drawing/2014/main" id="{6E19FF8B-D5B4-4F9D-B233-D2EFF31805AB}"/>
+                <a16:creationId xmlns:a16="http://schemas.microsoft.com/office/drawing/2014/main" xmlns="" id="{6E19FF8B-D5B4-4F9D-B233-D2EFF31805AB}"/>
               </a:ext>
             </a:extLst>
           </p:cNvPr>
@@ -3355,15 +3355,23 @@
             <p:ph type="ctrTitle"/>
           </p:nvPr>
         </p:nvSpPr>
-        <p:spPr/>
-        <p:txBody>
-          <a:bodyPr/>
-          <a:lstStyle/>
-          <a:p>
-            <a:r>
-              <a:rPr lang="it-IT" dirty="0"/>
-              <a:t>COMING SOON</a:t>
-            </a:r>
+        <p:spPr>
+          <a:xfrm>
+            <a:off x="1524000" y="4201230"/>
+            <a:ext cx="9144000" cy="2387600"/>
+          </a:xfrm>
+        </p:spPr>
+        <p:txBody>
+          <a:bodyPr>
+            <a:noAutofit/>
+          </a:bodyPr>
+          <a:lstStyle/>
+          <a:p>
+            <a:r>
+              <a:rPr lang="it-IT" sz="19900" b="1" dirty="0" smtClean="0"/>
+              <a:t>JUVE MERDA</a:t>
+            </a:r>
+            <a:endParaRPr lang="it-IT" sz="19900" b="1" dirty="0"/>
           </a:p>
         </p:txBody>
       </p:sp>
@@ -3372,7 +3380,7 @@
           <p:cNvPr id="3" name="Sottotitolo 2">
             <a:extLst>
               <a:ext uri="{FF2B5EF4-FFF2-40B4-BE49-F238E27FC236}">
-                <a16:creationId xmlns:a16="http://schemas.microsoft.com/office/drawing/2014/main" id="{B6EAD4EE-9CA7-42DC-97DE-19CF2A7E0FEB}"/>
+                <a16:creationId xmlns:a16="http://schemas.microsoft.com/office/drawing/2014/main" xmlns="" id="{B6EAD4EE-9CA7-42DC-97DE-19CF2A7E0FEB}"/>
               </a:ext>
             </a:extLst>
           </p:cNvPr>
@@ -3430,7 +3438,7 @@
           <p:cNvPr id="2" name="Titolo 1">
             <a:extLst>
               <a:ext uri="{FF2B5EF4-FFF2-40B4-BE49-F238E27FC236}">
-                <a16:creationId xmlns:a16="http://schemas.microsoft.com/office/drawing/2014/main" id="{A067CE87-7A60-4DFB-8B71-6EC9C173906C}"/>
+                <a16:creationId xmlns:a16="http://schemas.microsoft.com/office/drawing/2014/main" xmlns="" id="{A067CE87-7A60-4DFB-8B71-6EC9C173906C}"/>
               </a:ext>
             </a:extLst>
           </p:cNvPr>
@@ -3467,7 +3475,7 @@
           <p:cNvPr id="3" name="Segnaposto contenuto 2">
             <a:extLst>
               <a:ext uri="{FF2B5EF4-FFF2-40B4-BE49-F238E27FC236}">
-                <a16:creationId xmlns:a16="http://schemas.microsoft.com/office/drawing/2014/main" id="{F36FD6CB-DA10-49AA-AC33-97037567E37C}"/>
+                <a16:creationId xmlns:a16="http://schemas.microsoft.com/office/drawing/2014/main" xmlns="" id="{F36FD6CB-DA10-49AA-AC33-97037567E37C}"/>
               </a:ext>
             </a:extLst>
           </p:cNvPr>
@@ -3522,7 +3530,7 @@
           <p:cNvPr id="2" name="Titolo 1">
             <a:extLst>
               <a:ext uri="{FF2B5EF4-FFF2-40B4-BE49-F238E27FC236}">
-                <a16:creationId xmlns:a16="http://schemas.microsoft.com/office/drawing/2014/main" id="{5CD6C40B-86C1-403F-86AE-4F1BE0282E2A}"/>
+                <a16:creationId xmlns:a16="http://schemas.microsoft.com/office/drawing/2014/main" xmlns="" id="{5CD6C40B-86C1-403F-86AE-4F1BE0282E2A}"/>
               </a:ext>
             </a:extLst>
           </p:cNvPr>
@@ -3550,7 +3558,7 @@
           <p:cNvPr id="3" name="Sottotitolo 2">
             <a:extLst>
               <a:ext uri="{FF2B5EF4-FFF2-40B4-BE49-F238E27FC236}">
-                <a16:creationId xmlns:a16="http://schemas.microsoft.com/office/drawing/2014/main" id="{4B634A2A-7FE2-47D7-ABB2-30A9C641DBA4}"/>
+                <a16:creationId xmlns:a16="http://schemas.microsoft.com/office/drawing/2014/main" xmlns="" id="{4B634A2A-7FE2-47D7-ABB2-30A9C641DBA4}"/>
               </a:ext>
             </a:extLst>
           </p:cNvPr>
@@ -3608,7 +3616,7 @@
           <p:cNvPr id="2" name="Titolo 1">
             <a:extLst>
               <a:ext uri="{FF2B5EF4-FFF2-40B4-BE49-F238E27FC236}">
-                <a16:creationId xmlns:a16="http://schemas.microsoft.com/office/drawing/2014/main" id="{29ECC94F-CD55-472E-BBAD-EA5D9387F9F8}"/>
+                <a16:creationId xmlns:a16="http://schemas.microsoft.com/office/drawing/2014/main" xmlns="" id="{29ECC94F-CD55-472E-BBAD-EA5D9387F9F8}"/>
               </a:ext>
             </a:extLst>
           </p:cNvPr>
@@ -3636,7 +3644,7 @@
           <p:cNvPr id="3" name="Sottotitolo 2">
             <a:extLst>
               <a:ext uri="{FF2B5EF4-FFF2-40B4-BE49-F238E27FC236}">
-                <a16:creationId xmlns:a16="http://schemas.microsoft.com/office/drawing/2014/main" id="{3D1B3825-8169-45AD-B788-66B8EA98CA99}"/>
+                <a16:creationId xmlns:a16="http://schemas.microsoft.com/office/drawing/2014/main" xmlns="" id="{3D1B3825-8169-45AD-B788-66B8EA98CA99}"/>
               </a:ext>
             </a:extLst>
           </p:cNvPr>
@@ -3691,7 +3699,7 @@
           <p:cNvPr id="2" name="Titolo 1">
             <a:extLst>
               <a:ext uri="{FF2B5EF4-FFF2-40B4-BE49-F238E27FC236}">
-                <a16:creationId xmlns:a16="http://schemas.microsoft.com/office/drawing/2014/main" id="{0447D4BB-6529-4710-8705-90488E3EFB1B}"/>
+                <a16:creationId xmlns:a16="http://schemas.microsoft.com/office/drawing/2014/main" xmlns="" id="{0447D4BB-6529-4710-8705-90488E3EFB1B}"/>
               </a:ext>
             </a:extLst>
           </p:cNvPr>
@@ -3727,7 +3735,7 @@
           <p:cNvPr id="3" name="Segnaposto contenuto 2">
             <a:extLst>
               <a:ext uri="{FF2B5EF4-FFF2-40B4-BE49-F238E27FC236}">
-                <a16:creationId xmlns:a16="http://schemas.microsoft.com/office/drawing/2014/main" id="{A2D3F60E-8942-48DD-9307-04056E0A6F35}"/>
+                <a16:creationId xmlns:a16="http://schemas.microsoft.com/office/drawing/2014/main" xmlns="" id="{A2D3F60E-8942-48DD-9307-04056E0A6F35}"/>
               </a:ext>
             </a:extLst>
           </p:cNvPr>
@@ -3782,7 +3790,7 @@
           <p:cNvPr id="2" name="Titolo 1">
             <a:extLst>
               <a:ext uri="{FF2B5EF4-FFF2-40B4-BE49-F238E27FC236}">
-                <a16:creationId xmlns:a16="http://schemas.microsoft.com/office/drawing/2014/main" id="{AF0CB0CF-B89A-4803-B903-F1DF454B0F50}"/>
+                <a16:creationId xmlns:a16="http://schemas.microsoft.com/office/drawing/2014/main" xmlns="" id="{AF0CB0CF-B89A-4803-B903-F1DF454B0F50}"/>
               </a:ext>
             </a:extLst>
           </p:cNvPr>
@@ -3823,7 +3831,7 @@
           <p:cNvPr id="3" name="Segnaposto contenuto 2">
             <a:extLst>
               <a:ext uri="{FF2B5EF4-FFF2-40B4-BE49-F238E27FC236}">
-                <a16:creationId xmlns:a16="http://schemas.microsoft.com/office/drawing/2014/main" id="{962D3A82-B8F3-4A9D-B7FE-A246D898B7C3}"/>
+                <a16:creationId xmlns:a16="http://schemas.microsoft.com/office/drawing/2014/main" xmlns="" id="{962D3A82-B8F3-4A9D-B7FE-A246D898B7C3}"/>
               </a:ext>
             </a:extLst>
           </p:cNvPr>
@@ -3878,7 +3886,7 @@
           <p:cNvPr id="2" name="Titolo 1">
             <a:extLst>
               <a:ext uri="{FF2B5EF4-FFF2-40B4-BE49-F238E27FC236}">
-                <a16:creationId xmlns:a16="http://schemas.microsoft.com/office/drawing/2014/main" id="{4576E730-FB43-429D-8482-5F52964B3452}"/>
+                <a16:creationId xmlns:a16="http://schemas.microsoft.com/office/drawing/2014/main" xmlns="" id="{4576E730-FB43-429D-8482-5F52964B3452}"/>
               </a:ext>
             </a:extLst>
           </p:cNvPr>
@@ -3906,7 +3914,7 @@
           <p:cNvPr id="3" name="Sottotitolo 2">
             <a:extLst>
               <a:ext uri="{FF2B5EF4-FFF2-40B4-BE49-F238E27FC236}">
-                <a16:creationId xmlns:a16="http://schemas.microsoft.com/office/drawing/2014/main" id="{8FB6FD50-6889-47AA-9FF4-ED8CB2899864}"/>
+                <a16:creationId xmlns:a16="http://schemas.microsoft.com/office/drawing/2014/main" xmlns="" id="{8FB6FD50-6889-47AA-9FF4-ED8CB2899864}"/>
               </a:ext>
             </a:extLst>
           </p:cNvPr>
@@ -3961,7 +3969,7 @@
           <p:cNvPr id="2" name="Titolo 1">
             <a:extLst>
               <a:ext uri="{FF2B5EF4-FFF2-40B4-BE49-F238E27FC236}">
-                <a16:creationId xmlns:a16="http://schemas.microsoft.com/office/drawing/2014/main" id="{55A6B881-99C6-4A53-9887-C4CF7F81C98C}"/>
+                <a16:creationId xmlns:a16="http://schemas.microsoft.com/office/drawing/2014/main" xmlns="" id="{55A6B881-99C6-4A53-9887-C4CF7F81C98C}"/>
               </a:ext>
             </a:extLst>
           </p:cNvPr>
@@ -3990,7 +3998,7 @@
           <p:cNvPr id="3" name="Sottotitolo 2">
             <a:extLst>
               <a:ext uri="{FF2B5EF4-FFF2-40B4-BE49-F238E27FC236}">
-                <a16:creationId xmlns:a16="http://schemas.microsoft.com/office/drawing/2014/main" id="{8D40AB1A-1C75-4E7E-B2F6-E36092B5E52F}"/>
+                <a16:creationId xmlns:a16="http://schemas.microsoft.com/office/drawing/2014/main" xmlns="" id="{8D40AB1A-1C75-4E7E-B2F6-E36092B5E52F}"/>
               </a:ext>
             </a:extLst>
           </p:cNvPr>
@@ -4045,7 +4053,7 @@
           <p:cNvPr id="2" name="Titolo 1">
             <a:extLst>
               <a:ext uri="{FF2B5EF4-FFF2-40B4-BE49-F238E27FC236}">
-                <a16:creationId xmlns:a16="http://schemas.microsoft.com/office/drawing/2014/main" id="{46C691D0-7338-46F2-8ADD-28A06C048950}"/>
+                <a16:creationId xmlns:a16="http://schemas.microsoft.com/office/drawing/2014/main" xmlns="" id="{46C691D0-7338-46F2-8ADD-28A06C048950}"/>
               </a:ext>
             </a:extLst>
           </p:cNvPr>
@@ -4074,7 +4082,7 @@
           <p:cNvPr id="3" name="Segnaposto contenuto 2">
             <a:extLst>
               <a:ext uri="{FF2B5EF4-FFF2-40B4-BE49-F238E27FC236}">
-                <a16:creationId xmlns:a16="http://schemas.microsoft.com/office/drawing/2014/main" id="{08C787D0-B8AB-4FE5-887B-27D8C44837BC}"/>
+                <a16:creationId xmlns:a16="http://schemas.microsoft.com/office/drawing/2014/main" xmlns="" id="{08C787D0-B8AB-4FE5-887B-27D8C44837BC}"/>
               </a:ext>
             </a:extLst>
           </p:cNvPr>
@@ -4129,7 +4137,7 @@
           <p:cNvPr id="2" name="Titolo 1">
             <a:extLst>
               <a:ext uri="{FF2B5EF4-FFF2-40B4-BE49-F238E27FC236}">
-                <a16:creationId xmlns:a16="http://schemas.microsoft.com/office/drawing/2014/main" id="{B59E6DEA-D7A1-44D2-8559-89B730CE3681}"/>
+                <a16:creationId xmlns:a16="http://schemas.microsoft.com/office/drawing/2014/main" xmlns="" id="{B59E6DEA-D7A1-44D2-8559-89B730CE3681}"/>
               </a:ext>
             </a:extLst>
           </p:cNvPr>
@@ -4166,7 +4174,7 @@
           <p:cNvPr id="3" name="Sottotitolo 2">
             <a:extLst>
               <a:ext uri="{FF2B5EF4-FFF2-40B4-BE49-F238E27FC236}">
-                <a16:creationId xmlns:a16="http://schemas.microsoft.com/office/drawing/2014/main" id="{83A8CAC3-1E41-4E08-84F1-50D0906D1288}"/>
+                <a16:creationId xmlns:a16="http://schemas.microsoft.com/office/drawing/2014/main" xmlns="" id="{83A8CAC3-1E41-4E08-84F1-50D0906D1288}"/>
               </a:ext>
             </a:extLst>
           </p:cNvPr>

</xml_diff>

<commit_message>
(+) Aggiunta token IP-Based (+) Modifiche minori
</commit_message>
<xml_diff>
--- a/Documentazione e cose così/Slide_concettuali_Luca.pptx
+++ b/Documentazione e cose così/Slide_concettuali_Luca.pptx
@@ -11,10 +11,15 @@
     <p:sldId id="261" r:id="rId5"/>
     <p:sldId id="258" r:id="rId6"/>
     <p:sldId id="259" r:id="rId7"/>
-    <p:sldId id="263" r:id="rId8"/>
-    <p:sldId id="262" r:id="rId9"/>
-    <p:sldId id="264" r:id="rId10"/>
-    <p:sldId id="265" r:id="rId11"/>
+    <p:sldId id="267" r:id="rId8"/>
+    <p:sldId id="268" r:id="rId9"/>
+    <p:sldId id="271" r:id="rId10"/>
+    <p:sldId id="272" r:id="rId11"/>
+    <p:sldId id="263" r:id="rId12"/>
+    <p:sldId id="262" r:id="rId13"/>
+    <p:sldId id="266" r:id="rId14"/>
+    <p:sldId id="264" r:id="rId15"/>
+    <p:sldId id="265" r:id="rId16"/>
   </p:sldIdLst>
   <p:sldSz cx="12192000" cy="6858000"/>
   <p:notesSz cx="6858000" cy="9144000"/>
@@ -272,7 +277,7 @@
           <a:p>
             <a:fld id="{957CAE98-D902-491D-97AE-B55C550A56C1}" type="datetimeFigureOut">
               <a:rPr lang="it-IT" smtClean="0"/>
-              <a:t>15/12/2017</a:t>
+              <a:t>16/12/2017</a:t>
             </a:fld>
             <a:endParaRPr lang="it-IT"/>
           </a:p>
@@ -470,7 +475,7 @@
           <a:p>
             <a:fld id="{957CAE98-D902-491D-97AE-B55C550A56C1}" type="datetimeFigureOut">
               <a:rPr lang="it-IT" smtClean="0"/>
-              <a:t>15/12/2017</a:t>
+              <a:t>16/12/2017</a:t>
             </a:fld>
             <a:endParaRPr lang="it-IT"/>
           </a:p>
@@ -678,7 +683,7 @@
           <a:p>
             <a:fld id="{957CAE98-D902-491D-97AE-B55C550A56C1}" type="datetimeFigureOut">
               <a:rPr lang="it-IT" smtClean="0"/>
-              <a:t>15/12/2017</a:t>
+              <a:t>16/12/2017</a:t>
             </a:fld>
             <a:endParaRPr lang="it-IT"/>
           </a:p>
@@ -876,7 +881,7 @@
           <a:p>
             <a:fld id="{957CAE98-D902-491D-97AE-B55C550A56C1}" type="datetimeFigureOut">
               <a:rPr lang="it-IT" smtClean="0"/>
-              <a:t>15/12/2017</a:t>
+              <a:t>16/12/2017</a:t>
             </a:fld>
             <a:endParaRPr lang="it-IT"/>
           </a:p>
@@ -1151,7 +1156,7 @@
           <a:p>
             <a:fld id="{957CAE98-D902-491D-97AE-B55C550A56C1}" type="datetimeFigureOut">
               <a:rPr lang="it-IT" smtClean="0"/>
-              <a:t>15/12/2017</a:t>
+              <a:t>16/12/2017</a:t>
             </a:fld>
             <a:endParaRPr lang="it-IT"/>
           </a:p>
@@ -1416,7 +1421,7 @@
           <a:p>
             <a:fld id="{957CAE98-D902-491D-97AE-B55C550A56C1}" type="datetimeFigureOut">
               <a:rPr lang="it-IT" smtClean="0"/>
-              <a:t>15/12/2017</a:t>
+              <a:t>16/12/2017</a:t>
             </a:fld>
             <a:endParaRPr lang="it-IT"/>
           </a:p>
@@ -1828,7 +1833,7 @@
           <a:p>
             <a:fld id="{957CAE98-D902-491D-97AE-B55C550A56C1}" type="datetimeFigureOut">
               <a:rPr lang="it-IT" smtClean="0"/>
-              <a:t>15/12/2017</a:t>
+              <a:t>16/12/2017</a:t>
             </a:fld>
             <a:endParaRPr lang="it-IT"/>
           </a:p>
@@ -1969,7 +1974,7 @@
           <a:p>
             <a:fld id="{957CAE98-D902-491D-97AE-B55C550A56C1}" type="datetimeFigureOut">
               <a:rPr lang="it-IT" smtClean="0"/>
-              <a:t>15/12/2017</a:t>
+              <a:t>16/12/2017</a:t>
             </a:fld>
             <a:endParaRPr lang="it-IT"/>
           </a:p>
@@ -2082,7 +2087,7 @@
           <a:p>
             <a:fld id="{957CAE98-D902-491D-97AE-B55C550A56C1}" type="datetimeFigureOut">
               <a:rPr lang="it-IT" smtClean="0"/>
-              <a:t>15/12/2017</a:t>
+              <a:t>16/12/2017</a:t>
             </a:fld>
             <a:endParaRPr lang="it-IT"/>
           </a:p>
@@ -2393,7 +2398,7 @@
           <a:p>
             <a:fld id="{957CAE98-D902-491D-97AE-B55C550A56C1}" type="datetimeFigureOut">
               <a:rPr lang="it-IT" smtClean="0"/>
-              <a:t>15/12/2017</a:t>
+              <a:t>16/12/2017</a:t>
             </a:fld>
             <a:endParaRPr lang="it-IT"/>
           </a:p>
@@ -2681,7 +2686,7 @@
           <a:p>
             <a:fld id="{957CAE98-D902-491D-97AE-B55C550A56C1}" type="datetimeFigureOut">
               <a:rPr lang="it-IT" smtClean="0"/>
-              <a:t>15/12/2017</a:t>
+              <a:t>16/12/2017</a:t>
             </a:fld>
             <a:endParaRPr lang="it-IT"/>
           </a:p>
@@ -2922,7 +2927,7 @@
           <a:p>
             <a:fld id="{957CAE98-D902-491D-97AE-B55C550A56C1}" type="datetimeFigureOut">
               <a:rPr lang="it-IT" smtClean="0"/>
-              <a:t>15/12/2017</a:t>
+              <a:t>16/12/2017</a:t>
             </a:fld>
             <a:endParaRPr lang="it-IT"/>
           </a:p>
@@ -3430,6 +3435,605 @@
           <p:cNvPr id="2" name="Titolo 1">
             <a:extLst>
               <a:ext uri="{FF2B5EF4-FFF2-40B4-BE49-F238E27FC236}">
+                <a16:creationId xmlns:a16="http://schemas.microsoft.com/office/drawing/2014/main" id="{2AF7D77F-4F4F-4AF0-BDB1-7F5A66DA2224}"/>
+              </a:ext>
+            </a:extLst>
+          </p:cNvPr>
+          <p:cNvSpPr>
+            <a:spLocks noGrp="1"/>
+          </p:cNvSpPr>
+          <p:nvPr>
+            <p:ph type="title"/>
+          </p:nvPr>
+        </p:nvSpPr>
+        <p:spPr/>
+        <p:txBody>
+          <a:bodyPr/>
+          <a:lstStyle/>
+          <a:p>
+            <a:r>
+              <a:rPr lang="it-IT" dirty="0"/>
+              <a:t>2-steps </a:t>
+            </a:r>
+            <a:r>
+              <a:rPr lang="it-IT" dirty="0" err="1"/>
+              <a:t>Authentication</a:t>
+            </a:r>
+            <a:endParaRPr lang="it-IT" dirty="0"/>
+          </a:p>
+        </p:txBody>
+      </p:sp>
+      <p:sp>
+        <p:nvSpPr>
+          <p:cNvPr id="3" name="Segnaposto contenuto 2">
+            <a:extLst>
+              <a:ext uri="{FF2B5EF4-FFF2-40B4-BE49-F238E27FC236}">
+                <a16:creationId xmlns:a16="http://schemas.microsoft.com/office/drawing/2014/main" id="{729749EC-49A7-443C-A533-B49C9A20CA5A}"/>
+              </a:ext>
+            </a:extLst>
+          </p:cNvPr>
+          <p:cNvSpPr>
+            <a:spLocks noGrp="1"/>
+          </p:cNvSpPr>
+          <p:nvPr>
+            <p:ph idx="1"/>
+          </p:nvPr>
+        </p:nvSpPr>
+        <p:spPr/>
+        <p:txBody>
+          <a:bodyPr/>
+          <a:lstStyle/>
+          <a:p>
+            <a:r>
+              <a:rPr lang="it-IT" dirty="0" err="1"/>
+              <a:t>We</a:t>
+            </a:r>
+            <a:r>
+              <a:rPr lang="it-IT" dirty="0"/>
+              <a:t> </a:t>
+            </a:r>
+            <a:r>
+              <a:rPr lang="it-IT" dirty="0" err="1"/>
+              <a:t>implemented</a:t>
+            </a:r>
+            <a:r>
+              <a:rPr lang="it-IT" dirty="0"/>
+              <a:t> a 2-steps </a:t>
+            </a:r>
+            <a:r>
+              <a:rPr lang="it-IT" dirty="0" err="1"/>
+              <a:t>authentication</a:t>
+            </a:r>
+            <a:r>
+              <a:rPr lang="it-IT" dirty="0"/>
+              <a:t> system, so an </a:t>
+            </a:r>
+            <a:r>
+              <a:rPr lang="it-IT" dirty="0" err="1"/>
+              <a:t>attacker</a:t>
+            </a:r>
+            <a:r>
+              <a:rPr lang="it-IT" dirty="0"/>
+              <a:t> </a:t>
+            </a:r>
+            <a:r>
+              <a:rPr lang="it-IT" dirty="0" err="1"/>
+              <a:t>can’t</a:t>
+            </a:r>
+            <a:r>
+              <a:rPr lang="it-IT" dirty="0"/>
+              <a:t> </a:t>
+            </a:r>
+            <a:r>
+              <a:rPr lang="it-IT" dirty="0" err="1"/>
+              <a:t>steal</a:t>
+            </a:r>
+            <a:r>
+              <a:rPr lang="it-IT" dirty="0"/>
+              <a:t> user </a:t>
+            </a:r>
+            <a:r>
+              <a:rPr lang="it-IT" dirty="0" err="1"/>
+              <a:t>identity</a:t>
+            </a:r>
+            <a:r>
+              <a:rPr lang="it-IT" dirty="0"/>
+              <a:t> by password knowledge </a:t>
+            </a:r>
+            <a:r>
+              <a:rPr lang="it-IT" dirty="0" err="1"/>
+              <a:t>only</a:t>
+            </a:r>
+            <a:r>
+              <a:rPr lang="it-IT" dirty="0"/>
+              <a:t>.</a:t>
+            </a:r>
+          </a:p>
+          <a:p>
+            <a:pPr lvl="1"/>
+            <a:r>
+              <a:rPr lang="it-IT" dirty="0" err="1"/>
+              <a:t>We</a:t>
+            </a:r>
+            <a:r>
+              <a:rPr lang="it-IT" dirty="0"/>
+              <a:t> </a:t>
+            </a:r>
+            <a:r>
+              <a:rPr lang="it-IT" dirty="0" err="1"/>
+              <a:t>used</a:t>
+            </a:r>
+            <a:r>
+              <a:rPr lang="it-IT" dirty="0"/>
+              <a:t> IP </a:t>
+            </a:r>
+            <a:r>
+              <a:rPr lang="it-IT" dirty="0" err="1"/>
+              <a:t>as</a:t>
+            </a:r>
+            <a:r>
+              <a:rPr lang="it-IT" dirty="0"/>
+              <a:t> </a:t>
+            </a:r>
+            <a:r>
+              <a:rPr lang="it-IT" dirty="0" err="1"/>
+              <a:t>identifier</a:t>
+            </a:r>
+            <a:r>
+              <a:rPr lang="it-IT" dirty="0"/>
+              <a:t>, </a:t>
+            </a:r>
+            <a:r>
+              <a:rPr lang="it-IT" dirty="0" err="1"/>
+              <a:t>but</a:t>
+            </a:r>
+            <a:r>
+              <a:rPr lang="it-IT" dirty="0"/>
+              <a:t> in a </a:t>
+            </a:r>
+            <a:r>
+              <a:rPr lang="it-IT" dirty="0" err="1"/>
+              <a:t>real</a:t>
+            </a:r>
+            <a:r>
+              <a:rPr lang="it-IT" dirty="0"/>
+              <a:t>-world scenario a more accurate device </a:t>
+            </a:r>
+            <a:r>
+              <a:rPr lang="it-IT" dirty="0" err="1"/>
+              <a:t>fingerprint</a:t>
+            </a:r>
+            <a:r>
+              <a:rPr lang="it-IT" dirty="0"/>
+              <a:t> </a:t>
+            </a:r>
+            <a:r>
+              <a:rPr lang="it-IT" dirty="0" err="1"/>
+              <a:t>would</a:t>
+            </a:r>
+            <a:r>
+              <a:rPr lang="it-IT" dirty="0"/>
+              <a:t> be </a:t>
+            </a:r>
+            <a:r>
+              <a:rPr lang="it-IT" dirty="0" err="1"/>
+              <a:t>needed</a:t>
+            </a:r>
+            <a:r>
+              <a:rPr lang="it-IT" dirty="0"/>
+              <a:t>.</a:t>
+            </a:r>
+          </a:p>
+          <a:p>
+            <a:r>
+              <a:rPr lang="it-IT" dirty="0"/>
+              <a:t>For </a:t>
+            </a:r>
+            <a:r>
+              <a:rPr lang="it-IT" dirty="0" err="1"/>
+              <a:t>every</a:t>
+            </a:r>
+            <a:r>
+              <a:rPr lang="it-IT" dirty="0"/>
+              <a:t> login </a:t>
+            </a:r>
+            <a:r>
+              <a:rPr lang="it-IT" dirty="0" err="1"/>
+              <a:t>attempt</a:t>
+            </a:r>
+            <a:r>
+              <a:rPr lang="it-IT" dirty="0"/>
+              <a:t> the </a:t>
+            </a:r>
+          </a:p>
+        </p:txBody>
+      </p:sp>
+    </p:spTree>
+    <p:extLst>
+      <p:ext uri="{BB962C8B-B14F-4D97-AF65-F5344CB8AC3E}">
+        <p14:creationId xmlns:p14="http://schemas.microsoft.com/office/powerpoint/2010/main" val="3874558994"/>
+      </p:ext>
+    </p:extLst>
+  </p:cSld>
+  <p:clrMapOvr>
+    <a:masterClrMapping/>
+  </p:clrMapOvr>
+</p:sld>
+</file>
+
+<file path=ppt/slides/slide11.xml><?xml version="1.0" encoding="utf-8"?>
+<p:sld xmlns:a="http://schemas.openxmlformats.org/drawingml/2006/main" xmlns:r="http://schemas.openxmlformats.org/officeDocument/2006/relationships" xmlns:p="http://schemas.openxmlformats.org/presentationml/2006/main">
+  <p:cSld>
+    <p:spTree>
+      <p:nvGrpSpPr>
+        <p:cNvPr id="1" name=""/>
+        <p:cNvGrpSpPr/>
+        <p:nvPr/>
+      </p:nvGrpSpPr>
+      <p:grpSpPr>
+        <a:xfrm>
+          <a:off x="0" y="0"/>
+          <a:ext cx="0" cy="0"/>
+          <a:chOff x="0" y="0"/>
+          <a:chExt cx="0" cy="0"/>
+        </a:xfrm>
+      </p:grpSpPr>
+      <p:sp>
+        <p:nvSpPr>
+          <p:cNvPr id="2" name="Titolo 1">
+            <a:extLst>
+              <a:ext uri="{FF2B5EF4-FFF2-40B4-BE49-F238E27FC236}">
+                <a16:creationId xmlns:a16="http://schemas.microsoft.com/office/drawing/2014/main" id="{55A6B881-99C6-4A53-9887-C4CF7F81C98C}"/>
+              </a:ext>
+            </a:extLst>
+          </p:cNvPr>
+          <p:cNvSpPr>
+            <a:spLocks noGrp="1"/>
+          </p:cNvSpPr>
+          <p:nvPr>
+            <p:ph type="ctrTitle"/>
+          </p:nvPr>
+        </p:nvSpPr>
+        <p:spPr/>
+        <p:txBody>
+          <a:bodyPr/>
+          <a:lstStyle/>
+          <a:p>
+            <a:r>
+              <a:rPr lang="it-IT" dirty="0" err="1"/>
+              <a:t>Authentication</a:t>
+            </a:r>
+            <a:endParaRPr lang="it-IT" dirty="0"/>
+          </a:p>
+        </p:txBody>
+      </p:sp>
+      <p:sp>
+        <p:nvSpPr>
+          <p:cNvPr id="3" name="Sottotitolo 2">
+            <a:extLst>
+              <a:ext uri="{FF2B5EF4-FFF2-40B4-BE49-F238E27FC236}">
+                <a16:creationId xmlns:a16="http://schemas.microsoft.com/office/drawing/2014/main" id="{8D40AB1A-1C75-4E7E-B2F6-E36092B5E52F}"/>
+              </a:ext>
+            </a:extLst>
+          </p:cNvPr>
+          <p:cNvSpPr>
+            <a:spLocks noGrp="1"/>
+          </p:cNvSpPr>
+          <p:nvPr>
+            <p:ph type="subTitle" idx="1"/>
+          </p:nvPr>
+        </p:nvSpPr>
+        <p:spPr/>
+        <p:txBody>
+          <a:bodyPr/>
+          <a:lstStyle/>
+          <a:p>
+            <a:endParaRPr lang="it-IT"/>
+          </a:p>
+        </p:txBody>
+      </p:sp>
+    </p:spTree>
+    <p:extLst>
+      <p:ext uri="{BB962C8B-B14F-4D97-AF65-F5344CB8AC3E}">
+        <p14:creationId xmlns:p14="http://schemas.microsoft.com/office/powerpoint/2010/main" val="2828430958"/>
+      </p:ext>
+    </p:extLst>
+  </p:cSld>
+  <p:clrMapOvr>
+    <a:masterClrMapping/>
+  </p:clrMapOvr>
+</p:sld>
+</file>
+
+<file path=ppt/slides/slide12.xml><?xml version="1.0" encoding="utf-8"?>
+<p:sld xmlns:a="http://schemas.openxmlformats.org/drawingml/2006/main" xmlns:r="http://schemas.openxmlformats.org/officeDocument/2006/relationships" xmlns:p="http://schemas.openxmlformats.org/presentationml/2006/main">
+  <p:cSld>
+    <p:spTree>
+      <p:nvGrpSpPr>
+        <p:cNvPr id="1" name=""/>
+        <p:cNvGrpSpPr/>
+        <p:nvPr/>
+      </p:nvGrpSpPr>
+      <p:grpSpPr>
+        <a:xfrm>
+          <a:off x="0" y="0"/>
+          <a:ext cx="0" cy="0"/>
+          <a:chOff x="0" y="0"/>
+          <a:chExt cx="0" cy="0"/>
+        </a:xfrm>
+      </p:grpSpPr>
+      <p:sp>
+        <p:nvSpPr>
+          <p:cNvPr id="2" name="Titolo 1">
+            <a:extLst>
+              <a:ext uri="{FF2B5EF4-FFF2-40B4-BE49-F238E27FC236}">
+                <a16:creationId xmlns:a16="http://schemas.microsoft.com/office/drawing/2014/main" id="{46C691D0-7338-46F2-8ADD-28A06C048950}"/>
+              </a:ext>
+            </a:extLst>
+          </p:cNvPr>
+          <p:cNvSpPr>
+            <a:spLocks noGrp="1"/>
+          </p:cNvSpPr>
+          <p:nvPr>
+            <p:ph type="title"/>
+          </p:nvPr>
+        </p:nvSpPr>
+        <p:spPr/>
+        <p:txBody>
+          <a:bodyPr/>
+          <a:lstStyle/>
+          <a:p>
+            <a:r>
+              <a:rPr lang="it-IT" dirty="0" err="1"/>
+              <a:t>Authentication</a:t>
+            </a:r>
+            <a:endParaRPr lang="it-IT" dirty="0"/>
+          </a:p>
+        </p:txBody>
+      </p:sp>
+      <p:sp>
+        <p:nvSpPr>
+          <p:cNvPr id="3" name="Segnaposto contenuto 2">
+            <a:extLst>
+              <a:ext uri="{FF2B5EF4-FFF2-40B4-BE49-F238E27FC236}">
+                <a16:creationId xmlns:a16="http://schemas.microsoft.com/office/drawing/2014/main" id="{08C787D0-B8AB-4FE5-887B-27D8C44837BC}"/>
+              </a:ext>
+            </a:extLst>
+          </p:cNvPr>
+          <p:cNvSpPr>
+            <a:spLocks noGrp="1"/>
+          </p:cNvSpPr>
+          <p:nvPr>
+            <p:ph idx="1"/>
+          </p:nvPr>
+        </p:nvSpPr>
+        <p:spPr/>
+        <p:txBody>
+          <a:bodyPr/>
+          <a:lstStyle/>
+          <a:p>
+            <a:endParaRPr lang="it-IT"/>
+          </a:p>
+        </p:txBody>
+      </p:sp>
+    </p:spTree>
+    <p:extLst>
+      <p:ext uri="{BB962C8B-B14F-4D97-AF65-F5344CB8AC3E}">
+        <p14:creationId xmlns:p14="http://schemas.microsoft.com/office/powerpoint/2010/main" val="2618927754"/>
+      </p:ext>
+    </p:extLst>
+  </p:cSld>
+  <p:clrMapOvr>
+    <a:masterClrMapping/>
+  </p:clrMapOvr>
+</p:sld>
+</file>
+
+<file path=ppt/slides/slide13.xml><?xml version="1.0" encoding="utf-8"?>
+<p:sld xmlns:a="http://schemas.openxmlformats.org/drawingml/2006/main" xmlns:r="http://schemas.openxmlformats.org/officeDocument/2006/relationships" xmlns:p="http://schemas.openxmlformats.org/presentationml/2006/main">
+  <p:cSld>
+    <p:spTree>
+      <p:nvGrpSpPr>
+        <p:cNvPr id="1" name=""/>
+        <p:cNvGrpSpPr/>
+        <p:nvPr/>
+      </p:nvGrpSpPr>
+      <p:grpSpPr>
+        <a:xfrm>
+          <a:off x="0" y="0"/>
+          <a:ext cx="0" cy="0"/>
+          <a:chOff x="0" y="0"/>
+          <a:chExt cx="0" cy="0"/>
+        </a:xfrm>
+      </p:grpSpPr>
+      <p:sp>
+        <p:nvSpPr>
+          <p:cNvPr id="2" name="Titolo 1">
+            <a:extLst>
+              <a:ext uri="{FF2B5EF4-FFF2-40B4-BE49-F238E27FC236}">
+                <a16:creationId xmlns:a16="http://schemas.microsoft.com/office/drawing/2014/main" id="{C83D74B8-6F8F-481C-8088-17C123A66423}"/>
+              </a:ext>
+            </a:extLst>
+          </p:cNvPr>
+          <p:cNvSpPr>
+            <a:spLocks noGrp="1"/>
+          </p:cNvSpPr>
+          <p:nvPr>
+            <p:ph type="ctrTitle"/>
+          </p:nvPr>
+        </p:nvSpPr>
+        <p:spPr/>
+        <p:txBody>
+          <a:bodyPr/>
+          <a:lstStyle/>
+          <a:p>
+            <a:r>
+              <a:rPr lang="it-IT" dirty="0"/>
+              <a:t>SID : Simple </a:t>
+            </a:r>
+            <a:r>
+              <a:rPr lang="it-IT" dirty="0" err="1"/>
+              <a:t>Intrusion</a:t>
+            </a:r>
+            <a:r>
+              <a:rPr lang="it-IT" dirty="0"/>
+              <a:t> Detector</a:t>
+            </a:r>
+          </a:p>
+        </p:txBody>
+      </p:sp>
+      <p:sp>
+        <p:nvSpPr>
+          <p:cNvPr id="3" name="Sottotitolo 2">
+            <a:extLst>
+              <a:ext uri="{FF2B5EF4-FFF2-40B4-BE49-F238E27FC236}">
+                <a16:creationId xmlns:a16="http://schemas.microsoft.com/office/drawing/2014/main" id="{70630231-09D6-4CD3-9B2B-DBD9768B44E8}"/>
+              </a:ext>
+            </a:extLst>
+          </p:cNvPr>
+          <p:cNvSpPr>
+            <a:spLocks noGrp="1"/>
+          </p:cNvSpPr>
+          <p:nvPr>
+            <p:ph type="subTitle" idx="1"/>
+          </p:nvPr>
+        </p:nvSpPr>
+        <p:spPr/>
+        <p:txBody>
+          <a:bodyPr/>
+          <a:lstStyle/>
+          <a:p>
+            <a:endParaRPr lang="it-IT"/>
+          </a:p>
+        </p:txBody>
+      </p:sp>
+    </p:spTree>
+    <p:extLst>
+      <p:ext uri="{BB962C8B-B14F-4D97-AF65-F5344CB8AC3E}">
+        <p14:creationId xmlns:p14="http://schemas.microsoft.com/office/powerpoint/2010/main" val="3440133826"/>
+      </p:ext>
+    </p:extLst>
+  </p:cSld>
+  <p:clrMapOvr>
+    <a:masterClrMapping/>
+  </p:clrMapOvr>
+</p:sld>
+</file>
+
+<file path=ppt/slides/slide14.xml><?xml version="1.0" encoding="utf-8"?>
+<p:sld xmlns:a="http://schemas.openxmlformats.org/drawingml/2006/main" xmlns:r="http://schemas.openxmlformats.org/officeDocument/2006/relationships" xmlns:p="http://schemas.openxmlformats.org/presentationml/2006/main">
+  <p:cSld>
+    <p:spTree>
+      <p:nvGrpSpPr>
+        <p:cNvPr id="1" name=""/>
+        <p:cNvGrpSpPr/>
+        <p:nvPr/>
+      </p:nvGrpSpPr>
+      <p:grpSpPr>
+        <a:xfrm>
+          <a:off x="0" y="0"/>
+          <a:ext cx="0" cy="0"/>
+          <a:chOff x="0" y="0"/>
+          <a:chExt cx="0" cy="0"/>
+        </a:xfrm>
+      </p:grpSpPr>
+      <p:sp>
+        <p:nvSpPr>
+          <p:cNvPr id="2" name="Titolo 1">
+            <a:extLst>
+              <a:ext uri="{FF2B5EF4-FFF2-40B4-BE49-F238E27FC236}">
+                <a16:creationId xmlns:a16="http://schemas.microsoft.com/office/drawing/2014/main" id="{B59E6DEA-D7A1-44D2-8559-89B730CE3681}"/>
+              </a:ext>
+            </a:extLst>
+          </p:cNvPr>
+          <p:cNvSpPr>
+            <a:spLocks noGrp="1"/>
+          </p:cNvSpPr>
+          <p:nvPr>
+            <p:ph type="ctrTitle"/>
+          </p:nvPr>
+        </p:nvSpPr>
+        <p:spPr/>
+        <p:txBody>
+          <a:bodyPr/>
+          <a:lstStyle/>
+          <a:p>
+            <a:r>
+              <a:rPr lang="it-IT" dirty="0" err="1"/>
+              <a:t>Final</a:t>
+            </a:r>
+            <a:r>
+              <a:rPr lang="it-IT" dirty="0"/>
+              <a:t> </a:t>
+            </a:r>
+            <a:r>
+              <a:rPr lang="it-IT" dirty="0" err="1"/>
+              <a:t>thoughts</a:t>
+            </a:r>
+            <a:endParaRPr lang="it-IT" dirty="0"/>
+          </a:p>
+        </p:txBody>
+      </p:sp>
+      <p:sp>
+        <p:nvSpPr>
+          <p:cNvPr id="3" name="Sottotitolo 2">
+            <a:extLst>
+              <a:ext uri="{FF2B5EF4-FFF2-40B4-BE49-F238E27FC236}">
+                <a16:creationId xmlns:a16="http://schemas.microsoft.com/office/drawing/2014/main" id="{83A8CAC3-1E41-4E08-84F1-50D0906D1288}"/>
+              </a:ext>
+            </a:extLst>
+          </p:cNvPr>
+          <p:cNvSpPr>
+            <a:spLocks noGrp="1"/>
+          </p:cNvSpPr>
+          <p:nvPr>
+            <p:ph type="subTitle" idx="1"/>
+          </p:nvPr>
+        </p:nvSpPr>
+        <p:spPr/>
+        <p:txBody>
+          <a:bodyPr/>
+          <a:lstStyle/>
+          <a:p>
+            <a:endParaRPr lang="it-IT"/>
+          </a:p>
+        </p:txBody>
+      </p:sp>
+    </p:spTree>
+    <p:extLst>
+      <p:ext uri="{BB962C8B-B14F-4D97-AF65-F5344CB8AC3E}">
+        <p14:creationId xmlns:p14="http://schemas.microsoft.com/office/powerpoint/2010/main" val="3978280543"/>
+      </p:ext>
+    </p:extLst>
+  </p:cSld>
+  <p:clrMapOvr>
+    <a:masterClrMapping/>
+  </p:clrMapOvr>
+</p:sld>
+</file>
+
+<file path=ppt/slides/slide15.xml><?xml version="1.0" encoding="utf-8"?>
+<p:sld xmlns:a="http://schemas.openxmlformats.org/drawingml/2006/main" xmlns:r="http://schemas.openxmlformats.org/officeDocument/2006/relationships" xmlns:p="http://schemas.openxmlformats.org/presentationml/2006/main">
+  <p:cSld>
+    <p:spTree>
+      <p:nvGrpSpPr>
+        <p:cNvPr id="1" name=""/>
+        <p:cNvGrpSpPr/>
+        <p:nvPr/>
+      </p:nvGrpSpPr>
+      <p:grpSpPr>
+        <a:xfrm>
+          <a:off x="0" y="0"/>
+          <a:ext cx="0" cy="0"/>
+          <a:chOff x="0" y="0"/>
+          <a:chExt cx="0" cy="0"/>
+        </a:xfrm>
+      </p:grpSpPr>
+      <p:sp>
+        <p:nvSpPr>
+          <p:cNvPr id="2" name="Titolo 1">
+            <a:extLst>
+              <a:ext uri="{FF2B5EF4-FFF2-40B4-BE49-F238E27FC236}">
                 <a16:creationId xmlns:a16="http://schemas.microsoft.com/office/drawing/2014/main" id="{A067CE87-7A60-4DFB-8B71-6EC9C173906C}"/>
               </a:ext>
             </a:extLst>
@@ -3483,7 +4087,7 @@
           <a:bodyPr/>
           <a:lstStyle/>
           <a:p>
-            <a:endParaRPr lang="it-IT"/>
+            <a:endParaRPr lang="it-IT" dirty="0"/>
           </a:p>
         </p:txBody>
       </p:sp>
@@ -3839,7 +4443,41 @@
           <a:bodyPr/>
           <a:lstStyle/>
           <a:p>
-            <a:endParaRPr lang="it-IT"/>
+            <a:r>
+              <a:rPr lang="it-IT" dirty="0" err="1"/>
+              <a:t>Injection</a:t>
+            </a:r>
+            <a:r>
+              <a:rPr lang="it-IT" dirty="0"/>
+              <a:t> </a:t>
+            </a:r>
+            <a:r>
+              <a:rPr lang="it-IT" dirty="0" err="1"/>
+              <a:t>is</a:t>
+            </a:r>
+            <a:r>
+              <a:rPr lang="it-IT" dirty="0"/>
+              <a:t> </a:t>
+            </a:r>
+            <a:r>
+              <a:rPr lang="it-IT" dirty="0" err="1"/>
+              <a:t>included</a:t>
+            </a:r>
+            <a:r>
+              <a:rPr lang="it-IT" dirty="0"/>
+              <a:t> by OWASP in </a:t>
+            </a:r>
+            <a:r>
+              <a:rPr lang="it-IT" dirty="0" err="1"/>
+              <a:t>its</a:t>
+            </a:r>
+            <a:r>
+              <a:rPr lang="it-IT" dirty="0"/>
+              <a:t> Top 10 list</a:t>
+            </a:r>
+          </a:p>
+          <a:p>
+            <a:endParaRPr lang="it-IT" dirty="0"/>
           </a:p>
         </p:txBody>
       </p:sp>
@@ -3961,15 +4599,15 @@
           <p:cNvPr id="2" name="Titolo 1">
             <a:extLst>
               <a:ext uri="{FF2B5EF4-FFF2-40B4-BE49-F238E27FC236}">
-                <a16:creationId xmlns:a16="http://schemas.microsoft.com/office/drawing/2014/main" id="{55A6B881-99C6-4A53-9887-C4CF7F81C98C}"/>
-              </a:ext>
-            </a:extLst>
-          </p:cNvPr>
-          <p:cNvSpPr>
-            <a:spLocks noGrp="1"/>
-          </p:cNvSpPr>
-          <p:nvPr>
-            <p:ph type="ctrTitle"/>
+                <a16:creationId xmlns:a16="http://schemas.microsoft.com/office/drawing/2014/main" id="{798B9639-0F4A-45B1-8110-C19393E8FE7F}"/>
+              </a:ext>
+            </a:extLst>
+          </p:cNvPr>
+          <p:cNvSpPr>
+            <a:spLocks noGrp="1"/>
+          </p:cNvSpPr>
+          <p:nvPr>
+            <p:ph type="title"/>
           </p:nvPr>
         </p:nvSpPr>
         <p:spPr/>
@@ -3978,8 +4616,12 @@
           <a:lstStyle/>
           <a:p>
             <a:r>
-              <a:rPr lang="it-IT" dirty="0" err="1"/>
-              <a:t>Authentication</a:t>
+              <a:rPr lang="it-IT" dirty="0"/>
+              <a:t>Password Management </a:t>
+            </a:r>
+            <a:r>
+              <a:rPr lang="it-IT" dirty="0" err="1"/>
+              <a:t>Introduction</a:t>
             </a:r>
             <a:endParaRPr lang="it-IT" dirty="0"/>
           </a:p>
@@ -3987,33 +4629,454 @@
       </p:sp>
       <p:sp>
         <p:nvSpPr>
-          <p:cNvPr id="3" name="Sottotitolo 2">
-            <a:extLst>
-              <a:ext uri="{FF2B5EF4-FFF2-40B4-BE49-F238E27FC236}">
-                <a16:creationId xmlns:a16="http://schemas.microsoft.com/office/drawing/2014/main" id="{8D40AB1A-1C75-4E7E-B2F6-E36092B5E52F}"/>
-              </a:ext>
-            </a:extLst>
-          </p:cNvPr>
-          <p:cNvSpPr>
-            <a:spLocks noGrp="1"/>
-          </p:cNvSpPr>
-          <p:nvPr>
-            <p:ph type="subTitle" idx="1"/>
-          </p:nvPr>
-        </p:nvSpPr>
-        <p:spPr/>
-        <p:txBody>
-          <a:bodyPr/>
-          <a:lstStyle/>
-          <a:p>
-            <a:endParaRPr lang="it-IT"/>
+          <p:cNvPr id="3" name="Segnaposto contenuto 2">
+            <a:extLst>
+              <a:ext uri="{FF2B5EF4-FFF2-40B4-BE49-F238E27FC236}">
+                <a16:creationId xmlns:a16="http://schemas.microsoft.com/office/drawing/2014/main" id="{64307917-251F-4290-91B9-87BCC0169BCF}"/>
+              </a:ext>
+            </a:extLst>
+          </p:cNvPr>
+          <p:cNvSpPr>
+            <a:spLocks noGrp="1"/>
+          </p:cNvSpPr>
+          <p:nvPr>
+            <p:ph idx="1"/>
+          </p:nvPr>
+        </p:nvSpPr>
+        <p:spPr>
+          <a:xfrm>
+            <a:off x="562708" y="1420838"/>
+            <a:ext cx="10791092" cy="4756126"/>
+          </a:xfrm>
+        </p:spPr>
+        <p:txBody>
+          <a:bodyPr>
+            <a:normAutofit/>
+          </a:bodyPr>
+          <a:lstStyle/>
+          <a:p>
+            <a:r>
+              <a:rPr lang="it-IT" dirty="0"/>
+              <a:t>Password management </a:t>
+            </a:r>
+            <a:r>
+              <a:rPr lang="it-IT" dirty="0" err="1"/>
+              <a:t>is</a:t>
+            </a:r>
+            <a:r>
+              <a:rPr lang="it-IT" dirty="0"/>
+              <a:t> </a:t>
+            </a:r>
+            <a:r>
+              <a:rPr lang="it-IT" dirty="0" err="1"/>
+              <a:t>critical</a:t>
+            </a:r>
+            <a:r>
+              <a:rPr lang="it-IT" dirty="0"/>
+              <a:t> for system security</a:t>
+            </a:r>
+          </a:p>
+          <a:p>
+            <a:r>
+              <a:rPr lang="it-IT" dirty="0" err="1"/>
+              <a:t>Storing</a:t>
+            </a:r>
+            <a:r>
+              <a:rPr lang="it-IT" dirty="0"/>
+              <a:t> </a:t>
+            </a:r>
+            <a:r>
+              <a:rPr lang="it-IT" dirty="0" err="1"/>
+              <a:t>them</a:t>
+            </a:r>
+            <a:r>
+              <a:rPr lang="it-IT" dirty="0"/>
+              <a:t> in </a:t>
+            </a:r>
+            <a:r>
+              <a:rPr lang="it-IT" dirty="0" err="1"/>
+              <a:t>plain</a:t>
+            </a:r>
+            <a:r>
+              <a:rPr lang="it-IT" dirty="0"/>
+              <a:t> text or </a:t>
+            </a:r>
+            <a:r>
+              <a:rPr lang="it-IT" dirty="0" err="1"/>
+              <a:t>using</a:t>
+            </a:r>
+            <a:r>
+              <a:rPr lang="it-IT" dirty="0"/>
+              <a:t> </a:t>
+            </a:r>
+            <a:r>
+              <a:rPr lang="it-IT" dirty="0" err="1"/>
+              <a:t>weak</a:t>
+            </a:r>
+            <a:r>
+              <a:rPr lang="it-IT" dirty="0"/>
+              <a:t> </a:t>
+            </a:r>
+            <a:r>
+              <a:rPr lang="it-IT" dirty="0" err="1"/>
+              <a:t>unsalted</a:t>
+            </a:r>
+            <a:r>
+              <a:rPr lang="it-IT" dirty="0"/>
+              <a:t> </a:t>
+            </a:r>
+            <a:r>
+              <a:rPr lang="it-IT" dirty="0" err="1"/>
+              <a:t>hashes</a:t>
+            </a:r>
+            <a:r>
+              <a:rPr lang="it-IT" dirty="0"/>
+              <a:t> </a:t>
+            </a:r>
+            <a:r>
+              <a:rPr lang="it-IT" dirty="0" err="1"/>
+              <a:t>leads</a:t>
+            </a:r>
+            <a:r>
+              <a:rPr lang="it-IT" dirty="0"/>
+              <a:t> to account </a:t>
+            </a:r>
+            <a:r>
+              <a:rPr lang="it-IT" dirty="0" err="1"/>
+              <a:t>stealing</a:t>
+            </a:r>
+            <a:r>
+              <a:rPr lang="it-IT" dirty="0"/>
+              <a:t>, </a:t>
+            </a:r>
+            <a:r>
+              <a:rPr lang="it-IT" dirty="0" err="1"/>
+              <a:t>which</a:t>
+            </a:r>
+            <a:r>
+              <a:rPr lang="it-IT" dirty="0"/>
+              <a:t> </a:t>
+            </a:r>
+            <a:r>
+              <a:rPr lang="it-IT" dirty="0" err="1"/>
+              <a:t>may</a:t>
+            </a:r>
+            <a:r>
+              <a:rPr lang="it-IT" dirty="0"/>
+              <a:t> be the first step to sensitive data </a:t>
+            </a:r>
+            <a:r>
+              <a:rPr lang="it-IT" dirty="0" err="1"/>
+              <a:t>disclosure</a:t>
+            </a:r>
+            <a:r>
+              <a:rPr lang="it-IT" dirty="0"/>
+              <a:t> or </a:t>
+            </a:r>
+            <a:r>
+              <a:rPr lang="it-IT" dirty="0" err="1"/>
+              <a:t>backdoor</a:t>
+            </a:r>
+            <a:r>
+              <a:rPr lang="it-IT" dirty="0"/>
+              <a:t> </a:t>
+            </a:r>
+            <a:r>
+              <a:rPr lang="it-IT" dirty="0" err="1"/>
+              <a:t>installation</a:t>
+            </a:r>
+            <a:endParaRPr lang="it-IT" dirty="0"/>
+          </a:p>
+          <a:p>
+            <a:pPr lvl="1"/>
+            <a:r>
+              <a:rPr lang="it-IT" dirty="0"/>
+              <a:t>An </a:t>
+            </a:r>
+            <a:r>
+              <a:rPr lang="it-IT" dirty="0" err="1"/>
+              <a:t>example</a:t>
+            </a:r>
+            <a:r>
+              <a:rPr lang="it-IT" dirty="0"/>
+              <a:t> of </a:t>
+            </a:r>
+            <a:r>
+              <a:rPr lang="it-IT" dirty="0" err="1"/>
+              <a:t>weak</a:t>
+            </a:r>
+            <a:r>
+              <a:rPr lang="it-IT" dirty="0"/>
+              <a:t> </a:t>
+            </a:r>
+            <a:r>
+              <a:rPr lang="it-IT" dirty="0" err="1"/>
+              <a:t>hash</a:t>
+            </a:r>
+            <a:r>
+              <a:rPr lang="it-IT" dirty="0"/>
+              <a:t> </a:t>
+            </a:r>
+            <a:r>
+              <a:rPr lang="it-IT" dirty="0" err="1"/>
+              <a:t>is</a:t>
+            </a:r>
+            <a:r>
+              <a:rPr lang="it-IT" dirty="0"/>
+              <a:t> MD5 </a:t>
+            </a:r>
+            <a:r>
+              <a:rPr lang="it-IT" dirty="0" err="1"/>
+              <a:t>that</a:t>
+            </a:r>
+            <a:r>
+              <a:rPr lang="it-IT" dirty="0"/>
+              <a:t> </a:t>
+            </a:r>
+            <a:r>
+              <a:rPr lang="it-IT" dirty="0" err="1"/>
+              <a:t>should</a:t>
+            </a:r>
+            <a:r>
+              <a:rPr lang="it-IT" dirty="0"/>
+              <a:t> be </a:t>
+            </a:r>
+            <a:r>
+              <a:rPr lang="it-IT" dirty="0" err="1"/>
+              <a:t>used</a:t>
+            </a:r>
+            <a:r>
+              <a:rPr lang="it-IT" dirty="0"/>
+              <a:t> </a:t>
+            </a:r>
+            <a:r>
+              <a:rPr lang="it-IT" dirty="0" err="1"/>
+              <a:t>only</a:t>
+            </a:r>
+            <a:r>
+              <a:rPr lang="it-IT" dirty="0"/>
+              <a:t> for </a:t>
+            </a:r>
+            <a:r>
+              <a:rPr lang="it-IT" dirty="0" err="1"/>
+              <a:t>digests</a:t>
+            </a:r>
+            <a:r>
+              <a:rPr lang="it-IT" dirty="0"/>
+              <a:t>, </a:t>
+            </a:r>
+            <a:r>
+              <a:rPr lang="it-IT" dirty="0" err="1"/>
+              <a:t>because</a:t>
+            </a:r>
+            <a:r>
+              <a:rPr lang="it-IT" dirty="0"/>
+              <a:t> </a:t>
+            </a:r>
+            <a:r>
+              <a:rPr lang="it-IT" dirty="0" err="1"/>
+              <a:t>is</a:t>
+            </a:r>
+            <a:r>
+              <a:rPr lang="it-IT" dirty="0"/>
+              <a:t> a fast, </a:t>
+            </a:r>
+            <a:r>
+              <a:rPr lang="it-IT" dirty="0" err="1"/>
+              <a:t>memory-conserving</a:t>
+            </a:r>
+            <a:r>
+              <a:rPr lang="it-IT" dirty="0"/>
+              <a:t> </a:t>
+            </a:r>
+            <a:r>
+              <a:rPr lang="it-IT" dirty="0" err="1"/>
+              <a:t>algorithm</a:t>
+            </a:r>
+            <a:r>
+              <a:rPr lang="it-IT" dirty="0"/>
+              <a:t>, </a:t>
+            </a:r>
+            <a:r>
+              <a:rPr lang="it-IT" dirty="0" err="1"/>
+              <a:t>crackable</a:t>
+            </a:r>
+            <a:r>
+              <a:rPr lang="it-IT" dirty="0"/>
+              <a:t> by </a:t>
+            </a:r>
+            <a:r>
+              <a:rPr lang="it-IT" dirty="0" err="1"/>
+              <a:t>FPGAs</a:t>
+            </a:r>
+            <a:r>
+              <a:rPr lang="it-IT" dirty="0"/>
+              <a:t> and </a:t>
+            </a:r>
+            <a:r>
+              <a:rPr lang="it-IT" dirty="0" err="1"/>
+              <a:t>ASICs</a:t>
+            </a:r>
+            <a:endParaRPr lang="it-IT" dirty="0"/>
+          </a:p>
+          <a:p>
+            <a:r>
+              <a:rPr lang="it-IT" dirty="0" err="1"/>
+              <a:t>Allowing</a:t>
+            </a:r>
+            <a:r>
+              <a:rPr lang="it-IT" dirty="0"/>
+              <a:t> </a:t>
+            </a:r>
+            <a:r>
+              <a:rPr lang="it-IT" dirty="0" err="1"/>
+              <a:t>easily-guessable</a:t>
+            </a:r>
+            <a:r>
+              <a:rPr lang="it-IT" dirty="0"/>
+              <a:t> password </a:t>
+            </a:r>
+            <a:r>
+              <a:rPr lang="it-IT" dirty="0" err="1"/>
+              <a:t>like</a:t>
+            </a:r>
+            <a:r>
+              <a:rPr lang="it-IT" dirty="0"/>
+              <a:t> «1234» or «password» </a:t>
+            </a:r>
+            <a:r>
+              <a:rPr lang="it-IT" dirty="0" err="1"/>
+              <a:t>is</a:t>
+            </a:r>
+            <a:r>
+              <a:rPr lang="it-IT" dirty="0"/>
+              <a:t> a </a:t>
+            </a:r>
+            <a:r>
+              <a:rPr lang="it-IT" dirty="0" err="1"/>
+              <a:t>vulnerability</a:t>
+            </a:r>
+            <a:r>
+              <a:rPr lang="it-IT" dirty="0"/>
+              <a:t> </a:t>
+            </a:r>
+            <a:r>
+              <a:rPr lang="it-IT" dirty="0" err="1"/>
+              <a:t>independent</a:t>
+            </a:r>
+            <a:r>
+              <a:rPr lang="it-IT" dirty="0"/>
+              <a:t> from </a:t>
+            </a:r>
+            <a:r>
+              <a:rPr lang="it-IT" dirty="0" err="1"/>
+              <a:t>hashing</a:t>
+            </a:r>
+            <a:r>
+              <a:rPr lang="it-IT" dirty="0"/>
+              <a:t> </a:t>
+            </a:r>
+            <a:r>
+              <a:rPr lang="it-IT" dirty="0" err="1"/>
+              <a:t>technique</a:t>
+            </a:r>
+            <a:r>
+              <a:rPr lang="it-IT" dirty="0"/>
+              <a:t>, so a strong password policy </a:t>
+            </a:r>
+            <a:r>
+              <a:rPr lang="it-IT" dirty="0" err="1"/>
+              <a:t>should</a:t>
+            </a:r>
+            <a:r>
+              <a:rPr lang="it-IT" dirty="0"/>
+              <a:t> be </a:t>
+            </a:r>
+            <a:r>
+              <a:rPr lang="it-IT" dirty="0" err="1"/>
+              <a:t>needed</a:t>
+            </a:r>
+            <a:r>
+              <a:rPr lang="it-IT" dirty="0"/>
+              <a:t>.</a:t>
+            </a:r>
+          </a:p>
+          <a:p>
+            <a:r>
+              <a:rPr lang="it-IT" dirty="0"/>
+              <a:t>A system </a:t>
+            </a:r>
+            <a:r>
+              <a:rPr lang="it-IT" dirty="0" err="1"/>
+              <a:t>should</a:t>
+            </a:r>
+            <a:r>
+              <a:rPr lang="it-IT" dirty="0"/>
+              <a:t> be </a:t>
+            </a:r>
+            <a:r>
+              <a:rPr lang="it-IT" dirty="0" err="1"/>
+              <a:t>resilient</a:t>
+            </a:r>
+            <a:r>
+              <a:rPr lang="it-IT" dirty="0"/>
+              <a:t> </a:t>
+            </a:r>
+            <a:r>
+              <a:rPr lang="it-IT" dirty="0" err="1"/>
+              <a:t>even</a:t>
+            </a:r>
+            <a:r>
+              <a:rPr lang="it-IT" dirty="0"/>
+              <a:t> to password </a:t>
+            </a:r>
+            <a:r>
+              <a:rPr lang="it-IT" dirty="0" err="1"/>
+              <a:t>stealing</a:t>
+            </a:r>
+            <a:r>
+              <a:rPr lang="it-IT" dirty="0"/>
+              <a:t>, for </a:t>
+            </a:r>
+            <a:r>
+              <a:rPr lang="it-IT" dirty="0" err="1"/>
+              <a:t>example</a:t>
+            </a:r>
+            <a:r>
+              <a:rPr lang="it-IT" dirty="0"/>
+              <a:t> </a:t>
+            </a:r>
+            <a:r>
+              <a:rPr lang="it-IT" dirty="0" err="1"/>
+              <a:t>implementing</a:t>
+            </a:r>
+            <a:r>
+              <a:rPr lang="it-IT" dirty="0"/>
+              <a:t> a </a:t>
+            </a:r>
+            <a:r>
+              <a:rPr lang="it-IT" dirty="0" err="1"/>
+              <a:t>multifactor</a:t>
+            </a:r>
+            <a:r>
+              <a:rPr lang="it-IT" dirty="0"/>
+              <a:t> </a:t>
+            </a:r>
+            <a:r>
+              <a:rPr lang="it-IT" dirty="0" err="1"/>
+              <a:t>authentication</a:t>
+            </a:r>
+            <a:r>
+              <a:rPr lang="it-IT" dirty="0"/>
+              <a:t>.</a:t>
+            </a:r>
           </a:p>
         </p:txBody>
       </p:sp>
     </p:spTree>
     <p:extLst>
       <p:ext uri="{BB962C8B-B14F-4D97-AF65-F5344CB8AC3E}">
-        <p14:creationId xmlns:p14="http://schemas.microsoft.com/office/powerpoint/2010/main" val="2828430958"/>
+        <p14:creationId xmlns:p14="http://schemas.microsoft.com/office/powerpoint/2010/main" val="3434342530"/>
       </p:ext>
     </p:extLst>
   </p:cSld>
@@ -4045,7 +5108,7 @@
           <p:cNvPr id="2" name="Titolo 1">
             <a:extLst>
               <a:ext uri="{FF2B5EF4-FFF2-40B4-BE49-F238E27FC236}">
-                <a16:creationId xmlns:a16="http://schemas.microsoft.com/office/drawing/2014/main" id="{46C691D0-7338-46F2-8ADD-28A06C048950}"/>
+                <a16:creationId xmlns:a16="http://schemas.microsoft.com/office/drawing/2014/main" id="{C7C58847-30BA-42DB-A627-5C5318FEDCEE}"/>
               </a:ext>
             </a:extLst>
           </p:cNvPr>
@@ -4062,8 +5125,12 @@
           <a:lstStyle/>
           <a:p>
             <a:r>
-              <a:rPr lang="it-IT" dirty="0" err="1"/>
-              <a:t>Authentication</a:t>
+              <a:rPr lang="it-IT" dirty="0"/>
+              <a:t>Password </a:t>
+            </a:r>
+            <a:r>
+              <a:rPr lang="it-IT" dirty="0" err="1"/>
+              <a:t>cryptography</a:t>
             </a:r>
             <a:endParaRPr lang="it-IT" dirty="0"/>
           </a:p>
@@ -4074,7 +5141,7 @@
           <p:cNvPr id="3" name="Segnaposto contenuto 2">
             <a:extLst>
               <a:ext uri="{FF2B5EF4-FFF2-40B4-BE49-F238E27FC236}">
-                <a16:creationId xmlns:a16="http://schemas.microsoft.com/office/drawing/2014/main" id="{08C787D0-B8AB-4FE5-887B-27D8C44837BC}"/>
+                <a16:creationId xmlns:a16="http://schemas.microsoft.com/office/drawing/2014/main" id="{48DC0B16-F1BB-46C4-B359-A25BEEC7287E}"/>
               </a:ext>
             </a:extLst>
           </p:cNvPr>
@@ -4090,14 +5157,633 @@
           <a:bodyPr/>
           <a:lstStyle/>
           <a:p>
-            <a:endParaRPr lang="it-IT"/>
+            <a:r>
+              <a:rPr lang="it-IT" dirty="0" err="1"/>
+              <a:t>We</a:t>
+            </a:r>
+            <a:r>
+              <a:rPr lang="it-IT" dirty="0"/>
+              <a:t> </a:t>
+            </a:r>
+            <a:r>
+              <a:rPr lang="it-IT" dirty="0" err="1"/>
+              <a:t>analyzed</a:t>
+            </a:r>
+            <a:r>
+              <a:rPr lang="it-IT" dirty="0"/>
+              <a:t> </a:t>
+            </a:r>
+            <a:r>
+              <a:rPr lang="it-IT" dirty="0" err="1"/>
+              <a:t>several</a:t>
+            </a:r>
+            <a:r>
+              <a:rPr lang="it-IT" dirty="0"/>
+              <a:t> password </a:t>
+            </a:r>
+            <a:r>
+              <a:rPr lang="it-IT" dirty="0" err="1"/>
+              <a:t>cryptography</a:t>
+            </a:r>
+            <a:r>
+              <a:rPr lang="it-IT" dirty="0"/>
+              <a:t> </a:t>
+            </a:r>
+            <a:r>
+              <a:rPr lang="it-IT" dirty="0" err="1"/>
+              <a:t>techniques</a:t>
+            </a:r>
+            <a:r>
+              <a:rPr lang="it-IT" dirty="0"/>
+              <a:t>, </a:t>
+            </a:r>
+            <a:r>
+              <a:rPr lang="it-IT" dirty="0" err="1"/>
+              <a:t>like</a:t>
+            </a:r>
+            <a:r>
+              <a:rPr lang="it-IT" dirty="0"/>
+              <a:t> </a:t>
+            </a:r>
+            <a:r>
+              <a:rPr lang="it-IT" dirty="0" err="1"/>
+              <a:t>using</a:t>
+            </a:r>
+            <a:r>
+              <a:rPr lang="it-IT" dirty="0"/>
+              <a:t> </a:t>
+            </a:r>
+            <a:r>
+              <a:rPr lang="it-IT" dirty="0" err="1"/>
+              <a:t>not</a:t>
+            </a:r>
+            <a:r>
+              <a:rPr lang="it-IT" dirty="0"/>
+              <a:t> </a:t>
+            </a:r>
+            <a:r>
+              <a:rPr lang="it-IT" dirty="0" err="1"/>
+              <a:t>only</a:t>
+            </a:r>
+            <a:r>
+              <a:rPr lang="it-IT" dirty="0"/>
+              <a:t> a </a:t>
+            </a:r>
+            <a:r>
+              <a:rPr lang="it-IT" dirty="0" err="1"/>
+              <a:t>salt</a:t>
+            </a:r>
+            <a:r>
+              <a:rPr lang="it-IT" dirty="0"/>
+              <a:t>, </a:t>
+            </a:r>
+            <a:r>
+              <a:rPr lang="it-IT" dirty="0" err="1"/>
+              <a:t>but</a:t>
+            </a:r>
+            <a:r>
+              <a:rPr lang="it-IT" dirty="0"/>
+              <a:t> a </a:t>
+            </a:r>
+            <a:r>
+              <a:rPr lang="it-IT" dirty="0" err="1"/>
+              <a:t>pepper</a:t>
+            </a:r>
+            <a:r>
+              <a:rPr lang="it-IT" dirty="0"/>
+              <a:t> </a:t>
+            </a:r>
+            <a:r>
+              <a:rPr lang="it-IT" dirty="0" err="1"/>
+              <a:t>too</a:t>
+            </a:r>
+            <a:endParaRPr lang="it-IT" dirty="0"/>
+          </a:p>
+          <a:p>
+            <a:pPr lvl="1"/>
+            <a:r>
+              <a:rPr lang="it-IT" dirty="0"/>
+              <a:t>A </a:t>
+            </a:r>
+            <a:r>
+              <a:rPr lang="it-IT" dirty="0" err="1"/>
+              <a:t>pepper</a:t>
+            </a:r>
+            <a:r>
+              <a:rPr lang="it-IT" dirty="0"/>
+              <a:t> </a:t>
+            </a:r>
+            <a:r>
+              <a:rPr lang="it-IT" dirty="0" err="1"/>
+              <a:t>is</a:t>
+            </a:r>
+            <a:r>
+              <a:rPr lang="it-IT" dirty="0"/>
+              <a:t> </a:t>
+            </a:r>
+            <a:r>
+              <a:rPr lang="it-IT" dirty="0" err="1"/>
+              <a:t>like</a:t>
+            </a:r>
+            <a:r>
+              <a:rPr lang="it-IT" dirty="0"/>
+              <a:t> </a:t>
+            </a:r>
+            <a:r>
+              <a:rPr lang="it-IT" dirty="0" err="1"/>
+              <a:t>salt</a:t>
+            </a:r>
+            <a:r>
+              <a:rPr lang="it-IT" dirty="0"/>
+              <a:t> </a:t>
+            </a:r>
+            <a:r>
+              <a:rPr lang="it-IT" dirty="0" err="1"/>
+              <a:t>but</a:t>
+            </a:r>
+            <a:r>
+              <a:rPr lang="it-IT" dirty="0"/>
+              <a:t> </a:t>
+            </a:r>
+            <a:r>
+              <a:rPr lang="it-IT" dirty="0" err="1"/>
+              <a:t>is</a:t>
+            </a:r>
+            <a:r>
+              <a:rPr lang="it-IT" dirty="0"/>
+              <a:t> </a:t>
+            </a:r>
+            <a:r>
+              <a:rPr lang="it-IT" dirty="0" err="1"/>
+              <a:t>not</a:t>
+            </a:r>
+            <a:r>
+              <a:rPr lang="it-IT" dirty="0"/>
+              <a:t> </a:t>
+            </a:r>
+            <a:r>
+              <a:rPr lang="it-IT" dirty="0" err="1"/>
+              <a:t>stored</a:t>
+            </a:r>
+            <a:r>
+              <a:rPr lang="it-IT" dirty="0"/>
+              <a:t> </a:t>
+            </a:r>
+            <a:r>
+              <a:rPr lang="it-IT" dirty="0" err="1"/>
+              <a:t>alongside</a:t>
+            </a:r>
+            <a:r>
+              <a:rPr lang="it-IT" dirty="0"/>
+              <a:t> the password.</a:t>
+            </a:r>
+          </a:p>
+          <a:p>
+            <a:pPr lvl="1"/>
+            <a:r>
+              <a:rPr lang="it-IT" dirty="0" err="1"/>
+              <a:t>Even</a:t>
+            </a:r>
+            <a:r>
+              <a:rPr lang="it-IT" dirty="0"/>
+              <a:t> </a:t>
+            </a:r>
+            <a:r>
+              <a:rPr lang="it-IT" dirty="0" err="1"/>
+              <a:t>though</a:t>
+            </a:r>
+            <a:r>
+              <a:rPr lang="it-IT" dirty="0"/>
+              <a:t> </a:t>
+            </a:r>
+            <a:r>
+              <a:rPr lang="it-IT" dirty="0" err="1"/>
+              <a:t>may</a:t>
+            </a:r>
+            <a:r>
+              <a:rPr lang="it-IT" dirty="0"/>
+              <a:t> </a:t>
+            </a:r>
+            <a:r>
+              <a:rPr lang="it-IT" dirty="0" err="1"/>
+              <a:t>seem</a:t>
+            </a:r>
+            <a:r>
+              <a:rPr lang="it-IT" dirty="0"/>
+              <a:t> to </a:t>
+            </a:r>
+            <a:r>
+              <a:rPr lang="it-IT" dirty="0" err="1"/>
+              <a:t>add</a:t>
+            </a:r>
+            <a:r>
+              <a:rPr lang="it-IT" dirty="0"/>
+              <a:t> security to </a:t>
+            </a:r>
+            <a:r>
+              <a:rPr lang="it-IT" dirty="0" err="1"/>
+              <a:t>passwords</a:t>
+            </a:r>
+            <a:r>
+              <a:rPr lang="it-IT" dirty="0"/>
+              <a:t>, no </a:t>
+            </a:r>
+            <a:r>
+              <a:rPr lang="it-IT" dirty="0" err="1"/>
+              <a:t>algorithm</a:t>
+            </a:r>
+            <a:r>
+              <a:rPr lang="it-IT" dirty="0"/>
+              <a:t> supports </a:t>
+            </a:r>
+            <a:r>
+              <a:rPr lang="it-IT" dirty="0" err="1"/>
+              <a:t>them</a:t>
+            </a:r>
+            <a:r>
+              <a:rPr lang="it-IT" dirty="0"/>
+              <a:t>, </a:t>
+            </a:r>
+            <a:r>
+              <a:rPr lang="it-IT" dirty="0" err="1"/>
+              <a:t>meaning</a:t>
+            </a:r>
+            <a:r>
+              <a:rPr lang="it-IT" dirty="0"/>
+              <a:t> </a:t>
+            </a:r>
+            <a:r>
+              <a:rPr lang="it-IT" dirty="0" err="1"/>
+              <a:t>that</a:t>
+            </a:r>
+            <a:r>
+              <a:rPr lang="it-IT" dirty="0"/>
+              <a:t> </a:t>
+            </a:r>
+            <a:r>
+              <a:rPr lang="it-IT" dirty="0" err="1"/>
+              <a:t>we</a:t>
+            </a:r>
+            <a:r>
+              <a:rPr lang="it-IT" dirty="0"/>
+              <a:t> </a:t>
+            </a:r>
+            <a:r>
+              <a:rPr lang="it-IT" dirty="0" err="1"/>
+              <a:t>would</a:t>
+            </a:r>
+            <a:r>
+              <a:rPr lang="it-IT" dirty="0"/>
+              <a:t> </a:t>
+            </a:r>
+            <a:r>
+              <a:rPr lang="it-IT" dirty="0" err="1"/>
+              <a:t>have</a:t>
+            </a:r>
+            <a:r>
+              <a:rPr lang="it-IT" dirty="0"/>
+              <a:t> to </a:t>
+            </a:r>
+            <a:r>
+              <a:rPr lang="it-IT" dirty="0" err="1"/>
+              <a:t>develop</a:t>
+            </a:r>
+            <a:r>
+              <a:rPr lang="it-IT" dirty="0"/>
+              <a:t> </a:t>
+            </a:r>
+            <a:r>
+              <a:rPr lang="it-IT" dirty="0" err="1"/>
+              <a:t>our</a:t>
+            </a:r>
+            <a:r>
+              <a:rPr lang="it-IT" dirty="0"/>
+              <a:t> </a:t>
+            </a:r>
+            <a:r>
+              <a:rPr lang="it-IT" dirty="0" err="1"/>
+              <a:t>cryptography</a:t>
+            </a:r>
+            <a:r>
+              <a:rPr lang="it-IT" dirty="0"/>
+              <a:t> </a:t>
+            </a:r>
+            <a:r>
+              <a:rPr lang="it-IT" dirty="0" err="1"/>
+              <a:t>algorithm</a:t>
+            </a:r>
+            <a:r>
+              <a:rPr lang="it-IT" dirty="0"/>
+              <a:t> and </a:t>
+            </a:r>
+            <a:r>
+              <a:rPr lang="it-IT" dirty="0" err="1"/>
+              <a:t>would</a:t>
+            </a:r>
+            <a:r>
+              <a:rPr lang="it-IT" dirty="0"/>
+              <a:t> </a:t>
+            </a:r>
+            <a:r>
+              <a:rPr lang="it-IT" dirty="0" err="1"/>
+              <a:t>probably</a:t>
+            </a:r>
+            <a:r>
+              <a:rPr lang="it-IT" dirty="0"/>
+              <a:t> reduce </a:t>
+            </a:r>
+            <a:r>
+              <a:rPr lang="it-IT" dirty="0" err="1"/>
+              <a:t>rather</a:t>
+            </a:r>
+            <a:r>
+              <a:rPr lang="it-IT" dirty="0"/>
+              <a:t> </a:t>
+            </a:r>
+            <a:r>
+              <a:rPr lang="it-IT" dirty="0" err="1"/>
+              <a:t>than</a:t>
+            </a:r>
+            <a:r>
+              <a:rPr lang="it-IT" dirty="0"/>
+              <a:t> </a:t>
+            </a:r>
+            <a:r>
+              <a:rPr lang="it-IT" dirty="0" err="1"/>
+              <a:t>enhance</a:t>
+            </a:r>
+            <a:r>
+              <a:rPr lang="it-IT" dirty="0"/>
+              <a:t> system security</a:t>
+            </a:r>
+          </a:p>
+          <a:p>
+            <a:r>
+              <a:rPr lang="it-IT" dirty="0" err="1"/>
+              <a:t>Among</a:t>
+            </a:r>
+            <a:r>
+              <a:rPr lang="it-IT" dirty="0"/>
+              <a:t> </a:t>
+            </a:r>
+            <a:r>
+              <a:rPr lang="it-IT" dirty="0" err="1"/>
+              <a:t>all</a:t>
+            </a:r>
+            <a:r>
+              <a:rPr lang="it-IT" dirty="0"/>
+              <a:t> </a:t>
+            </a:r>
+            <a:r>
+              <a:rPr lang="it-IT" dirty="0" err="1"/>
+              <a:t>hashing</a:t>
+            </a:r>
+            <a:r>
+              <a:rPr lang="it-IT" dirty="0"/>
+              <a:t> </a:t>
+            </a:r>
+            <a:r>
+              <a:rPr lang="it-IT" dirty="0" err="1"/>
+              <a:t>algorithms</a:t>
+            </a:r>
+            <a:r>
+              <a:rPr lang="it-IT" dirty="0"/>
+              <a:t>, </a:t>
+            </a:r>
+            <a:r>
+              <a:rPr lang="it-IT" dirty="0" err="1"/>
+              <a:t>we</a:t>
+            </a:r>
+            <a:r>
+              <a:rPr lang="it-IT" dirty="0"/>
+              <a:t> </a:t>
+            </a:r>
+            <a:r>
+              <a:rPr lang="it-IT" dirty="0" err="1"/>
+              <a:t>whittled</a:t>
+            </a:r>
+            <a:r>
+              <a:rPr lang="it-IT" dirty="0"/>
+              <a:t> </a:t>
+            </a:r>
+            <a:r>
+              <a:rPr lang="it-IT" dirty="0" err="1"/>
+              <a:t>it</a:t>
+            </a:r>
+            <a:r>
+              <a:rPr lang="it-IT" dirty="0"/>
+              <a:t> down to the </a:t>
+            </a:r>
+            <a:r>
+              <a:rPr lang="it-IT" dirty="0" err="1"/>
+              <a:t>ones</a:t>
+            </a:r>
+            <a:r>
+              <a:rPr lang="it-IT" dirty="0"/>
+              <a:t> </a:t>
+            </a:r>
+            <a:r>
+              <a:rPr lang="it-IT" dirty="0" err="1"/>
+              <a:t>designed</a:t>
+            </a:r>
+            <a:r>
+              <a:rPr lang="it-IT" dirty="0"/>
+              <a:t> to </a:t>
+            </a:r>
+            <a:r>
+              <a:rPr lang="it-IT" dirty="0" err="1"/>
+              <a:t>passwords</a:t>
+            </a:r>
+            <a:r>
+              <a:rPr lang="it-IT" dirty="0"/>
+              <a:t>: </a:t>
+            </a:r>
+            <a:r>
+              <a:rPr lang="it-IT" dirty="0" err="1"/>
+              <a:t>bcrypt</a:t>
+            </a:r>
+            <a:r>
+              <a:rPr lang="it-IT" dirty="0"/>
+              <a:t>, </a:t>
+            </a:r>
+            <a:r>
+              <a:rPr lang="it-IT" dirty="0" err="1"/>
+              <a:t>scrypt</a:t>
+            </a:r>
+            <a:r>
+              <a:rPr lang="it-IT" dirty="0"/>
+              <a:t> and PBDKF2.</a:t>
+            </a:r>
+          </a:p>
+          <a:p>
+            <a:pPr lvl="1"/>
+            <a:r>
+              <a:rPr lang="it-IT" dirty="0"/>
+              <a:t>New </a:t>
+            </a:r>
+            <a:r>
+              <a:rPr lang="it-IT" dirty="0" err="1"/>
+              <a:t>ones</a:t>
+            </a:r>
+            <a:r>
+              <a:rPr lang="it-IT" dirty="0"/>
+              <a:t> are </a:t>
+            </a:r>
+            <a:r>
+              <a:rPr lang="it-IT" dirty="0" err="1"/>
+              <a:t>being</a:t>
+            </a:r>
+            <a:r>
+              <a:rPr lang="it-IT" dirty="0"/>
+              <a:t> </a:t>
+            </a:r>
+            <a:r>
+              <a:rPr lang="it-IT" dirty="0" err="1"/>
+              <a:t>developed</a:t>
+            </a:r>
+            <a:r>
+              <a:rPr lang="it-IT" dirty="0"/>
+              <a:t>, </a:t>
+            </a:r>
+            <a:r>
+              <a:rPr lang="it-IT" dirty="0" err="1"/>
+              <a:t>like</a:t>
+            </a:r>
+            <a:r>
+              <a:rPr lang="it-IT" dirty="0"/>
+              <a:t> Argon2, </a:t>
+            </a:r>
+            <a:r>
+              <a:rPr lang="it-IT" dirty="0" err="1"/>
+              <a:t>but</a:t>
+            </a:r>
+            <a:r>
+              <a:rPr lang="it-IT" dirty="0"/>
+              <a:t> security </a:t>
+            </a:r>
+            <a:r>
+              <a:rPr lang="it-IT" dirty="0" err="1"/>
+              <a:t>administrator</a:t>
+            </a:r>
+            <a:r>
+              <a:rPr lang="it-IT" dirty="0"/>
+              <a:t> </a:t>
+            </a:r>
+            <a:r>
+              <a:rPr lang="it-IT" dirty="0" err="1"/>
+              <a:t>should</a:t>
+            </a:r>
+            <a:r>
+              <a:rPr lang="it-IT" dirty="0"/>
+              <a:t> </a:t>
+            </a:r>
+            <a:r>
+              <a:rPr lang="it-IT" dirty="0" err="1"/>
+              <a:t>not</a:t>
+            </a:r>
+            <a:r>
+              <a:rPr lang="it-IT" dirty="0"/>
+              <a:t> use </a:t>
+            </a:r>
+            <a:r>
+              <a:rPr lang="it-IT" dirty="0" err="1"/>
+              <a:t>too</a:t>
+            </a:r>
+            <a:r>
+              <a:rPr lang="it-IT" dirty="0"/>
+              <a:t> </a:t>
+            </a:r>
+            <a:r>
+              <a:rPr lang="it-IT" dirty="0" err="1"/>
+              <a:t>recent</a:t>
+            </a:r>
+            <a:r>
+              <a:rPr lang="it-IT" dirty="0"/>
+              <a:t> </a:t>
+            </a:r>
+            <a:r>
+              <a:rPr lang="it-IT" dirty="0" err="1"/>
+              <a:t>algorithms</a:t>
+            </a:r>
+            <a:r>
+              <a:rPr lang="it-IT" dirty="0"/>
+              <a:t> </a:t>
+            </a:r>
+            <a:r>
+              <a:rPr lang="it-IT" dirty="0" err="1"/>
+              <a:t>because</a:t>
+            </a:r>
+            <a:r>
+              <a:rPr lang="it-IT" dirty="0"/>
+              <a:t> </a:t>
+            </a:r>
+            <a:r>
+              <a:rPr lang="it-IT" dirty="0" err="1"/>
+              <a:t>there</a:t>
+            </a:r>
+            <a:r>
+              <a:rPr lang="it-IT" dirty="0"/>
+              <a:t> </a:t>
+            </a:r>
+            <a:r>
+              <a:rPr lang="it-IT" dirty="0" err="1"/>
+              <a:t>could</a:t>
+            </a:r>
+            <a:r>
+              <a:rPr lang="it-IT" dirty="0"/>
+              <a:t> be </a:t>
+            </a:r>
+            <a:r>
+              <a:rPr lang="it-IT" dirty="0" err="1"/>
+              <a:t>critcial</a:t>
+            </a:r>
+            <a:r>
+              <a:rPr lang="it-IT" dirty="0"/>
+              <a:t> </a:t>
+            </a:r>
+            <a:r>
+              <a:rPr lang="it-IT" dirty="0" err="1"/>
+              <a:t>weaknesses</a:t>
+            </a:r>
+            <a:r>
+              <a:rPr lang="it-IT" dirty="0"/>
+              <a:t> </a:t>
+            </a:r>
+            <a:r>
+              <a:rPr lang="it-IT" dirty="0" err="1"/>
+              <a:t>not</a:t>
+            </a:r>
+            <a:r>
+              <a:rPr lang="it-IT" dirty="0"/>
+              <a:t> </a:t>
+            </a:r>
+            <a:r>
+              <a:rPr lang="it-IT" dirty="0" err="1"/>
+              <a:t>known</a:t>
+            </a:r>
+            <a:r>
+              <a:rPr lang="it-IT" dirty="0"/>
+              <a:t> </a:t>
+            </a:r>
+            <a:r>
+              <a:rPr lang="it-IT" dirty="0" err="1"/>
+              <a:t>yet</a:t>
+            </a:r>
+            <a:r>
+              <a:rPr lang="it-IT" dirty="0"/>
+              <a:t>.</a:t>
+            </a:r>
+          </a:p>
+          <a:p>
+            <a:pPr lvl="1"/>
+            <a:endParaRPr lang="it-IT" dirty="0"/>
           </a:p>
         </p:txBody>
       </p:sp>
     </p:spTree>
     <p:extLst>
       <p:ext uri="{BB962C8B-B14F-4D97-AF65-F5344CB8AC3E}">
-        <p14:creationId xmlns:p14="http://schemas.microsoft.com/office/powerpoint/2010/main" val="2618927754"/>
+        <p14:creationId xmlns:p14="http://schemas.microsoft.com/office/powerpoint/2010/main" val="3130169439"/>
       </p:ext>
     </p:extLst>
   </p:cSld>
@@ -4129,15 +5815,15 @@
           <p:cNvPr id="2" name="Titolo 1">
             <a:extLst>
               <a:ext uri="{FF2B5EF4-FFF2-40B4-BE49-F238E27FC236}">
-                <a16:creationId xmlns:a16="http://schemas.microsoft.com/office/drawing/2014/main" id="{B59E6DEA-D7A1-44D2-8559-89B730CE3681}"/>
-              </a:ext>
-            </a:extLst>
-          </p:cNvPr>
-          <p:cNvSpPr>
-            <a:spLocks noGrp="1"/>
-          </p:cNvSpPr>
-          <p:nvPr>
-            <p:ph type="ctrTitle"/>
+                <a16:creationId xmlns:a16="http://schemas.microsoft.com/office/drawing/2014/main" id="{850844C4-99AC-48E5-A637-111EC8D790C0}"/>
+              </a:ext>
+            </a:extLst>
+          </p:cNvPr>
+          <p:cNvSpPr>
+            <a:spLocks noGrp="1"/>
+          </p:cNvSpPr>
+          <p:nvPr>
+            <p:ph type="title"/>
           </p:nvPr>
         </p:nvSpPr>
         <p:spPr/>
@@ -4145,36 +5831,24 @@
           <a:bodyPr/>
           <a:lstStyle/>
           <a:p>
-            <a:r>
-              <a:rPr lang="it-IT" dirty="0" err="1"/>
-              <a:t>Final</a:t>
-            </a:r>
-            <a:r>
-              <a:rPr lang="it-IT" dirty="0"/>
-              <a:t> </a:t>
-            </a:r>
-            <a:r>
-              <a:rPr lang="it-IT" dirty="0" err="1"/>
-              <a:t>thoughts</a:t>
-            </a:r>
             <a:endParaRPr lang="it-IT" dirty="0"/>
           </a:p>
         </p:txBody>
       </p:sp>
       <p:sp>
         <p:nvSpPr>
-          <p:cNvPr id="3" name="Sottotitolo 2">
-            <a:extLst>
-              <a:ext uri="{FF2B5EF4-FFF2-40B4-BE49-F238E27FC236}">
-                <a16:creationId xmlns:a16="http://schemas.microsoft.com/office/drawing/2014/main" id="{83A8CAC3-1E41-4E08-84F1-50D0906D1288}"/>
-              </a:ext>
-            </a:extLst>
-          </p:cNvPr>
-          <p:cNvSpPr>
-            <a:spLocks noGrp="1"/>
-          </p:cNvSpPr>
-          <p:nvPr>
-            <p:ph type="subTitle" idx="1"/>
+          <p:cNvPr id="3" name="Segnaposto contenuto 2">
+            <a:extLst>
+              <a:ext uri="{FF2B5EF4-FFF2-40B4-BE49-F238E27FC236}">
+                <a16:creationId xmlns:a16="http://schemas.microsoft.com/office/drawing/2014/main" id="{F16BC3AC-6C51-4CE2-981E-814342336D18}"/>
+              </a:ext>
+            </a:extLst>
+          </p:cNvPr>
+          <p:cNvSpPr>
+            <a:spLocks noGrp="1"/>
+          </p:cNvSpPr>
+          <p:nvPr>
+            <p:ph idx="1"/>
           </p:nvPr>
         </p:nvSpPr>
         <p:spPr/>
@@ -4182,14 +5856,687 @@
           <a:bodyPr/>
           <a:lstStyle/>
           <a:p>
-            <a:endParaRPr lang="it-IT"/>
-          </a:p>
-        </p:txBody>
-      </p:sp>
+            <a:endParaRPr lang="it-IT" dirty="0"/>
+          </a:p>
+        </p:txBody>
+      </p:sp>
+      <p:sp>
+        <p:nvSpPr>
+          <p:cNvPr id="4" name="Segnaposto testo 3">
+            <a:extLst>
+              <a:ext uri="{FF2B5EF4-FFF2-40B4-BE49-F238E27FC236}">
+                <a16:creationId xmlns:a16="http://schemas.microsoft.com/office/drawing/2014/main" id="{3750F446-7C8C-4709-A14F-D8078F69D483}"/>
+              </a:ext>
+            </a:extLst>
+          </p:cNvPr>
+          <p:cNvSpPr>
+            <a:spLocks noGrp="1"/>
+          </p:cNvSpPr>
+          <p:nvPr>
+            <p:ph type="body" sz="half" idx="2"/>
+          </p:nvPr>
+        </p:nvSpPr>
+        <p:spPr/>
+        <p:txBody>
+          <a:bodyPr>
+            <a:normAutofit lnSpcReduction="10000"/>
+          </a:bodyPr>
+          <a:lstStyle/>
+          <a:p>
+            <a:pPr marL="285750" indent="-285750">
+              <a:buFont typeface="Arial" panose="020B0604020202020204" pitchFamily="34" charset="0"/>
+              <a:buChar char="•"/>
+            </a:pPr>
+            <a:r>
+              <a:rPr lang="it-IT" dirty="0" err="1"/>
+              <a:t>We</a:t>
+            </a:r>
+            <a:r>
+              <a:rPr lang="it-IT" dirty="0"/>
+              <a:t> </a:t>
+            </a:r>
+            <a:r>
+              <a:rPr lang="it-IT" dirty="0" err="1"/>
+              <a:t>decided</a:t>
+            </a:r>
+            <a:r>
+              <a:rPr lang="it-IT" dirty="0"/>
+              <a:t> to use </a:t>
+            </a:r>
+            <a:r>
+              <a:rPr lang="it-IT" dirty="0" err="1"/>
+              <a:t>bcrypt</a:t>
+            </a:r>
+            <a:r>
+              <a:rPr lang="it-IT" dirty="0"/>
+              <a:t> </a:t>
+            </a:r>
+            <a:r>
+              <a:rPr lang="it-IT" dirty="0" err="1"/>
+              <a:t>because</a:t>
+            </a:r>
+            <a:r>
+              <a:rPr lang="it-IT" dirty="0"/>
+              <a:t> </a:t>
+            </a:r>
+            <a:r>
+              <a:rPr lang="it-IT" dirty="0" err="1"/>
+              <a:t>it</a:t>
+            </a:r>
+            <a:r>
+              <a:rPr lang="it-IT" dirty="0"/>
+              <a:t> </a:t>
+            </a:r>
+            <a:r>
+              <a:rPr lang="it-IT" dirty="0" err="1"/>
+              <a:t>works</a:t>
+            </a:r>
+            <a:r>
+              <a:rPr lang="it-IT" dirty="0"/>
+              <a:t> </a:t>
+            </a:r>
+            <a:r>
+              <a:rPr lang="it-IT" dirty="0" err="1"/>
+              <a:t>using</a:t>
+            </a:r>
+            <a:r>
+              <a:rPr lang="it-IT" dirty="0"/>
+              <a:t> a </a:t>
+            </a:r>
+            <a:r>
+              <a:rPr lang="it-IT" dirty="0" err="1"/>
+              <a:t>table</a:t>
+            </a:r>
+            <a:r>
+              <a:rPr lang="it-IT" dirty="0"/>
+              <a:t> </a:t>
+            </a:r>
+            <a:r>
+              <a:rPr lang="it-IT" dirty="0" err="1"/>
+              <a:t>thats</a:t>
+            </a:r>
+            <a:r>
+              <a:rPr lang="it-IT" dirty="0"/>
+              <a:t> </a:t>
+            </a:r>
+            <a:r>
+              <a:rPr lang="it-IT" dirty="0" err="1"/>
+              <a:t>is</a:t>
+            </a:r>
+            <a:r>
+              <a:rPr lang="it-IT" dirty="0"/>
+              <a:t> </a:t>
+            </a:r>
+            <a:r>
+              <a:rPr lang="it-IT" dirty="0" err="1"/>
+              <a:t>modified</a:t>
+            </a:r>
+            <a:r>
+              <a:rPr lang="it-IT" dirty="0"/>
+              <a:t> </a:t>
+            </a:r>
+            <a:r>
+              <a:rPr lang="it-IT" dirty="0" err="1"/>
+              <a:t>after</a:t>
+            </a:r>
+            <a:r>
+              <a:rPr lang="it-IT" dirty="0"/>
+              <a:t> </a:t>
+            </a:r>
+            <a:r>
+              <a:rPr lang="it-IT" dirty="0" err="1"/>
+              <a:t>every</a:t>
+            </a:r>
+            <a:r>
+              <a:rPr lang="it-IT" dirty="0"/>
+              <a:t> access, </a:t>
+            </a:r>
+            <a:r>
+              <a:rPr lang="it-IT" dirty="0" err="1"/>
+              <a:t>which</a:t>
+            </a:r>
+            <a:r>
+              <a:rPr lang="it-IT" dirty="0"/>
+              <a:t> </a:t>
+            </a:r>
+            <a:r>
+              <a:rPr lang="it-IT" dirty="0" err="1"/>
+              <a:t>makes</a:t>
+            </a:r>
+            <a:r>
+              <a:rPr lang="it-IT" dirty="0"/>
+              <a:t> </a:t>
+            </a:r>
+            <a:r>
+              <a:rPr lang="it-IT" dirty="0" err="1"/>
+              <a:t>GPUs</a:t>
+            </a:r>
+            <a:r>
+              <a:rPr lang="it-IT" dirty="0"/>
+              <a:t> </a:t>
+            </a:r>
+            <a:r>
+              <a:rPr lang="it-IT" dirty="0" err="1"/>
+              <a:t>ineffective</a:t>
+            </a:r>
+            <a:r>
+              <a:rPr lang="it-IT" dirty="0"/>
+              <a:t> in cracking </a:t>
+            </a:r>
+            <a:r>
+              <a:rPr lang="it-IT" dirty="0" err="1"/>
+              <a:t>it</a:t>
+            </a:r>
+            <a:r>
+              <a:rPr lang="it-IT" dirty="0"/>
+              <a:t> (</a:t>
+            </a:r>
+            <a:r>
+              <a:rPr lang="it-IT" dirty="0" err="1"/>
+              <a:t>unlike</a:t>
+            </a:r>
+            <a:r>
+              <a:rPr lang="it-IT" dirty="0"/>
+              <a:t> PBKDF2)</a:t>
+            </a:r>
+          </a:p>
+          <a:p>
+            <a:pPr marL="285750" indent="-285750">
+              <a:buFont typeface="Arial" panose="020B0604020202020204" pitchFamily="34" charset="0"/>
+              <a:buChar char="•"/>
+            </a:pPr>
+            <a:r>
+              <a:rPr lang="it-IT" dirty="0" err="1"/>
+              <a:t>While</a:t>
+            </a:r>
+            <a:r>
+              <a:rPr lang="it-IT" dirty="0"/>
+              <a:t> </a:t>
+            </a:r>
+            <a:r>
+              <a:rPr lang="it-IT" dirty="0" err="1"/>
+              <a:t>scrypt</a:t>
+            </a:r>
+            <a:r>
+              <a:rPr lang="it-IT" dirty="0"/>
+              <a:t> </a:t>
+            </a:r>
+            <a:r>
+              <a:rPr lang="it-IT" dirty="0" err="1"/>
+              <a:t>should</a:t>
+            </a:r>
+            <a:r>
+              <a:rPr lang="it-IT" dirty="0"/>
+              <a:t> </a:t>
+            </a:r>
+            <a:r>
+              <a:rPr lang="it-IT" dirty="0" err="1"/>
+              <a:t>provide</a:t>
+            </a:r>
+            <a:r>
+              <a:rPr lang="it-IT" dirty="0"/>
+              <a:t> </a:t>
+            </a:r>
+            <a:r>
+              <a:rPr lang="it-IT" dirty="0" err="1"/>
+              <a:t>better</a:t>
+            </a:r>
+            <a:r>
+              <a:rPr lang="it-IT" dirty="0"/>
+              <a:t> security, </a:t>
+            </a:r>
+            <a:r>
+              <a:rPr lang="it-IT" dirty="0" err="1"/>
+              <a:t>it</a:t>
+            </a:r>
+            <a:r>
+              <a:rPr lang="it-IT" dirty="0"/>
+              <a:t> </a:t>
+            </a:r>
+            <a:r>
+              <a:rPr lang="it-IT" dirty="0" err="1"/>
+              <a:t>is</a:t>
+            </a:r>
+            <a:r>
+              <a:rPr lang="it-IT" dirty="0"/>
+              <a:t> a </a:t>
+            </a:r>
+            <a:r>
+              <a:rPr lang="it-IT" dirty="0" err="1"/>
+              <a:t>relatively</a:t>
+            </a:r>
+            <a:r>
+              <a:rPr lang="it-IT" dirty="0"/>
+              <a:t> </a:t>
+            </a:r>
+            <a:r>
+              <a:rPr lang="it-IT" dirty="0" err="1"/>
+              <a:t>recent</a:t>
+            </a:r>
+            <a:r>
+              <a:rPr lang="it-IT" dirty="0"/>
+              <a:t> </a:t>
+            </a:r>
+            <a:r>
+              <a:rPr lang="it-IT" dirty="0" err="1"/>
+              <a:t>algorithm</a:t>
+            </a:r>
+            <a:r>
+              <a:rPr lang="it-IT" dirty="0"/>
+              <a:t> (2009), </a:t>
+            </a:r>
+            <a:r>
+              <a:rPr lang="it-IT" dirty="0" err="1"/>
+              <a:t>meaning</a:t>
+            </a:r>
+            <a:r>
+              <a:rPr lang="it-IT" dirty="0"/>
+              <a:t> </a:t>
+            </a:r>
+            <a:r>
+              <a:rPr lang="it-IT" dirty="0" err="1"/>
+              <a:t>that</a:t>
+            </a:r>
+            <a:r>
+              <a:rPr lang="it-IT" dirty="0"/>
+              <a:t> </a:t>
+            </a:r>
+            <a:r>
+              <a:rPr lang="it-IT" dirty="0" err="1"/>
+              <a:t>has</a:t>
+            </a:r>
+            <a:r>
+              <a:rPr lang="it-IT" dirty="0"/>
+              <a:t> </a:t>
+            </a:r>
+            <a:r>
+              <a:rPr lang="it-IT" dirty="0" err="1"/>
+              <a:t>not</a:t>
+            </a:r>
+            <a:r>
+              <a:rPr lang="it-IT" dirty="0"/>
+              <a:t> </a:t>
+            </a:r>
+            <a:r>
+              <a:rPr lang="it-IT" dirty="0" err="1"/>
+              <a:t>received</a:t>
+            </a:r>
+            <a:r>
+              <a:rPr lang="it-IT" dirty="0"/>
+              <a:t> </a:t>
+            </a:r>
+            <a:r>
+              <a:rPr lang="it-IT" dirty="0" err="1"/>
+              <a:t>enough</a:t>
+            </a:r>
+            <a:r>
+              <a:rPr lang="it-IT" dirty="0"/>
+              <a:t> </a:t>
+            </a:r>
+            <a:r>
+              <a:rPr lang="it-IT" dirty="0" err="1"/>
+              <a:t>scrutiny</a:t>
+            </a:r>
+            <a:r>
+              <a:rPr lang="it-IT" dirty="0"/>
+              <a:t>. </a:t>
+            </a:r>
+            <a:r>
+              <a:rPr lang="it-IT" dirty="0" err="1"/>
+              <a:t>Most</a:t>
+            </a:r>
+            <a:r>
+              <a:rPr lang="it-IT" dirty="0"/>
+              <a:t> </a:t>
+            </a:r>
+            <a:r>
+              <a:rPr lang="it-IT" dirty="0" err="1"/>
+              <a:t>recent</a:t>
+            </a:r>
+            <a:r>
+              <a:rPr lang="it-IT" dirty="0"/>
+              <a:t> feedback </a:t>
+            </a:r>
+            <a:r>
+              <a:rPr lang="it-IT" dirty="0" err="1"/>
+              <a:t>has</a:t>
+            </a:r>
+            <a:r>
+              <a:rPr lang="it-IT" dirty="0"/>
+              <a:t> </a:t>
+            </a:r>
+            <a:r>
+              <a:rPr lang="it-IT" dirty="0" err="1"/>
+              <a:t>downsized</a:t>
+            </a:r>
+            <a:r>
+              <a:rPr lang="it-IT" dirty="0"/>
+              <a:t> </a:t>
+            </a:r>
+            <a:r>
+              <a:rPr lang="it-IT" dirty="0" err="1"/>
+              <a:t>its</a:t>
+            </a:r>
+            <a:r>
+              <a:rPr lang="it-IT" dirty="0"/>
+              <a:t> </a:t>
+            </a:r>
+            <a:r>
+              <a:rPr lang="it-IT" dirty="0" err="1"/>
+              <a:t>reputation</a:t>
+            </a:r>
+            <a:r>
+              <a:rPr lang="it-IT" dirty="0"/>
+              <a:t> and </a:t>
+            </a:r>
+            <a:r>
+              <a:rPr lang="it-IT" dirty="0" err="1"/>
+              <a:t>its</a:t>
+            </a:r>
+            <a:r>
+              <a:rPr lang="it-IT" dirty="0"/>
+              <a:t> </a:t>
+            </a:r>
+            <a:r>
+              <a:rPr lang="it-IT" dirty="0" err="1"/>
+              <a:t>encryption</a:t>
+            </a:r>
+            <a:r>
+              <a:rPr lang="it-IT" dirty="0"/>
+              <a:t> </a:t>
+            </a:r>
+            <a:r>
+              <a:rPr lang="it-IT" dirty="0" err="1"/>
+              <a:t>is</a:t>
+            </a:r>
+            <a:r>
+              <a:rPr lang="it-IT" dirty="0"/>
+              <a:t> by far more </a:t>
+            </a:r>
+            <a:r>
+              <a:rPr lang="it-IT" dirty="0" err="1"/>
+              <a:t>computationally</a:t>
+            </a:r>
+            <a:r>
+              <a:rPr lang="it-IT" dirty="0"/>
+              <a:t> intensive.</a:t>
+            </a:r>
+          </a:p>
+          <a:p>
+            <a:pPr marL="285750" indent="-285750">
+              <a:buFont typeface="Arial" panose="020B0604020202020204" pitchFamily="34" charset="0"/>
+              <a:buChar char="•"/>
+            </a:pPr>
+            <a:r>
+              <a:rPr lang="it-IT" dirty="0" err="1"/>
+              <a:t>bcrypt</a:t>
+            </a:r>
+            <a:r>
+              <a:rPr lang="it-IT" dirty="0"/>
+              <a:t> </a:t>
+            </a:r>
+            <a:r>
+              <a:rPr lang="it-IT" dirty="0" err="1"/>
+              <a:t>needs</a:t>
+            </a:r>
+            <a:r>
+              <a:rPr lang="it-IT" dirty="0"/>
+              <a:t> more </a:t>
+            </a:r>
+            <a:r>
+              <a:rPr lang="it-IT" dirty="0" err="1"/>
+              <a:t>expensive</a:t>
+            </a:r>
+            <a:r>
+              <a:rPr lang="it-IT" dirty="0"/>
+              <a:t> hardware </a:t>
+            </a:r>
+            <a:r>
+              <a:rPr lang="it-IT" dirty="0" err="1"/>
+              <a:t>than</a:t>
+            </a:r>
+            <a:r>
+              <a:rPr lang="it-IT" dirty="0"/>
+              <a:t> PBDKF2 in </a:t>
+            </a:r>
+            <a:r>
+              <a:rPr lang="it-IT" dirty="0" err="1"/>
+              <a:t>order</a:t>
+            </a:r>
+            <a:r>
+              <a:rPr lang="it-IT" dirty="0"/>
+              <a:t> to crack </a:t>
+            </a:r>
+            <a:r>
+              <a:rPr lang="it-IT" dirty="0" err="1"/>
+              <a:t>it</a:t>
+            </a:r>
+            <a:r>
+              <a:rPr lang="it-IT" dirty="0"/>
+              <a:t> </a:t>
+            </a:r>
+            <a:r>
+              <a:rPr lang="it-IT" dirty="0" err="1"/>
+              <a:t>only</a:t>
+            </a:r>
+            <a:r>
+              <a:rPr lang="it-IT" dirty="0"/>
+              <a:t> </a:t>
+            </a:r>
+            <a:r>
+              <a:rPr lang="it-IT" dirty="0" err="1"/>
+              <a:t>if</a:t>
+            </a:r>
+            <a:r>
+              <a:rPr lang="it-IT" dirty="0"/>
+              <a:t> password </a:t>
+            </a:r>
+            <a:r>
+              <a:rPr lang="it-IT" dirty="0" err="1"/>
+              <a:t>is</a:t>
+            </a:r>
+            <a:r>
+              <a:rPr lang="it-IT" dirty="0"/>
+              <a:t> </a:t>
+            </a:r>
+            <a:r>
+              <a:rPr lang="it-IT" dirty="0" err="1"/>
+              <a:t>less</a:t>
+            </a:r>
+            <a:r>
+              <a:rPr lang="it-IT" dirty="0"/>
+              <a:t> </a:t>
+            </a:r>
+            <a:r>
+              <a:rPr lang="it-IT" dirty="0" err="1"/>
+              <a:t>than</a:t>
+            </a:r>
+            <a:r>
+              <a:rPr lang="it-IT" dirty="0"/>
+              <a:t> 55 </a:t>
+            </a:r>
+            <a:r>
+              <a:rPr lang="it-IT" dirty="0" err="1"/>
+              <a:t>characters</a:t>
+            </a:r>
+            <a:r>
+              <a:rPr lang="it-IT" dirty="0"/>
+              <a:t> long, </a:t>
+            </a:r>
+            <a:r>
+              <a:rPr lang="it-IT" dirty="0" err="1"/>
+              <a:t>that’s</a:t>
+            </a:r>
+            <a:r>
+              <a:rPr lang="it-IT" dirty="0"/>
+              <a:t> </a:t>
+            </a:r>
+            <a:r>
+              <a:rPr lang="it-IT" dirty="0" err="1"/>
+              <a:t>bcrypt</a:t>
+            </a:r>
+            <a:r>
+              <a:rPr lang="it-IT" dirty="0"/>
+              <a:t> text </a:t>
+            </a:r>
+            <a:r>
+              <a:rPr lang="it-IT" dirty="0" err="1"/>
+              <a:t>length</a:t>
+            </a:r>
+            <a:r>
+              <a:rPr lang="it-IT" dirty="0"/>
+              <a:t> </a:t>
+            </a:r>
+            <a:r>
+              <a:rPr lang="it-IT" dirty="0" err="1"/>
+              <a:t>limit</a:t>
+            </a:r>
+            <a:r>
+              <a:rPr lang="it-IT" dirty="0"/>
+              <a:t>. </a:t>
+            </a:r>
+            <a:r>
+              <a:rPr lang="it-IT" dirty="0" err="1"/>
+              <a:t>Because</a:t>
+            </a:r>
+            <a:r>
+              <a:rPr lang="it-IT" dirty="0"/>
+              <a:t> a password </a:t>
+            </a:r>
+            <a:r>
+              <a:rPr lang="it-IT" dirty="0" err="1"/>
+              <a:t>is</a:t>
+            </a:r>
+            <a:r>
+              <a:rPr lang="it-IT" dirty="0"/>
+              <a:t> </a:t>
+            </a:r>
+            <a:r>
+              <a:rPr lang="it-IT" dirty="0" err="1"/>
+              <a:t>usually</a:t>
+            </a:r>
+            <a:r>
+              <a:rPr lang="it-IT" dirty="0"/>
+              <a:t> </a:t>
+            </a:r>
+            <a:r>
+              <a:rPr lang="it-IT" dirty="0" err="1"/>
+              <a:t>much</a:t>
+            </a:r>
+            <a:r>
+              <a:rPr lang="it-IT" dirty="0"/>
+              <a:t> </a:t>
+            </a:r>
+            <a:r>
+              <a:rPr lang="it-IT" dirty="0" err="1"/>
+              <a:t>shorter</a:t>
+            </a:r>
+            <a:r>
+              <a:rPr lang="it-IT" dirty="0"/>
+              <a:t> </a:t>
+            </a:r>
+            <a:r>
+              <a:rPr lang="it-IT" dirty="0" err="1"/>
+              <a:t>than</a:t>
+            </a:r>
+            <a:r>
+              <a:rPr lang="it-IT" dirty="0"/>
+              <a:t> 55 </a:t>
+            </a:r>
+            <a:r>
+              <a:rPr lang="it-IT" dirty="0" err="1"/>
+              <a:t>characters</a:t>
+            </a:r>
+            <a:r>
+              <a:rPr lang="it-IT" dirty="0"/>
+              <a:t>, </a:t>
+            </a:r>
+            <a:r>
+              <a:rPr lang="it-IT" dirty="0" err="1"/>
+              <a:t>that</a:t>
+            </a:r>
+            <a:r>
+              <a:rPr lang="it-IT" dirty="0"/>
+              <a:t> </a:t>
+            </a:r>
+            <a:r>
+              <a:rPr lang="it-IT" dirty="0" err="1"/>
+              <a:t>should</a:t>
+            </a:r>
+            <a:r>
+              <a:rPr lang="it-IT" dirty="0"/>
+              <a:t> </a:t>
+            </a:r>
+            <a:r>
+              <a:rPr lang="it-IT" dirty="0" err="1"/>
+              <a:t>not</a:t>
+            </a:r>
+            <a:r>
+              <a:rPr lang="it-IT" dirty="0"/>
+              <a:t> be an </a:t>
+            </a:r>
+            <a:r>
+              <a:rPr lang="it-IT" dirty="0" err="1"/>
+              <a:t>issue</a:t>
+            </a:r>
+            <a:r>
+              <a:rPr lang="it-IT" dirty="0"/>
+              <a:t>.</a:t>
+            </a:r>
+          </a:p>
+        </p:txBody>
+      </p:sp>
+      <p:pic>
+        <p:nvPicPr>
+          <p:cNvPr id="4098" name="Picture 2" descr="https://cdn-images-1.medium.com/max/800/1*QdbniDuZiiF1N7ArNJChOA.png">
+            <a:extLst>
+              <a:ext uri="{FF2B5EF4-FFF2-40B4-BE49-F238E27FC236}">
+                <a16:creationId xmlns:a16="http://schemas.microsoft.com/office/drawing/2014/main" id="{A86B65EE-152A-4699-A0D8-3195969A9408}"/>
+              </a:ext>
+            </a:extLst>
+          </p:cNvPr>
+          <p:cNvPicPr>
+            <a:picLocks noChangeAspect="1" noChangeArrowheads="1"/>
+          </p:cNvPicPr>
+          <p:nvPr/>
+        </p:nvPicPr>
+        <p:blipFill>
+          <a:blip r:embed="rId2">
+            <a:extLst>
+              <a:ext uri="{28A0092B-C50C-407E-A947-70E740481C1C}">
+                <a14:useLocalDpi xmlns:a14="http://schemas.microsoft.com/office/drawing/2010/main" val="0"/>
+              </a:ext>
+            </a:extLst>
+          </a:blip>
+          <a:srcRect/>
+          <a:stretch>
+            <a:fillRect/>
+          </a:stretch>
+        </p:blipFill>
+        <p:spPr bwMode="auto">
+          <a:xfrm>
+            <a:off x="5000307" y="871159"/>
+            <a:ext cx="6853251" cy="3278810"/>
+          </a:xfrm>
+          <a:prstGeom prst="rect">
+            <a:avLst/>
+          </a:prstGeom>
+          <a:noFill/>
+          <a:extLst>
+            <a:ext uri="{909E8E84-426E-40DD-AFC4-6F175D3DCCD1}">
+              <a14:hiddenFill xmlns:a14="http://schemas.microsoft.com/office/drawing/2010/main">
+                <a:solidFill>
+                  <a:srgbClr val="FFFFFF"/>
+                </a:solidFill>
+              </a14:hiddenFill>
+            </a:ext>
+          </a:extLst>
+        </p:spPr>
+      </p:pic>
     </p:spTree>
     <p:extLst>
       <p:ext uri="{BB962C8B-B14F-4D97-AF65-F5344CB8AC3E}">
-        <p14:creationId xmlns:p14="http://schemas.microsoft.com/office/powerpoint/2010/main" val="3978280543"/>
+        <p14:creationId xmlns:p14="http://schemas.microsoft.com/office/powerpoint/2010/main" val="941201197"/>
       </p:ext>
     </p:extLst>
   </p:cSld>

</xml_diff>

<commit_message>
FORZA JUVE ALÈ FORZA JUUUUUUVE ALÈ
</commit_message>
<xml_diff>
--- a/Documentazione e cose così/Slide_concettuali_Luca.pptx
+++ b/Documentazione e cose così/Slide_concettuali_Luca.pptx
@@ -4567,7 +4567,14 @@
           <a:bodyPr/>
           <a:lstStyle/>
           <a:p>
-            <a:endParaRPr lang="it-IT" dirty="0"/>
+            <a:r>
+              <a:rPr lang="it-IT" dirty="0" err="1"/>
+              <a:t>Harcoding</a:t>
+            </a:r>
+            <a:r>
+              <a:rPr lang="it-IT" dirty="0"/>
+              <a:t> password in code </a:t>
+            </a:r>
           </a:p>
         </p:txBody>
       </p:sp>
@@ -4729,6 +4736,129 @@
               <a:rPr lang="it-IT" dirty="0"/>
               <a:t> </a:t>
             </a:r>
+            <a:r>
+              <a:rPr lang="it-IT" dirty="0" err="1"/>
+              <a:t>not</a:t>
+            </a:r>
+            <a:r>
+              <a:rPr lang="it-IT" dirty="0"/>
+              <a:t> </a:t>
+            </a:r>
+            <a:r>
+              <a:rPr lang="it-IT" dirty="0" err="1"/>
+              <a:t>filtered</a:t>
+            </a:r>
+            <a:r>
+              <a:rPr lang="it-IT" dirty="0"/>
+              <a:t> or </a:t>
+            </a:r>
+            <a:r>
+              <a:rPr lang="it-IT" dirty="0" err="1"/>
+              <a:t>validated</a:t>
+            </a:r>
+            <a:endParaRPr lang="it-IT" dirty="0"/>
+          </a:p>
+          <a:p>
+            <a:r>
+              <a:rPr lang="it-IT" dirty="0"/>
+              <a:t>Database </a:t>
+            </a:r>
+            <a:r>
+              <a:rPr lang="it-IT" dirty="0" err="1"/>
+              <a:t>queries</a:t>
+            </a:r>
+            <a:r>
+              <a:rPr lang="it-IT" dirty="0"/>
+              <a:t> are </a:t>
+            </a:r>
+            <a:r>
+              <a:rPr lang="it-IT" dirty="0" err="1"/>
+              <a:t>run</a:t>
+            </a:r>
+            <a:r>
+              <a:rPr lang="it-IT" dirty="0"/>
+              <a:t> </a:t>
+            </a:r>
+            <a:r>
+              <a:rPr lang="it-IT" dirty="0" err="1"/>
+              <a:t>using</a:t>
+            </a:r>
+            <a:r>
+              <a:rPr lang="it-IT" dirty="0"/>
+              <a:t> </a:t>
+            </a:r>
+            <a:r>
+              <a:rPr lang="it-IT" dirty="0" err="1"/>
+              <a:t>PreparedStatements</a:t>
+            </a:r>
+            <a:r>
+              <a:rPr lang="it-IT" dirty="0"/>
+              <a:t>, </a:t>
+            </a:r>
+            <a:r>
+              <a:rPr lang="it-IT" dirty="0" err="1"/>
+              <a:t>that</a:t>
+            </a:r>
+            <a:r>
+              <a:rPr lang="it-IT" dirty="0"/>
+              <a:t> use </a:t>
+            </a:r>
+            <a:r>
+              <a:rPr lang="it-IT" dirty="0" err="1"/>
+              <a:t>placeholder</a:t>
+            </a:r>
+            <a:r>
+              <a:rPr lang="it-IT" dirty="0"/>
+              <a:t> </a:t>
+            </a:r>
+            <a:r>
+              <a:rPr lang="it-IT" dirty="0" err="1"/>
+              <a:t>before</a:t>
+            </a:r>
+            <a:r>
+              <a:rPr lang="it-IT" dirty="0"/>
+              <a:t> data </a:t>
+            </a:r>
+            <a:r>
+              <a:rPr lang="it-IT" dirty="0" err="1"/>
+              <a:t>evaluation</a:t>
+            </a:r>
+            <a:r>
+              <a:rPr lang="it-IT" dirty="0"/>
+              <a:t>, so </a:t>
+            </a:r>
+            <a:r>
+              <a:rPr lang="it-IT" dirty="0" err="1"/>
+              <a:t>query</a:t>
+            </a:r>
+            <a:r>
+              <a:rPr lang="it-IT" dirty="0"/>
+              <a:t> code and </a:t>
+            </a:r>
+            <a:r>
+              <a:rPr lang="it-IT" dirty="0" err="1"/>
+              <a:t>parameters</a:t>
+            </a:r>
+            <a:r>
+              <a:rPr lang="it-IT" dirty="0"/>
+              <a:t> are </a:t>
+            </a:r>
+            <a:r>
+              <a:rPr lang="it-IT" dirty="0" err="1"/>
+              <a:t>not</a:t>
+            </a:r>
+            <a:r>
+              <a:rPr lang="it-IT" dirty="0"/>
+              <a:t> </a:t>
+            </a:r>
+            <a:r>
+              <a:rPr lang="it-IT" dirty="0" err="1"/>
+              <a:t>mixed</a:t>
+            </a:r>
+            <a:r>
+              <a:rPr lang="it-IT" dirty="0"/>
+              <a:t>.</a:t>
+            </a:r>
           </a:p>
         </p:txBody>
       </p:sp>
@@ -5158,6 +5288,14 @@
             </a:r>
             <a:r>
               <a:rPr lang="it-IT" dirty="0" err="1"/>
+              <a:t>GPUs</a:t>
+            </a:r>
+            <a:r>
+              <a:rPr lang="it-IT" dirty="0"/>
+              <a:t>, </a:t>
+            </a:r>
+            <a:r>
+              <a:rPr lang="it-IT" dirty="0" err="1"/>
               <a:t>FPGAs</a:t>
             </a:r>
             <a:r>
@@ -5245,7 +5383,7 @@
             </a:r>
             <a:r>
               <a:rPr lang="it-IT" dirty="0" err="1"/>
-              <a:t>needed</a:t>
+              <a:t>enforced</a:t>
             </a:r>
             <a:r>
               <a:rPr lang="it-IT" dirty="0"/>

</xml_diff>

<commit_message>
(+) Inserito codice di logging (avevo committato ma non me lo aveva inviato) (+) Completata servlet di registrazione (resta da decidere se vogliamo che uno scelga da sè il ruolo, per ora registra tutti come utente)
</commit_message>
<xml_diff>
--- a/Documentazione e cose così/Slide_concettuali_Luca.pptx
+++ b/Documentazione e cose così/Slide_concettuali_Luca.pptx
@@ -3482,7 +3482,7 @@
         <p:spPr/>
         <p:txBody>
           <a:bodyPr>
-            <a:normAutofit lnSpcReduction="10000"/>
+            <a:normAutofit fontScale="85000" lnSpcReduction="20000"/>
           </a:bodyPr>
           <a:lstStyle/>
           <a:p>
@@ -3823,10 +3823,167 @@
               <a:t>hashed</a:t>
             </a:r>
             <a:r>
-              <a:rPr lang="it-IT"/>
+              <a:rPr lang="it-IT" dirty="0"/>
               <a:t> with SHA-256</a:t>
             </a:r>
-            <a:endParaRPr lang="it-IT" dirty="0"/>
+          </a:p>
+          <a:p>
+            <a:pPr lvl="1"/>
+            <a:r>
+              <a:rPr lang="it-IT" dirty="0" err="1"/>
+              <a:t>Codes</a:t>
+            </a:r>
+            <a:r>
+              <a:rPr lang="it-IT" dirty="0"/>
+              <a:t> </a:t>
+            </a:r>
+            <a:r>
+              <a:rPr lang="it-IT" dirty="0" err="1"/>
+              <a:t>expire</a:t>
+            </a:r>
+            <a:r>
+              <a:rPr lang="it-IT" dirty="0"/>
+              <a:t> </a:t>
+            </a:r>
+            <a:r>
+              <a:rPr lang="it-IT" dirty="0" err="1"/>
+              <a:t>after</a:t>
+            </a:r>
+            <a:r>
+              <a:rPr lang="it-IT" dirty="0"/>
+              <a:t> 30 minutes. No new </a:t>
+            </a:r>
+            <a:r>
+              <a:rPr lang="it-IT" dirty="0" err="1"/>
+              <a:t>codes</a:t>
+            </a:r>
+            <a:r>
+              <a:rPr lang="it-IT" dirty="0"/>
+              <a:t> can be </a:t>
+            </a:r>
+            <a:r>
+              <a:rPr lang="it-IT" dirty="0" err="1"/>
+              <a:t>required</a:t>
+            </a:r>
+            <a:r>
+              <a:rPr lang="it-IT" dirty="0"/>
+              <a:t> for </a:t>
+            </a:r>
+            <a:r>
+              <a:rPr lang="it-IT" dirty="0" err="1"/>
+              <a:t>same</a:t>
+            </a:r>
+            <a:r>
+              <a:rPr lang="it-IT" dirty="0"/>
+              <a:t> (</a:t>
+            </a:r>
+            <a:r>
+              <a:rPr lang="it-IT" dirty="0" err="1"/>
+              <a:t>user,device</a:t>
+            </a:r>
+            <a:r>
+              <a:rPr lang="it-IT" dirty="0"/>
+              <a:t>) </a:t>
+            </a:r>
+            <a:r>
+              <a:rPr lang="it-IT" dirty="0" err="1"/>
+              <a:t>before</a:t>
+            </a:r>
+            <a:r>
+              <a:rPr lang="it-IT" dirty="0"/>
+              <a:t> </a:t>
+            </a:r>
+            <a:r>
+              <a:rPr lang="it-IT" dirty="0" err="1"/>
+              <a:t>expiration</a:t>
+            </a:r>
+            <a:r>
+              <a:rPr lang="it-IT" dirty="0"/>
+              <a:t>.</a:t>
+            </a:r>
+          </a:p>
+          <a:p>
+            <a:pPr lvl="1"/>
+            <a:r>
+              <a:rPr lang="it-IT" dirty="0" err="1"/>
+              <a:t>After</a:t>
+            </a:r>
+            <a:r>
+              <a:rPr lang="it-IT" dirty="0"/>
+              <a:t> </a:t>
+            </a:r>
+            <a:r>
+              <a:rPr lang="it-IT" dirty="0" err="1"/>
+              <a:t>issuing</a:t>
+            </a:r>
+            <a:r>
+              <a:rPr lang="it-IT" dirty="0"/>
+              <a:t> a new code, </a:t>
+            </a:r>
+            <a:r>
+              <a:rPr lang="it-IT" dirty="0" err="1"/>
+              <a:t>old</a:t>
+            </a:r>
+            <a:r>
+              <a:rPr lang="it-IT" dirty="0"/>
+              <a:t> one </a:t>
+            </a:r>
+            <a:r>
+              <a:rPr lang="it-IT" dirty="0" err="1"/>
+              <a:t>is</a:t>
+            </a:r>
+            <a:r>
+              <a:rPr lang="it-IT" dirty="0"/>
+              <a:t> </a:t>
+            </a:r>
+            <a:r>
+              <a:rPr lang="it-IT" dirty="0" err="1"/>
+              <a:t>deleted</a:t>
+            </a:r>
+            <a:r>
+              <a:rPr lang="it-IT" dirty="0"/>
+              <a:t> (</a:t>
+            </a:r>
+            <a:r>
+              <a:rPr lang="it-IT" dirty="0" err="1"/>
+              <a:t>attacker</a:t>
+            </a:r>
+            <a:r>
+              <a:rPr lang="it-IT" dirty="0"/>
+              <a:t> </a:t>
+            </a:r>
+            <a:r>
+              <a:rPr lang="it-IT" dirty="0" err="1"/>
+              <a:t>can’t</a:t>
+            </a:r>
+            <a:r>
+              <a:rPr lang="it-IT" dirty="0"/>
+              <a:t> </a:t>
+            </a:r>
+            <a:r>
+              <a:rPr lang="it-IT" dirty="0" err="1"/>
+              <a:t>lead</a:t>
+            </a:r>
+            <a:r>
+              <a:rPr lang="it-IT" dirty="0"/>
+              <a:t> a replay </a:t>
+            </a:r>
+            <a:r>
+              <a:rPr lang="it-IT" dirty="0" err="1"/>
+              <a:t>attack</a:t>
+            </a:r>
+            <a:r>
+              <a:rPr lang="it-IT" dirty="0"/>
+              <a:t> with an </a:t>
+            </a:r>
+            <a:r>
+              <a:rPr lang="it-IT" dirty="0" err="1"/>
+              <a:t>old</a:t>
+            </a:r>
+            <a:r>
+              <a:rPr lang="it-IT" dirty="0"/>
+              <a:t> code)</a:t>
+            </a:r>
           </a:p>
           <a:p>
             <a:r>
@@ -4920,6 +5077,200 @@
             <a:r>
               <a:rPr lang="it-IT" dirty="0"/>
               <a:t>.</a:t>
+            </a:r>
+          </a:p>
+          <a:p>
+            <a:r>
+              <a:rPr lang="it-IT" dirty="0" err="1"/>
+              <a:t>Even</a:t>
+            </a:r>
+            <a:r>
+              <a:rPr lang="it-IT" dirty="0"/>
+              <a:t> </a:t>
+            </a:r>
+            <a:r>
+              <a:rPr lang="it-IT" dirty="0" err="1"/>
+              <a:t>if</a:t>
+            </a:r>
+            <a:r>
+              <a:rPr lang="it-IT" dirty="0"/>
+              <a:t> </a:t>
+            </a:r>
+            <a:r>
+              <a:rPr lang="it-IT" dirty="0" err="1"/>
+              <a:t>this</a:t>
+            </a:r>
+            <a:r>
+              <a:rPr lang="it-IT" dirty="0"/>
+              <a:t> </a:t>
+            </a:r>
+            <a:r>
+              <a:rPr lang="it-IT" dirty="0" err="1"/>
+              <a:t>countermeasure</a:t>
+            </a:r>
+            <a:r>
+              <a:rPr lang="it-IT" dirty="0"/>
+              <a:t> </a:t>
+            </a:r>
+            <a:r>
+              <a:rPr lang="it-IT" dirty="0" err="1"/>
+              <a:t>shouldn’t</a:t>
+            </a:r>
+            <a:r>
+              <a:rPr lang="it-IT" dirty="0"/>
+              <a:t> work, </a:t>
+            </a:r>
+            <a:r>
+              <a:rPr lang="it-IT" dirty="0" err="1"/>
+              <a:t>there</a:t>
+            </a:r>
+            <a:r>
+              <a:rPr lang="it-IT" dirty="0"/>
+              <a:t> are some sensitive </a:t>
+            </a:r>
+            <a:r>
+              <a:rPr lang="it-IT" dirty="0" err="1"/>
+              <a:t>queries</a:t>
+            </a:r>
+            <a:r>
+              <a:rPr lang="it-IT" dirty="0"/>
+              <a:t> with «LIMIT 1» </a:t>
+            </a:r>
+            <a:r>
+              <a:rPr lang="it-IT" dirty="0" err="1"/>
+              <a:t>constraint</a:t>
+            </a:r>
+            <a:r>
+              <a:rPr lang="it-IT" dirty="0"/>
+              <a:t>: </a:t>
+            </a:r>
+            <a:r>
+              <a:rPr lang="it-IT" dirty="0" err="1"/>
+              <a:t>that</a:t>
+            </a:r>
+            <a:r>
+              <a:rPr lang="it-IT" dirty="0"/>
+              <a:t> </a:t>
+            </a:r>
+            <a:r>
+              <a:rPr lang="it-IT" dirty="0" err="1"/>
+              <a:t>means</a:t>
+            </a:r>
+            <a:r>
+              <a:rPr lang="it-IT" dirty="0"/>
+              <a:t> </a:t>
+            </a:r>
+            <a:r>
+              <a:rPr lang="it-IT" dirty="0" err="1"/>
+              <a:t>that</a:t>
+            </a:r>
+            <a:r>
+              <a:rPr lang="it-IT" dirty="0"/>
+              <a:t> </a:t>
+            </a:r>
+            <a:r>
+              <a:rPr lang="it-IT" dirty="0" err="1"/>
+              <a:t>even</a:t>
+            </a:r>
+            <a:r>
+              <a:rPr lang="it-IT" dirty="0"/>
+              <a:t> </a:t>
+            </a:r>
+            <a:r>
+              <a:rPr lang="it-IT" dirty="0" err="1"/>
+              <a:t>if</a:t>
+            </a:r>
+            <a:r>
+              <a:rPr lang="it-IT" dirty="0"/>
+              <a:t> some data can be </a:t>
+            </a:r>
+            <a:r>
+              <a:rPr lang="it-IT" dirty="0" err="1"/>
+              <a:t>disclosed</a:t>
+            </a:r>
+            <a:r>
+              <a:rPr lang="it-IT" dirty="0"/>
+              <a:t>, </a:t>
+            </a:r>
+            <a:r>
+              <a:rPr lang="it-IT" dirty="0" err="1"/>
+              <a:t>attacker</a:t>
+            </a:r>
+            <a:r>
+              <a:rPr lang="it-IT" dirty="0"/>
+              <a:t> </a:t>
+            </a:r>
+            <a:r>
+              <a:rPr lang="it-IT" dirty="0" err="1"/>
+              <a:t>should</a:t>
+            </a:r>
+            <a:r>
+              <a:rPr lang="it-IT" dirty="0"/>
+              <a:t> </a:t>
+            </a:r>
+            <a:r>
+              <a:rPr lang="it-IT" dirty="0" err="1"/>
+              <a:t>retrieve</a:t>
+            </a:r>
+            <a:r>
+              <a:rPr lang="it-IT" dirty="0"/>
+              <a:t> </a:t>
+            </a:r>
+            <a:r>
+              <a:rPr lang="it-IT" dirty="0" err="1"/>
+              <a:t>them</a:t>
+            </a:r>
+            <a:r>
+              <a:rPr lang="it-IT" dirty="0"/>
+              <a:t> one </a:t>
+            </a:r>
+            <a:r>
+              <a:rPr lang="it-IT" dirty="0" err="1"/>
+              <a:t>at</a:t>
+            </a:r>
+            <a:r>
+              <a:rPr lang="it-IT" dirty="0"/>
+              <a:t> a time (and </a:t>
+            </a:r>
+            <a:r>
+              <a:rPr lang="it-IT" dirty="0" err="1"/>
+              <a:t>provide</a:t>
+            </a:r>
+            <a:r>
+              <a:rPr lang="it-IT" dirty="0"/>
+              <a:t> </a:t>
+            </a:r>
+            <a:r>
+              <a:rPr lang="it-IT" dirty="0" err="1"/>
+              <a:t>different</a:t>
+            </a:r>
+            <a:r>
+              <a:rPr lang="it-IT" dirty="0"/>
+              <a:t> </a:t>
+            </a:r>
+            <a:r>
+              <a:rPr lang="it-IT" dirty="0" err="1"/>
+              <a:t>inputs</a:t>
+            </a:r>
+            <a:r>
+              <a:rPr lang="it-IT" dirty="0"/>
+              <a:t> for </a:t>
+            </a:r>
+            <a:r>
+              <a:rPr lang="it-IT" dirty="0" err="1"/>
+              <a:t>every</a:t>
+            </a:r>
+            <a:r>
+              <a:rPr lang="it-IT" dirty="0"/>
+              <a:t> </a:t>
+            </a:r>
+            <a:r>
+              <a:rPr lang="it-IT" dirty="0" err="1"/>
+              <a:t>attack</a:t>
+            </a:r>
+            <a:r>
+              <a:rPr lang="it-IT" dirty="0"/>
+              <a:t>)</a:t>
             </a:r>
           </a:p>
         </p:txBody>

</xml_diff>

<commit_message>
(+) Aggiunta thread safeness (per quello che vale...)
</commit_message>
<xml_diff>
--- a/Documentazione e cose così/Slide_concettuali_Luca.pptx
+++ b/Documentazione e cose così/Slide_concettuali_Luca.pptx
@@ -5,11 +5,11 @@
     <p:sldMasterId id="2147483648" r:id="rId1"/>
   </p:sldMasterIdLst>
   <p:sldIdLst>
-    <p:sldId id="256" r:id="rId2"/>
-    <p:sldId id="257" r:id="rId3"/>
-    <p:sldId id="260" r:id="rId4"/>
-    <p:sldId id="261" r:id="rId5"/>
-    <p:sldId id="258" r:id="rId6"/>
+    <p:sldId id="257" r:id="rId2"/>
+    <p:sldId id="260" r:id="rId3"/>
+    <p:sldId id="261" r:id="rId4"/>
+    <p:sldId id="258" r:id="rId5"/>
+    <p:sldId id="279" r:id="rId6"/>
     <p:sldId id="259" r:id="rId7"/>
     <p:sldId id="267" r:id="rId8"/>
     <p:sldId id="268" r:id="rId9"/>
@@ -21,8 +21,11 @@
     <p:sldId id="273" r:id="rId15"/>
     <p:sldId id="274" r:id="rId16"/>
     <p:sldId id="275" r:id="rId17"/>
-    <p:sldId id="264" r:id="rId18"/>
-    <p:sldId id="265" r:id="rId19"/>
+    <p:sldId id="278" r:id="rId18"/>
+    <p:sldId id="264" r:id="rId19"/>
+    <p:sldId id="265" r:id="rId20"/>
+    <p:sldId id="276" r:id="rId21"/>
+    <p:sldId id="277" r:id="rId22"/>
   </p:sldIdLst>
   <p:sldSz cx="12192000" cy="6858000"/>
   <p:notesSz cx="6858000" cy="9144000"/>
@@ -3352,7 +3355,7 @@
           <p:cNvPr id="2" name="Titolo 1">
             <a:extLst>
               <a:ext uri="{FF2B5EF4-FFF2-40B4-BE49-F238E27FC236}">
-                <a16:creationId xmlns:a16="http://schemas.microsoft.com/office/drawing/2014/main" id="{6E19FF8B-D5B4-4F9D-B233-D2EFF31805AB}"/>
+                <a16:creationId xmlns:a16="http://schemas.microsoft.com/office/drawing/2014/main" id="{5CD6C40B-86C1-403F-86AE-4F1BE0282E2A}"/>
               </a:ext>
             </a:extLst>
           </p:cNvPr>
@@ -3370,7 +3373,7 @@
           <a:p>
             <a:r>
               <a:rPr lang="it-IT" dirty="0"/>
-              <a:t>COMING SOON</a:t>
+              <a:t>SERVER FEATURES</a:t>
             </a:r>
           </a:p>
         </p:txBody>
@@ -3380,7 +3383,7 @@
           <p:cNvPr id="3" name="Sottotitolo 2">
             <a:extLst>
               <a:ext uri="{FF2B5EF4-FFF2-40B4-BE49-F238E27FC236}">
-                <a16:creationId xmlns:a16="http://schemas.microsoft.com/office/drawing/2014/main" id="{B6EAD4EE-9CA7-42DC-97DE-19CF2A7E0FEB}"/>
+                <a16:creationId xmlns:a16="http://schemas.microsoft.com/office/drawing/2014/main" id="{4B634A2A-7FE2-47D7-ABB2-30A9C641DBA4}"/>
               </a:ext>
             </a:extLst>
           </p:cNvPr>
@@ -3398,7 +3401,7 @@
           <a:p>
             <a:r>
               <a:rPr lang="it-IT" dirty="0"/>
-              <a:t>Ma poi sono le mie, perché le stai guardando? Fatti le slide tue</a:t>
+              <a:t>Certificate server</a:t>
             </a:r>
           </a:p>
         </p:txBody>
@@ -3406,7 +3409,7 @@
     </p:spTree>
     <p:extLst>
       <p:ext uri="{BB962C8B-B14F-4D97-AF65-F5344CB8AC3E}">
-        <p14:creationId xmlns:p14="http://schemas.microsoft.com/office/powerpoint/2010/main" val="1806440508"/>
+        <p14:creationId xmlns:p14="http://schemas.microsoft.com/office/powerpoint/2010/main" val="1609170951"/>
       </p:ext>
     </p:extLst>
   </p:cSld>
@@ -3750,6 +3753,22 @@
             <a:r>
               <a:rPr lang="it-IT" dirty="0"/>
               <a:t> </a:t>
+            </a:r>
+            <a:r>
+              <a:rPr lang="it-IT" dirty="0" err="1"/>
+              <a:t>secure</a:t>
+            </a:r>
+            <a:r>
+              <a:rPr lang="it-IT" dirty="0"/>
+              <a:t> </a:t>
+            </a:r>
+            <a:r>
+              <a:rPr lang="it-IT" dirty="0" err="1"/>
+              <a:t>communication</a:t>
+            </a:r>
+            <a:r>
+              <a:rPr lang="it-IT" dirty="0"/>
+              <a:t> and </a:t>
             </a:r>
             <a:r>
               <a:rPr lang="it-IT" dirty="0" err="1"/>
@@ -4565,7 +4584,7 @@
             </a:r>
             <a:r>
               <a:rPr lang="it-IT" dirty="0"/>
-              <a:t> IDPS</a:t>
+              <a:t> IPS</a:t>
             </a:r>
           </a:p>
         </p:txBody>
@@ -4648,7 +4667,7 @@
           <a:p>
             <a:r>
               <a:rPr lang="it-IT" dirty="0"/>
-              <a:t>Simple IDPS</a:t>
+              <a:t>Simple IPS</a:t>
             </a:r>
           </a:p>
         </p:txBody>
@@ -4705,12 +4724,8 @@
               <a:t>instrusion</a:t>
             </a:r>
             <a:r>
-              <a:rPr lang="it-IT" dirty="0"/>
-              <a:t> detector and </a:t>
-            </a:r>
-            <a:r>
-              <a:rPr lang="it-IT" dirty="0" err="1"/>
-              <a:t>preventer</a:t>
+              <a:rPr lang="it-IT"/>
+              <a:t> preventer</a:t>
             </a:r>
             <a:r>
               <a:rPr lang="it-IT" dirty="0"/>
@@ -5151,7 +5166,7 @@
         <p:spPr/>
         <p:txBody>
           <a:bodyPr>
-            <a:normAutofit fontScale="77500" lnSpcReduction="20000"/>
+            <a:normAutofit fontScale="70000" lnSpcReduction="20000"/>
           </a:bodyPr>
           <a:lstStyle/>
           <a:p>
@@ -5216,6 +5231,68 @@
               <a:t>generated</a:t>
             </a:r>
             <a:endParaRPr lang="it-IT" dirty="0"/>
+          </a:p>
+          <a:p>
+            <a:r>
+              <a:rPr lang="it-IT" dirty="0"/>
+              <a:t>Client-side a </a:t>
+            </a:r>
+            <a:r>
+              <a:rPr lang="it-IT" dirty="0" err="1"/>
+              <a:t>captcha</a:t>
+            </a:r>
+            <a:r>
+              <a:rPr lang="it-IT" dirty="0"/>
+              <a:t> </a:t>
+            </a:r>
+            <a:r>
+              <a:rPr lang="it-IT" dirty="0" err="1"/>
+              <a:t>is</a:t>
+            </a:r>
+            <a:r>
+              <a:rPr lang="it-IT" dirty="0"/>
+              <a:t> </a:t>
+            </a:r>
+            <a:r>
+              <a:rPr lang="it-IT" dirty="0" err="1"/>
+              <a:t>generated</a:t>
+            </a:r>
+            <a:r>
+              <a:rPr lang="it-IT" dirty="0"/>
+              <a:t> </a:t>
+            </a:r>
+            <a:r>
+              <a:rPr lang="it-IT" dirty="0" err="1"/>
+              <a:t>after</a:t>
+            </a:r>
+            <a:r>
+              <a:rPr lang="it-IT" dirty="0"/>
+              <a:t> </a:t>
+            </a:r>
+            <a:r>
+              <a:rPr lang="it-IT" dirty="0" err="1"/>
+              <a:t>every</a:t>
+            </a:r>
+            <a:r>
+              <a:rPr lang="it-IT" dirty="0"/>
+              <a:t> </a:t>
+            </a:r>
+            <a:r>
+              <a:rPr lang="it-IT" dirty="0" err="1"/>
+              <a:t>failed</a:t>
+            </a:r>
+            <a:r>
+              <a:rPr lang="it-IT" dirty="0"/>
+              <a:t> login </a:t>
+            </a:r>
+            <a:r>
+              <a:rPr lang="it-IT" dirty="0" err="1"/>
+              <a:t>attempt</a:t>
+            </a:r>
+            <a:r>
+              <a:rPr lang="it-IT" dirty="0"/>
+              <a:t>.</a:t>
+            </a:r>
           </a:p>
           <a:p>
             <a:r>
@@ -5862,6 +5939,14 @@
               <a:rPr lang="it-IT" dirty="0" err="1"/>
               <a:t>lockdowns</a:t>
             </a:r>
+            <a:r>
+              <a:rPr lang="it-IT" dirty="0"/>
+              <a:t> and IP </a:t>
+            </a:r>
+            <a:r>
+              <a:rPr lang="it-IT" dirty="0" err="1"/>
+              <a:t>lockdowns</a:t>
+            </a:r>
             <a:endParaRPr lang="it-IT" dirty="0"/>
           </a:p>
         </p:txBody>
@@ -6195,6 +6280,93 @@
           <p:cNvPr id="2" name="Titolo 1">
             <a:extLst>
               <a:ext uri="{FF2B5EF4-FFF2-40B4-BE49-F238E27FC236}">
+                <a16:creationId xmlns:a16="http://schemas.microsoft.com/office/drawing/2014/main" id="{FF972202-5F86-4383-B490-146A9CEFED87}"/>
+              </a:ext>
+            </a:extLst>
+          </p:cNvPr>
+          <p:cNvSpPr>
+            <a:spLocks noGrp="1"/>
+          </p:cNvSpPr>
+          <p:nvPr>
+            <p:ph type="title"/>
+          </p:nvPr>
+        </p:nvSpPr>
+        <p:spPr/>
+        <p:txBody>
+          <a:bodyPr/>
+          <a:lstStyle/>
+          <a:p>
+            <a:r>
+              <a:rPr lang="it-IT" dirty="0" err="1"/>
+              <a:t>References</a:t>
+            </a:r>
+            <a:endParaRPr lang="it-IT" dirty="0"/>
+          </a:p>
+        </p:txBody>
+      </p:sp>
+      <p:sp>
+        <p:nvSpPr>
+          <p:cNvPr id="3" name="Segnaposto contenuto 2">
+            <a:extLst>
+              <a:ext uri="{FF2B5EF4-FFF2-40B4-BE49-F238E27FC236}">
+                <a16:creationId xmlns:a16="http://schemas.microsoft.com/office/drawing/2014/main" id="{25964BCA-16A9-42FF-8753-7421DC6E84A7}"/>
+              </a:ext>
+            </a:extLst>
+          </p:cNvPr>
+          <p:cNvSpPr>
+            <a:spLocks noGrp="1"/>
+          </p:cNvSpPr>
+          <p:nvPr>
+            <p:ph idx="1"/>
+          </p:nvPr>
+        </p:nvSpPr>
+        <p:spPr/>
+        <p:txBody>
+          <a:bodyPr/>
+          <a:lstStyle/>
+          <a:p>
+            <a:r>
+              <a:rPr lang="it-IT" dirty="0"/>
+              <a:t>https://www.owasp.org/index.php/Blocking_Brute_Force_Attacks</a:t>
+            </a:r>
+          </a:p>
+        </p:txBody>
+      </p:sp>
+    </p:spTree>
+    <p:extLst>
+      <p:ext uri="{BB962C8B-B14F-4D97-AF65-F5344CB8AC3E}">
+        <p14:creationId xmlns:p14="http://schemas.microsoft.com/office/powerpoint/2010/main" val="654137429"/>
+      </p:ext>
+    </p:extLst>
+  </p:cSld>
+  <p:clrMapOvr>
+    <a:masterClrMapping/>
+  </p:clrMapOvr>
+</p:sld>
+</file>
+
+<file path=ppt/slides/slide18.xml><?xml version="1.0" encoding="utf-8"?>
+<p:sld xmlns:a="http://schemas.openxmlformats.org/drawingml/2006/main" xmlns:r="http://schemas.openxmlformats.org/officeDocument/2006/relationships" xmlns:p="http://schemas.openxmlformats.org/presentationml/2006/main">
+  <p:cSld>
+    <p:spTree>
+      <p:nvGrpSpPr>
+        <p:cNvPr id="1" name=""/>
+        <p:cNvGrpSpPr/>
+        <p:nvPr/>
+      </p:nvGrpSpPr>
+      <p:grpSpPr>
+        <a:xfrm>
+          <a:off x="0" y="0"/>
+          <a:ext cx="0" cy="0"/>
+          <a:chOff x="0" y="0"/>
+          <a:chExt cx="0" cy="0"/>
+        </a:xfrm>
+      </p:grpSpPr>
+      <p:sp>
+        <p:nvSpPr>
+          <p:cNvPr id="2" name="Titolo 1">
+            <a:extLst>
+              <a:ext uri="{FF2B5EF4-FFF2-40B4-BE49-F238E27FC236}">
                 <a16:creationId xmlns:a16="http://schemas.microsoft.com/office/drawing/2014/main" id="{B59E6DEA-D7A1-44D2-8559-89B730CE3681}"/>
               </a:ext>
             </a:extLst>
@@ -6265,7 +6437,7 @@
 </p:sld>
 </file>
 
-<file path=ppt/slides/slide18.xml><?xml version="1.0" encoding="utf-8"?>
+<file path=ppt/slides/slide19.xml><?xml version="1.0" encoding="utf-8"?>
 <p:sld xmlns:a="http://schemas.openxmlformats.org/drawingml/2006/main" xmlns:r="http://schemas.openxmlformats.org/officeDocument/2006/relationships" xmlns:p="http://schemas.openxmlformats.org/presentationml/2006/main">
   <p:cSld>
     <p:spTree>
@@ -6335,12 +6507,791 @@
             <p:ph idx="1"/>
           </p:nvPr>
         </p:nvSpPr>
-        <p:spPr/>
+        <p:spPr>
+          <a:xfrm>
+            <a:off x="239151" y="1505243"/>
+            <a:ext cx="11830929" cy="5233182"/>
+          </a:xfrm>
+        </p:spPr>
         <p:txBody>
-          <a:bodyPr/>
+          <a:bodyPr>
+            <a:normAutofit fontScale="25000" lnSpcReduction="20000"/>
+          </a:bodyPr>
           <a:lstStyle/>
           <a:p>
+            <a:r>
+              <a:rPr lang="it-IT" sz="7400" dirty="0" err="1"/>
+              <a:t>When</a:t>
+            </a:r>
+            <a:r>
+              <a:rPr lang="it-IT" sz="7400" dirty="0"/>
+              <a:t> </a:t>
+            </a:r>
+            <a:r>
+              <a:rPr lang="it-IT" sz="7400" dirty="0" err="1"/>
+              <a:t>developing</a:t>
+            </a:r>
+            <a:r>
+              <a:rPr lang="it-IT" sz="7400" dirty="0"/>
+              <a:t> an </a:t>
+            </a:r>
+            <a:r>
+              <a:rPr lang="it-IT" sz="7400" dirty="0" err="1"/>
+              <a:t>application</a:t>
+            </a:r>
+            <a:r>
+              <a:rPr lang="it-IT" sz="7400" dirty="0"/>
+              <a:t>, </a:t>
+            </a:r>
+            <a:r>
+              <a:rPr lang="it-IT" sz="7400" dirty="0" err="1"/>
+              <a:t>even</a:t>
+            </a:r>
+            <a:r>
+              <a:rPr lang="it-IT" sz="7400" dirty="0"/>
+              <a:t> </a:t>
+            </a:r>
+            <a:r>
+              <a:rPr lang="it-IT" sz="7400" dirty="0" err="1"/>
+              <a:t>if</a:t>
+            </a:r>
+            <a:r>
+              <a:rPr lang="it-IT" sz="7400" dirty="0"/>
+              <a:t> </a:t>
+            </a:r>
+            <a:r>
+              <a:rPr lang="it-IT" sz="7400" dirty="0" err="1"/>
+              <a:t>we</a:t>
+            </a:r>
+            <a:r>
+              <a:rPr lang="it-IT" sz="7400" dirty="0"/>
+              <a:t> </a:t>
+            </a:r>
+            <a:r>
+              <a:rPr lang="it-IT" sz="7400" dirty="0" err="1"/>
+              <a:t>strictly</a:t>
+            </a:r>
+            <a:r>
+              <a:rPr lang="it-IT" sz="7400" dirty="0"/>
+              <a:t> </a:t>
+            </a:r>
+            <a:r>
+              <a:rPr lang="it-IT" sz="7400" dirty="0" err="1"/>
+              <a:t>follow</a:t>
+            </a:r>
+            <a:r>
+              <a:rPr lang="it-IT" sz="7400" dirty="0"/>
+              <a:t> </a:t>
+            </a:r>
+            <a:r>
+              <a:rPr lang="it-IT" sz="7400" dirty="0" err="1"/>
+              <a:t>secure</a:t>
+            </a:r>
+            <a:r>
+              <a:rPr lang="it-IT" sz="7400" dirty="0"/>
+              <a:t> </a:t>
+            </a:r>
+            <a:r>
+              <a:rPr lang="it-IT" sz="7400" dirty="0" err="1"/>
+              <a:t>programming</a:t>
+            </a:r>
+            <a:r>
+              <a:rPr lang="it-IT" sz="7400" dirty="0"/>
+              <a:t> </a:t>
+            </a:r>
+            <a:r>
+              <a:rPr lang="it-IT" sz="7400" dirty="0" err="1"/>
+              <a:t>techniques</a:t>
+            </a:r>
+            <a:r>
+              <a:rPr lang="it-IT" sz="7400" dirty="0"/>
+              <a:t>, </a:t>
+            </a:r>
+            <a:r>
+              <a:rPr lang="it-IT" sz="7400" dirty="0" err="1"/>
+              <a:t>there</a:t>
+            </a:r>
+            <a:r>
+              <a:rPr lang="it-IT" sz="7400" dirty="0"/>
+              <a:t> are some </a:t>
+            </a:r>
+            <a:r>
+              <a:rPr lang="it-IT" sz="7400" dirty="0" err="1"/>
+              <a:t>residual</a:t>
+            </a:r>
+            <a:r>
+              <a:rPr lang="it-IT" sz="7400" dirty="0"/>
+              <a:t> </a:t>
+            </a:r>
+            <a:r>
+              <a:rPr lang="it-IT" sz="7400" dirty="0" err="1"/>
+              <a:t>potential</a:t>
+            </a:r>
+            <a:r>
+              <a:rPr lang="it-IT" sz="7400" dirty="0"/>
+              <a:t> </a:t>
+            </a:r>
+            <a:r>
+              <a:rPr lang="it-IT" sz="7400" dirty="0" err="1"/>
+              <a:t>weaknesses</a:t>
+            </a:r>
+            <a:r>
+              <a:rPr lang="it-IT" sz="7400" dirty="0"/>
+              <a:t>.</a:t>
+            </a:r>
+          </a:p>
+          <a:p>
+            <a:r>
+              <a:rPr lang="it-IT" sz="7400" dirty="0" err="1"/>
+              <a:t>We</a:t>
+            </a:r>
+            <a:r>
+              <a:rPr lang="it-IT" sz="7400" dirty="0"/>
+              <a:t> </a:t>
+            </a:r>
+            <a:r>
+              <a:rPr lang="it-IT" sz="7400" dirty="0" err="1"/>
+              <a:t>rely</a:t>
+            </a:r>
+            <a:r>
+              <a:rPr lang="it-IT" sz="7400" dirty="0"/>
+              <a:t> on </a:t>
+            </a:r>
+            <a:r>
+              <a:rPr lang="it-IT" sz="7400" dirty="0" err="1"/>
+              <a:t>programming</a:t>
+            </a:r>
+            <a:r>
+              <a:rPr lang="it-IT" sz="7400" dirty="0"/>
+              <a:t> </a:t>
+            </a:r>
+            <a:r>
+              <a:rPr lang="it-IT" sz="7400" dirty="0" err="1"/>
+              <a:t>languages</a:t>
+            </a:r>
+            <a:r>
+              <a:rPr lang="it-IT" sz="7400" dirty="0"/>
+              <a:t> </a:t>
+            </a:r>
+          </a:p>
+          <a:p>
+            <a:pPr lvl="1"/>
+            <a:r>
+              <a:rPr lang="it-IT" sz="7400" dirty="0"/>
+              <a:t>In </a:t>
+            </a:r>
+            <a:r>
+              <a:rPr lang="it-IT" sz="7400" dirty="0" err="1"/>
+              <a:t>recent</a:t>
+            </a:r>
+            <a:r>
+              <a:rPr lang="it-IT" sz="7400" dirty="0"/>
+              <a:t> Black </a:t>
+            </a:r>
+            <a:r>
+              <a:rPr lang="it-IT" sz="7400" dirty="0" err="1"/>
+              <a:t>Hat</a:t>
+            </a:r>
+            <a:r>
+              <a:rPr lang="it-IT" sz="7400" dirty="0"/>
+              <a:t> Europe 2017 Convention Fernando Arnaboldi, Senior Security Consultant, </a:t>
+            </a:r>
+            <a:r>
+              <a:rPr lang="it-IT" sz="7400" dirty="0" err="1"/>
+              <a:t>showed</a:t>
+            </a:r>
+            <a:r>
+              <a:rPr lang="it-IT" sz="7400" dirty="0"/>
+              <a:t> </a:t>
+            </a:r>
+            <a:r>
+              <a:rPr lang="it-IT" sz="7400" dirty="0" err="1"/>
+              <a:t>how</a:t>
+            </a:r>
+            <a:r>
+              <a:rPr lang="it-IT" sz="7400" dirty="0"/>
+              <a:t> </a:t>
+            </a:r>
+            <a:r>
+              <a:rPr lang="it-IT" sz="7400" dirty="0" err="1"/>
+              <a:t>securely</a:t>
+            </a:r>
+            <a:r>
+              <a:rPr lang="it-IT" sz="7400" dirty="0"/>
+              <a:t> </a:t>
+            </a:r>
+            <a:r>
+              <a:rPr lang="it-IT" sz="7400" dirty="0" err="1"/>
+              <a:t>developed</a:t>
+            </a:r>
+            <a:r>
+              <a:rPr lang="it-IT" sz="7400" dirty="0"/>
+              <a:t> </a:t>
+            </a:r>
+            <a:r>
+              <a:rPr lang="it-IT" sz="7400" dirty="0" err="1"/>
+              <a:t>application</a:t>
+            </a:r>
+            <a:r>
+              <a:rPr lang="it-IT" sz="7400" dirty="0"/>
+              <a:t> </a:t>
+            </a:r>
+            <a:r>
+              <a:rPr lang="it-IT" sz="7400" dirty="0" err="1"/>
+              <a:t>may</a:t>
+            </a:r>
+            <a:r>
+              <a:rPr lang="it-IT" sz="7400" dirty="0"/>
+              <a:t> </a:t>
+            </a:r>
+            <a:r>
+              <a:rPr lang="it-IT" sz="7400" dirty="0" err="1"/>
+              <a:t>have</a:t>
+            </a:r>
+            <a:r>
+              <a:rPr lang="it-IT" sz="7400" dirty="0"/>
+              <a:t> </a:t>
+            </a:r>
+            <a:r>
+              <a:rPr lang="it-IT" sz="7400" dirty="0" err="1"/>
+              <a:t>unindentified</a:t>
+            </a:r>
+            <a:r>
+              <a:rPr lang="it-IT" sz="7400" dirty="0"/>
+              <a:t> </a:t>
+            </a:r>
+            <a:r>
+              <a:rPr lang="it-IT" sz="7400" dirty="0" err="1"/>
+              <a:t>vulnerabilities</a:t>
+            </a:r>
+            <a:r>
+              <a:rPr lang="it-IT" sz="7400" dirty="0"/>
+              <a:t> in the </a:t>
+            </a:r>
+            <a:r>
+              <a:rPr lang="it-IT" sz="7400" dirty="0" err="1"/>
+              <a:t>underlying</a:t>
+            </a:r>
+            <a:r>
+              <a:rPr lang="it-IT" sz="7400" dirty="0"/>
+              <a:t> </a:t>
+            </a:r>
+            <a:r>
+              <a:rPr lang="it-IT" sz="7400" dirty="0" err="1"/>
+              <a:t>programming</a:t>
+            </a:r>
+            <a:r>
+              <a:rPr lang="it-IT" sz="7400" dirty="0"/>
+              <a:t> </a:t>
+            </a:r>
+            <a:r>
+              <a:rPr lang="it-IT" sz="7400" dirty="0" err="1"/>
+              <a:t>languages</a:t>
+            </a:r>
+            <a:r>
+              <a:rPr lang="it-IT" sz="7400" dirty="0"/>
+              <a:t> </a:t>
+            </a:r>
+            <a:r>
+              <a:rPr lang="it-IT" sz="7400" dirty="0" err="1"/>
+              <a:t>that</a:t>
+            </a:r>
+            <a:r>
+              <a:rPr lang="it-IT" sz="7400" dirty="0"/>
+              <a:t> </a:t>
+            </a:r>
+            <a:r>
+              <a:rPr lang="it-IT" sz="7400" dirty="0" err="1"/>
+              <a:t>may</a:t>
+            </a:r>
+            <a:r>
+              <a:rPr lang="it-IT" sz="7400" dirty="0"/>
+              <a:t> </a:t>
+            </a:r>
+            <a:r>
+              <a:rPr lang="it-IT" sz="7400" dirty="0" err="1"/>
+              <a:t>lead</a:t>
+            </a:r>
+            <a:r>
+              <a:rPr lang="it-IT" sz="7400" dirty="0"/>
+              <a:t> to remote code </a:t>
+            </a:r>
+            <a:r>
+              <a:rPr lang="it-IT" sz="7400" dirty="0" err="1"/>
+              <a:t>execution</a:t>
+            </a:r>
+            <a:r>
+              <a:rPr lang="it-IT" sz="7400" dirty="0"/>
+              <a:t> </a:t>
+            </a:r>
+          </a:p>
+          <a:p>
+            <a:pPr lvl="2"/>
+            <a:r>
+              <a:rPr lang="it-IT" sz="7400" dirty="0" err="1"/>
+              <a:t>Affected</a:t>
+            </a:r>
+            <a:r>
+              <a:rPr lang="it-IT" sz="7400" dirty="0"/>
+              <a:t> </a:t>
+            </a:r>
+            <a:r>
+              <a:rPr lang="it-IT" sz="7400" dirty="0" err="1"/>
+              <a:t>languages</a:t>
+            </a:r>
+            <a:r>
+              <a:rPr lang="it-IT" sz="7400" dirty="0"/>
+              <a:t> are common </a:t>
+            </a:r>
+            <a:r>
+              <a:rPr lang="it-IT" sz="7400" dirty="0" err="1"/>
+              <a:t>used</a:t>
+            </a:r>
+            <a:r>
+              <a:rPr lang="it-IT" sz="7400" dirty="0"/>
+              <a:t> </a:t>
+            </a:r>
+            <a:r>
+              <a:rPr lang="it-IT" sz="7400" dirty="0" err="1"/>
+              <a:t>ones</a:t>
+            </a:r>
+            <a:r>
+              <a:rPr lang="it-IT" sz="7400" dirty="0"/>
+              <a:t> </a:t>
+            </a:r>
+            <a:r>
+              <a:rPr lang="it-IT" sz="7400" dirty="0" err="1"/>
+              <a:t>like</a:t>
+            </a:r>
+            <a:r>
+              <a:rPr lang="it-IT" sz="7400" dirty="0"/>
+              <a:t> </a:t>
+            </a:r>
+            <a:r>
+              <a:rPr lang="it-IT" sz="7400" dirty="0" err="1"/>
+              <a:t>Javascript</a:t>
+            </a:r>
+            <a:r>
+              <a:rPr lang="it-IT" sz="7400" dirty="0"/>
+              <a:t>, PHP, Ruby, </a:t>
+            </a:r>
+            <a:r>
+              <a:rPr lang="it-IT" sz="7400" dirty="0" err="1"/>
+              <a:t>Perl</a:t>
+            </a:r>
+            <a:r>
+              <a:rPr lang="it-IT" sz="7400" dirty="0"/>
+              <a:t> and </a:t>
+            </a:r>
+            <a:r>
+              <a:rPr lang="it-IT" sz="7400" dirty="0" err="1"/>
+              <a:t>Python</a:t>
+            </a:r>
+            <a:r>
+              <a:rPr lang="it-IT" sz="7400" dirty="0"/>
+              <a:t>.</a:t>
+            </a:r>
+          </a:p>
+          <a:p>
+            <a:r>
+              <a:rPr lang="it-IT" sz="7400" dirty="0" err="1"/>
+              <a:t>Trusting</a:t>
+            </a:r>
+            <a:r>
+              <a:rPr lang="it-IT" sz="7400" dirty="0"/>
+              <a:t> </a:t>
+            </a:r>
+            <a:r>
+              <a:rPr lang="it-IT" sz="7400" dirty="0" err="1"/>
+              <a:t>third</a:t>
+            </a:r>
+            <a:r>
+              <a:rPr lang="it-IT" sz="7400" dirty="0"/>
+              <a:t> party-</a:t>
+            </a:r>
+            <a:r>
+              <a:rPr lang="it-IT" sz="7400" dirty="0" err="1"/>
+              <a:t>developed</a:t>
+            </a:r>
+            <a:r>
+              <a:rPr lang="it-IT" sz="7400" dirty="0"/>
+              <a:t> </a:t>
+            </a:r>
+            <a:r>
+              <a:rPr lang="it-IT" sz="7400" dirty="0" err="1"/>
+              <a:t>cryptography</a:t>
+            </a:r>
+            <a:r>
+              <a:rPr lang="it-IT" sz="7400" dirty="0"/>
+              <a:t> </a:t>
+            </a:r>
+            <a:r>
+              <a:rPr lang="it-IT" sz="7400" dirty="0" err="1"/>
+              <a:t>libraries</a:t>
+            </a:r>
+            <a:endParaRPr lang="it-IT" sz="7400" dirty="0"/>
+          </a:p>
+          <a:p>
+            <a:pPr lvl="1"/>
+            <a:r>
+              <a:rPr lang="it-IT" sz="7400" dirty="0" err="1"/>
+              <a:t>That</a:t>
+            </a:r>
+            <a:r>
+              <a:rPr lang="it-IT" sz="7400" dirty="0"/>
+              <a:t> </a:t>
+            </a:r>
+            <a:r>
+              <a:rPr lang="it-IT" sz="7400" dirty="0" err="1"/>
+              <a:t>library</a:t>
+            </a:r>
+            <a:r>
+              <a:rPr lang="it-IT" sz="7400" dirty="0"/>
+              <a:t> </a:t>
+            </a:r>
+            <a:r>
+              <a:rPr lang="it-IT" sz="7400" dirty="0" err="1"/>
+              <a:t>could</a:t>
+            </a:r>
+            <a:r>
+              <a:rPr lang="it-IT" sz="7400" dirty="0"/>
+              <a:t> </a:t>
+            </a:r>
+            <a:r>
+              <a:rPr lang="it-IT" sz="7400" dirty="0" err="1"/>
+              <a:t>contains</a:t>
+            </a:r>
+            <a:r>
+              <a:rPr lang="it-IT" sz="7400" dirty="0"/>
+              <a:t> </a:t>
+            </a:r>
+            <a:r>
+              <a:rPr lang="it-IT" sz="7400" dirty="0" err="1"/>
+              <a:t>intentional</a:t>
+            </a:r>
+            <a:r>
+              <a:rPr lang="it-IT" sz="7400" dirty="0"/>
+              <a:t> or due to </a:t>
+            </a:r>
+            <a:r>
+              <a:rPr lang="it-IT" sz="7400" dirty="0" err="1"/>
+              <a:t>laziness</a:t>
+            </a:r>
+            <a:r>
+              <a:rPr lang="it-IT" sz="7400" dirty="0"/>
+              <a:t> or </a:t>
+            </a:r>
+            <a:r>
+              <a:rPr lang="it-IT" sz="7400" dirty="0" err="1"/>
+              <a:t>mistake</a:t>
+            </a:r>
+            <a:r>
+              <a:rPr lang="it-IT" sz="7400" dirty="0"/>
+              <a:t>  </a:t>
+            </a:r>
+            <a:r>
+              <a:rPr lang="it-IT" sz="7400" dirty="0" err="1"/>
+              <a:t>weaknesses</a:t>
+            </a:r>
+            <a:r>
+              <a:rPr lang="it-IT" sz="7400" dirty="0"/>
+              <a:t> or </a:t>
+            </a:r>
+            <a:r>
+              <a:rPr lang="it-IT" sz="7400" dirty="0" err="1"/>
+              <a:t>backdoors</a:t>
+            </a:r>
+            <a:r>
+              <a:rPr lang="it-IT" sz="7400" dirty="0"/>
+              <a:t>, </a:t>
+            </a:r>
+            <a:r>
+              <a:rPr lang="it-IT" sz="7400" dirty="0" err="1"/>
+              <a:t>that</a:t>
+            </a:r>
+            <a:r>
+              <a:rPr lang="it-IT" sz="7400" dirty="0"/>
+              <a:t> </a:t>
+            </a:r>
+            <a:r>
+              <a:rPr lang="it-IT" sz="7400" dirty="0" err="1"/>
+              <a:t>could</a:t>
+            </a:r>
+            <a:r>
+              <a:rPr lang="it-IT" sz="7400" dirty="0"/>
+              <a:t> </a:t>
+            </a:r>
+            <a:r>
+              <a:rPr lang="it-IT" sz="7400" dirty="0" err="1"/>
+              <a:t>ease</a:t>
+            </a:r>
+            <a:r>
+              <a:rPr lang="it-IT" sz="7400" dirty="0"/>
+              <a:t> data </a:t>
+            </a:r>
+            <a:r>
+              <a:rPr lang="it-IT" sz="7400" dirty="0" err="1"/>
+              <a:t>decryption</a:t>
+            </a:r>
+            <a:r>
+              <a:rPr lang="it-IT" sz="7400" dirty="0"/>
+              <a:t>.</a:t>
+            </a:r>
+          </a:p>
+          <a:p>
+            <a:pPr lvl="2"/>
+            <a:r>
+              <a:rPr lang="it-IT" sz="7400" dirty="0" err="1"/>
+              <a:t>Detect</a:t>
+            </a:r>
+            <a:r>
+              <a:rPr lang="it-IT" sz="7400" dirty="0"/>
+              <a:t> </a:t>
+            </a:r>
+            <a:r>
+              <a:rPr lang="it-IT" sz="7400" dirty="0" err="1"/>
+              <a:t>such</a:t>
+            </a:r>
+            <a:r>
+              <a:rPr lang="it-IT" sz="7400" dirty="0"/>
+              <a:t> </a:t>
+            </a:r>
+            <a:r>
+              <a:rPr lang="it-IT" sz="7400" dirty="0" err="1"/>
+              <a:t>errors</a:t>
+            </a:r>
+            <a:r>
+              <a:rPr lang="it-IT" sz="7400" dirty="0"/>
+              <a:t> </a:t>
+            </a:r>
+            <a:r>
+              <a:rPr lang="it-IT" sz="7400" dirty="0" err="1"/>
+              <a:t>is</a:t>
+            </a:r>
+            <a:r>
+              <a:rPr lang="it-IT" sz="7400" dirty="0"/>
+              <a:t> </a:t>
+            </a:r>
+            <a:r>
+              <a:rPr lang="it-IT" sz="7400" dirty="0" err="1"/>
+              <a:t>not</a:t>
+            </a:r>
+            <a:r>
+              <a:rPr lang="it-IT" sz="7400" dirty="0"/>
+              <a:t> a </a:t>
+            </a:r>
+            <a:r>
+              <a:rPr lang="it-IT" sz="7400" dirty="0" err="1"/>
+              <a:t>trivial</a:t>
+            </a:r>
+            <a:r>
+              <a:rPr lang="it-IT" sz="7400" dirty="0"/>
+              <a:t> task.</a:t>
+            </a:r>
+          </a:p>
+          <a:p>
+            <a:r>
+              <a:rPr lang="it-IT" sz="7400" dirty="0" err="1"/>
+              <a:t>There</a:t>
+            </a:r>
+            <a:r>
+              <a:rPr lang="it-IT" sz="7400" dirty="0"/>
+              <a:t> </a:t>
+            </a:r>
+            <a:r>
+              <a:rPr lang="it-IT" sz="7400" dirty="0" err="1"/>
+              <a:t>could</a:t>
+            </a:r>
+            <a:r>
+              <a:rPr lang="it-IT" sz="7400" dirty="0"/>
+              <a:t> be </a:t>
+            </a:r>
+            <a:r>
+              <a:rPr lang="it-IT" sz="7400" dirty="0" err="1"/>
+              <a:t>flaws</a:t>
+            </a:r>
+            <a:r>
+              <a:rPr lang="it-IT" sz="7400" dirty="0"/>
+              <a:t> </a:t>
+            </a:r>
+            <a:r>
+              <a:rPr lang="it-IT" sz="7400" dirty="0" err="1"/>
+              <a:t>at</a:t>
+            </a:r>
+            <a:r>
+              <a:rPr lang="it-IT" sz="7400" dirty="0"/>
+              <a:t> </a:t>
+            </a:r>
+            <a:r>
+              <a:rPr lang="it-IT" sz="7400" dirty="0" err="1"/>
+              <a:t>algorithmic</a:t>
+            </a:r>
+            <a:r>
+              <a:rPr lang="it-IT" sz="7400" dirty="0"/>
+              <a:t> </a:t>
+            </a:r>
+            <a:r>
+              <a:rPr lang="it-IT" sz="7400" dirty="0" err="1"/>
+              <a:t>level</a:t>
+            </a:r>
+            <a:endParaRPr lang="it-IT" sz="7400" dirty="0"/>
+          </a:p>
+          <a:p>
+            <a:pPr lvl="1"/>
+            <a:r>
+              <a:rPr lang="it-IT" sz="7400" dirty="0"/>
+              <a:t>NSA </a:t>
+            </a:r>
+            <a:r>
+              <a:rPr lang="it-IT" sz="7400" dirty="0" err="1"/>
+              <a:t>has</a:t>
+            </a:r>
+            <a:r>
+              <a:rPr lang="it-IT" sz="7400" dirty="0"/>
+              <a:t> </a:t>
+            </a:r>
+            <a:r>
+              <a:rPr lang="it-IT" sz="7400" dirty="0" err="1"/>
+              <a:t>been</a:t>
+            </a:r>
+            <a:r>
+              <a:rPr lang="it-IT" sz="7400" dirty="0"/>
+              <a:t> </a:t>
+            </a:r>
+            <a:r>
+              <a:rPr lang="it-IT" sz="7400" dirty="0" err="1"/>
+              <a:t>blamed</a:t>
+            </a:r>
+            <a:r>
+              <a:rPr lang="it-IT" sz="7400" dirty="0"/>
+              <a:t> for Random </a:t>
+            </a:r>
+            <a:r>
+              <a:rPr lang="it-IT" sz="7400" dirty="0" err="1"/>
+              <a:t>Number</a:t>
+            </a:r>
+            <a:r>
+              <a:rPr lang="it-IT" sz="7400" dirty="0"/>
+              <a:t> Generation </a:t>
+            </a:r>
+            <a:r>
+              <a:rPr lang="it-IT" sz="7400" dirty="0" err="1"/>
+              <a:t>weaknesses</a:t>
+            </a:r>
+            <a:r>
+              <a:rPr lang="it-IT" sz="7400" dirty="0"/>
+              <a:t> in </a:t>
+            </a:r>
+            <a:r>
+              <a:rPr lang="it-IT" sz="7400" dirty="0" err="1"/>
+              <a:t>Dual_EC_DRBG</a:t>
+            </a:r>
+            <a:r>
+              <a:rPr lang="it-IT" sz="7400" dirty="0"/>
+              <a:t> </a:t>
+            </a:r>
+            <a:r>
+              <a:rPr lang="it-IT" sz="7400" dirty="0" err="1"/>
+              <a:t>algorithm</a:t>
+            </a:r>
+            <a:r>
+              <a:rPr lang="it-IT" sz="7400" dirty="0"/>
+              <a:t>, </a:t>
+            </a:r>
+            <a:r>
+              <a:rPr lang="it-IT" sz="7400" dirty="0" err="1"/>
+              <a:t>that</a:t>
+            </a:r>
+            <a:r>
+              <a:rPr lang="it-IT" sz="7400" dirty="0"/>
+              <a:t> </a:t>
+            </a:r>
+            <a:r>
+              <a:rPr lang="it-IT" sz="7400" dirty="0" err="1"/>
+              <a:t>was</a:t>
+            </a:r>
+            <a:r>
+              <a:rPr lang="it-IT" sz="7400" dirty="0"/>
+              <a:t> </a:t>
+            </a:r>
+            <a:r>
+              <a:rPr lang="it-IT" sz="7400" dirty="0" err="1"/>
+              <a:t>approved</a:t>
+            </a:r>
+            <a:r>
+              <a:rPr lang="it-IT" sz="7400" dirty="0"/>
+              <a:t> by NIST and </a:t>
+            </a:r>
+            <a:r>
+              <a:rPr lang="it-IT" sz="7400" dirty="0" err="1"/>
+              <a:t>used</a:t>
+            </a:r>
+            <a:r>
+              <a:rPr lang="it-IT" sz="7400" dirty="0"/>
+              <a:t> by </a:t>
+            </a:r>
+            <a:r>
+              <a:rPr lang="it-IT" sz="7400" dirty="0" err="1"/>
+              <a:t>important</a:t>
+            </a:r>
+            <a:r>
+              <a:rPr lang="it-IT" sz="7400" dirty="0"/>
+              <a:t> companies </a:t>
+            </a:r>
+            <a:r>
+              <a:rPr lang="it-IT" sz="7400" dirty="0" err="1"/>
+              <a:t>like</a:t>
+            </a:r>
+            <a:r>
+              <a:rPr lang="it-IT" sz="7400" dirty="0"/>
+              <a:t> RSA. DUAL_EC_DRBG </a:t>
+            </a:r>
+          </a:p>
+          <a:p>
+            <a:pPr lvl="2"/>
+            <a:endParaRPr lang="it-IT" sz="2800" dirty="0"/>
+          </a:p>
+          <a:p>
+            <a:pPr marL="457200" lvl="1" indent="0">
+              <a:buNone/>
+            </a:pPr>
+            <a:endParaRPr lang="it-IT" sz="3200" dirty="0"/>
+          </a:p>
+          <a:p>
+            <a:pPr lvl="1"/>
+            <a:endParaRPr lang="it-IT" sz="3200" dirty="0"/>
+          </a:p>
+          <a:p>
+            <a:pPr lvl="1"/>
             <a:endParaRPr lang="it-IT" dirty="0"/>
+          </a:p>
+          <a:p>
+            <a:pPr lvl="1"/>
+            <a:endParaRPr lang="it-IT" dirty="0"/>
+          </a:p>
+          <a:p>
+            <a:pPr marL="457200" lvl="1" indent="0">
+              <a:buNone/>
+            </a:pPr>
+            <a:r>
+              <a:rPr lang="it-IT" dirty="0"/>
+              <a:t> </a:t>
+            </a:r>
+          </a:p>
+          <a:p>
+            <a:pPr marL="0" indent="0">
+              <a:buNone/>
+            </a:pPr>
+            <a:endParaRPr lang="it-IT" dirty="0"/>
+          </a:p>
+          <a:p>
+            <a:pPr marL="457200" lvl="1" indent="0">
+              <a:buNone/>
+            </a:pPr>
+            <a:r>
+              <a:rPr lang="it-IT" dirty="0"/>
+              <a:t>	</a:t>
+            </a:r>
           </a:p>
         </p:txBody>
       </p:sp>
@@ -6379,92 +7330,6 @@
           <p:cNvPr id="2" name="Titolo 1">
             <a:extLst>
               <a:ext uri="{FF2B5EF4-FFF2-40B4-BE49-F238E27FC236}">
-                <a16:creationId xmlns:a16="http://schemas.microsoft.com/office/drawing/2014/main" id="{5CD6C40B-86C1-403F-86AE-4F1BE0282E2A}"/>
-              </a:ext>
-            </a:extLst>
-          </p:cNvPr>
-          <p:cNvSpPr>
-            <a:spLocks noGrp="1"/>
-          </p:cNvSpPr>
-          <p:nvPr>
-            <p:ph type="ctrTitle"/>
-          </p:nvPr>
-        </p:nvSpPr>
-        <p:spPr/>
-        <p:txBody>
-          <a:bodyPr/>
-          <a:lstStyle/>
-          <a:p>
-            <a:r>
-              <a:rPr lang="it-IT" dirty="0"/>
-              <a:t>SERVER FEATURES</a:t>
-            </a:r>
-          </a:p>
-        </p:txBody>
-      </p:sp>
-      <p:sp>
-        <p:nvSpPr>
-          <p:cNvPr id="3" name="Sottotitolo 2">
-            <a:extLst>
-              <a:ext uri="{FF2B5EF4-FFF2-40B4-BE49-F238E27FC236}">
-                <a16:creationId xmlns:a16="http://schemas.microsoft.com/office/drawing/2014/main" id="{4B634A2A-7FE2-47D7-ABB2-30A9C641DBA4}"/>
-              </a:ext>
-            </a:extLst>
-          </p:cNvPr>
-          <p:cNvSpPr>
-            <a:spLocks noGrp="1"/>
-          </p:cNvSpPr>
-          <p:nvPr>
-            <p:ph type="subTitle" idx="1"/>
-          </p:nvPr>
-        </p:nvSpPr>
-        <p:spPr/>
-        <p:txBody>
-          <a:bodyPr/>
-          <a:lstStyle/>
-          <a:p>
-            <a:r>
-              <a:rPr lang="it-IT" dirty="0"/>
-              <a:t>Certificate server</a:t>
-            </a:r>
-          </a:p>
-        </p:txBody>
-      </p:sp>
-    </p:spTree>
-    <p:extLst>
-      <p:ext uri="{BB962C8B-B14F-4D97-AF65-F5344CB8AC3E}">
-        <p14:creationId xmlns:p14="http://schemas.microsoft.com/office/powerpoint/2010/main" val="1609170951"/>
-      </p:ext>
-    </p:extLst>
-  </p:cSld>
-  <p:clrMapOvr>
-    <a:masterClrMapping/>
-  </p:clrMapOvr>
-</p:sld>
-</file>
-
-<file path=ppt/slides/slide3.xml><?xml version="1.0" encoding="utf-8"?>
-<p:sld xmlns:a="http://schemas.openxmlformats.org/drawingml/2006/main" xmlns:r="http://schemas.openxmlformats.org/officeDocument/2006/relationships" xmlns:p="http://schemas.openxmlformats.org/presentationml/2006/main">
-  <p:cSld>
-    <p:spTree>
-      <p:nvGrpSpPr>
-        <p:cNvPr id="1" name=""/>
-        <p:cNvGrpSpPr/>
-        <p:nvPr/>
-      </p:nvGrpSpPr>
-      <p:grpSpPr>
-        <a:xfrm>
-          <a:off x="0" y="0"/>
-          <a:ext cx="0" cy="0"/>
-          <a:chOff x="0" y="0"/>
-          <a:chExt cx="0" cy="0"/>
-        </a:xfrm>
-      </p:grpSpPr>
-      <p:sp>
-        <p:nvSpPr>
-          <p:cNvPr id="2" name="Titolo 1">
-            <a:extLst>
-              <a:ext uri="{FF2B5EF4-FFF2-40B4-BE49-F238E27FC236}">
                 <a16:creationId xmlns:a16="http://schemas.microsoft.com/office/drawing/2014/main" id="{29ECC94F-CD55-472E-BBAD-EA5D9387F9F8}"/>
               </a:ext>
             </a:extLst>
@@ -6526,7 +7391,773 @@
 </p:sld>
 </file>
 
-<file path=ppt/slides/slide4.xml><?xml version="1.0" encoding="utf-8"?>
+<file path=ppt/slides/slide20.xml><?xml version="1.0" encoding="utf-8"?>
+<p:sld xmlns:a="http://schemas.openxmlformats.org/drawingml/2006/main" xmlns:r="http://schemas.openxmlformats.org/officeDocument/2006/relationships" xmlns:p="http://schemas.openxmlformats.org/presentationml/2006/main">
+  <p:cSld>
+    <p:spTree>
+      <p:nvGrpSpPr>
+        <p:cNvPr id="1" name=""/>
+        <p:cNvGrpSpPr/>
+        <p:nvPr/>
+      </p:nvGrpSpPr>
+      <p:grpSpPr>
+        <a:xfrm>
+          <a:off x="0" y="0"/>
+          <a:ext cx="0" cy="0"/>
+          <a:chOff x="0" y="0"/>
+          <a:chExt cx="0" cy="0"/>
+        </a:xfrm>
+      </p:grpSpPr>
+      <p:sp>
+        <p:nvSpPr>
+          <p:cNvPr id="2" name="Titolo 1">
+            <a:extLst>
+              <a:ext uri="{FF2B5EF4-FFF2-40B4-BE49-F238E27FC236}">
+                <a16:creationId xmlns:a16="http://schemas.microsoft.com/office/drawing/2014/main" id="{7925F094-0128-4BCD-B3FB-F25952F2B281}"/>
+              </a:ext>
+            </a:extLst>
+          </p:cNvPr>
+          <p:cNvSpPr>
+            <a:spLocks noGrp="1"/>
+          </p:cNvSpPr>
+          <p:nvPr>
+            <p:ph type="title"/>
+          </p:nvPr>
+        </p:nvSpPr>
+        <p:spPr/>
+        <p:txBody>
+          <a:bodyPr/>
+          <a:lstStyle/>
+          <a:p>
+            <a:r>
+              <a:rPr lang="it-IT" dirty="0" err="1"/>
+              <a:t>Implicit</a:t>
+            </a:r>
+            <a:r>
+              <a:rPr lang="it-IT" dirty="0"/>
+              <a:t> </a:t>
+            </a:r>
+            <a:r>
+              <a:rPr lang="it-IT" dirty="0" err="1"/>
+              <a:t>Weaknesses</a:t>
+            </a:r>
+            <a:endParaRPr lang="it-IT" dirty="0"/>
+          </a:p>
+        </p:txBody>
+      </p:sp>
+      <p:sp>
+        <p:nvSpPr>
+          <p:cNvPr id="3" name="Segnaposto contenuto 2">
+            <a:extLst>
+              <a:ext uri="{FF2B5EF4-FFF2-40B4-BE49-F238E27FC236}">
+                <a16:creationId xmlns:a16="http://schemas.microsoft.com/office/drawing/2014/main" id="{462D5848-CCFE-4409-A4DC-9302344E3FAF}"/>
+              </a:ext>
+            </a:extLst>
+          </p:cNvPr>
+          <p:cNvSpPr>
+            <a:spLocks noGrp="1"/>
+          </p:cNvSpPr>
+          <p:nvPr>
+            <p:ph idx="1"/>
+          </p:nvPr>
+        </p:nvSpPr>
+        <p:spPr/>
+        <p:txBody>
+          <a:bodyPr>
+            <a:normAutofit fontScale="62500" lnSpcReduction="20000"/>
+          </a:bodyPr>
+          <a:lstStyle/>
+          <a:p>
+            <a:r>
+              <a:rPr lang="it-IT" sz="3200" dirty="0" err="1"/>
+              <a:t>Even</a:t>
+            </a:r>
+            <a:r>
+              <a:rPr lang="it-IT" sz="3200" dirty="0"/>
+              <a:t> hardware can be </a:t>
+            </a:r>
+            <a:r>
+              <a:rPr lang="it-IT" sz="3200" dirty="0" err="1"/>
+              <a:t>exploited</a:t>
+            </a:r>
+            <a:r>
+              <a:rPr lang="it-IT" sz="3200" dirty="0"/>
+              <a:t> and </a:t>
+            </a:r>
+            <a:r>
+              <a:rPr lang="it-IT" sz="3200" dirty="0" err="1"/>
+              <a:t>firmwares</a:t>
+            </a:r>
+            <a:r>
+              <a:rPr lang="it-IT" sz="3200" dirty="0"/>
+              <a:t> </a:t>
+            </a:r>
+            <a:r>
+              <a:rPr lang="it-IT" sz="3200" dirty="0" err="1"/>
+              <a:t>should</a:t>
+            </a:r>
+            <a:r>
+              <a:rPr lang="it-IT" sz="3200" dirty="0"/>
+              <a:t> be </a:t>
+            </a:r>
+            <a:r>
+              <a:rPr lang="it-IT" sz="3200" dirty="0" err="1"/>
+              <a:t>regurarly</a:t>
+            </a:r>
+            <a:r>
+              <a:rPr lang="it-IT" sz="3200" dirty="0"/>
+              <a:t> </a:t>
+            </a:r>
+            <a:r>
+              <a:rPr lang="it-IT" sz="3200" dirty="0" err="1"/>
+              <a:t>updated</a:t>
+            </a:r>
+            <a:endParaRPr lang="it-IT" sz="3200" dirty="0"/>
+          </a:p>
+          <a:p>
+            <a:pPr lvl="1"/>
+            <a:r>
+              <a:rPr lang="it-IT" sz="3200" dirty="0" err="1"/>
+              <a:t>Modern</a:t>
+            </a:r>
+            <a:r>
+              <a:rPr lang="it-IT" sz="3200" dirty="0"/>
+              <a:t> </a:t>
+            </a:r>
+            <a:r>
+              <a:rPr lang="it-IT" sz="3200" dirty="0" err="1"/>
+              <a:t>CPUs</a:t>
+            </a:r>
+            <a:r>
+              <a:rPr lang="it-IT" sz="3200" dirty="0"/>
+              <a:t> </a:t>
+            </a:r>
+            <a:r>
+              <a:rPr lang="it-IT" sz="3200" dirty="0" err="1"/>
+              <a:t>have</a:t>
+            </a:r>
+            <a:r>
+              <a:rPr lang="it-IT" sz="3200" dirty="0"/>
+              <a:t> </a:t>
+            </a:r>
+            <a:r>
+              <a:rPr lang="it-IT" sz="3200" dirty="0" err="1"/>
+              <a:t>cryptographic</a:t>
+            </a:r>
+            <a:r>
+              <a:rPr lang="it-IT" sz="3200" dirty="0"/>
+              <a:t> </a:t>
+            </a:r>
+            <a:r>
+              <a:rPr lang="it-IT" sz="3200" dirty="0" err="1"/>
+              <a:t>APIs</a:t>
+            </a:r>
+            <a:r>
+              <a:rPr lang="it-IT" sz="3200" dirty="0"/>
+              <a:t>, </a:t>
+            </a:r>
+            <a:r>
+              <a:rPr lang="it-IT" sz="3200" dirty="0" err="1"/>
+              <a:t>that</a:t>
+            </a:r>
+            <a:r>
+              <a:rPr lang="it-IT" sz="3200" dirty="0"/>
+              <a:t> </a:t>
+            </a:r>
+            <a:r>
+              <a:rPr lang="it-IT" sz="3200" dirty="0" err="1"/>
+              <a:t>could</a:t>
+            </a:r>
+            <a:r>
+              <a:rPr lang="it-IT" sz="3200" dirty="0"/>
+              <a:t> </a:t>
+            </a:r>
+            <a:r>
+              <a:rPr lang="it-IT" sz="3200" dirty="0" err="1"/>
+              <a:t>have</a:t>
+            </a:r>
+            <a:r>
+              <a:rPr lang="it-IT" sz="3200" dirty="0"/>
+              <a:t> the </a:t>
+            </a:r>
+            <a:r>
+              <a:rPr lang="it-IT" sz="3200" dirty="0" err="1"/>
+              <a:t>flaws</a:t>
+            </a:r>
+            <a:r>
+              <a:rPr lang="it-IT" sz="3200" dirty="0"/>
+              <a:t> </a:t>
+            </a:r>
+            <a:r>
+              <a:rPr lang="it-IT" sz="3200" dirty="0" err="1"/>
+              <a:t>we</a:t>
+            </a:r>
+            <a:r>
+              <a:rPr lang="it-IT" sz="3200" dirty="0"/>
+              <a:t> </a:t>
+            </a:r>
+            <a:r>
+              <a:rPr lang="it-IT" sz="3200" dirty="0" err="1"/>
+              <a:t>discussed</a:t>
+            </a:r>
+            <a:r>
+              <a:rPr lang="it-IT" sz="3200" dirty="0"/>
+              <a:t> </a:t>
+            </a:r>
+            <a:r>
+              <a:rPr lang="it-IT" sz="3200" dirty="0" err="1"/>
+              <a:t>before</a:t>
+            </a:r>
+            <a:r>
+              <a:rPr lang="it-IT" sz="3200" dirty="0"/>
+              <a:t>.</a:t>
+            </a:r>
+          </a:p>
+          <a:p>
+            <a:pPr lvl="1"/>
+            <a:r>
+              <a:rPr lang="it-IT" sz="3200" dirty="0" err="1"/>
+              <a:t>Recent</a:t>
+            </a:r>
+            <a:r>
+              <a:rPr lang="it-IT" sz="3200" dirty="0"/>
+              <a:t> Intel </a:t>
+            </a:r>
+            <a:r>
+              <a:rPr lang="it-IT" sz="3200" dirty="0" err="1"/>
+              <a:t>CPUs</a:t>
+            </a:r>
+            <a:r>
+              <a:rPr lang="it-IT" sz="3200" dirty="0"/>
+              <a:t> </a:t>
+            </a:r>
+            <a:r>
+              <a:rPr lang="it-IT" sz="3200" dirty="0" err="1"/>
+              <a:t>had</a:t>
+            </a:r>
+            <a:r>
+              <a:rPr lang="it-IT" sz="3200" dirty="0"/>
+              <a:t> firmware </a:t>
+            </a:r>
+            <a:r>
+              <a:rPr lang="it-IT" sz="3200" dirty="0" err="1"/>
+              <a:t>faults</a:t>
+            </a:r>
+            <a:r>
+              <a:rPr lang="it-IT" sz="3200" dirty="0"/>
+              <a:t> for Management Engine, </a:t>
+            </a:r>
+            <a:r>
+              <a:rPr lang="it-IT" sz="3200" dirty="0" err="1"/>
+              <a:t>Trusted</a:t>
+            </a:r>
+            <a:r>
+              <a:rPr lang="it-IT" sz="3200" dirty="0"/>
+              <a:t> </a:t>
+            </a:r>
+            <a:r>
+              <a:rPr lang="it-IT" sz="3200" dirty="0" err="1"/>
+              <a:t>Execution</a:t>
+            </a:r>
+            <a:r>
+              <a:rPr lang="it-IT" sz="3200" dirty="0"/>
+              <a:t> Engine, Server Platform Services </a:t>
+            </a:r>
+            <a:r>
+              <a:rPr lang="it-IT" sz="3200" dirty="0" err="1"/>
+              <a:t>that</a:t>
+            </a:r>
+            <a:r>
+              <a:rPr lang="it-IT" sz="3200" dirty="0"/>
+              <a:t> </a:t>
+            </a:r>
+            <a:r>
+              <a:rPr lang="it-IT" sz="3200" dirty="0" err="1"/>
+              <a:t>could</a:t>
+            </a:r>
+            <a:r>
+              <a:rPr lang="it-IT" sz="3200" dirty="0"/>
+              <a:t> </a:t>
+            </a:r>
+            <a:r>
+              <a:rPr lang="it-IT" sz="3200" dirty="0" err="1"/>
+              <a:t>lead</a:t>
+            </a:r>
+            <a:r>
+              <a:rPr lang="it-IT" sz="3200" dirty="0"/>
+              <a:t> to </a:t>
+            </a:r>
+            <a:r>
+              <a:rPr lang="it-IT" sz="3200" dirty="0" err="1"/>
+              <a:t>tens</a:t>
+            </a:r>
+            <a:r>
+              <a:rPr lang="it-IT" sz="3200" dirty="0"/>
+              <a:t> of </a:t>
+            </a:r>
+            <a:r>
+              <a:rPr lang="it-IT" sz="3200" dirty="0" err="1"/>
+              <a:t>dangerous</a:t>
+            </a:r>
+            <a:r>
+              <a:rPr lang="it-IT" sz="3200" dirty="0"/>
+              <a:t> </a:t>
+            </a:r>
+            <a:r>
+              <a:rPr lang="it-IT" sz="3200" dirty="0" err="1"/>
+              <a:t>vulnerabilities</a:t>
+            </a:r>
+            <a:r>
+              <a:rPr lang="it-IT" sz="3200" dirty="0"/>
+              <a:t>, </a:t>
+            </a:r>
+            <a:r>
+              <a:rPr lang="it-IT" sz="3200" dirty="0" err="1"/>
+              <a:t>permit</a:t>
+            </a:r>
+            <a:r>
+              <a:rPr lang="it-IT" sz="3200" dirty="0"/>
+              <a:t> non-</a:t>
+            </a:r>
+            <a:r>
+              <a:rPr lang="it-IT" sz="3200" dirty="0" err="1"/>
+              <a:t>signed</a:t>
+            </a:r>
+            <a:r>
+              <a:rPr lang="it-IT" sz="3200" dirty="0"/>
+              <a:t> code </a:t>
+            </a:r>
+            <a:r>
+              <a:rPr lang="it-IT" sz="3200" dirty="0" err="1"/>
+              <a:t>execution</a:t>
+            </a:r>
+            <a:r>
+              <a:rPr lang="it-IT" sz="3200" dirty="0"/>
+              <a:t> </a:t>
+            </a:r>
+            <a:r>
+              <a:rPr lang="it-IT" sz="3200" dirty="0" err="1"/>
+              <a:t>that</a:t>
+            </a:r>
+            <a:r>
+              <a:rPr lang="it-IT" sz="3200" dirty="0"/>
+              <a:t> </a:t>
+            </a:r>
+            <a:r>
+              <a:rPr lang="it-IT" sz="3200" dirty="0" err="1"/>
+              <a:t>could</a:t>
+            </a:r>
+            <a:r>
+              <a:rPr lang="it-IT" sz="3200" dirty="0"/>
+              <a:t> </a:t>
+            </a:r>
+            <a:r>
+              <a:rPr lang="it-IT" sz="3200" dirty="0" err="1"/>
+              <a:t>not</a:t>
+            </a:r>
+            <a:r>
+              <a:rPr lang="it-IT" sz="3200" dirty="0"/>
+              <a:t> be </a:t>
+            </a:r>
+            <a:r>
+              <a:rPr lang="it-IT" sz="3200" dirty="0" err="1"/>
+              <a:t>discovered</a:t>
+            </a:r>
+            <a:r>
+              <a:rPr lang="it-IT" sz="3200" dirty="0"/>
+              <a:t> by CPU  security </a:t>
+            </a:r>
+            <a:r>
+              <a:rPr lang="it-IT" sz="3200" dirty="0" err="1"/>
+              <a:t>measures</a:t>
+            </a:r>
+            <a:r>
+              <a:rPr lang="it-IT" sz="3200" dirty="0"/>
+              <a:t> or security </a:t>
+            </a:r>
+            <a:r>
+              <a:rPr lang="it-IT" sz="3200" dirty="0" err="1"/>
+              <a:t>softwares</a:t>
+            </a:r>
+            <a:endParaRPr lang="it-IT" sz="3200" dirty="0"/>
+          </a:p>
+          <a:p>
+            <a:pPr lvl="1"/>
+            <a:r>
+              <a:rPr lang="it-IT" sz="3200" dirty="0" err="1"/>
+              <a:t>There</a:t>
+            </a:r>
+            <a:r>
+              <a:rPr lang="it-IT" sz="3200" dirty="0"/>
+              <a:t> </a:t>
+            </a:r>
+            <a:r>
+              <a:rPr lang="it-IT" sz="3200" dirty="0" err="1"/>
+              <a:t>is</a:t>
+            </a:r>
+            <a:r>
+              <a:rPr lang="it-IT" sz="3200" dirty="0"/>
+              <a:t> a small </a:t>
+            </a:r>
+            <a:r>
+              <a:rPr lang="it-IT" sz="3200" dirty="0" err="1"/>
+              <a:t>Minix-running</a:t>
+            </a:r>
+            <a:r>
+              <a:rPr lang="it-IT" sz="3200" dirty="0"/>
+              <a:t> CPU in </a:t>
+            </a:r>
+            <a:r>
+              <a:rPr lang="it-IT" sz="3200" dirty="0" err="1"/>
+              <a:t>recent</a:t>
+            </a:r>
+            <a:r>
+              <a:rPr lang="it-IT" sz="3200" dirty="0"/>
+              <a:t> Intel </a:t>
+            </a:r>
+            <a:r>
+              <a:rPr lang="it-IT" sz="3200" dirty="0" err="1"/>
+              <a:t>CPUs</a:t>
+            </a:r>
+            <a:r>
+              <a:rPr lang="it-IT" sz="3200" dirty="0"/>
+              <a:t>, with ring -3 </a:t>
+            </a:r>
+            <a:r>
+              <a:rPr lang="it-IT" sz="3200" dirty="0" err="1"/>
+              <a:t>privileges</a:t>
+            </a:r>
+            <a:r>
+              <a:rPr lang="it-IT" sz="3200" dirty="0"/>
+              <a:t> (full </a:t>
+            </a:r>
+            <a:r>
+              <a:rPr lang="it-IT" sz="3200" dirty="0" err="1"/>
+              <a:t>privileges</a:t>
+            </a:r>
+            <a:r>
+              <a:rPr lang="it-IT" sz="3200" dirty="0"/>
+              <a:t>), </a:t>
+            </a:r>
+            <a:r>
+              <a:rPr lang="it-IT" sz="3200" dirty="0" err="1"/>
+              <a:t>containing</a:t>
+            </a:r>
+            <a:r>
+              <a:rPr lang="it-IT" sz="3200" dirty="0"/>
+              <a:t> :</a:t>
+            </a:r>
+          </a:p>
+          <a:p>
+            <a:pPr lvl="2"/>
+            <a:r>
+              <a:rPr lang="it-IT" sz="2800" dirty="0"/>
+              <a:t>Full network </a:t>
+            </a:r>
+            <a:r>
+              <a:rPr lang="it-IT" sz="2800" dirty="0" err="1"/>
+              <a:t>stack</a:t>
+            </a:r>
+            <a:endParaRPr lang="it-IT" sz="2800" dirty="0"/>
+          </a:p>
+          <a:p>
+            <a:pPr lvl="2"/>
+            <a:r>
+              <a:rPr lang="it-IT" sz="2800" dirty="0"/>
+              <a:t>File system</a:t>
+            </a:r>
+          </a:p>
+          <a:p>
+            <a:pPr lvl="2"/>
+            <a:r>
+              <a:rPr lang="it-IT" sz="2800" dirty="0" err="1"/>
+              <a:t>Many</a:t>
+            </a:r>
+            <a:r>
+              <a:rPr lang="it-IT" sz="2800" dirty="0"/>
+              <a:t> drivers</a:t>
+            </a:r>
+          </a:p>
+          <a:p>
+            <a:pPr lvl="2"/>
+            <a:r>
+              <a:rPr lang="it-IT" sz="2800" dirty="0"/>
+              <a:t>A web server (?)</a:t>
+            </a:r>
+          </a:p>
+          <a:p>
+            <a:pPr lvl="1"/>
+            <a:r>
+              <a:rPr lang="it-IT" sz="3200" dirty="0"/>
+              <a:t>The Management Engine fault </a:t>
+            </a:r>
+            <a:r>
+              <a:rPr lang="it-IT" sz="3200" dirty="0" err="1"/>
+              <a:t>we</a:t>
+            </a:r>
+            <a:r>
+              <a:rPr lang="it-IT" sz="3200" dirty="0"/>
+              <a:t> </a:t>
+            </a:r>
+            <a:r>
+              <a:rPr lang="it-IT" sz="3200" dirty="0" err="1"/>
+              <a:t>discussed</a:t>
+            </a:r>
+            <a:r>
+              <a:rPr lang="it-IT" sz="3200" dirty="0"/>
+              <a:t> </a:t>
+            </a:r>
+            <a:r>
+              <a:rPr lang="it-IT" sz="3200" dirty="0" err="1"/>
+              <a:t>before</a:t>
+            </a:r>
+            <a:r>
+              <a:rPr lang="it-IT" sz="3200" dirty="0"/>
+              <a:t> </a:t>
+            </a:r>
+            <a:r>
+              <a:rPr lang="it-IT" sz="3200" dirty="0" err="1"/>
+              <a:t>affected</a:t>
+            </a:r>
+            <a:r>
+              <a:rPr lang="it-IT" sz="3200" dirty="0"/>
+              <a:t> the </a:t>
+            </a:r>
+            <a:r>
+              <a:rPr lang="it-IT" sz="3200" dirty="0" err="1"/>
+              <a:t>Minix</a:t>
+            </a:r>
+            <a:r>
+              <a:rPr lang="it-IT" sz="3200" dirty="0"/>
+              <a:t>-in-Intel CPU, so remote code </a:t>
+            </a:r>
+            <a:r>
+              <a:rPr lang="it-IT" sz="3200" dirty="0" err="1"/>
+              <a:t>would</a:t>
+            </a:r>
+            <a:r>
+              <a:rPr lang="it-IT" sz="3200" dirty="0"/>
+              <a:t> </a:t>
+            </a:r>
+            <a:r>
+              <a:rPr lang="it-IT" sz="3200" dirty="0" err="1"/>
+              <a:t>have</a:t>
+            </a:r>
+            <a:r>
+              <a:rPr lang="it-IT" sz="3200" dirty="0"/>
+              <a:t> </a:t>
+            </a:r>
+            <a:r>
+              <a:rPr lang="it-IT" sz="3200" dirty="0" err="1"/>
+              <a:t>been</a:t>
+            </a:r>
+            <a:r>
+              <a:rPr lang="it-IT" sz="3200" dirty="0"/>
+              <a:t> </a:t>
+            </a:r>
+            <a:r>
+              <a:rPr lang="it-IT" sz="3200" dirty="0" err="1"/>
+              <a:t>executed</a:t>
+            </a:r>
+            <a:r>
+              <a:rPr lang="it-IT" sz="3200" dirty="0"/>
+              <a:t> with full </a:t>
+            </a:r>
+            <a:r>
+              <a:rPr lang="it-IT" sz="3200" dirty="0" err="1"/>
+              <a:t>privileges</a:t>
+            </a:r>
+            <a:r>
+              <a:rPr lang="it-IT" sz="3200" dirty="0"/>
+              <a:t> and no software or hardware tracking.</a:t>
+            </a:r>
+          </a:p>
+          <a:p>
+            <a:pPr lvl="1"/>
+            <a:r>
+              <a:rPr lang="it-IT" sz="3200" dirty="0"/>
+              <a:t>Google </a:t>
+            </a:r>
+            <a:r>
+              <a:rPr lang="it-IT" sz="3200" dirty="0" err="1"/>
+              <a:t>is</a:t>
+            </a:r>
+            <a:r>
+              <a:rPr lang="it-IT" sz="3200" dirty="0"/>
+              <a:t> </a:t>
+            </a:r>
+            <a:r>
+              <a:rPr lang="it-IT" sz="3200" dirty="0" err="1"/>
+              <a:t>working</a:t>
+            </a:r>
+            <a:r>
+              <a:rPr lang="it-IT" sz="3200" dirty="0"/>
+              <a:t> for </a:t>
+            </a:r>
+            <a:r>
+              <a:rPr lang="it-IT" sz="3200" dirty="0" err="1"/>
+              <a:t>removing</a:t>
+            </a:r>
+            <a:r>
+              <a:rPr lang="it-IT" sz="3200" dirty="0"/>
+              <a:t> Management Engine from </a:t>
+            </a:r>
+            <a:r>
+              <a:rPr lang="it-IT" sz="3200" dirty="0" err="1"/>
+              <a:t>their</a:t>
+            </a:r>
+            <a:r>
+              <a:rPr lang="it-IT" sz="3200" dirty="0"/>
+              <a:t> </a:t>
+            </a:r>
+            <a:r>
+              <a:rPr lang="it-IT" sz="3200" dirty="0" err="1"/>
+              <a:t>servers</a:t>
+            </a:r>
+            <a:br>
+              <a:rPr lang="it-IT" sz="2800" dirty="0"/>
+            </a:br>
+            <a:r>
+              <a:rPr lang="it-IT" sz="2800" dirty="0"/>
+              <a:t>	</a:t>
+            </a:r>
+          </a:p>
+          <a:p>
+            <a:endParaRPr lang="it-IT" dirty="0"/>
+          </a:p>
+        </p:txBody>
+      </p:sp>
+    </p:spTree>
+    <p:extLst>
+      <p:ext uri="{BB962C8B-B14F-4D97-AF65-F5344CB8AC3E}">
+        <p14:creationId xmlns:p14="http://schemas.microsoft.com/office/powerpoint/2010/main" val="3727351069"/>
+      </p:ext>
+    </p:extLst>
+  </p:cSld>
+  <p:clrMapOvr>
+    <a:masterClrMapping/>
+  </p:clrMapOvr>
+</p:sld>
+</file>
+
+<file path=ppt/slides/slide21.xml><?xml version="1.0" encoding="utf-8"?>
+<p:sld xmlns:a="http://schemas.openxmlformats.org/drawingml/2006/main" xmlns:r="http://schemas.openxmlformats.org/officeDocument/2006/relationships" xmlns:p="http://schemas.openxmlformats.org/presentationml/2006/main">
+  <p:cSld>
+    <p:spTree>
+      <p:nvGrpSpPr>
+        <p:cNvPr id="1" name=""/>
+        <p:cNvGrpSpPr/>
+        <p:nvPr/>
+      </p:nvGrpSpPr>
+      <p:grpSpPr>
+        <a:xfrm>
+          <a:off x="0" y="0"/>
+          <a:ext cx="0" cy="0"/>
+          <a:chOff x="0" y="0"/>
+          <a:chExt cx="0" cy="0"/>
+        </a:xfrm>
+      </p:grpSpPr>
+      <p:sp>
+        <p:nvSpPr>
+          <p:cNvPr id="2" name="Titolo 1">
+            <a:extLst>
+              <a:ext uri="{FF2B5EF4-FFF2-40B4-BE49-F238E27FC236}">
+                <a16:creationId xmlns:a16="http://schemas.microsoft.com/office/drawing/2014/main" id="{59A923D4-4675-483E-B5CD-78C7FC3CFC7E}"/>
+              </a:ext>
+            </a:extLst>
+          </p:cNvPr>
+          <p:cNvSpPr>
+            <a:spLocks noGrp="1"/>
+          </p:cNvSpPr>
+          <p:nvPr>
+            <p:ph type="title"/>
+          </p:nvPr>
+        </p:nvSpPr>
+        <p:spPr/>
+        <p:txBody>
+          <a:bodyPr/>
+          <a:lstStyle/>
+          <a:p>
+            <a:r>
+              <a:rPr lang="it-IT" dirty="0" err="1"/>
+              <a:t>References</a:t>
+            </a:r>
+            <a:endParaRPr lang="it-IT" dirty="0"/>
+          </a:p>
+        </p:txBody>
+      </p:sp>
+      <p:sp>
+        <p:nvSpPr>
+          <p:cNvPr id="3" name="Segnaposto contenuto 2">
+            <a:extLst>
+              <a:ext uri="{FF2B5EF4-FFF2-40B4-BE49-F238E27FC236}">
+                <a16:creationId xmlns:a16="http://schemas.microsoft.com/office/drawing/2014/main" id="{F9F6257A-539A-485C-A816-675944DA3317}"/>
+              </a:ext>
+            </a:extLst>
+          </p:cNvPr>
+          <p:cNvSpPr>
+            <a:spLocks noGrp="1"/>
+          </p:cNvSpPr>
+          <p:nvPr>
+            <p:ph idx="1"/>
+          </p:nvPr>
+        </p:nvSpPr>
+        <p:spPr/>
+        <p:txBody>
+          <a:bodyPr/>
+          <a:lstStyle/>
+          <a:p>
+            <a:r>
+              <a:rPr lang="it-IT" dirty="0">
+                <a:hlinkClick r:id="rId2"/>
+              </a:rPr>
+              <a:t>https://www.blackhat.com/docs/eu-17/materials/eu-17-Arnaboldi-Exposing-Hidden-Exploitable-Behaviors-In-Programming-Languages-Using-Differential-Fuzzing-wp.pdf</a:t>
+            </a:r>
+          </a:p>
+          <a:p>
+            <a:r>
+              <a:rPr lang="it-IT" dirty="0">
+                <a:hlinkClick r:id="rId2"/>
+              </a:rPr>
+              <a:t>https://www.tomshw.it/falle-firmware-intel-milioni-computer-aggiornare-89817</a:t>
+            </a:r>
+          </a:p>
+          <a:p>
+            <a:r>
+              <a:rPr lang="it-IT" dirty="0">
+                <a:hlinkClick r:id="rId2"/>
+              </a:rPr>
+              <a:t>https://www.networkworld.com/article/3236064/servers/minix-the-most-popular-os-in-the-world-thanks-to-intel.html</a:t>
+            </a:r>
+          </a:p>
+          <a:p>
+            <a:r>
+              <a:rPr lang="it-IT" dirty="0">
+                <a:hlinkClick r:id="rId2"/>
+              </a:rPr>
+              <a:t>https://schd.ws/hosted_files/osseu17/84/Replace%20UEFI%20with%20Linux.pdf</a:t>
+            </a:r>
+            <a:endParaRPr lang="it-IT" dirty="0"/>
+          </a:p>
+          <a:p>
+            <a:endParaRPr lang="it-IT" dirty="0"/>
+          </a:p>
+        </p:txBody>
+      </p:sp>
+    </p:spTree>
+    <p:extLst>
+      <p:ext uri="{BB962C8B-B14F-4D97-AF65-F5344CB8AC3E}">
+        <p14:creationId xmlns:p14="http://schemas.microsoft.com/office/powerpoint/2010/main" val="4261377353"/>
+      </p:ext>
+    </p:extLst>
+  </p:cSld>
+  <p:clrMapOvr>
+    <a:masterClrMapping/>
+  </p:clrMapOvr>
+</p:sld>
+</file>
+
+<file path=ppt/slides/slide3.xml><?xml version="1.0" encoding="utf-8"?>
 <p:sld xmlns:a="http://schemas.openxmlformats.org/drawingml/2006/main" xmlns:r="http://schemas.openxmlformats.org/officeDocument/2006/relationships" xmlns:p="http://schemas.openxmlformats.org/presentationml/2006/main">
   <p:cSld>
     <p:spTree>
@@ -7209,7 +8840,7 @@
 </p:sld>
 </file>
 
-<file path=ppt/slides/slide5.xml><?xml version="1.0" encoding="utf-8"?>
+<file path=ppt/slides/slide4.xml><?xml version="1.0" encoding="utf-8"?>
 <p:sld xmlns:a="http://schemas.openxmlformats.org/drawingml/2006/main" xmlns:r="http://schemas.openxmlformats.org/officeDocument/2006/relationships" xmlns:p="http://schemas.openxmlformats.org/presentationml/2006/main">
   <p:cSld>
     <p:spTree>
@@ -7678,6 +9309,96 @@
     <p:extLst>
       <p:ext uri="{BB962C8B-B14F-4D97-AF65-F5344CB8AC3E}">
         <p14:creationId xmlns:p14="http://schemas.microsoft.com/office/powerpoint/2010/main" val="3332312053"/>
+      </p:ext>
+    </p:extLst>
+  </p:cSld>
+  <p:clrMapOvr>
+    <a:masterClrMapping/>
+  </p:clrMapOvr>
+</p:sld>
+</file>
+
+<file path=ppt/slides/slide5.xml><?xml version="1.0" encoding="utf-8"?>
+<p:sld xmlns:a="http://schemas.openxmlformats.org/drawingml/2006/main" xmlns:r="http://schemas.openxmlformats.org/officeDocument/2006/relationships" xmlns:p="http://schemas.openxmlformats.org/presentationml/2006/main">
+  <p:cSld>
+    <p:spTree>
+      <p:nvGrpSpPr>
+        <p:cNvPr id="1" name=""/>
+        <p:cNvGrpSpPr/>
+        <p:nvPr/>
+      </p:nvGrpSpPr>
+      <p:grpSpPr>
+        <a:xfrm>
+          <a:off x="0" y="0"/>
+          <a:ext cx="0" cy="0"/>
+          <a:chOff x="0" y="0"/>
+          <a:chExt cx="0" cy="0"/>
+        </a:xfrm>
+      </p:grpSpPr>
+      <p:sp>
+        <p:nvSpPr>
+          <p:cNvPr id="2" name="Titolo 1">
+            <a:extLst>
+              <a:ext uri="{FF2B5EF4-FFF2-40B4-BE49-F238E27FC236}">
+                <a16:creationId xmlns:a16="http://schemas.microsoft.com/office/drawing/2014/main" id="{B2F62334-0E63-4123-A976-1EB27DF2F860}"/>
+              </a:ext>
+            </a:extLst>
+          </p:cNvPr>
+          <p:cNvSpPr>
+            <a:spLocks noGrp="1"/>
+          </p:cNvSpPr>
+          <p:nvPr>
+            <p:ph type="title"/>
+          </p:nvPr>
+        </p:nvSpPr>
+        <p:spPr/>
+        <p:txBody>
+          <a:bodyPr/>
+          <a:lstStyle/>
+          <a:p>
+            <a:r>
+              <a:rPr lang="it-IT" dirty="0" err="1"/>
+              <a:t>References</a:t>
+            </a:r>
+            <a:endParaRPr lang="it-IT" dirty="0"/>
+          </a:p>
+        </p:txBody>
+      </p:sp>
+      <p:sp>
+        <p:nvSpPr>
+          <p:cNvPr id="3" name="Segnaposto contenuto 2">
+            <a:extLst>
+              <a:ext uri="{FF2B5EF4-FFF2-40B4-BE49-F238E27FC236}">
+                <a16:creationId xmlns:a16="http://schemas.microsoft.com/office/drawing/2014/main" id="{C5DCC903-F3F9-4FCB-926D-DC461BC1D4CC}"/>
+              </a:ext>
+            </a:extLst>
+          </p:cNvPr>
+          <p:cNvSpPr>
+            <a:spLocks noGrp="1"/>
+          </p:cNvSpPr>
+          <p:nvPr>
+            <p:ph idx="1"/>
+          </p:nvPr>
+        </p:nvSpPr>
+        <p:spPr/>
+        <p:txBody>
+          <a:bodyPr/>
+          <a:lstStyle/>
+          <a:p>
+            <a:endParaRPr lang="it-IT" dirty="0"/>
+          </a:p>
+          <a:p>
+            <a:r>
+              <a:rPr lang="it-IT" dirty="0"/>
+              <a:t>https://www.owasp.org/index.php/Use_of_hard-coded_password</a:t>
+            </a:r>
+          </a:p>
+        </p:txBody>
+      </p:sp>
+    </p:spTree>
+    <p:extLst>
+      <p:ext uri="{BB962C8B-B14F-4D97-AF65-F5344CB8AC3E}">
+        <p14:creationId xmlns:p14="http://schemas.microsoft.com/office/powerpoint/2010/main" val="2286028093"/>
       </p:ext>
     </p:extLst>
   </p:cSld>

</xml_diff>

<commit_message>
(+) Gli aggiornamenti, quelli belli
</commit_message>
<xml_diff>
--- a/Documentazione e cose così/Slide_concettuali_Luca.pptx
+++ b/Documentazione e cose così/Slide_concettuali_Luca.pptx
@@ -4,6 +4,9 @@
   <p:sldMasterIdLst>
     <p:sldMasterId id="2147483648" r:id="rId1"/>
   </p:sldMasterIdLst>
+  <p:notesMasterIdLst>
+    <p:notesMasterId r:id="rId25"/>
+  </p:notesMasterIdLst>
   <p:sldIdLst>
     <p:sldId id="257" r:id="rId2"/>
     <p:sldId id="260" r:id="rId3"/>
@@ -17,15 +20,17 @@
     <p:sldId id="272" r:id="rId11"/>
     <p:sldId id="263" r:id="rId12"/>
     <p:sldId id="262" r:id="rId13"/>
-    <p:sldId id="266" r:id="rId14"/>
-    <p:sldId id="273" r:id="rId15"/>
-    <p:sldId id="274" r:id="rId16"/>
-    <p:sldId id="275" r:id="rId17"/>
-    <p:sldId id="278" r:id="rId18"/>
-    <p:sldId id="264" r:id="rId19"/>
-    <p:sldId id="265" r:id="rId20"/>
-    <p:sldId id="276" r:id="rId21"/>
-    <p:sldId id="277" r:id="rId22"/>
+    <p:sldId id="280" r:id="rId14"/>
+    <p:sldId id="281" r:id="rId15"/>
+    <p:sldId id="266" r:id="rId16"/>
+    <p:sldId id="273" r:id="rId17"/>
+    <p:sldId id="274" r:id="rId18"/>
+    <p:sldId id="275" r:id="rId19"/>
+    <p:sldId id="278" r:id="rId20"/>
+    <p:sldId id="264" r:id="rId21"/>
+    <p:sldId id="265" r:id="rId22"/>
+    <p:sldId id="276" r:id="rId23"/>
+    <p:sldId id="277" r:id="rId24"/>
   </p:sldIdLst>
   <p:sldSz cx="12192000" cy="6858000"/>
   <p:notesSz cx="6858000" cy="9144000"/>
@@ -134,6 +139,442 @@
 
 <file path=ppt/revisionInfo.xml><?xml version="1.0" encoding="utf-8"?>
 <p1510:revInfo xmlns:a="http://schemas.openxmlformats.org/drawingml/2006/main" xmlns:r="http://schemas.openxmlformats.org/officeDocument/2006/relationships" xmlns:p1510="http://schemas.microsoft.com/office/powerpoint/2015/10/main"/>
+</file>
+
+<file path=ppt/notesMasters/notesMaster1.xml><?xml version="1.0" encoding="utf-8"?>
+<p:notesMaster xmlns:a="http://schemas.openxmlformats.org/drawingml/2006/main" xmlns:r="http://schemas.openxmlformats.org/officeDocument/2006/relationships" xmlns:p="http://schemas.openxmlformats.org/presentationml/2006/main">
+  <p:cSld>
+    <p:bg>
+      <p:bgRef idx="1001">
+        <a:schemeClr val="bg1"/>
+      </p:bgRef>
+    </p:bg>
+    <p:spTree>
+      <p:nvGrpSpPr>
+        <p:cNvPr id="1" name=""/>
+        <p:cNvGrpSpPr/>
+        <p:nvPr/>
+      </p:nvGrpSpPr>
+      <p:grpSpPr>
+        <a:xfrm>
+          <a:off x="0" y="0"/>
+          <a:ext cx="0" cy="0"/>
+          <a:chOff x="0" y="0"/>
+          <a:chExt cx="0" cy="0"/>
+        </a:xfrm>
+      </p:grpSpPr>
+      <p:sp>
+        <p:nvSpPr>
+          <p:cNvPr id="2" name="Segnaposto intestazione 1"/>
+          <p:cNvSpPr>
+            <a:spLocks noGrp="1"/>
+          </p:cNvSpPr>
+          <p:nvPr>
+            <p:ph type="hdr" sz="quarter"/>
+          </p:nvPr>
+        </p:nvSpPr>
+        <p:spPr>
+          <a:xfrm>
+            <a:off x="0" y="0"/>
+            <a:ext cx="2971800" cy="458788"/>
+          </a:xfrm>
+          <a:prstGeom prst="rect">
+            <a:avLst/>
+          </a:prstGeom>
+        </p:spPr>
+        <p:txBody>
+          <a:bodyPr vert="horz" lIns="91440" tIns="45720" rIns="91440" bIns="45720" rtlCol="0"/>
+          <a:lstStyle>
+            <a:lvl1pPr algn="l">
+              <a:defRPr sz="1200"/>
+            </a:lvl1pPr>
+          </a:lstStyle>
+          <a:p>
+            <a:endParaRPr lang="it-IT"/>
+          </a:p>
+        </p:txBody>
+      </p:sp>
+      <p:sp>
+        <p:nvSpPr>
+          <p:cNvPr id="3" name="Segnaposto data 2"/>
+          <p:cNvSpPr>
+            <a:spLocks noGrp="1"/>
+          </p:cNvSpPr>
+          <p:nvPr>
+            <p:ph type="dt" idx="1"/>
+          </p:nvPr>
+        </p:nvSpPr>
+        <p:spPr>
+          <a:xfrm>
+            <a:off x="3884613" y="0"/>
+            <a:ext cx="2971800" cy="458788"/>
+          </a:xfrm>
+          <a:prstGeom prst="rect">
+            <a:avLst/>
+          </a:prstGeom>
+        </p:spPr>
+        <p:txBody>
+          <a:bodyPr vert="horz" lIns="91440" tIns="45720" rIns="91440" bIns="45720" rtlCol="0"/>
+          <a:lstStyle>
+            <a:lvl1pPr algn="r">
+              <a:defRPr sz="1200"/>
+            </a:lvl1pPr>
+          </a:lstStyle>
+          <a:p>
+            <a:fld id="{69DC9BD8-5B55-4603-85C1-E71BA819D9DB}" type="datetimeFigureOut">
+              <a:rPr lang="it-IT" smtClean="0"/>
+              <a:t>18/12/2017</a:t>
+            </a:fld>
+            <a:endParaRPr lang="it-IT"/>
+          </a:p>
+        </p:txBody>
+      </p:sp>
+      <p:sp>
+        <p:nvSpPr>
+          <p:cNvPr id="4" name="Segnaposto immagine diapositiva 3"/>
+          <p:cNvSpPr>
+            <a:spLocks noGrp="1" noRot="1" noChangeAspect="1"/>
+          </p:cNvSpPr>
+          <p:nvPr>
+            <p:ph type="sldImg" idx="2"/>
+          </p:nvPr>
+        </p:nvSpPr>
+        <p:spPr>
+          <a:xfrm>
+            <a:off x="685800" y="1143000"/>
+            <a:ext cx="5486400" cy="3086100"/>
+          </a:xfrm>
+          <a:prstGeom prst="rect">
+            <a:avLst/>
+          </a:prstGeom>
+          <a:noFill/>
+          <a:ln w="12700">
+            <a:solidFill>
+              <a:prstClr val="black"/>
+            </a:solidFill>
+          </a:ln>
+        </p:spPr>
+        <p:txBody>
+          <a:bodyPr vert="horz" lIns="91440" tIns="45720" rIns="91440" bIns="45720" rtlCol="0" anchor="ctr"/>
+          <a:lstStyle/>
+          <a:p>
+            <a:endParaRPr lang="it-IT"/>
+          </a:p>
+        </p:txBody>
+      </p:sp>
+      <p:sp>
+        <p:nvSpPr>
+          <p:cNvPr id="5" name="Segnaposto note 4"/>
+          <p:cNvSpPr>
+            <a:spLocks noGrp="1"/>
+          </p:cNvSpPr>
+          <p:nvPr>
+            <p:ph type="body" sz="quarter" idx="3"/>
+          </p:nvPr>
+        </p:nvSpPr>
+        <p:spPr>
+          <a:xfrm>
+            <a:off x="685800" y="4400550"/>
+            <a:ext cx="5486400" cy="3600450"/>
+          </a:xfrm>
+          <a:prstGeom prst="rect">
+            <a:avLst/>
+          </a:prstGeom>
+        </p:spPr>
+        <p:txBody>
+          <a:bodyPr vert="horz" lIns="91440" tIns="45720" rIns="91440" bIns="45720" rtlCol="0"/>
+          <a:lstStyle/>
+          <a:p>
+            <a:pPr lvl="0"/>
+            <a:r>
+              <a:rPr lang="it-IT"/>
+              <a:t>Modifica gli stili del testo dello schema</a:t>
+            </a:r>
+          </a:p>
+          <a:p>
+            <a:pPr lvl="1"/>
+            <a:r>
+              <a:rPr lang="it-IT"/>
+              <a:t>Secondo livello</a:t>
+            </a:r>
+          </a:p>
+          <a:p>
+            <a:pPr lvl="2"/>
+            <a:r>
+              <a:rPr lang="it-IT"/>
+              <a:t>Terzo livello</a:t>
+            </a:r>
+          </a:p>
+          <a:p>
+            <a:pPr lvl="3"/>
+            <a:r>
+              <a:rPr lang="it-IT"/>
+              <a:t>Quarto livello</a:t>
+            </a:r>
+          </a:p>
+          <a:p>
+            <a:pPr lvl="4"/>
+            <a:r>
+              <a:rPr lang="it-IT"/>
+              <a:t>Quinto livello</a:t>
+            </a:r>
+          </a:p>
+        </p:txBody>
+      </p:sp>
+      <p:sp>
+        <p:nvSpPr>
+          <p:cNvPr id="6" name="Segnaposto piè di pagina 5"/>
+          <p:cNvSpPr>
+            <a:spLocks noGrp="1"/>
+          </p:cNvSpPr>
+          <p:nvPr>
+            <p:ph type="ftr" sz="quarter" idx="4"/>
+          </p:nvPr>
+        </p:nvSpPr>
+        <p:spPr>
+          <a:xfrm>
+            <a:off x="0" y="8685213"/>
+            <a:ext cx="2971800" cy="458787"/>
+          </a:xfrm>
+          <a:prstGeom prst="rect">
+            <a:avLst/>
+          </a:prstGeom>
+        </p:spPr>
+        <p:txBody>
+          <a:bodyPr vert="horz" lIns="91440" tIns="45720" rIns="91440" bIns="45720" rtlCol="0" anchor="b"/>
+          <a:lstStyle>
+            <a:lvl1pPr algn="l">
+              <a:defRPr sz="1200"/>
+            </a:lvl1pPr>
+          </a:lstStyle>
+          <a:p>
+            <a:endParaRPr lang="it-IT"/>
+          </a:p>
+        </p:txBody>
+      </p:sp>
+      <p:sp>
+        <p:nvSpPr>
+          <p:cNvPr id="7" name="Segnaposto numero diapositiva 6"/>
+          <p:cNvSpPr>
+            <a:spLocks noGrp="1"/>
+          </p:cNvSpPr>
+          <p:nvPr>
+            <p:ph type="sldNum" sz="quarter" idx="5"/>
+          </p:nvPr>
+        </p:nvSpPr>
+        <p:spPr>
+          <a:xfrm>
+            <a:off x="3884613" y="8685213"/>
+            <a:ext cx="2971800" cy="458787"/>
+          </a:xfrm>
+          <a:prstGeom prst="rect">
+            <a:avLst/>
+          </a:prstGeom>
+        </p:spPr>
+        <p:txBody>
+          <a:bodyPr vert="horz" lIns="91440" tIns="45720" rIns="91440" bIns="45720" rtlCol="0" anchor="b"/>
+          <a:lstStyle>
+            <a:lvl1pPr algn="r">
+              <a:defRPr sz="1200"/>
+            </a:lvl1pPr>
+          </a:lstStyle>
+          <a:p>
+            <a:fld id="{1DD7381B-3428-4DEB-AC6F-7F61398EE165}" type="slidenum">
+              <a:rPr lang="it-IT" smtClean="0"/>
+              <a:t>‹N›</a:t>
+            </a:fld>
+            <a:endParaRPr lang="it-IT"/>
+          </a:p>
+        </p:txBody>
+      </p:sp>
+    </p:spTree>
+    <p:extLst>
+      <p:ext uri="{BB962C8B-B14F-4D97-AF65-F5344CB8AC3E}">
+        <p14:creationId xmlns:p14="http://schemas.microsoft.com/office/powerpoint/2010/main" val="3525910664"/>
+      </p:ext>
+    </p:extLst>
+  </p:cSld>
+  <p:clrMap bg1="lt1" tx1="dk1" bg2="lt2" tx2="dk2" accent1="accent1" accent2="accent2" accent3="accent3" accent4="accent4" accent5="accent5" accent6="accent6" hlink="hlink" folHlink="folHlink"/>
+  <p:notesStyle>
+    <a:lvl1pPr marL="0" algn="l" defTabSz="914400" rtl="0" eaLnBrk="1" latinLnBrk="0" hangingPunct="1">
+      <a:defRPr sz="1200" kern="1200">
+        <a:solidFill>
+          <a:schemeClr val="tx1"/>
+        </a:solidFill>
+        <a:latin typeface="+mn-lt"/>
+        <a:ea typeface="+mn-ea"/>
+        <a:cs typeface="+mn-cs"/>
+      </a:defRPr>
+    </a:lvl1pPr>
+    <a:lvl2pPr marL="457200" algn="l" defTabSz="914400" rtl="0" eaLnBrk="1" latinLnBrk="0" hangingPunct="1">
+      <a:defRPr sz="1200" kern="1200">
+        <a:solidFill>
+          <a:schemeClr val="tx1"/>
+        </a:solidFill>
+        <a:latin typeface="+mn-lt"/>
+        <a:ea typeface="+mn-ea"/>
+        <a:cs typeface="+mn-cs"/>
+      </a:defRPr>
+    </a:lvl2pPr>
+    <a:lvl3pPr marL="914400" algn="l" defTabSz="914400" rtl="0" eaLnBrk="1" latinLnBrk="0" hangingPunct="1">
+      <a:defRPr sz="1200" kern="1200">
+        <a:solidFill>
+          <a:schemeClr val="tx1"/>
+        </a:solidFill>
+        <a:latin typeface="+mn-lt"/>
+        <a:ea typeface="+mn-ea"/>
+        <a:cs typeface="+mn-cs"/>
+      </a:defRPr>
+    </a:lvl3pPr>
+    <a:lvl4pPr marL="1371600" algn="l" defTabSz="914400" rtl="0" eaLnBrk="1" latinLnBrk="0" hangingPunct="1">
+      <a:defRPr sz="1200" kern="1200">
+        <a:solidFill>
+          <a:schemeClr val="tx1"/>
+        </a:solidFill>
+        <a:latin typeface="+mn-lt"/>
+        <a:ea typeface="+mn-ea"/>
+        <a:cs typeface="+mn-cs"/>
+      </a:defRPr>
+    </a:lvl4pPr>
+    <a:lvl5pPr marL="1828800" algn="l" defTabSz="914400" rtl="0" eaLnBrk="1" latinLnBrk="0" hangingPunct="1">
+      <a:defRPr sz="1200" kern="1200">
+        <a:solidFill>
+          <a:schemeClr val="tx1"/>
+        </a:solidFill>
+        <a:latin typeface="+mn-lt"/>
+        <a:ea typeface="+mn-ea"/>
+        <a:cs typeface="+mn-cs"/>
+      </a:defRPr>
+    </a:lvl5pPr>
+    <a:lvl6pPr marL="2286000" algn="l" defTabSz="914400" rtl="0" eaLnBrk="1" latinLnBrk="0" hangingPunct="1">
+      <a:defRPr sz="1200" kern="1200">
+        <a:solidFill>
+          <a:schemeClr val="tx1"/>
+        </a:solidFill>
+        <a:latin typeface="+mn-lt"/>
+        <a:ea typeface="+mn-ea"/>
+        <a:cs typeface="+mn-cs"/>
+      </a:defRPr>
+    </a:lvl6pPr>
+    <a:lvl7pPr marL="2743200" algn="l" defTabSz="914400" rtl="0" eaLnBrk="1" latinLnBrk="0" hangingPunct="1">
+      <a:defRPr sz="1200" kern="1200">
+        <a:solidFill>
+          <a:schemeClr val="tx1"/>
+        </a:solidFill>
+        <a:latin typeface="+mn-lt"/>
+        <a:ea typeface="+mn-ea"/>
+        <a:cs typeface="+mn-cs"/>
+      </a:defRPr>
+    </a:lvl7pPr>
+    <a:lvl8pPr marL="3200400" algn="l" defTabSz="914400" rtl="0" eaLnBrk="1" latinLnBrk="0" hangingPunct="1">
+      <a:defRPr sz="1200" kern="1200">
+        <a:solidFill>
+          <a:schemeClr val="tx1"/>
+        </a:solidFill>
+        <a:latin typeface="+mn-lt"/>
+        <a:ea typeface="+mn-ea"/>
+        <a:cs typeface="+mn-cs"/>
+      </a:defRPr>
+    </a:lvl8pPr>
+    <a:lvl9pPr marL="3657600" algn="l" defTabSz="914400" rtl="0" eaLnBrk="1" latinLnBrk="0" hangingPunct="1">
+      <a:defRPr sz="1200" kern="1200">
+        <a:solidFill>
+          <a:schemeClr val="tx1"/>
+        </a:solidFill>
+        <a:latin typeface="+mn-lt"/>
+        <a:ea typeface="+mn-ea"/>
+        <a:cs typeface="+mn-cs"/>
+      </a:defRPr>
+    </a:lvl9pPr>
+  </p:notesStyle>
+</p:notesMaster>
+</file>
+
+<file path=ppt/notesSlides/notesSlide1.xml><?xml version="1.0" encoding="utf-8"?>
+<p:notes xmlns:a="http://schemas.openxmlformats.org/drawingml/2006/main" xmlns:r="http://schemas.openxmlformats.org/officeDocument/2006/relationships" xmlns:p="http://schemas.openxmlformats.org/presentationml/2006/main">
+  <p:cSld>
+    <p:spTree>
+      <p:nvGrpSpPr>
+        <p:cNvPr id="1" name=""/>
+        <p:cNvGrpSpPr/>
+        <p:nvPr/>
+      </p:nvGrpSpPr>
+      <p:grpSpPr>
+        <a:xfrm>
+          <a:off x="0" y="0"/>
+          <a:ext cx="0" cy="0"/>
+          <a:chOff x="0" y="0"/>
+          <a:chExt cx="0" cy="0"/>
+        </a:xfrm>
+      </p:grpSpPr>
+      <p:sp>
+        <p:nvSpPr>
+          <p:cNvPr id="2" name="Segnaposto immagine diapositiva 1"/>
+          <p:cNvSpPr>
+            <a:spLocks noGrp="1" noRot="1" noChangeAspect="1"/>
+          </p:cNvSpPr>
+          <p:nvPr>
+            <p:ph type="sldImg"/>
+          </p:nvPr>
+        </p:nvSpPr>
+        <p:spPr/>
+      </p:sp>
+      <p:sp>
+        <p:nvSpPr>
+          <p:cNvPr id="3" name="Segnaposto note 2"/>
+          <p:cNvSpPr>
+            <a:spLocks noGrp="1"/>
+          </p:cNvSpPr>
+          <p:nvPr>
+            <p:ph type="body" idx="1"/>
+          </p:nvPr>
+        </p:nvSpPr>
+        <p:spPr/>
+        <p:txBody>
+          <a:bodyPr/>
+          <a:lstStyle/>
+          <a:p>
+            <a:r>
+              <a:rPr lang="it-IT" dirty="0"/>
+              <a:t> </a:t>
+            </a:r>
+          </a:p>
+        </p:txBody>
+      </p:sp>
+      <p:sp>
+        <p:nvSpPr>
+          <p:cNvPr id="4" name="Segnaposto numero diapositiva 3"/>
+          <p:cNvSpPr>
+            <a:spLocks noGrp="1"/>
+          </p:cNvSpPr>
+          <p:nvPr>
+            <p:ph type="sldNum" sz="quarter" idx="10"/>
+          </p:nvPr>
+        </p:nvSpPr>
+        <p:spPr/>
+        <p:txBody>
+          <a:bodyPr/>
+          <a:lstStyle/>
+          <a:p>
+            <a:fld id="{1DD7381B-3428-4DEB-AC6F-7F61398EE165}" type="slidenum">
+              <a:rPr lang="it-IT" smtClean="0"/>
+              <a:t>12</a:t>
+            </a:fld>
+            <a:endParaRPr lang="it-IT"/>
+          </a:p>
+        </p:txBody>
+      </p:sp>
+    </p:spTree>
+    <p:extLst>
+      <p:ext uri="{BB962C8B-B14F-4D97-AF65-F5344CB8AC3E}">
+        <p14:creationId xmlns:p14="http://schemas.microsoft.com/office/powerpoint/2010/main" val="2472118639"/>
+      </p:ext>
+    </p:extLst>
+  </p:cSld>
+  <p:clrMapOvr>
+    <a:masterClrMapping/>
+  </p:clrMapOvr>
+</p:notes>
 </file>
 
 <file path=ppt/slideLayouts/slideLayout1.xml><?xml version="1.0" encoding="utf-8"?>
@@ -4516,10 +4957,429 @@
         </p:nvSpPr>
         <p:spPr/>
         <p:txBody>
-          <a:bodyPr/>
+          <a:bodyPr>
+            <a:normAutofit fontScale="92500"/>
+          </a:bodyPr>
           <a:lstStyle/>
           <a:p>
+            <a:r>
+              <a:rPr lang="it-IT" dirty="0" err="1"/>
+              <a:t>We</a:t>
+            </a:r>
+            <a:r>
+              <a:rPr lang="it-IT" dirty="0"/>
+              <a:t> </a:t>
+            </a:r>
+            <a:r>
+              <a:rPr lang="it-IT" dirty="0" err="1"/>
+              <a:t>developed</a:t>
+            </a:r>
+            <a:r>
+              <a:rPr lang="it-IT" dirty="0"/>
+              <a:t> a token </a:t>
+            </a:r>
+            <a:r>
+              <a:rPr lang="it-IT" dirty="0" err="1"/>
+              <a:t>based</a:t>
+            </a:r>
+            <a:r>
+              <a:rPr lang="it-IT" dirty="0"/>
+              <a:t> </a:t>
+            </a:r>
+            <a:r>
+              <a:rPr lang="it-IT" dirty="0" err="1"/>
+              <a:t>authentication</a:t>
+            </a:r>
+            <a:r>
+              <a:rPr lang="it-IT" dirty="0"/>
+              <a:t> schema</a:t>
+            </a:r>
+          </a:p>
+          <a:p>
+            <a:r>
+              <a:rPr lang="it-IT" dirty="0" err="1"/>
+              <a:t>Firstly</a:t>
+            </a:r>
+            <a:r>
+              <a:rPr lang="it-IT" dirty="0"/>
+              <a:t>, client </a:t>
+            </a:r>
+            <a:r>
+              <a:rPr lang="it-IT" dirty="0" err="1"/>
+              <a:t>sends</a:t>
+            </a:r>
+            <a:r>
+              <a:rPr lang="it-IT" dirty="0"/>
+              <a:t> username and password to server</a:t>
+            </a:r>
+          </a:p>
+          <a:p>
+            <a:pPr lvl="1"/>
+            <a:r>
+              <a:rPr lang="it-IT" dirty="0" err="1"/>
+              <a:t>They</a:t>
+            </a:r>
+            <a:r>
+              <a:rPr lang="it-IT" dirty="0"/>
+              <a:t> are </a:t>
+            </a:r>
+            <a:r>
+              <a:rPr lang="it-IT" dirty="0" err="1"/>
+              <a:t>sent</a:t>
+            </a:r>
+            <a:r>
+              <a:rPr lang="it-IT" dirty="0"/>
+              <a:t> </a:t>
+            </a:r>
+            <a:r>
+              <a:rPr lang="it-IT" dirty="0" err="1"/>
+              <a:t>not</a:t>
+            </a:r>
+            <a:r>
+              <a:rPr lang="it-IT" dirty="0"/>
+              <a:t> </a:t>
+            </a:r>
+            <a:r>
+              <a:rPr lang="it-IT" dirty="0" err="1"/>
+              <a:t>encrypted</a:t>
+            </a:r>
+            <a:r>
+              <a:rPr lang="it-IT" dirty="0"/>
+              <a:t>, </a:t>
+            </a:r>
+            <a:r>
+              <a:rPr lang="it-IT" dirty="0" err="1"/>
+              <a:t>because</a:t>
+            </a:r>
+            <a:r>
+              <a:rPr lang="it-IT" dirty="0"/>
+              <a:t> HTTPS (SSL) </a:t>
+            </a:r>
+            <a:r>
+              <a:rPr lang="it-IT" dirty="0" err="1"/>
+              <a:t>will</a:t>
+            </a:r>
+            <a:r>
+              <a:rPr lang="it-IT" dirty="0"/>
+              <a:t> </a:t>
+            </a:r>
+            <a:r>
+              <a:rPr lang="it-IT" dirty="0" err="1"/>
+              <a:t>encode</a:t>
+            </a:r>
+            <a:r>
+              <a:rPr lang="it-IT" dirty="0"/>
+              <a:t> </a:t>
+            </a:r>
+            <a:r>
+              <a:rPr lang="it-IT" dirty="0" err="1"/>
+              <a:t>it</a:t>
+            </a:r>
+            <a:r>
+              <a:rPr lang="it-IT" dirty="0"/>
+              <a:t> (</a:t>
+            </a:r>
+            <a:r>
+              <a:rPr lang="it-IT" dirty="0" err="1"/>
+              <a:t>if</a:t>
+            </a:r>
+            <a:r>
+              <a:rPr lang="it-IT" dirty="0"/>
+              <a:t> </a:t>
+            </a:r>
+            <a:r>
+              <a:rPr lang="it-IT" dirty="0" err="1"/>
+              <a:t>we</a:t>
+            </a:r>
+            <a:r>
+              <a:rPr lang="it-IT" dirty="0"/>
+              <a:t> </a:t>
+            </a:r>
+            <a:r>
+              <a:rPr lang="it-IT" dirty="0" err="1"/>
+              <a:t>encoded</a:t>
+            </a:r>
+            <a:r>
+              <a:rPr lang="it-IT" dirty="0"/>
+              <a:t> </a:t>
+            </a:r>
+            <a:r>
+              <a:rPr lang="it-IT" dirty="0" err="1"/>
+              <a:t>it</a:t>
+            </a:r>
+            <a:r>
+              <a:rPr lang="it-IT" dirty="0"/>
+              <a:t> with </a:t>
+            </a:r>
+            <a:r>
+              <a:rPr lang="it-IT" dirty="0" err="1"/>
+              <a:t>same</a:t>
+            </a:r>
+            <a:r>
+              <a:rPr lang="it-IT" dirty="0"/>
+              <a:t> </a:t>
+            </a:r>
+            <a:r>
+              <a:rPr lang="it-IT" dirty="0" err="1"/>
+              <a:t>key</a:t>
+            </a:r>
+            <a:r>
+              <a:rPr lang="it-IT" dirty="0"/>
+              <a:t>, no security </a:t>
+            </a:r>
+            <a:r>
+              <a:rPr lang="it-IT" dirty="0" err="1"/>
+              <a:t>would</a:t>
+            </a:r>
+            <a:r>
+              <a:rPr lang="it-IT" dirty="0"/>
+              <a:t> be </a:t>
+            </a:r>
+            <a:r>
+              <a:rPr lang="it-IT" dirty="0" err="1"/>
+              <a:t>added</a:t>
+            </a:r>
+            <a:r>
+              <a:rPr lang="it-IT" dirty="0"/>
+              <a:t>, </a:t>
+            </a:r>
+            <a:r>
+              <a:rPr lang="it-IT" dirty="0" err="1"/>
+              <a:t>but</a:t>
+            </a:r>
+            <a:r>
+              <a:rPr lang="it-IT" dirty="0"/>
+              <a:t> </a:t>
+            </a:r>
+            <a:r>
+              <a:rPr lang="it-IT" dirty="0" err="1"/>
+              <a:t>computation</a:t>
+            </a:r>
+            <a:r>
+              <a:rPr lang="it-IT" dirty="0"/>
+              <a:t> time </a:t>
+            </a:r>
+            <a:r>
+              <a:rPr lang="it-IT" dirty="0" err="1"/>
+              <a:t>will</a:t>
+            </a:r>
+            <a:r>
+              <a:rPr lang="it-IT" dirty="0"/>
+              <a:t> </a:t>
+            </a:r>
+            <a:r>
+              <a:rPr lang="it-IT" dirty="0" err="1"/>
+              <a:t>increase</a:t>
+            </a:r>
+            <a:r>
+              <a:rPr lang="it-IT" dirty="0"/>
+              <a:t>)</a:t>
+            </a:r>
+          </a:p>
+          <a:p>
+            <a:r>
+              <a:rPr lang="it-IT" dirty="0" err="1"/>
+              <a:t>If</a:t>
+            </a:r>
+            <a:r>
+              <a:rPr lang="it-IT" dirty="0"/>
+              <a:t> data are </a:t>
+            </a:r>
+            <a:r>
+              <a:rPr lang="it-IT" dirty="0" err="1"/>
+              <a:t>correct</a:t>
+            </a:r>
+            <a:r>
+              <a:rPr lang="it-IT" dirty="0"/>
+              <a:t>, server </a:t>
+            </a:r>
+            <a:r>
+              <a:rPr lang="it-IT" dirty="0" err="1"/>
+              <a:t>compares</a:t>
+            </a:r>
+            <a:r>
+              <a:rPr lang="it-IT" dirty="0"/>
+              <a:t> device data to a list of </a:t>
+            </a:r>
+            <a:r>
+              <a:rPr lang="it-IT" dirty="0" err="1"/>
+              <a:t>trusted</a:t>
+            </a:r>
+            <a:r>
+              <a:rPr lang="it-IT" dirty="0"/>
+              <a:t> devices for </a:t>
+            </a:r>
+            <a:r>
+              <a:rPr lang="it-IT" dirty="0" err="1"/>
+              <a:t>that</a:t>
+            </a:r>
+            <a:r>
+              <a:rPr lang="it-IT" dirty="0"/>
+              <a:t> account</a:t>
+            </a:r>
+          </a:p>
+          <a:p>
+            <a:pPr lvl="1"/>
+            <a:r>
+              <a:rPr lang="it-IT" dirty="0" err="1"/>
+              <a:t>If</a:t>
+            </a:r>
+            <a:r>
+              <a:rPr lang="it-IT" dirty="0"/>
+              <a:t> device </a:t>
+            </a:r>
+            <a:r>
+              <a:rPr lang="it-IT" dirty="0" err="1"/>
+              <a:t>is</a:t>
+            </a:r>
+            <a:r>
+              <a:rPr lang="it-IT" dirty="0"/>
+              <a:t> </a:t>
+            </a:r>
+            <a:r>
+              <a:rPr lang="it-IT" dirty="0" err="1"/>
+              <a:t>already</a:t>
+            </a:r>
+            <a:r>
+              <a:rPr lang="it-IT" dirty="0"/>
+              <a:t> </a:t>
+            </a:r>
+            <a:r>
+              <a:rPr lang="it-IT" dirty="0" err="1"/>
+              <a:t>trusted</a:t>
+            </a:r>
+            <a:r>
+              <a:rPr lang="it-IT" dirty="0"/>
+              <a:t>, user </a:t>
+            </a:r>
+            <a:r>
+              <a:rPr lang="it-IT" dirty="0" err="1"/>
+              <a:t>is</a:t>
+            </a:r>
+            <a:r>
+              <a:rPr lang="it-IT" dirty="0"/>
+              <a:t> </a:t>
+            </a:r>
+            <a:r>
+              <a:rPr lang="it-IT" dirty="0" err="1"/>
+              <a:t>authenticated</a:t>
+            </a:r>
             <a:endParaRPr lang="it-IT" dirty="0"/>
+          </a:p>
+          <a:p>
+            <a:pPr lvl="1"/>
+            <a:r>
+              <a:rPr lang="it-IT" dirty="0" err="1"/>
+              <a:t>If</a:t>
+            </a:r>
+            <a:r>
+              <a:rPr lang="it-IT" dirty="0"/>
+              <a:t> </a:t>
+            </a:r>
+            <a:r>
+              <a:rPr lang="it-IT" dirty="0" err="1"/>
+              <a:t>not</a:t>
+            </a:r>
+            <a:r>
+              <a:rPr lang="it-IT" dirty="0"/>
+              <a:t>, a mail </a:t>
+            </a:r>
+            <a:r>
+              <a:rPr lang="it-IT" dirty="0" err="1"/>
+              <a:t>is</a:t>
+            </a:r>
+            <a:r>
+              <a:rPr lang="it-IT" dirty="0"/>
+              <a:t> </a:t>
+            </a:r>
+            <a:r>
+              <a:rPr lang="it-IT" dirty="0" err="1"/>
+              <a:t>sent</a:t>
+            </a:r>
+            <a:r>
+              <a:rPr lang="it-IT" dirty="0"/>
+              <a:t> to </a:t>
+            </a:r>
+            <a:r>
+              <a:rPr lang="it-IT" dirty="0" err="1"/>
+              <a:t>user’s</a:t>
+            </a:r>
+            <a:r>
+              <a:rPr lang="it-IT" dirty="0"/>
+              <a:t> mail and user </a:t>
+            </a:r>
+            <a:r>
+              <a:rPr lang="it-IT" dirty="0" err="1"/>
+              <a:t>should</a:t>
+            </a:r>
+            <a:r>
+              <a:rPr lang="it-IT" dirty="0"/>
+              <a:t> </a:t>
+            </a:r>
+            <a:r>
+              <a:rPr lang="it-IT" dirty="0" err="1"/>
+              <a:t>provide</a:t>
+            </a:r>
+            <a:r>
+              <a:rPr lang="it-IT" dirty="0"/>
+              <a:t> </a:t>
+            </a:r>
+            <a:r>
+              <a:rPr lang="it-IT" dirty="0" err="1"/>
+              <a:t>also</a:t>
+            </a:r>
+            <a:r>
+              <a:rPr lang="it-IT" dirty="0"/>
+              <a:t> an </a:t>
+            </a:r>
+            <a:r>
+              <a:rPr lang="it-IT" dirty="0" err="1"/>
+              <a:t>activation</a:t>
+            </a:r>
+            <a:r>
+              <a:rPr lang="it-IT" dirty="0"/>
+              <a:t> code</a:t>
+            </a:r>
+          </a:p>
+          <a:p>
+            <a:r>
+              <a:rPr lang="it-IT" dirty="0"/>
+              <a:t>The server </a:t>
+            </a:r>
+            <a:r>
+              <a:rPr lang="it-IT" dirty="0" err="1"/>
+              <a:t>replies</a:t>
+            </a:r>
+            <a:r>
+              <a:rPr lang="it-IT" dirty="0"/>
+              <a:t> with a token</a:t>
+            </a:r>
+          </a:p>
+          <a:p>
+            <a:r>
+              <a:rPr lang="it-IT" dirty="0" err="1"/>
+              <a:t>We</a:t>
+            </a:r>
+            <a:r>
+              <a:rPr lang="it-IT" dirty="0"/>
+              <a:t> </a:t>
+            </a:r>
+            <a:r>
+              <a:rPr lang="it-IT" dirty="0" err="1"/>
+              <a:t>used</a:t>
+            </a:r>
+            <a:r>
+              <a:rPr lang="it-IT" dirty="0"/>
+              <a:t> JSON Web Tokens (JTW), an </a:t>
+            </a:r>
+            <a:r>
+              <a:rPr lang="it-IT" dirty="0" err="1"/>
+              <a:t>industry</a:t>
+            </a:r>
+            <a:r>
+              <a:rPr lang="it-IT" dirty="0"/>
+              <a:t> standard (RFC 7519)</a:t>
+            </a:r>
           </a:p>
         </p:txBody>
       </p:sp>
@@ -4558,6 +5418,896 @@
           <p:cNvPr id="2" name="Titolo 1">
             <a:extLst>
               <a:ext uri="{FF2B5EF4-FFF2-40B4-BE49-F238E27FC236}">
+                <a16:creationId xmlns:a16="http://schemas.microsoft.com/office/drawing/2014/main" id="{7788923F-177C-4A60-A975-853FA33EEEC7}"/>
+              </a:ext>
+            </a:extLst>
+          </p:cNvPr>
+          <p:cNvSpPr>
+            <a:spLocks noGrp="1"/>
+          </p:cNvSpPr>
+          <p:nvPr>
+            <p:ph type="title"/>
+          </p:nvPr>
+        </p:nvSpPr>
+        <p:spPr/>
+        <p:txBody>
+          <a:bodyPr/>
+          <a:lstStyle/>
+          <a:p>
+            <a:r>
+              <a:rPr lang="it-IT" dirty="0"/>
+              <a:t>Token</a:t>
+            </a:r>
+          </a:p>
+        </p:txBody>
+      </p:sp>
+      <p:sp>
+        <p:nvSpPr>
+          <p:cNvPr id="3" name="Segnaposto contenuto 2">
+            <a:extLst>
+              <a:ext uri="{FF2B5EF4-FFF2-40B4-BE49-F238E27FC236}">
+                <a16:creationId xmlns:a16="http://schemas.microsoft.com/office/drawing/2014/main" id="{4E50E866-E507-404C-B0D0-DE15C4601D51}"/>
+              </a:ext>
+            </a:extLst>
+          </p:cNvPr>
+          <p:cNvSpPr>
+            <a:spLocks noGrp="1"/>
+          </p:cNvSpPr>
+          <p:nvPr>
+            <p:ph idx="1"/>
+          </p:nvPr>
+        </p:nvSpPr>
+        <p:spPr/>
+        <p:txBody>
+          <a:bodyPr>
+            <a:normAutofit/>
+          </a:bodyPr>
+          <a:lstStyle/>
+          <a:p>
+            <a:r>
+              <a:rPr lang="it-IT" dirty="0" err="1"/>
+              <a:t>We</a:t>
+            </a:r>
+            <a:r>
+              <a:rPr lang="it-IT" dirty="0"/>
+              <a:t> </a:t>
+            </a:r>
+            <a:r>
+              <a:rPr lang="it-IT" dirty="0" err="1"/>
+              <a:t>choiced</a:t>
+            </a:r>
+            <a:r>
+              <a:rPr lang="it-IT" dirty="0"/>
+              <a:t> to use </a:t>
+            </a:r>
+            <a:r>
+              <a:rPr lang="it-IT" dirty="0" err="1"/>
+              <a:t>stateless</a:t>
+            </a:r>
+            <a:r>
+              <a:rPr lang="it-IT" dirty="0"/>
+              <a:t> tokens</a:t>
+            </a:r>
+          </a:p>
+          <a:p>
+            <a:pPr lvl="1"/>
+            <a:r>
+              <a:rPr lang="it-IT" dirty="0"/>
+              <a:t>Server </a:t>
+            </a:r>
+            <a:r>
+              <a:rPr lang="it-IT" dirty="0" err="1"/>
+              <a:t>keeps</a:t>
+            </a:r>
+            <a:r>
+              <a:rPr lang="it-IT" dirty="0"/>
+              <a:t> no track of </a:t>
+            </a:r>
+            <a:r>
+              <a:rPr lang="it-IT" dirty="0" err="1"/>
+              <a:t>them</a:t>
+            </a:r>
+            <a:endParaRPr lang="it-IT" dirty="0"/>
+          </a:p>
+          <a:p>
+            <a:r>
+              <a:rPr lang="it-IT" dirty="0"/>
+              <a:t>A token </a:t>
+            </a:r>
+            <a:r>
+              <a:rPr lang="it-IT" dirty="0" err="1"/>
+              <a:t>contains</a:t>
+            </a:r>
+            <a:r>
+              <a:rPr lang="it-IT" dirty="0"/>
+              <a:t>:</a:t>
+            </a:r>
+          </a:p>
+          <a:p>
+            <a:pPr lvl="1"/>
+            <a:r>
+              <a:rPr lang="it-IT" dirty="0"/>
+              <a:t>Username</a:t>
+            </a:r>
+          </a:p>
+          <a:p>
+            <a:pPr lvl="1"/>
+            <a:r>
+              <a:rPr lang="it-IT" dirty="0"/>
+              <a:t>Device data</a:t>
+            </a:r>
+          </a:p>
+          <a:p>
+            <a:pPr lvl="2"/>
+            <a:r>
+              <a:rPr lang="it-IT" dirty="0" err="1"/>
+              <a:t>Protects</a:t>
+            </a:r>
+            <a:r>
+              <a:rPr lang="it-IT" dirty="0"/>
+              <a:t> </a:t>
+            </a:r>
+            <a:r>
+              <a:rPr lang="it-IT" dirty="0" err="1"/>
+              <a:t>against</a:t>
+            </a:r>
+            <a:r>
+              <a:rPr lang="it-IT" dirty="0"/>
+              <a:t> </a:t>
+            </a:r>
+            <a:r>
+              <a:rPr lang="it-IT" dirty="0" err="1"/>
+              <a:t>using</a:t>
+            </a:r>
+            <a:r>
+              <a:rPr lang="it-IT" dirty="0"/>
+              <a:t> token </a:t>
+            </a:r>
+            <a:r>
+              <a:rPr lang="it-IT" dirty="0" err="1"/>
+              <a:t>replays</a:t>
+            </a:r>
+            <a:r>
+              <a:rPr lang="it-IT" dirty="0"/>
+              <a:t> on </a:t>
+            </a:r>
+            <a:r>
+              <a:rPr lang="it-IT" dirty="0" err="1"/>
+              <a:t>untrusted</a:t>
+            </a:r>
+            <a:r>
+              <a:rPr lang="it-IT" dirty="0"/>
+              <a:t> devices</a:t>
+            </a:r>
+          </a:p>
+          <a:p>
+            <a:pPr lvl="1"/>
+            <a:r>
+              <a:rPr lang="it-IT" dirty="0" err="1"/>
+              <a:t>Issuing</a:t>
+            </a:r>
+            <a:r>
+              <a:rPr lang="it-IT" dirty="0"/>
+              <a:t> time</a:t>
+            </a:r>
+          </a:p>
+          <a:p>
+            <a:pPr lvl="2"/>
+            <a:r>
+              <a:rPr lang="it-IT" dirty="0" err="1"/>
+              <a:t>Protects</a:t>
+            </a:r>
+            <a:r>
+              <a:rPr lang="it-IT" dirty="0"/>
+              <a:t> </a:t>
+            </a:r>
+            <a:r>
+              <a:rPr lang="it-IT" dirty="0" err="1"/>
+              <a:t>against</a:t>
+            </a:r>
+            <a:r>
+              <a:rPr lang="it-IT" dirty="0"/>
+              <a:t> </a:t>
+            </a:r>
+            <a:r>
+              <a:rPr lang="it-IT" dirty="0" err="1"/>
+              <a:t>using</a:t>
+            </a:r>
+            <a:r>
+              <a:rPr lang="it-IT" dirty="0"/>
+              <a:t> </a:t>
+            </a:r>
+            <a:r>
+              <a:rPr lang="it-IT" dirty="0" err="1"/>
+              <a:t>same</a:t>
+            </a:r>
+            <a:r>
+              <a:rPr lang="it-IT" dirty="0"/>
+              <a:t> token </a:t>
+            </a:r>
+            <a:r>
+              <a:rPr lang="it-IT" dirty="0" err="1"/>
+              <a:t>usage</a:t>
+            </a:r>
+            <a:r>
+              <a:rPr lang="it-IT" dirty="0"/>
+              <a:t> on </a:t>
+            </a:r>
+            <a:r>
+              <a:rPr lang="it-IT" dirty="0" err="1"/>
+              <a:t>stolen</a:t>
+            </a:r>
+            <a:r>
+              <a:rPr lang="it-IT" dirty="0"/>
+              <a:t> devices</a:t>
+            </a:r>
+          </a:p>
+          <a:p>
+            <a:pPr lvl="1"/>
+            <a:r>
+              <a:rPr lang="it-IT" dirty="0" err="1"/>
+              <a:t>Remaining</a:t>
+            </a:r>
+            <a:r>
+              <a:rPr lang="it-IT" dirty="0"/>
+              <a:t> </a:t>
+            </a:r>
+            <a:r>
+              <a:rPr lang="it-IT" dirty="0" err="1"/>
+              <a:t>uses</a:t>
+            </a:r>
+            <a:endParaRPr lang="it-IT" dirty="0"/>
+          </a:p>
+          <a:p>
+            <a:pPr lvl="2"/>
+            <a:r>
+              <a:rPr lang="it-IT" dirty="0" err="1"/>
+              <a:t>Protects</a:t>
+            </a:r>
+            <a:r>
+              <a:rPr lang="it-IT" dirty="0"/>
+              <a:t> </a:t>
+            </a:r>
+            <a:r>
+              <a:rPr lang="it-IT" dirty="0" err="1"/>
+              <a:t>against</a:t>
+            </a:r>
+            <a:r>
+              <a:rPr lang="it-IT" dirty="0"/>
+              <a:t> an </a:t>
+            </a:r>
+            <a:r>
+              <a:rPr lang="it-IT" dirty="0" err="1"/>
+              <a:t>attacker</a:t>
+            </a:r>
+            <a:r>
+              <a:rPr lang="it-IT" dirty="0"/>
+              <a:t> </a:t>
+            </a:r>
+            <a:r>
+              <a:rPr lang="it-IT" dirty="0" err="1"/>
+              <a:t>who</a:t>
+            </a:r>
+            <a:r>
+              <a:rPr lang="it-IT" dirty="0"/>
+              <a:t> </a:t>
+            </a:r>
+            <a:r>
+              <a:rPr lang="it-IT" dirty="0" err="1"/>
+              <a:t>manages</a:t>
+            </a:r>
+            <a:r>
+              <a:rPr lang="it-IT" dirty="0"/>
+              <a:t> to stole a device with an </a:t>
+            </a:r>
+            <a:r>
+              <a:rPr lang="it-IT" dirty="0" err="1"/>
+              <a:t>active</a:t>
+            </a:r>
+            <a:r>
+              <a:rPr lang="it-IT" dirty="0"/>
+              <a:t> session</a:t>
+            </a:r>
+          </a:p>
+          <a:p>
+            <a:pPr lvl="2"/>
+            <a:r>
+              <a:rPr lang="it-IT" dirty="0" err="1"/>
+              <a:t>Protects</a:t>
+            </a:r>
+            <a:r>
+              <a:rPr lang="it-IT" dirty="0"/>
+              <a:t> </a:t>
+            </a:r>
+            <a:r>
+              <a:rPr lang="it-IT" dirty="0" err="1"/>
+              <a:t>against</a:t>
+            </a:r>
+            <a:r>
+              <a:rPr lang="it-IT" dirty="0"/>
+              <a:t> spam</a:t>
+            </a:r>
+          </a:p>
+          <a:p>
+            <a:pPr lvl="1"/>
+            <a:endParaRPr lang="it-IT" dirty="0"/>
+          </a:p>
+        </p:txBody>
+      </p:sp>
+    </p:spTree>
+    <p:extLst>
+      <p:ext uri="{BB962C8B-B14F-4D97-AF65-F5344CB8AC3E}">
+        <p14:creationId xmlns:p14="http://schemas.microsoft.com/office/powerpoint/2010/main" val="2013820452"/>
+      </p:ext>
+    </p:extLst>
+  </p:cSld>
+  <p:clrMapOvr>
+    <a:masterClrMapping/>
+  </p:clrMapOvr>
+</p:sld>
+</file>
+
+<file path=ppt/slides/slide14.xml><?xml version="1.0" encoding="utf-8"?>
+<p:sld xmlns:a="http://schemas.openxmlformats.org/drawingml/2006/main" xmlns:r="http://schemas.openxmlformats.org/officeDocument/2006/relationships" xmlns:p="http://schemas.openxmlformats.org/presentationml/2006/main">
+  <p:cSld>
+    <p:spTree>
+      <p:nvGrpSpPr>
+        <p:cNvPr id="1" name=""/>
+        <p:cNvGrpSpPr/>
+        <p:nvPr/>
+      </p:nvGrpSpPr>
+      <p:grpSpPr>
+        <a:xfrm>
+          <a:off x="0" y="0"/>
+          <a:ext cx="0" cy="0"/>
+          <a:chOff x="0" y="0"/>
+          <a:chExt cx="0" cy="0"/>
+        </a:xfrm>
+      </p:grpSpPr>
+      <p:sp>
+        <p:nvSpPr>
+          <p:cNvPr id="2" name="Titolo 1">
+            <a:extLst>
+              <a:ext uri="{FF2B5EF4-FFF2-40B4-BE49-F238E27FC236}">
+                <a16:creationId xmlns:a16="http://schemas.microsoft.com/office/drawing/2014/main" id="{C3C54225-4641-4842-8FCF-0480A6BF471E}"/>
+              </a:ext>
+            </a:extLst>
+          </p:cNvPr>
+          <p:cNvSpPr>
+            <a:spLocks noGrp="1"/>
+          </p:cNvSpPr>
+          <p:nvPr>
+            <p:ph type="title"/>
+          </p:nvPr>
+        </p:nvSpPr>
+        <p:spPr/>
+        <p:txBody>
+          <a:bodyPr/>
+          <a:lstStyle/>
+          <a:p>
+            <a:r>
+              <a:rPr lang="it-IT" dirty="0" err="1"/>
+              <a:t>Stateless</a:t>
+            </a:r>
+            <a:r>
+              <a:rPr lang="it-IT" dirty="0"/>
+              <a:t> tokens</a:t>
+            </a:r>
+          </a:p>
+        </p:txBody>
+      </p:sp>
+      <p:sp>
+        <p:nvSpPr>
+          <p:cNvPr id="3" name="Segnaposto contenuto 2">
+            <a:extLst>
+              <a:ext uri="{FF2B5EF4-FFF2-40B4-BE49-F238E27FC236}">
+                <a16:creationId xmlns:a16="http://schemas.microsoft.com/office/drawing/2014/main" id="{0DE591EC-98F0-454E-9086-034E2120F1B2}"/>
+              </a:ext>
+            </a:extLst>
+          </p:cNvPr>
+          <p:cNvSpPr>
+            <a:spLocks noGrp="1"/>
+          </p:cNvSpPr>
+          <p:nvPr>
+            <p:ph idx="1"/>
+          </p:nvPr>
+        </p:nvSpPr>
+        <p:spPr/>
+        <p:txBody>
+          <a:bodyPr>
+            <a:normAutofit lnSpcReduction="10000"/>
+          </a:bodyPr>
+          <a:lstStyle/>
+          <a:p>
+            <a:r>
+              <a:rPr lang="it-IT" dirty="0"/>
+              <a:t>The </a:t>
+            </a:r>
+            <a:r>
+              <a:rPr lang="it-IT" dirty="0" err="1"/>
+              <a:t>stateless</a:t>
+            </a:r>
+            <a:r>
+              <a:rPr lang="it-IT" dirty="0"/>
+              <a:t> feature </a:t>
+            </a:r>
+            <a:r>
+              <a:rPr lang="it-IT" dirty="0" err="1"/>
+              <a:t>has</a:t>
+            </a:r>
+            <a:r>
+              <a:rPr lang="it-IT" dirty="0"/>
+              <a:t> </a:t>
+            </a:r>
+            <a:r>
+              <a:rPr lang="it-IT" dirty="0" err="1"/>
+              <a:t>been</a:t>
+            </a:r>
+            <a:r>
+              <a:rPr lang="it-IT" dirty="0"/>
+              <a:t> </a:t>
+            </a:r>
+            <a:r>
+              <a:rPr lang="it-IT" dirty="0" err="1"/>
+              <a:t>added</a:t>
+            </a:r>
+            <a:r>
+              <a:rPr lang="it-IT" dirty="0"/>
+              <a:t> for a </a:t>
+            </a:r>
+            <a:r>
+              <a:rPr lang="it-IT" dirty="0" err="1"/>
+              <a:t>better</a:t>
+            </a:r>
+            <a:r>
+              <a:rPr lang="it-IT" dirty="0"/>
+              <a:t> </a:t>
+            </a:r>
+            <a:r>
+              <a:rPr lang="it-IT" dirty="0" err="1"/>
+              <a:t>scalability</a:t>
+            </a:r>
+            <a:endParaRPr lang="it-IT" dirty="0"/>
+          </a:p>
+          <a:p>
+            <a:r>
+              <a:rPr lang="it-IT" dirty="0" err="1"/>
+              <a:t>Because</a:t>
+            </a:r>
+            <a:r>
+              <a:rPr lang="it-IT" dirty="0"/>
+              <a:t> server </a:t>
+            </a:r>
+            <a:r>
+              <a:rPr lang="it-IT" dirty="0" err="1"/>
+              <a:t>doesn’t</a:t>
+            </a:r>
+            <a:r>
+              <a:rPr lang="it-IT" dirty="0"/>
+              <a:t> track </a:t>
+            </a:r>
+            <a:r>
+              <a:rPr lang="it-IT" dirty="0" err="1"/>
+              <a:t>issued</a:t>
+            </a:r>
+            <a:r>
+              <a:rPr lang="it-IT" dirty="0"/>
+              <a:t> token, </a:t>
+            </a:r>
+            <a:r>
+              <a:rPr lang="it-IT" dirty="0" err="1"/>
+              <a:t>there</a:t>
+            </a:r>
+            <a:r>
+              <a:rPr lang="it-IT" dirty="0"/>
+              <a:t> </a:t>
+            </a:r>
+            <a:r>
+              <a:rPr lang="it-IT" dirty="0" err="1"/>
+              <a:t>is</a:t>
+            </a:r>
+            <a:r>
+              <a:rPr lang="it-IT" dirty="0"/>
+              <a:t> no </a:t>
+            </a:r>
+            <a:r>
+              <a:rPr lang="it-IT" dirty="0" err="1"/>
+              <a:t>explicit</a:t>
+            </a:r>
+            <a:r>
+              <a:rPr lang="it-IT" dirty="0"/>
+              <a:t> token </a:t>
+            </a:r>
+            <a:r>
+              <a:rPr lang="it-IT" dirty="0" err="1"/>
+              <a:t>invalidation</a:t>
+            </a:r>
+            <a:r>
+              <a:rPr lang="it-IT" dirty="0"/>
+              <a:t> </a:t>
+            </a:r>
+            <a:r>
+              <a:rPr lang="it-IT" dirty="0" err="1"/>
+              <a:t>mechanism</a:t>
+            </a:r>
+            <a:endParaRPr lang="it-IT" dirty="0"/>
+          </a:p>
+          <a:p>
+            <a:r>
+              <a:rPr lang="it-IT" dirty="0" err="1"/>
+              <a:t>Including</a:t>
+            </a:r>
+            <a:r>
+              <a:rPr lang="it-IT" dirty="0"/>
+              <a:t> </a:t>
+            </a:r>
+            <a:r>
+              <a:rPr lang="it-IT" dirty="0" err="1"/>
+              <a:t>it</a:t>
+            </a:r>
+            <a:r>
+              <a:rPr lang="it-IT" dirty="0"/>
+              <a:t> </a:t>
+            </a:r>
+            <a:r>
+              <a:rPr lang="it-IT" dirty="0" err="1"/>
+              <a:t>wouldn’t</a:t>
+            </a:r>
+            <a:r>
+              <a:rPr lang="it-IT" dirty="0"/>
+              <a:t> </a:t>
+            </a:r>
+            <a:r>
+              <a:rPr lang="it-IT" dirty="0" err="1"/>
+              <a:t>require</a:t>
+            </a:r>
+            <a:r>
+              <a:rPr lang="it-IT" dirty="0"/>
+              <a:t> </a:t>
+            </a:r>
+            <a:r>
+              <a:rPr lang="it-IT" dirty="0" err="1"/>
+              <a:t>many</a:t>
+            </a:r>
+            <a:r>
+              <a:rPr lang="it-IT" dirty="0"/>
+              <a:t> </a:t>
+            </a:r>
+            <a:r>
+              <a:rPr lang="it-IT" dirty="0" err="1"/>
+              <a:t>changes</a:t>
+            </a:r>
+            <a:r>
+              <a:rPr lang="it-IT" dirty="0"/>
+              <a:t> to </a:t>
+            </a:r>
+            <a:r>
+              <a:rPr lang="it-IT" dirty="0" err="1"/>
+              <a:t>existing</a:t>
+            </a:r>
+            <a:r>
+              <a:rPr lang="it-IT" dirty="0"/>
+              <a:t> </a:t>
+            </a:r>
+            <a:r>
+              <a:rPr lang="it-IT" dirty="0" err="1"/>
+              <a:t>application</a:t>
+            </a:r>
+            <a:endParaRPr lang="it-IT" dirty="0"/>
+          </a:p>
+          <a:p>
+            <a:r>
+              <a:rPr lang="it-IT" dirty="0" err="1"/>
+              <a:t>It</a:t>
+            </a:r>
+            <a:r>
+              <a:rPr lang="it-IT" dirty="0"/>
+              <a:t> </a:t>
+            </a:r>
+            <a:r>
+              <a:rPr lang="it-IT" dirty="0" err="1"/>
+              <a:t>would</a:t>
+            </a:r>
+            <a:r>
+              <a:rPr lang="it-IT" dirty="0"/>
+              <a:t> </a:t>
+            </a:r>
+            <a:r>
+              <a:rPr lang="it-IT" dirty="0" err="1"/>
+              <a:t>need</a:t>
+            </a:r>
+            <a:r>
+              <a:rPr lang="it-IT" dirty="0"/>
+              <a:t> </a:t>
+            </a:r>
+            <a:r>
+              <a:rPr lang="it-IT" dirty="0" err="1"/>
+              <a:t>only</a:t>
+            </a:r>
+            <a:r>
+              <a:rPr lang="it-IT" dirty="0"/>
+              <a:t> a </a:t>
+            </a:r>
+            <a:r>
+              <a:rPr lang="it-IT" dirty="0" err="1"/>
+              <a:t>table</a:t>
+            </a:r>
+            <a:r>
+              <a:rPr lang="it-IT" dirty="0"/>
+              <a:t> </a:t>
+            </a:r>
+            <a:r>
+              <a:rPr lang="it-IT" dirty="0" err="1"/>
+              <a:t>that</a:t>
+            </a:r>
+            <a:r>
+              <a:rPr lang="it-IT" dirty="0"/>
+              <a:t> </a:t>
+            </a:r>
+            <a:r>
+              <a:rPr lang="it-IT" dirty="0" err="1"/>
+              <a:t>tracks</a:t>
+            </a:r>
+            <a:r>
+              <a:rPr lang="it-IT" dirty="0"/>
+              <a:t> user, device and </a:t>
+            </a:r>
+            <a:r>
+              <a:rPr lang="it-IT" dirty="0" err="1"/>
+              <a:t>logout</a:t>
+            </a:r>
+            <a:r>
+              <a:rPr lang="it-IT" dirty="0"/>
+              <a:t> time. </a:t>
+            </a:r>
+            <a:r>
+              <a:rPr lang="it-IT" dirty="0" err="1"/>
+              <a:t>When</a:t>
+            </a:r>
+            <a:r>
+              <a:rPr lang="it-IT" dirty="0"/>
+              <a:t> a new token </a:t>
+            </a:r>
+            <a:r>
+              <a:rPr lang="it-IT" dirty="0" err="1"/>
+              <a:t>is</a:t>
+            </a:r>
+            <a:r>
+              <a:rPr lang="it-IT" dirty="0"/>
+              <a:t> </a:t>
+            </a:r>
+            <a:r>
+              <a:rPr lang="it-IT" dirty="0" err="1"/>
+              <a:t>received</a:t>
+            </a:r>
+            <a:r>
+              <a:rPr lang="it-IT" dirty="0"/>
+              <a:t> for </a:t>
+            </a:r>
+            <a:r>
+              <a:rPr lang="it-IT" dirty="0" err="1"/>
+              <a:t>same</a:t>
+            </a:r>
+            <a:r>
+              <a:rPr lang="it-IT" dirty="0"/>
+              <a:t> user and device, </a:t>
+            </a:r>
+            <a:r>
+              <a:rPr lang="it-IT" dirty="0" err="1"/>
+              <a:t>issuing</a:t>
+            </a:r>
+            <a:r>
+              <a:rPr lang="it-IT" dirty="0"/>
+              <a:t> time </a:t>
+            </a:r>
+            <a:r>
+              <a:rPr lang="it-IT" dirty="0" err="1"/>
+              <a:t>is</a:t>
+            </a:r>
+            <a:r>
+              <a:rPr lang="it-IT" dirty="0"/>
+              <a:t> </a:t>
+            </a:r>
+            <a:r>
+              <a:rPr lang="it-IT" dirty="0" err="1"/>
+              <a:t>compared</a:t>
+            </a:r>
+            <a:r>
+              <a:rPr lang="it-IT" dirty="0"/>
+              <a:t> to last </a:t>
+            </a:r>
+            <a:r>
+              <a:rPr lang="it-IT" dirty="0" err="1"/>
+              <a:t>logout</a:t>
+            </a:r>
+            <a:r>
+              <a:rPr lang="it-IT" dirty="0"/>
+              <a:t>: </a:t>
+            </a:r>
+            <a:r>
+              <a:rPr lang="it-IT" dirty="0" err="1"/>
+              <a:t>if</a:t>
+            </a:r>
+            <a:r>
+              <a:rPr lang="it-IT" dirty="0"/>
+              <a:t> </a:t>
+            </a:r>
+            <a:r>
+              <a:rPr lang="it-IT" dirty="0" err="1"/>
+              <a:t>it</a:t>
+            </a:r>
+            <a:r>
+              <a:rPr lang="it-IT" dirty="0"/>
+              <a:t> </a:t>
+            </a:r>
+            <a:r>
+              <a:rPr lang="it-IT" dirty="0" err="1"/>
+              <a:t>happened</a:t>
+            </a:r>
+            <a:r>
+              <a:rPr lang="it-IT" dirty="0"/>
+              <a:t> </a:t>
+            </a:r>
+            <a:r>
+              <a:rPr lang="it-IT" dirty="0" err="1"/>
+              <a:t>before</a:t>
+            </a:r>
+            <a:r>
+              <a:rPr lang="it-IT" dirty="0"/>
+              <a:t>, the token </a:t>
+            </a:r>
+            <a:r>
+              <a:rPr lang="it-IT" dirty="0" err="1"/>
+              <a:t>would</a:t>
+            </a:r>
+            <a:r>
+              <a:rPr lang="it-IT" dirty="0"/>
+              <a:t> be </a:t>
+            </a:r>
+            <a:r>
+              <a:rPr lang="it-IT" dirty="0" err="1"/>
+              <a:t>considered</a:t>
+            </a:r>
+            <a:r>
+              <a:rPr lang="it-IT" dirty="0"/>
+              <a:t> </a:t>
+            </a:r>
+            <a:r>
+              <a:rPr lang="it-IT" dirty="0" err="1"/>
+              <a:t>not</a:t>
+            </a:r>
+            <a:r>
+              <a:rPr lang="it-IT" dirty="0"/>
+              <a:t> </a:t>
+            </a:r>
+            <a:r>
+              <a:rPr lang="it-IT" dirty="0" err="1"/>
+              <a:t>valid</a:t>
+            </a:r>
+            <a:r>
+              <a:rPr lang="it-IT" dirty="0"/>
+              <a:t>.</a:t>
+            </a:r>
+          </a:p>
+          <a:p>
+            <a:r>
+              <a:rPr lang="it-IT" dirty="0" err="1"/>
+              <a:t>If</a:t>
+            </a:r>
+            <a:r>
+              <a:rPr lang="it-IT" dirty="0"/>
+              <a:t> user </a:t>
+            </a:r>
+            <a:r>
+              <a:rPr lang="it-IT" dirty="0" err="1"/>
+              <a:t>system’s</a:t>
+            </a:r>
+            <a:r>
+              <a:rPr lang="it-IT" dirty="0"/>
+              <a:t> </a:t>
+            </a:r>
+            <a:r>
+              <a:rPr lang="it-IT" dirty="0" err="1"/>
+              <a:t>crashed</a:t>
+            </a:r>
+            <a:r>
+              <a:rPr lang="it-IT" dirty="0"/>
+              <a:t> or user </a:t>
+            </a:r>
+            <a:r>
+              <a:rPr lang="it-IT" dirty="0" err="1"/>
+              <a:t>forgot</a:t>
+            </a:r>
+            <a:r>
+              <a:rPr lang="it-IT" dirty="0"/>
+              <a:t> the client </a:t>
+            </a:r>
+            <a:r>
+              <a:rPr lang="it-IT" dirty="0" err="1"/>
+              <a:t>logged</a:t>
+            </a:r>
+            <a:r>
+              <a:rPr lang="it-IT" dirty="0"/>
+              <a:t> in, the </a:t>
+            </a:r>
+            <a:r>
+              <a:rPr lang="it-IT" dirty="0" err="1"/>
+              <a:t>usual</a:t>
+            </a:r>
+            <a:r>
+              <a:rPr lang="it-IT" dirty="0"/>
+              <a:t> token </a:t>
+            </a:r>
+            <a:r>
+              <a:rPr lang="it-IT" dirty="0" err="1"/>
+              <a:t>timeout</a:t>
+            </a:r>
+            <a:r>
+              <a:rPr lang="it-IT" dirty="0"/>
+              <a:t> </a:t>
+            </a:r>
+            <a:r>
+              <a:rPr lang="it-IT" dirty="0" err="1"/>
+              <a:t>would</a:t>
+            </a:r>
+            <a:r>
+              <a:rPr lang="it-IT" dirty="0"/>
+              <a:t> </a:t>
+            </a:r>
+            <a:r>
+              <a:rPr lang="it-IT" dirty="0" err="1"/>
+              <a:t>implicitly</a:t>
+            </a:r>
+            <a:r>
+              <a:rPr lang="it-IT" dirty="0"/>
+              <a:t> invalidate </a:t>
+            </a:r>
+            <a:r>
+              <a:rPr lang="it-IT" dirty="0" err="1"/>
+              <a:t>it</a:t>
+            </a:r>
+            <a:r>
+              <a:rPr lang="it-IT" dirty="0"/>
+              <a:t>.</a:t>
+            </a:r>
+          </a:p>
+        </p:txBody>
+      </p:sp>
+    </p:spTree>
+    <p:extLst>
+      <p:ext uri="{BB962C8B-B14F-4D97-AF65-F5344CB8AC3E}">
+        <p14:creationId xmlns:p14="http://schemas.microsoft.com/office/powerpoint/2010/main" val="1922586467"/>
+      </p:ext>
+    </p:extLst>
+  </p:cSld>
+  <p:clrMapOvr>
+    <a:masterClrMapping/>
+  </p:clrMapOvr>
+</p:sld>
+</file>
+
+<file path=ppt/slides/slide15.xml><?xml version="1.0" encoding="utf-8"?>
+<p:sld xmlns:a="http://schemas.openxmlformats.org/drawingml/2006/main" xmlns:r="http://schemas.openxmlformats.org/officeDocument/2006/relationships" xmlns:p="http://schemas.openxmlformats.org/presentationml/2006/main">
+  <p:cSld>
+    <p:spTree>
+      <p:nvGrpSpPr>
+        <p:cNvPr id="1" name=""/>
+        <p:cNvGrpSpPr/>
+        <p:nvPr/>
+      </p:nvGrpSpPr>
+      <p:grpSpPr>
+        <a:xfrm>
+          <a:off x="0" y="0"/>
+          <a:ext cx="0" cy="0"/>
+          <a:chOff x="0" y="0"/>
+          <a:chExt cx="0" cy="0"/>
+        </a:xfrm>
+      </p:grpSpPr>
+      <p:sp>
+        <p:nvSpPr>
+          <p:cNvPr id="2" name="Titolo 1">
+            <a:extLst>
+              <a:ext uri="{FF2B5EF4-FFF2-40B4-BE49-F238E27FC236}">
                 <a16:creationId xmlns:a16="http://schemas.microsoft.com/office/drawing/2014/main" id="{C83D74B8-6F8F-481C-8088-17C123A66423}"/>
               </a:ext>
             </a:extLst>
@@ -4627,7 +6377,7 @@
 </p:sld>
 </file>
 
-<file path=ppt/slides/slide14.xml><?xml version="1.0" encoding="utf-8"?>
+<file path=ppt/slides/slide16.xml><?xml version="1.0" encoding="utf-8"?>
 <p:sld xmlns:a="http://schemas.openxmlformats.org/drawingml/2006/main" xmlns:r="http://schemas.openxmlformats.org/officeDocument/2006/relationships" xmlns:p="http://schemas.openxmlformats.org/presentationml/2006/main">
   <p:cSld>
     <p:spTree>
@@ -4724,8 +6474,12 @@
               <a:t>instrusion</a:t>
             </a:r>
             <a:r>
-              <a:rPr lang="it-IT"/>
-              <a:t> preventer</a:t>
+              <a:rPr lang="it-IT" dirty="0"/>
+              <a:t> </a:t>
+            </a:r>
+            <a:r>
+              <a:rPr lang="it-IT" dirty="0" err="1"/>
+              <a:t>preventer</a:t>
             </a:r>
             <a:r>
               <a:rPr lang="it-IT" dirty="0"/>
@@ -5090,7 +6844,7 @@
 </p:sld>
 </file>
 
-<file path=ppt/slides/slide15.xml><?xml version="1.0" encoding="utf-8"?>
+<file path=ppt/slides/slide17.xml><?xml version="1.0" encoding="utf-8"?>
 <p:sld xmlns:a="http://schemas.openxmlformats.org/drawingml/2006/main" xmlns:r="http://schemas.openxmlformats.org/officeDocument/2006/relationships" xmlns:p="http://schemas.openxmlformats.org/presentationml/2006/main">
   <p:cSld>
     <p:spTree>
@@ -5893,7 +7647,7 @@
 </p:sld>
 </file>
 
-<file path=ppt/slides/slide16.xml><?xml version="1.0" encoding="utf-8"?>
+<file path=ppt/slides/slide18.xml><?xml version="1.0" encoding="utf-8"?>
 <p:sld xmlns:a="http://schemas.openxmlformats.org/drawingml/2006/main" xmlns:r="http://schemas.openxmlformats.org/officeDocument/2006/relationships" xmlns:p="http://schemas.openxmlformats.org/presentationml/2006/main">
   <p:cSld>
     <p:spTree>
@@ -6258,7 +8012,7 @@
 </p:sld>
 </file>
 
-<file path=ppt/slides/slide17.xml><?xml version="1.0" encoding="utf-8"?>
+<file path=ppt/slides/slide19.xml><?xml version="1.0" encoding="utf-8"?>
 <p:sld xmlns:a="http://schemas.openxmlformats.org/drawingml/2006/main" xmlns:r="http://schemas.openxmlformats.org/officeDocument/2006/relationships" xmlns:p="http://schemas.openxmlformats.org/presentationml/2006/main">
   <p:cSld>
     <p:spTree>
@@ -6336,969 +8090,6 @@
     <p:extLst>
       <p:ext uri="{BB962C8B-B14F-4D97-AF65-F5344CB8AC3E}">
         <p14:creationId xmlns:p14="http://schemas.microsoft.com/office/powerpoint/2010/main" val="654137429"/>
-      </p:ext>
-    </p:extLst>
-  </p:cSld>
-  <p:clrMapOvr>
-    <a:masterClrMapping/>
-  </p:clrMapOvr>
-</p:sld>
-</file>
-
-<file path=ppt/slides/slide18.xml><?xml version="1.0" encoding="utf-8"?>
-<p:sld xmlns:a="http://schemas.openxmlformats.org/drawingml/2006/main" xmlns:r="http://schemas.openxmlformats.org/officeDocument/2006/relationships" xmlns:p="http://schemas.openxmlformats.org/presentationml/2006/main">
-  <p:cSld>
-    <p:spTree>
-      <p:nvGrpSpPr>
-        <p:cNvPr id="1" name=""/>
-        <p:cNvGrpSpPr/>
-        <p:nvPr/>
-      </p:nvGrpSpPr>
-      <p:grpSpPr>
-        <a:xfrm>
-          <a:off x="0" y="0"/>
-          <a:ext cx="0" cy="0"/>
-          <a:chOff x="0" y="0"/>
-          <a:chExt cx="0" cy="0"/>
-        </a:xfrm>
-      </p:grpSpPr>
-      <p:sp>
-        <p:nvSpPr>
-          <p:cNvPr id="2" name="Titolo 1">
-            <a:extLst>
-              <a:ext uri="{FF2B5EF4-FFF2-40B4-BE49-F238E27FC236}">
-                <a16:creationId xmlns:a16="http://schemas.microsoft.com/office/drawing/2014/main" id="{B59E6DEA-D7A1-44D2-8559-89B730CE3681}"/>
-              </a:ext>
-            </a:extLst>
-          </p:cNvPr>
-          <p:cNvSpPr>
-            <a:spLocks noGrp="1"/>
-          </p:cNvSpPr>
-          <p:nvPr>
-            <p:ph type="ctrTitle"/>
-          </p:nvPr>
-        </p:nvSpPr>
-        <p:spPr/>
-        <p:txBody>
-          <a:bodyPr/>
-          <a:lstStyle/>
-          <a:p>
-            <a:r>
-              <a:rPr lang="it-IT" dirty="0" err="1"/>
-              <a:t>Final</a:t>
-            </a:r>
-            <a:r>
-              <a:rPr lang="it-IT" dirty="0"/>
-              <a:t> </a:t>
-            </a:r>
-            <a:r>
-              <a:rPr lang="it-IT" dirty="0" err="1"/>
-              <a:t>thoughts</a:t>
-            </a:r>
-            <a:endParaRPr lang="it-IT" dirty="0"/>
-          </a:p>
-        </p:txBody>
-      </p:sp>
-      <p:sp>
-        <p:nvSpPr>
-          <p:cNvPr id="3" name="Sottotitolo 2">
-            <a:extLst>
-              <a:ext uri="{FF2B5EF4-FFF2-40B4-BE49-F238E27FC236}">
-                <a16:creationId xmlns:a16="http://schemas.microsoft.com/office/drawing/2014/main" id="{83A8CAC3-1E41-4E08-84F1-50D0906D1288}"/>
-              </a:ext>
-            </a:extLst>
-          </p:cNvPr>
-          <p:cNvSpPr>
-            <a:spLocks noGrp="1"/>
-          </p:cNvSpPr>
-          <p:nvPr>
-            <p:ph type="subTitle" idx="1"/>
-          </p:nvPr>
-        </p:nvSpPr>
-        <p:spPr/>
-        <p:txBody>
-          <a:bodyPr/>
-          <a:lstStyle/>
-          <a:p>
-            <a:endParaRPr lang="it-IT"/>
-          </a:p>
-        </p:txBody>
-      </p:sp>
-    </p:spTree>
-    <p:extLst>
-      <p:ext uri="{BB962C8B-B14F-4D97-AF65-F5344CB8AC3E}">
-        <p14:creationId xmlns:p14="http://schemas.microsoft.com/office/powerpoint/2010/main" val="3978280543"/>
-      </p:ext>
-    </p:extLst>
-  </p:cSld>
-  <p:clrMapOvr>
-    <a:masterClrMapping/>
-  </p:clrMapOvr>
-</p:sld>
-</file>
-
-<file path=ppt/slides/slide19.xml><?xml version="1.0" encoding="utf-8"?>
-<p:sld xmlns:a="http://schemas.openxmlformats.org/drawingml/2006/main" xmlns:r="http://schemas.openxmlformats.org/officeDocument/2006/relationships" xmlns:p="http://schemas.openxmlformats.org/presentationml/2006/main">
-  <p:cSld>
-    <p:spTree>
-      <p:nvGrpSpPr>
-        <p:cNvPr id="1" name=""/>
-        <p:cNvGrpSpPr/>
-        <p:nvPr/>
-      </p:nvGrpSpPr>
-      <p:grpSpPr>
-        <a:xfrm>
-          <a:off x="0" y="0"/>
-          <a:ext cx="0" cy="0"/>
-          <a:chOff x="0" y="0"/>
-          <a:chExt cx="0" cy="0"/>
-        </a:xfrm>
-      </p:grpSpPr>
-      <p:sp>
-        <p:nvSpPr>
-          <p:cNvPr id="2" name="Titolo 1">
-            <a:extLst>
-              <a:ext uri="{FF2B5EF4-FFF2-40B4-BE49-F238E27FC236}">
-                <a16:creationId xmlns:a16="http://schemas.microsoft.com/office/drawing/2014/main" id="{A067CE87-7A60-4DFB-8B71-6EC9C173906C}"/>
-              </a:ext>
-            </a:extLst>
-          </p:cNvPr>
-          <p:cNvSpPr>
-            <a:spLocks noGrp="1"/>
-          </p:cNvSpPr>
-          <p:nvPr>
-            <p:ph type="title"/>
-          </p:nvPr>
-        </p:nvSpPr>
-        <p:spPr/>
-        <p:txBody>
-          <a:bodyPr/>
-          <a:lstStyle/>
-          <a:p>
-            <a:r>
-              <a:rPr lang="it-IT" dirty="0" err="1"/>
-              <a:t>Implicit</a:t>
-            </a:r>
-            <a:r>
-              <a:rPr lang="it-IT" dirty="0"/>
-              <a:t> </a:t>
-            </a:r>
-            <a:r>
-              <a:rPr lang="it-IT" dirty="0" err="1"/>
-              <a:t>weaknesses</a:t>
-            </a:r>
-            <a:endParaRPr lang="it-IT" dirty="0"/>
-          </a:p>
-        </p:txBody>
-      </p:sp>
-      <p:sp>
-        <p:nvSpPr>
-          <p:cNvPr id="3" name="Segnaposto contenuto 2">
-            <a:extLst>
-              <a:ext uri="{FF2B5EF4-FFF2-40B4-BE49-F238E27FC236}">
-                <a16:creationId xmlns:a16="http://schemas.microsoft.com/office/drawing/2014/main" id="{F36FD6CB-DA10-49AA-AC33-97037567E37C}"/>
-              </a:ext>
-            </a:extLst>
-          </p:cNvPr>
-          <p:cNvSpPr>
-            <a:spLocks noGrp="1"/>
-          </p:cNvSpPr>
-          <p:nvPr>
-            <p:ph idx="1"/>
-          </p:nvPr>
-        </p:nvSpPr>
-        <p:spPr>
-          <a:xfrm>
-            <a:off x="239151" y="1505243"/>
-            <a:ext cx="11830929" cy="5233182"/>
-          </a:xfrm>
-        </p:spPr>
-        <p:txBody>
-          <a:bodyPr>
-            <a:normAutofit fontScale="25000" lnSpcReduction="20000"/>
-          </a:bodyPr>
-          <a:lstStyle/>
-          <a:p>
-            <a:r>
-              <a:rPr lang="it-IT" sz="7400" dirty="0" err="1"/>
-              <a:t>When</a:t>
-            </a:r>
-            <a:r>
-              <a:rPr lang="it-IT" sz="7400" dirty="0"/>
-              <a:t> </a:t>
-            </a:r>
-            <a:r>
-              <a:rPr lang="it-IT" sz="7400" dirty="0" err="1"/>
-              <a:t>developing</a:t>
-            </a:r>
-            <a:r>
-              <a:rPr lang="it-IT" sz="7400" dirty="0"/>
-              <a:t> an </a:t>
-            </a:r>
-            <a:r>
-              <a:rPr lang="it-IT" sz="7400" dirty="0" err="1"/>
-              <a:t>application</a:t>
-            </a:r>
-            <a:r>
-              <a:rPr lang="it-IT" sz="7400" dirty="0"/>
-              <a:t>, </a:t>
-            </a:r>
-            <a:r>
-              <a:rPr lang="it-IT" sz="7400" dirty="0" err="1"/>
-              <a:t>even</a:t>
-            </a:r>
-            <a:r>
-              <a:rPr lang="it-IT" sz="7400" dirty="0"/>
-              <a:t> </a:t>
-            </a:r>
-            <a:r>
-              <a:rPr lang="it-IT" sz="7400" dirty="0" err="1"/>
-              <a:t>if</a:t>
-            </a:r>
-            <a:r>
-              <a:rPr lang="it-IT" sz="7400" dirty="0"/>
-              <a:t> </a:t>
-            </a:r>
-            <a:r>
-              <a:rPr lang="it-IT" sz="7400" dirty="0" err="1"/>
-              <a:t>we</a:t>
-            </a:r>
-            <a:r>
-              <a:rPr lang="it-IT" sz="7400" dirty="0"/>
-              <a:t> </a:t>
-            </a:r>
-            <a:r>
-              <a:rPr lang="it-IT" sz="7400" dirty="0" err="1"/>
-              <a:t>strictly</a:t>
-            </a:r>
-            <a:r>
-              <a:rPr lang="it-IT" sz="7400" dirty="0"/>
-              <a:t> </a:t>
-            </a:r>
-            <a:r>
-              <a:rPr lang="it-IT" sz="7400" dirty="0" err="1"/>
-              <a:t>follow</a:t>
-            </a:r>
-            <a:r>
-              <a:rPr lang="it-IT" sz="7400" dirty="0"/>
-              <a:t> </a:t>
-            </a:r>
-            <a:r>
-              <a:rPr lang="it-IT" sz="7400" dirty="0" err="1"/>
-              <a:t>secure</a:t>
-            </a:r>
-            <a:r>
-              <a:rPr lang="it-IT" sz="7400" dirty="0"/>
-              <a:t> </a:t>
-            </a:r>
-            <a:r>
-              <a:rPr lang="it-IT" sz="7400" dirty="0" err="1"/>
-              <a:t>programming</a:t>
-            </a:r>
-            <a:r>
-              <a:rPr lang="it-IT" sz="7400" dirty="0"/>
-              <a:t> </a:t>
-            </a:r>
-            <a:r>
-              <a:rPr lang="it-IT" sz="7400" dirty="0" err="1"/>
-              <a:t>techniques</a:t>
-            </a:r>
-            <a:r>
-              <a:rPr lang="it-IT" sz="7400" dirty="0"/>
-              <a:t>, </a:t>
-            </a:r>
-            <a:r>
-              <a:rPr lang="it-IT" sz="7400" dirty="0" err="1"/>
-              <a:t>there</a:t>
-            </a:r>
-            <a:r>
-              <a:rPr lang="it-IT" sz="7400" dirty="0"/>
-              <a:t> are some </a:t>
-            </a:r>
-            <a:r>
-              <a:rPr lang="it-IT" sz="7400" dirty="0" err="1"/>
-              <a:t>residual</a:t>
-            </a:r>
-            <a:r>
-              <a:rPr lang="it-IT" sz="7400" dirty="0"/>
-              <a:t> </a:t>
-            </a:r>
-            <a:r>
-              <a:rPr lang="it-IT" sz="7400" dirty="0" err="1"/>
-              <a:t>potential</a:t>
-            </a:r>
-            <a:r>
-              <a:rPr lang="it-IT" sz="7400" dirty="0"/>
-              <a:t> </a:t>
-            </a:r>
-            <a:r>
-              <a:rPr lang="it-IT" sz="7400" dirty="0" err="1"/>
-              <a:t>weaknesses</a:t>
-            </a:r>
-            <a:r>
-              <a:rPr lang="it-IT" sz="7400" dirty="0"/>
-              <a:t>.</a:t>
-            </a:r>
-          </a:p>
-          <a:p>
-            <a:r>
-              <a:rPr lang="it-IT" sz="7400" dirty="0" err="1"/>
-              <a:t>We</a:t>
-            </a:r>
-            <a:r>
-              <a:rPr lang="it-IT" sz="7400" dirty="0"/>
-              <a:t> </a:t>
-            </a:r>
-            <a:r>
-              <a:rPr lang="it-IT" sz="7400" dirty="0" err="1"/>
-              <a:t>rely</a:t>
-            </a:r>
-            <a:r>
-              <a:rPr lang="it-IT" sz="7400" dirty="0"/>
-              <a:t> on </a:t>
-            </a:r>
-            <a:r>
-              <a:rPr lang="it-IT" sz="7400" dirty="0" err="1"/>
-              <a:t>programming</a:t>
-            </a:r>
-            <a:r>
-              <a:rPr lang="it-IT" sz="7400" dirty="0"/>
-              <a:t> </a:t>
-            </a:r>
-            <a:r>
-              <a:rPr lang="it-IT" sz="7400" dirty="0" err="1"/>
-              <a:t>languages</a:t>
-            </a:r>
-            <a:r>
-              <a:rPr lang="it-IT" sz="7400" dirty="0"/>
-              <a:t> </a:t>
-            </a:r>
-          </a:p>
-          <a:p>
-            <a:pPr lvl="1"/>
-            <a:r>
-              <a:rPr lang="it-IT" sz="7400" dirty="0"/>
-              <a:t>In </a:t>
-            </a:r>
-            <a:r>
-              <a:rPr lang="it-IT" sz="7400" dirty="0" err="1"/>
-              <a:t>recent</a:t>
-            </a:r>
-            <a:r>
-              <a:rPr lang="it-IT" sz="7400" dirty="0"/>
-              <a:t> Black </a:t>
-            </a:r>
-            <a:r>
-              <a:rPr lang="it-IT" sz="7400" dirty="0" err="1"/>
-              <a:t>Hat</a:t>
-            </a:r>
-            <a:r>
-              <a:rPr lang="it-IT" sz="7400" dirty="0"/>
-              <a:t> Europe 2017 Convention Fernando Arnaboldi, Senior Security Consultant, </a:t>
-            </a:r>
-            <a:r>
-              <a:rPr lang="it-IT" sz="7400" dirty="0" err="1"/>
-              <a:t>showed</a:t>
-            </a:r>
-            <a:r>
-              <a:rPr lang="it-IT" sz="7400" dirty="0"/>
-              <a:t> </a:t>
-            </a:r>
-            <a:r>
-              <a:rPr lang="it-IT" sz="7400" dirty="0" err="1"/>
-              <a:t>how</a:t>
-            </a:r>
-            <a:r>
-              <a:rPr lang="it-IT" sz="7400" dirty="0"/>
-              <a:t> </a:t>
-            </a:r>
-            <a:r>
-              <a:rPr lang="it-IT" sz="7400" dirty="0" err="1"/>
-              <a:t>securely</a:t>
-            </a:r>
-            <a:r>
-              <a:rPr lang="it-IT" sz="7400" dirty="0"/>
-              <a:t> </a:t>
-            </a:r>
-            <a:r>
-              <a:rPr lang="it-IT" sz="7400" dirty="0" err="1"/>
-              <a:t>developed</a:t>
-            </a:r>
-            <a:r>
-              <a:rPr lang="it-IT" sz="7400" dirty="0"/>
-              <a:t> </a:t>
-            </a:r>
-            <a:r>
-              <a:rPr lang="it-IT" sz="7400" dirty="0" err="1"/>
-              <a:t>application</a:t>
-            </a:r>
-            <a:r>
-              <a:rPr lang="it-IT" sz="7400" dirty="0"/>
-              <a:t> </a:t>
-            </a:r>
-            <a:r>
-              <a:rPr lang="it-IT" sz="7400" dirty="0" err="1"/>
-              <a:t>may</a:t>
-            </a:r>
-            <a:r>
-              <a:rPr lang="it-IT" sz="7400" dirty="0"/>
-              <a:t> </a:t>
-            </a:r>
-            <a:r>
-              <a:rPr lang="it-IT" sz="7400" dirty="0" err="1"/>
-              <a:t>have</a:t>
-            </a:r>
-            <a:r>
-              <a:rPr lang="it-IT" sz="7400" dirty="0"/>
-              <a:t> </a:t>
-            </a:r>
-            <a:r>
-              <a:rPr lang="it-IT" sz="7400" dirty="0" err="1"/>
-              <a:t>unindentified</a:t>
-            </a:r>
-            <a:r>
-              <a:rPr lang="it-IT" sz="7400" dirty="0"/>
-              <a:t> </a:t>
-            </a:r>
-            <a:r>
-              <a:rPr lang="it-IT" sz="7400" dirty="0" err="1"/>
-              <a:t>vulnerabilities</a:t>
-            </a:r>
-            <a:r>
-              <a:rPr lang="it-IT" sz="7400" dirty="0"/>
-              <a:t> in the </a:t>
-            </a:r>
-            <a:r>
-              <a:rPr lang="it-IT" sz="7400" dirty="0" err="1"/>
-              <a:t>underlying</a:t>
-            </a:r>
-            <a:r>
-              <a:rPr lang="it-IT" sz="7400" dirty="0"/>
-              <a:t> </a:t>
-            </a:r>
-            <a:r>
-              <a:rPr lang="it-IT" sz="7400" dirty="0" err="1"/>
-              <a:t>programming</a:t>
-            </a:r>
-            <a:r>
-              <a:rPr lang="it-IT" sz="7400" dirty="0"/>
-              <a:t> </a:t>
-            </a:r>
-            <a:r>
-              <a:rPr lang="it-IT" sz="7400" dirty="0" err="1"/>
-              <a:t>languages</a:t>
-            </a:r>
-            <a:r>
-              <a:rPr lang="it-IT" sz="7400" dirty="0"/>
-              <a:t> </a:t>
-            </a:r>
-            <a:r>
-              <a:rPr lang="it-IT" sz="7400" dirty="0" err="1"/>
-              <a:t>that</a:t>
-            </a:r>
-            <a:r>
-              <a:rPr lang="it-IT" sz="7400" dirty="0"/>
-              <a:t> </a:t>
-            </a:r>
-            <a:r>
-              <a:rPr lang="it-IT" sz="7400" dirty="0" err="1"/>
-              <a:t>may</a:t>
-            </a:r>
-            <a:r>
-              <a:rPr lang="it-IT" sz="7400" dirty="0"/>
-              <a:t> </a:t>
-            </a:r>
-            <a:r>
-              <a:rPr lang="it-IT" sz="7400" dirty="0" err="1"/>
-              <a:t>lead</a:t>
-            </a:r>
-            <a:r>
-              <a:rPr lang="it-IT" sz="7400" dirty="0"/>
-              <a:t> to remote code </a:t>
-            </a:r>
-            <a:r>
-              <a:rPr lang="it-IT" sz="7400" dirty="0" err="1"/>
-              <a:t>execution</a:t>
-            </a:r>
-            <a:r>
-              <a:rPr lang="it-IT" sz="7400" dirty="0"/>
-              <a:t> </a:t>
-            </a:r>
-          </a:p>
-          <a:p>
-            <a:pPr lvl="2"/>
-            <a:r>
-              <a:rPr lang="it-IT" sz="7400" dirty="0" err="1"/>
-              <a:t>Affected</a:t>
-            </a:r>
-            <a:r>
-              <a:rPr lang="it-IT" sz="7400" dirty="0"/>
-              <a:t> </a:t>
-            </a:r>
-            <a:r>
-              <a:rPr lang="it-IT" sz="7400" dirty="0" err="1"/>
-              <a:t>languages</a:t>
-            </a:r>
-            <a:r>
-              <a:rPr lang="it-IT" sz="7400" dirty="0"/>
-              <a:t> are common </a:t>
-            </a:r>
-            <a:r>
-              <a:rPr lang="it-IT" sz="7400" dirty="0" err="1"/>
-              <a:t>used</a:t>
-            </a:r>
-            <a:r>
-              <a:rPr lang="it-IT" sz="7400" dirty="0"/>
-              <a:t> </a:t>
-            </a:r>
-            <a:r>
-              <a:rPr lang="it-IT" sz="7400" dirty="0" err="1"/>
-              <a:t>ones</a:t>
-            </a:r>
-            <a:r>
-              <a:rPr lang="it-IT" sz="7400" dirty="0"/>
-              <a:t> </a:t>
-            </a:r>
-            <a:r>
-              <a:rPr lang="it-IT" sz="7400" dirty="0" err="1"/>
-              <a:t>like</a:t>
-            </a:r>
-            <a:r>
-              <a:rPr lang="it-IT" sz="7400" dirty="0"/>
-              <a:t> </a:t>
-            </a:r>
-            <a:r>
-              <a:rPr lang="it-IT" sz="7400" dirty="0" err="1"/>
-              <a:t>Javascript</a:t>
-            </a:r>
-            <a:r>
-              <a:rPr lang="it-IT" sz="7400" dirty="0"/>
-              <a:t>, PHP, Ruby, </a:t>
-            </a:r>
-            <a:r>
-              <a:rPr lang="it-IT" sz="7400" dirty="0" err="1"/>
-              <a:t>Perl</a:t>
-            </a:r>
-            <a:r>
-              <a:rPr lang="it-IT" sz="7400" dirty="0"/>
-              <a:t> and </a:t>
-            </a:r>
-            <a:r>
-              <a:rPr lang="it-IT" sz="7400" dirty="0" err="1"/>
-              <a:t>Python</a:t>
-            </a:r>
-            <a:r>
-              <a:rPr lang="it-IT" sz="7400" dirty="0"/>
-              <a:t>.</a:t>
-            </a:r>
-          </a:p>
-          <a:p>
-            <a:r>
-              <a:rPr lang="it-IT" sz="7400" dirty="0" err="1"/>
-              <a:t>Trusting</a:t>
-            </a:r>
-            <a:r>
-              <a:rPr lang="it-IT" sz="7400" dirty="0"/>
-              <a:t> </a:t>
-            </a:r>
-            <a:r>
-              <a:rPr lang="it-IT" sz="7400" dirty="0" err="1"/>
-              <a:t>third</a:t>
-            </a:r>
-            <a:r>
-              <a:rPr lang="it-IT" sz="7400" dirty="0"/>
-              <a:t> party-</a:t>
-            </a:r>
-            <a:r>
-              <a:rPr lang="it-IT" sz="7400" dirty="0" err="1"/>
-              <a:t>developed</a:t>
-            </a:r>
-            <a:r>
-              <a:rPr lang="it-IT" sz="7400" dirty="0"/>
-              <a:t> </a:t>
-            </a:r>
-            <a:r>
-              <a:rPr lang="it-IT" sz="7400" dirty="0" err="1"/>
-              <a:t>cryptography</a:t>
-            </a:r>
-            <a:r>
-              <a:rPr lang="it-IT" sz="7400" dirty="0"/>
-              <a:t> </a:t>
-            </a:r>
-            <a:r>
-              <a:rPr lang="it-IT" sz="7400" dirty="0" err="1"/>
-              <a:t>libraries</a:t>
-            </a:r>
-            <a:endParaRPr lang="it-IT" sz="7400" dirty="0"/>
-          </a:p>
-          <a:p>
-            <a:pPr lvl="1"/>
-            <a:r>
-              <a:rPr lang="it-IT" sz="7400" dirty="0" err="1"/>
-              <a:t>That</a:t>
-            </a:r>
-            <a:r>
-              <a:rPr lang="it-IT" sz="7400" dirty="0"/>
-              <a:t> </a:t>
-            </a:r>
-            <a:r>
-              <a:rPr lang="it-IT" sz="7400" dirty="0" err="1"/>
-              <a:t>library</a:t>
-            </a:r>
-            <a:r>
-              <a:rPr lang="it-IT" sz="7400" dirty="0"/>
-              <a:t> </a:t>
-            </a:r>
-            <a:r>
-              <a:rPr lang="it-IT" sz="7400" dirty="0" err="1"/>
-              <a:t>could</a:t>
-            </a:r>
-            <a:r>
-              <a:rPr lang="it-IT" sz="7400" dirty="0"/>
-              <a:t> </a:t>
-            </a:r>
-            <a:r>
-              <a:rPr lang="it-IT" sz="7400" dirty="0" err="1"/>
-              <a:t>contains</a:t>
-            </a:r>
-            <a:r>
-              <a:rPr lang="it-IT" sz="7400" dirty="0"/>
-              <a:t> </a:t>
-            </a:r>
-            <a:r>
-              <a:rPr lang="it-IT" sz="7400" dirty="0" err="1"/>
-              <a:t>intentional</a:t>
-            </a:r>
-            <a:r>
-              <a:rPr lang="it-IT" sz="7400" dirty="0"/>
-              <a:t> or due to </a:t>
-            </a:r>
-            <a:r>
-              <a:rPr lang="it-IT" sz="7400" dirty="0" err="1"/>
-              <a:t>laziness</a:t>
-            </a:r>
-            <a:r>
-              <a:rPr lang="it-IT" sz="7400" dirty="0"/>
-              <a:t> or </a:t>
-            </a:r>
-            <a:r>
-              <a:rPr lang="it-IT" sz="7400" dirty="0" err="1"/>
-              <a:t>mistake</a:t>
-            </a:r>
-            <a:r>
-              <a:rPr lang="it-IT" sz="7400" dirty="0"/>
-              <a:t>  </a:t>
-            </a:r>
-            <a:r>
-              <a:rPr lang="it-IT" sz="7400" dirty="0" err="1"/>
-              <a:t>weaknesses</a:t>
-            </a:r>
-            <a:r>
-              <a:rPr lang="it-IT" sz="7400" dirty="0"/>
-              <a:t> or </a:t>
-            </a:r>
-            <a:r>
-              <a:rPr lang="it-IT" sz="7400" dirty="0" err="1"/>
-              <a:t>backdoors</a:t>
-            </a:r>
-            <a:r>
-              <a:rPr lang="it-IT" sz="7400" dirty="0"/>
-              <a:t>, </a:t>
-            </a:r>
-            <a:r>
-              <a:rPr lang="it-IT" sz="7400" dirty="0" err="1"/>
-              <a:t>that</a:t>
-            </a:r>
-            <a:r>
-              <a:rPr lang="it-IT" sz="7400" dirty="0"/>
-              <a:t> </a:t>
-            </a:r>
-            <a:r>
-              <a:rPr lang="it-IT" sz="7400" dirty="0" err="1"/>
-              <a:t>could</a:t>
-            </a:r>
-            <a:r>
-              <a:rPr lang="it-IT" sz="7400" dirty="0"/>
-              <a:t> </a:t>
-            </a:r>
-            <a:r>
-              <a:rPr lang="it-IT" sz="7400" dirty="0" err="1"/>
-              <a:t>ease</a:t>
-            </a:r>
-            <a:r>
-              <a:rPr lang="it-IT" sz="7400" dirty="0"/>
-              <a:t> data </a:t>
-            </a:r>
-            <a:r>
-              <a:rPr lang="it-IT" sz="7400" dirty="0" err="1"/>
-              <a:t>decryption</a:t>
-            </a:r>
-            <a:r>
-              <a:rPr lang="it-IT" sz="7400" dirty="0"/>
-              <a:t>.</a:t>
-            </a:r>
-          </a:p>
-          <a:p>
-            <a:pPr lvl="2"/>
-            <a:r>
-              <a:rPr lang="it-IT" sz="7400" dirty="0" err="1"/>
-              <a:t>Detect</a:t>
-            </a:r>
-            <a:r>
-              <a:rPr lang="it-IT" sz="7400" dirty="0"/>
-              <a:t> </a:t>
-            </a:r>
-            <a:r>
-              <a:rPr lang="it-IT" sz="7400" dirty="0" err="1"/>
-              <a:t>such</a:t>
-            </a:r>
-            <a:r>
-              <a:rPr lang="it-IT" sz="7400" dirty="0"/>
-              <a:t> </a:t>
-            </a:r>
-            <a:r>
-              <a:rPr lang="it-IT" sz="7400" dirty="0" err="1"/>
-              <a:t>errors</a:t>
-            </a:r>
-            <a:r>
-              <a:rPr lang="it-IT" sz="7400" dirty="0"/>
-              <a:t> </a:t>
-            </a:r>
-            <a:r>
-              <a:rPr lang="it-IT" sz="7400" dirty="0" err="1"/>
-              <a:t>is</a:t>
-            </a:r>
-            <a:r>
-              <a:rPr lang="it-IT" sz="7400" dirty="0"/>
-              <a:t> </a:t>
-            </a:r>
-            <a:r>
-              <a:rPr lang="it-IT" sz="7400" dirty="0" err="1"/>
-              <a:t>not</a:t>
-            </a:r>
-            <a:r>
-              <a:rPr lang="it-IT" sz="7400" dirty="0"/>
-              <a:t> a </a:t>
-            </a:r>
-            <a:r>
-              <a:rPr lang="it-IT" sz="7400" dirty="0" err="1"/>
-              <a:t>trivial</a:t>
-            </a:r>
-            <a:r>
-              <a:rPr lang="it-IT" sz="7400" dirty="0"/>
-              <a:t> task.</a:t>
-            </a:r>
-          </a:p>
-          <a:p>
-            <a:r>
-              <a:rPr lang="it-IT" sz="7400" dirty="0" err="1"/>
-              <a:t>There</a:t>
-            </a:r>
-            <a:r>
-              <a:rPr lang="it-IT" sz="7400" dirty="0"/>
-              <a:t> </a:t>
-            </a:r>
-            <a:r>
-              <a:rPr lang="it-IT" sz="7400" dirty="0" err="1"/>
-              <a:t>could</a:t>
-            </a:r>
-            <a:r>
-              <a:rPr lang="it-IT" sz="7400" dirty="0"/>
-              <a:t> be </a:t>
-            </a:r>
-            <a:r>
-              <a:rPr lang="it-IT" sz="7400" dirty="0" err="1"/>
-              <a:t>flaws</a:t>
-            </a:r>
-            <a:r>
-              <a:rPr lang="it-IT" sz="7400" dirty="0"/>
-              <a:t> </a:t>
-            </a:r>
-            <a:r>
-              <a:rPr lang="it-IT" sz="7400" dirty="0" err="1"/>
-              <a:t>at</a:t>
-            </a:r>
-            <a:r>
-              <a:rPr lang="it-IT" sz="7400" dirty="0"/>
-              <a:t> </a:t>
-            </a:r>
-            <a:r>
-              <a:rPr lang="it-IT" sz="7400" dirty="0" err="1"/>
-              <a:t>algorithmic</a:t>
-            </a:r>
-            <a:r>
-              <a:rPr lang="it-IT" sz="7400" dirty="0"/>
-              <a:t> </a:t>
-            </a:r>
-            <a:r>
-              <a:rPr lang="it-IT" sz="7400" dirty="0" err="1"/>
-              <a:t>level</a:t>
-            </a:r>
-            <a:endParaRPr lang="it-IT" sz="7400" dirty="0"/>
-          </a:p>
-          <a:p>
-            <a:pPr lvl="1"/>
-            <a:r>
-              <a:rPr lang="it-IT" sz="7400" dirty="0"/>
-              <a:t>NSA </a:t>
-            </a:r>
-            <a:r>
-              <a:rPr lang="it-IT" sz="7400" dirty="0" err="1"/>
-              <a:t>has</a:t>
-            </a:r>
-            <a:r>
-              <a:rPr lang="it-IT" sz="7400" dirty="0"/>
-              <a:t> </a:t>
-            </a:r>
-            <a:r>
-              <a:rPr lang="it-IT" sz="7400" dirty="0" err="1"/>
-              <a:t>been</a:t>
-            </a:r>
-            <a:r>
-              <a:rPr lang="it-IT" sz="7400" dirty="0"/>
-              <a:t> </a:t>
-            </a:r>
-            <a:r>
-              <a:rPr lang="it-IT" sz="7400" dirty="0" err="1"/>
-              <a:t>blamed</a:t>
-            </a:r>
-            <a:r>
-              <a:rPr lang="it-IT" sz="7400" dirty="0"/>
-              <a:t> for Random </a:t>
-            </a:r>
-            <a:r>
-              <a:rPr lang="it-IT" sz="7400" dirty="0" err="1"/>
-              <a:t>Number</a:t>
-            </a:r>
-            <a:r>
-              <a:rPr lang="it-IT" sz="7400" dirty="0"/>
-              <a:t> Generation </a:t>
-            </a:r>
-            <a:r>
-              <a:rPr lang="it-IT" sz="7400" dirty="0" err="1"/>
-              <a:t>weaknesses</a:t>
-            </a:r>
-            <a:r>
-              <a:rPr lang="it-IT" sz="7400" dirty="0"/>
-              <a:t> in </a:t>
-            </a:r>
-            <a:r>
-              <a:rPr lang="it-IT" sz="7400" dirty="0" err="1"/>
-              <a:t>Dual_EC_DRBG</a:t>
-            </a:r>
-            <a:r>
-              <a:rPr lang="it-IT" sz="7400" dirty="0"/>
-              <a:t> </a:t>
-            </a:r>
-            <a:r>
-              <a:rPr lang="it-IT" sz="7400" dirty="0" err="1"/>
-              <a:t>algorithm</a:t>
-            </a:r>
-            <a:r>
-              <a:rPr lang="it-IT" sz="7400" dirty="0"/>
-              <a:t>, </a:t>
-            </a:r>
-            <a:r>
-              <a:rPr lang="it-IT" sz="7400" dirty="0" err="1"/>
-              <a:t>that</a:t>
-            </a:r>
-            <a:r>
-              <a:rPr lang="it-IT" sz="7400" dirty="0"/>
-              <a:t> </a:t>
-            </a:r>
-            <a:r>
-              <a:rPr lang="it-IT" sz="7400" dirty="0" err="1"/>
-              <a:t>was</a:t>
-            </a:r>
-            <a:r>
-              <a:rPr lang="it-IT" sz="7400" dirty="0"/>
-              <a:t> </a:t>
-            </a:r>
-            <a:r>
-              <a:rPr lang="it-IT" sz="7400" dirty="0" err="1"/>
-              <a:t>approved</a:t>
-            </a:r>
-            <a:r>
-              <a:rPr lang="it-IT" sz="7400" dirty="0"/>
-              <a:t> by NIST and </a:t>
-            </a:r>
-            <a:r>
-              <a:rPr lang="it-IT" sz="7400" dirty="0" err="1"/>
-              <a:t>used</a:t>
-            </a:r>
-            <a:r>
-              <a:rPr lang="it-IT" sz="7400" dirty="0"/>
-              <a:t> by </a:t>
-            </a:r>
-            <a:r>
-              <a:rPr lang="it-IT" sz="7400" dirty="0" err="1"/>
-              <a:t>important</a:t>
-            </a:r>
-            <a:r>
-              <a:rPr lang="it-IT" sz="7400" dirty="0"/>
-              <a:t> companies </a:t>
-            </a:r>
-            <a:r>
-              <a:rPr lang="it-IT" sz="7400" dirty="0" err="1"/>
-              <a:t>like</a:t>
-            </a:r>
-            <a:r>
-              <a:rPr lang="it-IT" sz="7400" dirty="0"/>
-              <a:t> RSA. DUAL_EC_DRBG </a:t>
-            </a:r>
-          </a:p>
-          <a:p>
-            <a:pPr lvl="2"/>
-            <a:endParaRPr lang="it-IT" sz="2800" dirty="0"/>
-          </a:p>
-          <a:p>
-            <a:pPr marL="457200" lvl="1" indent="0">
-              <a:buNone/>
-            </a:pPr>
-            <a:endParaRPr lang="it-IT" sz="3200" dirty="0"/>
-          </a:p>
-          <a:p>
-            <a:pPr lvl="1"/>
-            <a:endParaRPr lang="it-IT" sz="3200" dirty="0"/>
-          </a:p>
-          <a:p>
-            <a:pPr lvl="1"/>
-            <a:endParaRPr lang="it-IT" dirty="0"/>
-          </a:p>
-          <a:p>
-            <a:pPr lvl="1"/>
-            <a:endParaRPr lang="it-IT" dirty="0"/>
-          </a:p>
-          <a:p>
-            <a:pPr marL="457200" lvl="1" indent="0">
-              <a:buNone/>
-            </a:pPr>
-            <a:r>
-              <a:rPr lang="it-IT" dirty="0"/>
-              <a:t> </a:t>
-            </a:r>
-          </a:p>
-          <a:p>
-            <a:pPr marL="0" indent="0">
-              <a:buNone/>
-            </a:pPr>
-            <a:endParaRPr lang="it-IT" dirty="0"/>
-          </a:p>
-          <a:p>
-            <a:pPr marL="457200" lvl="1" indent="0">
-              <a:buNone/>
-            </a:pPr>
-            <a:r>
-              <a:rPr lang="it-IT" dirty="0"/>
-              <a:t>	</a:t>
-            </a:r>
-          </a:p>
-        </p:txBody>
-      </p:sp>
-    </p:spTree>
-    <p:extLst>
-      <p:ext uri="{BB962C8B-B14F-4D97-AF65-F5344CB8AC3E}">
-        <p14:creationId xmlns:p14="http://schemas.microsoft.com/office/powerpoint/2010/main" val="2278474667"/>
       </p:ext>
     </p:extLst>
   </p:cSld>
@@ -7413,6 +8204,1024 @@
           <p:cNvPr id="2" name="Titolo 1">
             <a:extLst>
               <a:ext uri="{FF2B5EF4-FFF2-40B4-BE49-F238E27FC236}">
+                <a16:creationId xmlns:a16="http://schemas.microsoft.com/office/drawing/2014/main" id="{B59E6DEA-D7A1-44D2-8559-89B730CE3681}"/>
+              </a:ext>
+            </a:extLst>
+          </p:cNvPr>
+          <p:cNvSpPr>
+            <a:spLocks noGrp="1"/>
+          </p:cNvSpPr>
+          <p:nvPr>
+            <p:ph type="ctrTitle"/>
+          </p:nvPr>
+        </p:nvSpPr>
+        <p:spPr/>
+        <p:txBody>
+          <a:bodyPr/>
+          <a:lstStyle/>
+          <a:p>
+            <a:r>
+              <a:rPr lang="it-IT" dirty="0" err="1"/>
+              <a:t>Final</a:t>
+            </a:r>
+            <a:r>
+              <a:rPr lang="it-IT" dirty="0"/>
+              <a:t> </a:t>
+            </a:r>
+            <a:r>
+              <a:rPr lang="it-IT" dirty="0" err="1"/>
+              <a:t>thoughts</a:t>
+            </a:r>
+            <a:endParaRPr lang="it-IT" dirty="0"/>
+          </a:p>
+        </p:txBody>
+      </p:sp>
+      <p:sp>
+        <p:nvSpPr>
+          <p:cNvPr id="3" name="Sottotitolo 2">
+            <a:extLst>
+              <a:ext uri="{FF2B5EF4-FFF2-40B4-BE49-F238E27FC236}">
+                <a16:creationId xmlns:a16="http://schemas.microsoft.com/office/drawing/2014/main" id="{83A8CAC3-1E41-4E08-84F1-50D0906D1288}"/>
+              </a:ext>
+            </a:extLst>
+          </p:cNvPr>
+          <p:cNvSpPr>
+            <a:spLocks noGrp="1"/>
+          </p:cNvSpPr>
+          <p:nvPr>
+            <p:ph type="subTitle" idx="1"/>
+          </p:nvPr>
+        </p:nvSpPr>
+        <p:spPr/>
+        <p:txBody>
+          <a:bodyPr/>
+          <a:lstStyle/>
+          <a:p>
+            <a:endParaRPr lang="it-IT"/>
+          </a:p>
+        </p:txBody>
+      </p:sp>
+    </p:spTree>
+    <p:extLst>
+      <p:ext uri="{BB962C8B-B14F-4D97-AF65-F5344CB8AC3E}">
+        <p14:creationId xmlns:p14="http://schemas.microsoft.com/office/powerpoint/2010/main" val="3978280543"/>
+      </p:ext>
+    </p:extLst>
+  </p:cSld>
+  <p:clrMapOvr>
+    <a:masterClrMapping/>
+  </p:clrMapOvr>
+</p:sld>
+</file>
+
+<file path=ppt/slides/slide21.xml><?xml version="1.0" encoding="utf-8"?>
+<p:sld xmlns:a="http://schemas.openxmlformats.org/drawingml/2006/main" xmlns:r="http://schemas.openxmlformats.org/officeDocument/2006/relationships" xmlns:p="http://schemas.openxmlformats.org/presentationml/2006/main">
+  <p:cSld>
+    <p:spTree>
+      <p:nvGrpSpPr>
+        <p:cNvPr id="1" name=""/>
+        <p:cNvGrpSpPr/>
+        <p:nvPr/>
+      </p:nvGrpSpPr>
+      <p:grpSpPr>
+        <a:xfrm>
+          <a:off x="0" y="0"/>
+          <a:ext cx="0" cy="0"/>
+          <a:chOff x="0" y="0"/>
+          <a:chExt cx="0" cy="0"/>
+        </a:xfrm>
+      </p:grpSpPr>
+      <p:sp>
+        <p:nvSpPr>
+          <p:cNvPr id="2" name="Titolo 1">
+            <a:extLst>
+              <a:ext uri="{FF2B5EF4-FFF2-40B4-BE49-F238E27FC236}">
+                <a16:creationId xmlns:a16="http://schemas.microsoft.com/office/drawing/2014/main" id="{A067CE87-7A60-4DFB-8B71-6EC9C173906C}"/>
+              </a:ext>
+            </a:extLst>
+          </p:cNvPr>
+          <p:cNvSpPr>
+            <a:spLocks noGrp="1"/>
+          </p:cNvSpPr>
+          <p:nvPr>
+            <p:ph type="title"/>
+          </p:nvPr>
+        </p:nvSpPr>
+        <p:spPr/>
+        <p:txBody>
+          <a:bodyPr/>
+          <a:lstStyle/>
+          <a:p>
+            <a:r>
+              <a:rPr lang="it-IT" dirty="0" err="1"/>
+              <a:t>Implicit</a:t>
+            </a:r>
+            <a:r>
+              <a:rPr lang="it-IT" dirty="0"/>
+              <a:t> </a:t>
+            </a:r>
+            <a:r>
+              <a:rPr lang="it-IT" dirty="0" err="1"/>
+              <a:t>weaknesses</a:t>
+            </a:r>
+            <a:endParaRPr lang="it-IT" dirty="0"/>
+          </a:p>
+        </p:txBody>
+      </p:sp>
+      <p:sp>
+        <p:nvSpPr>
+          <p:cNvPr id="3" name="Segnaposto contenuto 2">
+            <a:extLst>
+              <a:ext uri="{FF2B5EF4-FFF2-40B4-BE49-F238E27FC236}">
+                <a16:creationId xmlns:a16="http://schemas.microsoft.com/office/drawing/2014/main" id="{F36FD6CB-DA10-49AA-AC33-97037567E37C}"/>
+              </a:ext>
+            </a:extLst>
+          </p:cNvPr>
+          <p:cNvSpPr>
+            <a:spLocks noGrp="1"/>
+          </p:cNvSpPr>
+          <p:nvPr>
+            <p:ph idx="1"/>
+          </p:nvPr>
+        </p:nvSpPr>
+        <p:spPr>
+          <a:xfrm>
+            <a:off x="239151" y="1505243"/>
+            <a:ext cx="11830929" cy="5233182"/>
+          </a:xfrm>
+        </p:spPr>
+        <p:txBody>
+          <a:bodyPr>
+            <a:normAutofit fontScale="25000" lnSpcReduction="20000"/>
+          </a:bodyPr>
+          <a:lstStyle/>
+          <a:p>
+            <a:r>
+              <a:rPr lang="it-IT" sz="7400" dirty="0" err="1"/>
+              <a:t>When</a:t>
+            </a:r>
+            <a:r>
+              <a:rPr lang="it-IT" sz="7400" dirty="0"/>
+              <a:t> </a:t>
+            </a:r>
+            <a:r>
+              <a:rPr lang="it-IT" sz="7400" dirty="0" err="1"/>
+              <a:t>developing</a:t>
+            </a:r>
+            <a:r>
+              <a:rPr lang="it-IT" sz="7400" dirty="0"/>
+              <a:t> an </a:t>
+            </a:r>
+            <a:r>
+              <a:rPr lang="it-IT" sz="7400" dirty="0" err="1"/>
+              <a:t>application</a:t>
+            </a:r>
+            <a:r>
+              <a:rPr lang="it-IT" sz="7400" dirty="0"/>
+              <a:t>, </a:t>
+            </a:r>
+            <a:r>
+              <a:rPr lang="it-IT" sz="7400" dirty="0" err="1"/>
+              <a:t>even</a:t>
+            </a:r>
+            <a:r>
+              <a:rPr lang="it-IT" sz="7400" dirty="0"/>
+              <a:t> </a:t>
+            </a:r>
+            <a:r>
+              <a:rPr lang="it-IT" sz="7400" dirty="0" err="1"/>
+              <a:t>if</a:t>
+            </a:r>
+            <a:r>
+              <a:rPr lang="it-IT" sz="7400" dirty="0"/>
+              <a:t> </a:t>
+            </a:r>
+            <a:r>
+              <a:rPr lang="it-IT" sz="7400" dirty="0" err="1"/>
+              <a:t>we</a:t>
+            </a:r>
+            <a:r>
+              <a:rPr lang="it-IT" sz="7400" dirty="0"/>
+              <a:t> </a:t>
+            </a:r>
+            <a:r>
+              <a:rPr lang="it-IT" sz="7400" dirty="0" err="1"/>
+              <a:t>strictly</a:t>
+            </a:r>
+            <a:r>
+              <a:rPr lang="it-IT" sz="7400" dirty="0"/>
+              <a:t> </a:t>
+            </a:r>
+            <a:r>
+              <a:rPr lang="it-IT" sz="7400" dirty="0" err="1"/>
+              <a:t>follow</a:t>
+            </a:r>
+            <a:r>
+              <a:rPr lang="it-IT" sz="7400" dirty="0"/>
+              <a:t> </a:t>
+            </a:r>
+            <a:r>
+              <a:rPr lang="it-IT" sz="7400" dirty="0" err="1"/>
+              <a:t>secure</a:t>
+            </a:r>
+            <a:r>
+              <a:rPr lang="it-IT" sz="7400" dirty="0"/>
+              <a:t> </a:t>
+            </a:r>
+            <a:r>
+              <a:rPr lang="it-IT" sz="7400" dirty="0" err="1"/>
+              <a:t>programming</a:t>
+            </a:r>
+            <a:r>
+              <a:rPr lang="it-IT" sz="7400" dirty="0"/>
+              <a:t> </a:t>
+            </a:r>
+            <a:r>
+              <a:rPr lang="it-IT" sz="7400" dirty="0" err="1"/>
+              <a:t>techniques</a:t>
+            </a:r>
+            <a:r>
+              <a:rPr lang="it-IT" sz="7400" dirty="0"/>
+              <a:t>, </a:t>
+            </a:r>
+            <a:r>
+              <a:rPr lang="it-IT" sz="7400" dirty="0" err="1"/>
+              <a:t>there</a:t>
+            </a:r>
+            <a:r>
+              <a:rPr lang="it-IT" sz="7400" dirty="0"/>
+              <a:t> are some </a:t>
+            </a:r>
+            <a:r>
+              <a:rPr lang="it-IT" sz="7400" dirty="0" err="1"/>
+              <a:t>residual</a:t>
+            </a:r>
+            <a:r>
+              <a:rPr lang="it-IT" sz="7400" dirty="0"/>
+              <a:t> </a:t>
+            </a:r>
+            <a:r>
+              <a:rPr lang="it-IT" sz="7400" dirty="0" err="1"/>
+              <a:t>potential</a:t>
+            </a:r>
+            <a:r>
+              <a:rPr lang="it-IT" sz="7400" dirty="0"/>
+              <a:t> </a:t>
+            </a:r>
+            <a:r>
+              <a:rPr lang="it-IT" sz="7400" dirty="0" err="1"/>
+              <a:t>weaknesses</a:t>
+            </a:r>
+            <a:r>
+              <a:rPr lang="it-IT" sz="7400" dirty="0"/>
+              <a:t>.</a:t>
+            </a:r>
+          </a:p>
+          <a:p>
+            <a:r>
+              <a:rPr lang="it-IT" sz="7400" dirty="0" err="1"/>
+              <a:t>We</a:t>
+            </a:r>
+            <a:r>
+              <a:rPr lang="it-IT" sz="7400" dirty="0"/>
+              <a:t> </a:t>
+            </a:r>
+            <a:r>
+              <a:rPr lang="it-IT" sz="7400" dirty="0" err="1"/>
+              <a:t>rely</a:t>
+            </a:r>
+            <a:r>
+              <a:rPr lang="it-IT" sz="7400" dirty="0"/>
+              <a:t> on </a:t>
+            </a:r>
+            <a:r>
+              <a:rPr lang="it-IT" sz="7400" dirty="0" err="1"/>
+              <a:t>programming</a:t>
+            </a:r>
+            <a:r>
+              <a:rPr lang="it-IT" sz="7400" dirty="0"/>
+              <a:t> </a:t>
+            </a:r>
+            <a:r>
+              <a:rPr lang="it-IT" sz="7400" dirty="0" err="1"/>
+              <a:t>languages</a:t>
+            </a:r>
+            <a:r>
+              <a:rPr lang="it-IT" sz="7400" dirty="0"/>
+              <a:t> </a:t>
+            </a:r>
+          </a:p>
+          <a:p>
+            <a:pPr lvl="1"/>
+            <a:r>
+              <a:rPr lang="it-IT" sz="7400" dirty="0"/>
+              <a:t>In </a:t>
+            </a:r>
+            <a:r>
+              <a:rPr lang="it-IT" sz="7400" dirty="0" err="1"/>
+              <a:t>recent</a:t>
+            </a:r>
+            <a:r>
+              <a:rPr lang="it-IT" sz="7400" dirty="0"/>
+              <a:t> Black </a:t>
+            </a:r>
+            <a:r>
+              <a:rPr lang="it-IT" sz="7400" dirty="0" err="1"/>
+              <a:t>Hat</a:t>
+            </a:r>
+            <a:r>
+              <a:rPr lang="it-IT" sz="7400" dirty="0"/>
+              <a:t> Europe 2017 Convention Fernando Arnaboldi, Senior Security Consultant, </a:t>
+            </a:r>
+            <a:r>
+              <a:rPr lang="it-IT" sz="7400" dirty="0" err="1"/>
+              <a:t>showed</a:t>
+            </a:r>
+            <a:r>
+              <a:rPr lang="it-IT" sz="7400" dirty="0"/>
+              <a:t> </a:t>
+            </a:r>
+            <a:r>
+              <a:rPr lang="it-IT" sz="7400" dirty="0" err="1"/>
+              <a:t>how</a:t>
+            </a:r>
+            <a:r>
+              <a:rPr lang="it-IT" sz="7400" dirty="0"/>
+              <a:t> </a:t>
+            </a:r>
+            <a:r>
+              <a:rPr lang="it-IT" sz="7400" dirty="0" err="1"/>
+              <a:t>securely</a:t>
+            </a:r>
+            <a:r>
+              <a:rPr lang="it-IT" sz="7400" dirty="0"/>
+              <a:t> </a:t>
+            </a:r>
+            <a:r>
+              <a:rPr lang="it-IT" sz="7400" dirty="0" err="1"/>
+              <a:t>developed</a:t>
+            </a:r>
+            <a:r>
+              <a:rPr lang="it-IT" sz="7400" dirty="0"/>
+              <a:t> </a:t>
+            </a:r>
+            <a:r>
+              <a:rPr lang="it-IT" sz="7400" dirty="0" err="1"/>
+              <a:t>application</a:t>
+            </a:r>
+            <a:r>
+              <a:rPr lang="it-IT" sz="7400" dirty="0"/>
+              <a:t> </a:t>
+            </a:r>
+            <a:r>
+              <a:rPr lang="it-IT" sz="7400" dirty="0" err="1"/>
+              <a:t>may</a:t>
+            </a:r>
+            <a:r>
+              <a:rPr lang="it-IT" sz="7400" dirty="0"/>
+              <a:t> </a:t>
+            </a:r>
+            <a:r>
+              <a:rPr lang="it-IT" sz="7400" dirty="0" err="1"/>
+              <a:t>have</a:t>
+            </a:r>
+            <a:r>
+              <a:rPr lang="it-IT" sz="7400" dirty="0"/>
+              <a:t> </a:t>
+            </a:r>
+            <a:r>
+              <a:rPr lang="it-IT" sz="7400" dirty="0" err="1"/>
+              <a:t>unindentified</a:t>
+            </a:r>
+            <a:r>
+              <a:rPr lang="it-IT" sz="7400" dirty="0"/>
+              <a:t> </a:t>
+            </a:r>
+            <a:r>
+              <a:rPr lang="it-IT" sz="7400" dirty="0" err="1"/>
+              <a:t>vulnerabilities</a:t>
+            </a:r>
+            <a:r>
+              <a:rPr lang="it-IT" sz="7400" dirty="0"/>
+              <a:t> in the </a:t>
+            </a:r>
+            <a:r>
+              <a:rPr lang="it-IT" sz="7400" dirty="0" err="1"/>
+              <a:t>underlying</a:t>
+            </a:r>
+            <a:r>
+              <a:rPr lang="it-IT" sz="7400" dirty="0"/>
+              <a:t> </a:t>
+            </a:r>
+            <a:r>
+              <a:rPr lang="it-IT" sz="7400" dirty="0" err="1"/>
+              <a:t>programming</a:t>
+            </a:r>
+            <a:r>
+              <a:rPr lang="it-IT" sz="7400" dirty="0"/>
+              <a:t> </a:t>
+            </a:r>
+            <a:r>
+              <a:rPr lang="it-IT" sz="7400" dirty="0" err="1"/>
+              <a:t>languages</a:t>
+            </a:r>
+            <a:r>
+              <a:rPr lang="it-IT" sz="7400" dirty="0"/>
+              <a:t> </a:t>
+            </a:r>
+            <a:r>
+              <a:rPr lang="it-IT" sz="7400" dirty="0" err="1"/>
+              <a:t>that</a:t>
+            </a:r>
+            <a:r>
+              <a:rPr lang="it-IT" sz="7400" dirty="0"/>
+              <a:t> </a:t>
+            </a:r>
+            <a:r>
+              <a:rPr lang="it-IT" sz="7400" dirty="0" err="1"/>
+              <a:t>may</a:t>
+            </a:r>
+            <a:r>
+              <a:rPr lang="it-IT" sz="7400" dirty="0"/>
+              <a:t> </a:t>
+            </a:r>
+            <a:r>
+              <a:rPr lang="it-IT" sz="7400" dirty="0" err="1"/>
+              <a:t>lead</a:t>
+            </a:r>
+            <a:r>
+              <a:rPr lang="it-IT" sz="7400" dirty="0"/>
+              <a:t> to remote code </a:t>
+            </a:r>
+            <a:r>
+              <a:rPr lang="it-IT" sz="7400" dirty="0" err="1"/>
+              <a:t>execution</a:t>
+            </a:r>
+            <a:r>
+              <a:rPr lang="it-IT" sz="7400" dirty="0"/>
+              <a:t> </a:t>
+            </a:r>
+          </a:p>
+          <a:p>
+            <a:pPr lvl="2"/>
+            <a:r>
+              <a:rPr lang="it-IT" sz="7400" dirty="0" err="1"/>
+              <a:t>Affected</a:t>
+            </a:r>
+            <a:r>
+              <a:rPr lang="it-IT" sz="7400" dirty="0"/>
+              <a:t> </a:t>
+            </a:r>
+            <a:r>
+              <a:rPr lang="it-IT" sz="7400" dirty="0" err="1"/>
+              <a:t>languages</a:t>
+            </a:r>
+            <a:r>
+              <a:rPr lang="it-IT" sz="7400" dirty="0"/>
+              <a:t> are common </a:t>
+            </a:r>
+            <a:r>
+              <a:rPr lang="it-IT" sz="7400" dirty="0" err="1"/>
+              <a:t>used</a:t>
+            </a:r>
+            <a:r>
+              <a:rPr lang="it-IT" sz="7400" dirty="0"/>
+              <a:t> </a:t>
+            </a:r>
+            <a:r>
+              <a:rPr lang="it-IT" sz="7400" dirty="0" err="1"/>
+              <a:t>ones</a:t>
+            </a:r>
+            <a:r>
+              <a:rPr lang="it-IT" sz="7400" dirty="0"/>
+              <a:t> </a:t>
+            </a:r>
+            <a:r>
+              <a:rPr lang="it-IT" sz="7400" dirty="0" err="1"/>
+              <a:t>like</a:t>
+            </a:r>
+            <a:r>
+              <a:rPr lang="it-IT" sz="7400" dirty="0"/>
+              <a:t> </a:t>
+            </a:r>
+            <a:r>
+              <a:rPr lang="it-IT" sz="7400" dirty="0" err="1"/>
+              <a:t>Javascript</a:t>
+            </a:r>
+            <a:r>
+              <a:rPr lang="it-IT" sz="7400" dirty="0"/>
+              <a:t>, PHP, Ruby, </a:t>
+            </a:r>
+            <a:r>
+              <a:rPr lang="it-IT" sz="7400" dirty="0" err="1"/>
+              <a:t>Perl</a:t>
+            </a:r>
+            <a:r>
+              <a:rPr lang="it-IT" sz="7400" dirty="0"/>
+              <a:t> and </a:t>
+            </a:r>
+            <a:r>
+              <a:rPr lang="it-IT" sz="7400" dirty="0" err="1"/>
+              <a:t>Python</a:t>
+            </a:r>
+            <a:r>
+              <a:rPr lang="it-IT" sz="7400" dirty="0"/>
+              <a:t>.</a:t>
+            </a:r>
+          </a:p>
+          <a:p>
+            <a:r>
+              <a:rPr lang="it-IT" sz="7400" dirty="0" err="1"/>
+              <a:t>Trusting</a:t>
+            </a:r>
+            <a:r>
+              <a:rPr lang="it-IT" sz="7400" dirty="0"/>
+              <a:t> </a:t>
+            </a:r>
+            <a:r>
+              <a:rPr lang="it-IT" sz="7400" dirty="0" err="1"/>
+              <a:t>third</a:t>
+            </a:r>
+            <a:r>
+              <a:rPr lang="it-IT" sz="7400" dirty="0"/>
+              <a:t> party-</a:t>
+            </a:r>
+            <a:r>
+              <a:rPr lang="it-IT" sz="7400" dirty="0" err="1"/>
+              <a:t>developed</a:t>
+            </a:r>
+            <a:r>
+              <a:rPr lang="it-IT" sz="7400" dirty="0"/>
+              <a:t> </a:t>
+            </a:r>
+            <a:r>
+              <a:rPr lang="it-IT" sz="7400" dirty="0" err="1"/>
+              <a:t>cryptography</a:t>
+            </a:r>
+            <a:r>
+              <a:rPr lang="it-IT" sz="7400" dirty="0"/>
+              <a:t> </a:t>
+            </a:r>
+            <a:r>
+              <a:rPr lang="it-IT" sz="7400" dirty="0" err="1"/>
+              <a:t>libraries</a:t>
+            </a:r>
+            <a:endParaRPr lang="it-IT" sz="7400" dirty="0"/>
+          </a:p>
+          <a:p>
+            <a:pPr lvl="1"/>
+            <a:r>
+              <a:rPr lang="it-IT" sz="7000" dirty="0"/>
+              <a:t>A </a:t>
+            </a:r>
+            <a:r>
+              <a:rPr lang="it-IT" sz="7000" dirty="0" err="1"/>
+              <a:t>trapdoor</a:t>
+            </a:r>
+            <a:r>
+              <a:rPr lang="it-IT" sz="7000" dirty="0"/>
+              <a:t> </a:t>
+            </a:r>
+            <a:r>
+              <a:rPr lang="it-IT" sz="7000" dirty="0" err="1"/>
+              <a:t>would</a:t>
+            </a:r>
+            <a:r>
+              <a:rPr lang="it-IT" sz="7000" dirty="0"/>
+              <a:t> </a:t>
+            </a:r>
+            <a:r>
+              <a:rPr lang="it-IT" sz="7000" dirty="0" err="1"/>
+              <a:t>allow</a:t>
+            </a:r>
+            <a:r>
+              <a:rPr lang="it-IT" sz="7000" dirty="0"/>
+              <a:t> </a:t>
+            </a:r>
+            <a:r>
+              <a:rPr lang="it-IT" sz="7000" dirty="0" err="1"/>
+              <a:t>decryption</a:t>
+            </a:r>
+            <a:r>
+              <a:rPr lang="it-IT" sz="7000" dirty="0"/>
+              <a:t> </a:t>
+            </a:r>
+            <a:r>
+              <a:rPr lang="it-IT" sz="7000" dirty="0" err="1"/>
+              <a:t>without</a:t>
+            </a:r>
+            <a:r>
+              <a:rPr lang="it-IT" sz="7000" dirty="0"/>
+              <a:t> </a:t>
+            </a:r>
+            <a:r>
+              <a:rPr lang="it-IT" sz="7000" dirty="0" err="1"/>
+              <a:t>key</a:t>
+            </a:r>
+            <a:r>
+              <a:rPr lang="it-IT" sz="7000" dirty="0"/>
+              <a:t> knowledge</a:t>
+            </a:r>
+          </a:p>
+          <a:p>
+            <a:pPr lvl="1"/>
+            <a:r>
+              <a:rPr lang="it-IT" sz="7400" dirty="0" err="1"/>
+              <a:t>That</a:t>
+            </a:r>
+            <a:r>
+              <a:rPr lang="it-IT" sz="7400" dirty="0"/>
+              <a:t> </a:t>
+            </a:r>
+            <a:r>
+              <a:rPr lang="it-IT" sz="7400" dirty="0" err="1"/>
+              <a:t>library</a:t>
+            </a:r>
+            <a:r>
+              <a:rPr lang="it-IT" sz="7400" dirty="0"/>
+              <a:t> </a:t>
+            </a:r>
+            <a:r>
+              <a:rPr lang="it-IT" sz="7400" dirty="0" err="1"/>
+              <a:t>could</a:t>
+            </a:r>
+            <a:r>
+              <a:rPr lang="it-IT" sz="7400" dirty="0"/>
+              <a:t> </a:t>
+            </a:r>
+            <a:r>
+              <a:rPr lang="it-IT" sz="7400" dirty="0" err="1"/>
+              <a:t>contains</a:t>
+            </a:r>
+            <a:r>
+              <a:rPr lang="it-IT" sz="7400" dirty="0"/>
+              <a:t> </a:t>
+            </a:r>
+            <a:r>
+              <a:rPr lang="it-IT" sz="7400" dirty="0" err="1"/>
+              <a:t>intentional</a:t>
+            </a:r>
+            <a:r>
+              <a:rPr lang="it-IT" sz="7400" dirty="0"/>
+              <a:t> or due to </a:t>
+            </a:r>
+            <a:r>
+              <a:rPr lang="it-IT" sz="7400" dirty="0" err="1"/>
+              <a:t>laziness</a:t>
+            </a:r>
+            <a:r>
+              <a:rPr lang="it-IT" sz="7400" dirty="0"/>
+              <a:t> or </a:t>
+            </a:r>
+            <a:r>
+              <a:rPr lang="it-IT" sz="7400" dirty="0" err="1"/>
+              <a:t>mistake</a:t>
+            </a:r>
+            <a:r>
+              <a:rPr lang="it-IT" sz="7400" dirty="0"/>
+              <a:t>  </a:t>
+            </a:r>
+            <a:r>
+              <a:rPr lang="it-IT" sz="7400" dirty="0" err="1"/>
+              <a:t>weaknesses</a:t>
+            </a:r>
+            <a:r>
+              <a:rPr lang="it-IT" sz="7400" dirty="0"/>
+              <a:t> or </a:t>
+            </a:r>
+            <a:r>
+              <a:rPr lang="it-IT" sz="7400" dirty="0" err="1"/>
+              <a:t>backdoors</a:t>
+            </a:r>
+            <a:r>
+              <a:rPr lang="it-IT" sz="7400" dirty="0"/>
+              <a:t>, </a:t>
+            </a:r>
+            <a:r>
+              <a:rPr lang="it-IT" sz="7400" dirty="0" err="1"/>
+              <a:t>that</a:t>
+            </a:r>
+            <a:r>
+              <a:rPr lang="it-IT" sz="7400" dirty="0"/>
+              <a:t> </a:t>
+            </a:r>
+            <a:r>
+              <a:rPr lang="it-IT" sz="7400" dirty="0" err="1"/>
+              <a:t>could</a:t>
+            </a:r>
+            <a:r>
+              <a:rPr lang="it-IT" sz="7400" dirty="0"/>
+              <a:t> </a:t>
+            </a:r>
+            <a:r>
+              <a:rPr lang="it-IT" sz="7400" dirty="0" err="1"/>
+              <a:t>ease</a:t>
+            </a:r>
+            <a:r>
+              <a:rPr lang="it-IT" sz="7400" dirty="0"/>
+              <a:t> data </a:t>
+            </a:r>
+            <a:r>
+              <a:rPr lang="it-IT" sz="7400" dirty="0" err="1"/>
+              <a:t>decryption</a:t>
+            </a:r>
+            <a:r>
+              <a:rPr lang="it-IT" sz="7400" dirty="0"/>
+              <a:t>.</a:t>
+            </a:r>
+          </a:p>
+          <a:p>
+            <a:pPr lvl="2"/>
+            <a:r>
+              <a:rPr lang="it-IT" sz="7400" dirty="0" err="1"/>
+              <a:t>Detect</a:t>
+            </a:r>
+            <a:r>
+              <a:rPr lang="it-IT" sz="7400" dirty="0"/>
+              <a:t> </a:t>
+            </a:r>
+            <a:r>
+              <a:rPr lang="it-IT" sz="7400" dirty="0" err="1"/>
+              <a:t>such</a:t>
+            </a:r>
+            <a:r>
+              <a:rPr lang="it-IT" sz="7400" dirty="0"/>
+              <a:t> </a:t>
+            </a:r>
+            <a:r>
+              <a:rPr lang="it-IT" sz="7400" dirty="0" err="1"/>
+              <a:t>errors</a:t>
+            </a:r>
+            <a:r>
+              <a:rPr lang="it-IT" sz="7400" dirty="0"/>
+              <a:t> </a:t>
+            </a:r>
+            <a:r>
+              <a:rPr lang="it-IT" sz="7400" dirty="0" err="1"/>
+              <a:t>is</a:t>
+            </a:r>
+            <a:r>
+              <a:rPr lang="it-IT" sz="7400" dirty="0"/>
+              <a:t> </a:t>
+            </a:r>
+            <a:r>
+              <a:rPr lang="it-IT" sz="7400" dirty="0" err="1"/>
+              <a:t>not</a:t>
+            </a:r>
+            <a:r>
+              <a:rPr lang="it-IT" sz="7400" dirty="0"/>
+              <a:t> a </a:t>
+            </a:r>
+            <a:r>
+              <a:rPr lang="it-IT" sz="7400" dirty="0" err="1"/>
+              <a:t>trivial</a:t>
+            </a:r>
+            <a:r>
+              <a:rPr lang="it-IT" sz="7400" dirty="0"/>
+              <a:t> task.</a:t>
+            </a:r>
+          </a:p>
+          <a:p>
+            <a:r>
+              <a:rPr lang="it-IT" sz="7400" dirty="0" err="1"/>
+              <a:t>There</a:t>
+            </a:r>
+            <a:r>
+              <a:rPr lang="it-IT" sz="7400" dirty="0"/>
+              <a:t> </a:t>
+            </a:r>
+            <a:r>
+              <a:rPr lang="it-IT" sz="7400" dirty="0" err="1"/>
+              <a:t>could</a:t>
+            </a:r>
+            <a:r>
+              <a:rPr lang="it-IT" sz="7400" dirty="0"/>
+              <a:t> be </a:t>
+            </a:r>
+            <a:r>
+              <a:rPr lang="it-IT" sz="7400" dirty="0" err="1"/>
+              <a:t>flaws</a:t>
+            </a:r>
+            <a:r>
+              <a:rPr lang="it-IT" sz="7400" dirty="0"/>
+              <a:t> </a:t>
+            </a:r>
+            <a:r>
+              <a:rPr lang="it-IT" sz="7400" dirty="0" err="1"/>
+              <a:t>at</a:t>
+            </a:r>
+            <a:r>
+              <a:rPr lang="it-IT" sz="7400" dirty="0"/>
+              <a:t> </a:t>
+            </a:r>
+            <a:r>
+              <a:rPr lang="it-IT" sz="7400" dirty="0" err="1"/>
+              <a:t>algorithmic</a:t>
+            </a:r>
+            <a:r>
+              <a:rPr lang="it-IT" sz="7400" dirty="0"/>
+              <a:t> </a:t>
+            </a:r>
+            <a:r>
+              <a:rPr lang="it-IT" sz="7400" dirty="0" err="1"/>
+              <a:t>level</a:t>
+            </a:r>
+            <a:endParaRPr lang="it-IT" sz="7400" dirty="0"/>
+          </a:p>
+          <a:p>
+            <a:pPr lvl="1"/>
+            <a:r>
+              <a:rPr lang="it-IT" sz="7400" dirty="0"/>
+              <a:t>NSA </a:t>
+            </a:r>
+            <a:r>
+              <a:rPr lang="it-IT" sz="7400" dirty="0" err="1"/>
+              <a:t>has</a:t>
+            </a:r>
+            <a:r>
+              <a:rPr lang="it-IT" sz="7400" dirty="0"/>
+              <a:t> </a:t>
+            </a:r>
+            <a:r>
+              <a:rPr lang="it-IT" sz="7400" dirty="0" err="1"/>
+              <a:t>been</a:t>
+            </a:r>
+            <a:r>
+              <a:rPr lang="it-IT" sz="7400" dirty="0"/>
+              <a:t> </a:t>
+            </a:r>
+            <a:r>
+              <a:rPr lang="it-IT" sz="7400" dirty="0" err="1"/>
+              <a:t>blamed</a:t>
+            </a:r>
+            <a:r>
+              <a:rPr lang="it-IT" sz="7400" dirty="0"/>
+              <a:t> for Random </a:t>
+            </a:r>
+            <a:r>
+              <a:rPr lang="it-IT" sz="7400" dirty="0" err="1"/>
+              <a:t>Number</a:t>
+            </a:r>
+            <a:r>
+              <a:rPr lang="it-IT" sz="7400" dirty="0"/>
+              <a:t> Generation </a:t>
+            </a:r>
+            <a:r>
+              <a:rPr lang="it-IT" sz="7400" dirty="0" err="1"/>
+              <a:t>weaknesses</a:t>
+            </a:r>
+            <a:r>
+              <a:rPr lang="it-IT" sz="7400" dirty="0"/>
+              <a:t> in </a:t>
+            </a:r>
+            <a:r>
+              <a:rPr lang="it-IT" sz="7400" dirty="0" err="1"/>
+              <a:t>Dual_EC_DRBG</a:t>
+            </a:r>
+            <a:r>
+              <a:rPr lang="it-IT" sz="7400" dirty="0"/>
+              <a:t> </a:t>
+            </a:r>
+            <a:r>
+              <a:rPr lang="it-IT" sz="7400" dirty="0" err="1"/>
+              <a:t>algorithm</a:t>
+            </a:r>
+            <a:r>
+              <a:rPr lang="it-IT" sz="7400" dirty="0"/>
+              <a:t>, </a:t>
+            </a:r>
+            <a:r>
+              <a:rPr lang="it-IT" sz="7400" dirty="0" err="1"/>
+              <a:t>that</a:t>
+            </a:r>
+            <a:r>
+              <a:rPr lang="it-IT" sz="7400" dirty="0"/>
+              <a:t> </a:t>
+            </a:r>
+            <a:r>
+              <a:rPr lang="it-IT" sz="7400" dirty="0" err="1"/>
+              <a:t>was</a:t>
+            </a:r>
+            <a:r>
+              <a:rPr lang="it-IT" sz="7400" dirty="0"/>
+              <a:t> </a:t>
+            </a:r>
+            <a:r>
+              <a:rPr lang="it-IT" sz="7400" dirty="0" err="1"/>
+              <a:t>approved</a:t>
+            </a:r>
+            <a:r>
+              <a:rPr lang="it-IT" sz="7400" dirty="0"/>
+              <a:t> by NIST and </a:t>
+            </a:r>
+            <a:r>
+              <a:rPr lang="it-IT" sz="7400" dirty="0" err="1"/>
+              <a:t>used</a:t>
+            </a:r>
+            <a:r>
+              <a:rPr lang="it-IT" sz="7400" dirty="0"/>
+              <a:t> by </a:t>
+            </a:r>
+            <a:r>
+              <a:rPr lang="it-IT" sz="7400" dirty="0" err="1"/>
+              <a:t>important</a:t>
+            </a:r>
+            <a:r>
+              <a:rPr lang="it-IT" sz="7400" dirty="0"/>
+              <a:t> companies </a:t>
+            </a:r>
+            <a:r>
+              <a:rPr lang="it-IT" sz="7400" dirty="0" err="1"/>
+              <a:t>like</a:t>
+            </a:r>
+            <a:r>
+              <a:rPr lang="it-IT" sz="7400" dirty="0"/>
+              <a:t> RSA. DUAL_EC_DRBG </a:t>
+            </a:r>
+          </a:p>
+          <a:p>
+            <a:pPr lvl="2"/>
+            <a:endParaRPr lang="it-IT" sz="2800" dirty="0"/>
+          </a:p>
+          <a:p>
+            <a:pPr marL="457200" lvl="1" indent="0">
+              <a:buNone/>
+            </a:pPr>
+            <a:endParaRPr lang="it-IT" sz="3200" dirty="0"/>
+          </a:p>
+          <a:p>
+            <a:pPr lvl="1"/>
+            <a:endParaRPr lang="it-IT" sz="3200" dirty="0"/>
+          </a:p>
+          <a:p>
+            <a:pPr lvl="1"/>
+            <a:endParaRPr lang="it-IT" dirty="0"/>
+          </a:p>
+          <a:p>
+            <a:pPr lvl="1"/>
+            <a:endParaRPr lang="it-IT" dirty="0"/>
+          </a:p>
+          <a:p>
+            <a:pPr marL="457200" lvl="1" indent="0">
+              <a:buNone/>
+            </a:pPr>
+            <a:r>
+              <a:rPr lang="it-IT" dirty="0"/>
+              <a:t> </a:t>
+            </a:r>
+          </a:p>
+          <a:p>
+            <a:pPr marL="0" indent="0">
+              <a:buNone/>
+            </a:pPr>
+            <a:endParaRPr lang="it-IT" dirty="0"/>
+          </a:p>
+          <a:p>
+            <a:pPr marL="457200" lvl="1" indent="0">
+              <a:buNone/>
+            </a:pPr>
+            <a:r>
+              <a:rPr lang="it-IT" dirty="0"/>
+              <a:t>	</a:t>
+            </a:r>
+          </a:p>
+        </p:txBody>
+      </p:sp>
+    </p:spTree>
+    <p:extLst>
+      <p:ext uri="{BB962C8B-B14F-4D97-AF65-F5344CB8AC3E}">
+        <p14:creationId xmlns:p14="http://schemas.microsoft.com/office/powerpoint/2010/main" val="2278474667"/>
+      </p:ext>
+    </p:extLst>
+  </p:cSld>
+  <p:clrMapOvr>
+    <a:masterClrMapping/>
+  </p:clrMapOvr>
+</p:sld>
+</file>
+
+<file path=ppt/slides/slide22.xml><?xml version="1.0" encoding="utf-8"?>
+<p:sld xmlns:a="http://schemas.openxmlformats.org/drawingml/2006/main" xmlns:r="http://schemas.openxmlformats.org/officeDocument/2006/relationships" xmlns:p="http://schemas.openxmlformats.org/presentationml/2006/main">
+  <p:cSld>
+    <p:spTree>
+      <p:nvGrpSpPr>
+        <p:cNvPr id="1" name=""/>
+        <p:cNvGrpSpPr/>
+        <p:nvPr/>
+      </p:nvGrpSpPr>
+      <p:grpSpPr>
+        <a:xfrm>
+          <a:off x="0" y="0"/>
+          <a:ext cx="0" cy="0"/>
+          <a:chOff x="0" y="0"/>
+          <a:chExt cx="0" cy="0"/>
+        </a:xfrm>
+      </p:grpSpPr>
+      <p:sp>
+        <p:nvSpPr>
+          <p:cNvPr id="2" name="Titolo 1">
+            <a:extLst>
+              <a:ext uri="{FF2B5EF4-FFF2-40B4-BE49-F238E27FC236}">
                 <a16:creationId xmlns:a16="http://schemas.microsoft.com/office/drawing/2014/main" id="{7925F094-0128-4BCD-B3FB-F25952F2B281}"/>
               </a:ext>
             </a:extLst>
@@ -7439,7 +9248,7 @@
             </a:r>
             <a:r>
               <a:rPr lang="it-IT" dirty="0" err="1"/>
-              <a:t>Weaknesses</a:t>
+              <a:t>weaknesses</a:t>
             </a:r>
             <a:endParaRPr lang="it-IT" dirty="0"/>
           </a:p>
@@ -7461,7 +9270,12 @@
             <p:ph idx="1"/>
           </p:nvPr>
         </p:nvSpPr>
-        <p:spPr/>
+        <p:spPr>
+          <a:xfrm>
+            <a:off x="267286" y="1463040"/>
+            <a:ext cx="11086514" cy="4713923"/>
+          </a:xfrm>
+        </p:spPr>
         <p:txBody>
           <a:bodyPr>
             <a:normAutofit fontScale="62500" lnSpcReduction="20000"/>
@@ -8013,6 +9827,130 @@
             <a:r>
               <a:rPr lang="it-IT" sz="3200" dirty="0" err="1"/>
               <a:t>servers</a:t>
+            </a:r>
+            <a:endParaRPr lang="it-IT" sz="3200" dirty="0"/>
+          </a:p>
+          <a:p>
+            <a:pPr lvl="1"/>
+            <a:r>
+              <a:rPr lang="it-IT" sz="2800" dirty="0" err="1"/>
+              <a:t>What</a:t>
+            </a:r>
+            <a:r>
+              <a:rPr lang="it-IT" sz="2800" dirty="0"/>
+              <a:t> </a:t>
+            </a:r>
+            <a:r>
+              <a:rPr lang="it-IT" sz="2800" dirty="0" err="1"/>
+              <a:t>if</a:t>
+            </a:r>
+            <a:r>
+              <a:rPr lang="it-IT" sz="2800" dirty="0"/>
+              <a:t> a malware </a:t>
+            </a:r>
+            <a:r>
+              <a:rPr lang="it-IT" sz="2800" dirty="0" err="1"/>
+              <a:t>is</a:t>
+            </a:r>
+            <a:r>
+              <a:rPr lang="it-IT" sz="2800" dirty="0"/>
+              <a:t> </a:t>
+            </a:r>
+            <a:r>
+              <a:rPr lang="it-IT" sz="2800" dirty="0" err="1"/>
+              <a:t>inserted</a:t>
+            </a:r>
+            <a:r>
+              <a:rPr lang="it-IT" sz="2800" dirty="0"/>
+              <a:t> </a:t>
+            </a:r>
+            <a:r>
+              <a:rPr lang="it-IT" sz="2800" dirty="0" err="1"/>
+              <a:t>at</a:t>
+            </a:r>
+            <a:r>
+              <a:rPr lang="it-IT" sz="2800" dirty="0"/>
+              <a:t> MINIX-CPU </a:t>
+            </a:r>
+            <a:r>
+              <a:rPr lang="it-IT" sz="2800" dirty="0" err="1"/>
+              <a:t>level</a:t>
+            </a:r>
+            <a:r>
+              <a:rPr lang="it-IT" sz="2800" dirty="0"/>
+              <a:t> so </a:t>
+            </a:r>
+            <a:r>
+              <a:rPr lang="it-IT" sz="2800" dirty="0" err="1"/>
+              <a:t>that</a:t>
+            </a:r>
+            <a:r>
+              <a:rPr lang="it-IT" sz="2800" dirty="0"/>
+              <a:t> </a:t>
+            </a:r>
+            <a:r>
+              <a:rPr lang="it-IT" sz="2800" dirty="0" err="1"/>
+              <a:t>every</a:t>
+            </a:r>
+            <a:r>
+              <a:rPr lang="it-IT" sz="2800" dirty="0"/>
+              <a:t> Intel-CPU </a:t>
+            </a:r>
+            <a:r>
+              <a:rPr lang="it-IT" sz="2800" dirty="0" err="1"/>
+              <a:t>generated</a:t>
+            </a:r>
+            <a:r>
+              <a:rPr lang="it-IT" sz="2800" dirty="0"/>
+              <a:t> </a:t>
+            </a:r>
+            <a:r>
+              <a:rPr lang="it-IT" sz="2800" dirty="0" err="1"/>
+              <a:t>cryptographic</a:t>
+            </a:r>
+            <a:r>
+              <a:rPr lang="it-IT" sz="2800" dirty="0"/>
+              <a:t> </a:t>
+            </a:r>
+            <a:r>
+              <a:rPr lang="it-IT" sz="2800" dirty="0" err="1"/>
+              <a:t>key</a:t>
+            </a:r>
+            <a:r>
+              <a:rPr lang="it-IT" sz="2800" dirty="0"/>
+              <a:t> </a:t>
+            </a:r>
+            <a:r>
+              <a:rPr lang="it-IT" sz="2800" dirty="0" err="1"/>
+              <a:t>is</a:t>
+            </a:r>
+            <a:r>
+              <a:rPr lang="it-IT" sz="2800" dirty="0"/>
+              <a:t> </a:t>
+            </a:r>
+            <a:r>
+              <a:rPr lang="it-IT" sz="2800" dirty="0" err="1"/>
+              <a:t>sent</a:t>
+            </a:r>
+            <a:r>
+              <a:rPr lang="it-IT" sz="2800" dirty="0"/>
+              <a:t> by MINIX </a:t>
+            </a:r>
+            <a:r>
+              <a:rPr lang="it-IT" sz="2800" dirty="0" err="1"/>
+              <a:t>webserver</a:t>
+            </a:r>
+            <a:r>
+              <a:rPr lang="it-IT" sz="2800" dirty="0"/>
+              <a:t> to an </a:t>
+            </a:r>
+            <a:r>
+              <a:rPr lang="it-IT" sz="2800" dirty="0" err="1"/>
+              <a:t>attacker</a:t>
+            </a:r>
+            <a:r>
+              <a:rPr lang="it-IT" sz="2800" dirty="0"/>
+              <a:t>?</a:t>
             </a:r>
             <a:br>
               <a:rPr lang="it-IT" sz="2800" dirty="0"/>
@@ -8040,7 +9978,7 @@
 </p:sld>
 </file>
 
-<file path=ppt/slides/slide21.xml><?xml version="1.0" encoding="utf-8"?>
+<file path=ppt/slides/slide23.xml><?xml version="1.0" encoding="utf-8"?>
 <p:sld xmlns:a="http://schemas.openxmlformats.org/drawingml/2006/main" xmlns:r="http://schemas.openxmlformats.org/officeDocument/2006/relationships" xmlns:p="http://schemas.openxmlformats.org/presentationml/2006/main">
   <p:cSld>
     <p:spTree>
@@ -11959,4 +13897,299 @@
     </a:ext>
   </a:extLst>
 </a:theme>
+</file>
+
+<file path=ppt/theme/theme2.xml><?xml version="1.0" encoding="utf-8"?>
+<a:theme xmlns:a="http://schemas.openxmlformats.org/drawingml/2006/main" name="Tema di Office">
+  <a:themeElements>
+    <a:clrScheme name="Office">
+      <a:dk1>
+        <a:sysClr val="windowText" lastClr="000000"/>
+      </a:dk1>
+      <a:lt1>
+        <a:sysClr val="window" lastClr="FFFFFF"/>
+      </a:lt1>
+      <a:dk2>
+        <a:srgbClr val="44546A"/>
+      </a:dk2>
+      <a:lt2>
+        <a:srgbClr val="E7E6E6"/>
+      </a:lt2>
+      <a:accent1>
+        <a:srgbClr val="4472C4"/>
+      </a:accent1>
+      <a:accent2>
+        <a:srgbClr val="ED7D31"/>
+      </a:accent2>
+      <a:accent3>
+        <a:srgbClr val="A5A5A5"/>
+      </a:accent3>
+      <a:accent4>
+        <a:srgbClr val="FFC000"/>
+      </a:accent4>
+      <a:accent5>
+        <a:srgbClr val="5B9BD5"/>
+      </a:accent5>
+      <a:accent6>
+        <a:srgbClr val="70AD47"/>
+      </a:accent6>
+      <a:hlink>
+        <a:srgbClr val="0563C1"/>
+      </a:hlink>
+      <a:folHlink>
+        <a:srgbClr val="954F72"/>
+      </a:folHlink>
+    </a:clrScheme>
+    <a:fontScheme name="Office">
+      <a:majorFont>
+        <a:latin typeface="Calibri Light" panose="020F0302020204030204"/>
+        <a:ea typeface=""/>
+        <a:cs typeface=""/>
+        <a:font script="Jpan" typeface="游ゴシック Light"/>
+        <a:font script="Hang" typeface="맑은 고딕"/>
+        <a:font script="Hans" typeface="等线 Light"/>
+        <a:font script="Hant" typeface="新細明體"/>
+        <a:font script="Arab" typeface="Times New Roman"/>
+        <a:font script="Hebr" typeface="Times New Roman"/>
+        <a:font script="Thai" typeface="Angsana New"/>
+        <a:font script="Ethi" typeface="Nyala"/>
+        <a:font script="Beng" typeface="Vrinda"/>
+        <a:font script="Gujr" typeface="Shruti"/>
+        <a:font script="Khmr" typeface="MoolBoran"/>
+        <a:font script="Knda" typeface="Tunga"/>
+        <a:font script="Guru" typeface="Raavi"/>
+        <a:font script="Cans" typeface="Euphemia"/>
+        <a:font script="Cher" typeface="Plantagenet Cherokee"/>
+        <a:font script="Yiii" typeface="Microsoft Yi Baiti"/>
+        <a:font script="Tibt" typeface="Microsoft Himalaya"/>
+        <a:font script="Thaa" typeface="MV Boli"/>
+        <a:font script="Deva" typeface="Mangal"/>
+        <a:font script="Telu" typeface="Gautami"/>
+        <a:font script="Taml" typeface="Latha"/>
+        <a:font script="Syrc" typeface="Estrangelo Edessa"/>
+        <a:font script="Orya" typeface="Kalinga"/>
+        <a:font script="Mlym" typeface="Kartika"/>
+        <a:font script="Laoo" typeface="DokChampa"/>
+        <a:font script="Sinh" typeface="Iskoola Pota"/>
+        <a:font script="Mong" typeface="Mongolian Baiti"/>
+        <a:font script="Viet" typeface="Times New Roman"/>
+        <a:font script="Uigh" typeface="Microsoft Uighur"/>
+        <a:font script="Geor" typeface="Sylfaen"/>
+        <a:font script="Armn" typeface="Arial"/>
+        <a:font script="Bugi" typeface="Leelawadee UI"/>
+        <a:font script="Bopo" typeface="Microsoft JhengHei"/>
+        <a:font script="Java" typeface="Javanese Text"/>
+        <a:font script="Lisu" typeface="Segoe UI"/>
+        <a:font script="Mymr" typeface="Myanmar Text"/>
+        <a:font script="Nkoo" typeface="Ebrima"/>
+        <a:font script="Olck" typeface="Nirmala UI"/>
+        <a:font script="Osma" typeface="Ebrima"/>
+        <a:font script="Phag" typeface="Phagspa"/>
+        <a:font script="Syrn" typeface="Estrangelo Edessa"/>
+        <a:font script="Syrj" typeface="Estrangelo Edessa"/>
+        <a:font script="Syre" typeface="Estrangelo Edessa"/>
+        <a:font script="Sora" typeface="Nirmala UI"/>
+        <a:font script="Tale" typeface="Microsoft Tai Le"/>
+        <a:font script="Talu" typeface="Microsoft New Tai Lue"/>
+        <a:font script="Tfng" typeface="Ebrima"/>
+      </a:majorFont>
+      <a:minorFont>
+        <a:latin typeface="Calibri" panose="020F0502020204030204"/>
+        <a:ea typeface=""/>
+        <a:cs typeface=""/>
+        <a:font script="Jpan" typeface="游ゴシック"/>
+        <a:font script="Hang" typeface="맑은 고딕"/>
+        <a:font script="Hans" typeface="等线"/>
+        <a:font script="Hant" typeface="新細明體"/>
+        <a:font script="Arab" typeface="Arial"/>
+        <a:font script="Hebr" typeface="Arial"/>
+        <a:font script="Thai" typeface="Cordia New"/>
+        <a:font script="Ethi" typeface="Nyala"/>
+        <a:font script="Beng" typeface="Vrinda"/>
+        <a:font script="Gujr" typeface="Shruti"/>
+        <a:font script="Khmr" typeface="DaunPenh"/>
+        <a:font script="Knda" typeface="Tunga"/>
+        <a:font script="Guru" typeface="Raavi"/>
+        <a:font script="Cans" typeface="Euphemia"/>
+        <a:font script="Cher" typeface="Plantagenet Cherokee"/>
+        <a:font script="Yiii" typeface="Microsoft Yi Baiti"/>
+        <a:font script="Tibt" typeface="Microsoft Himalaya"/>
+        <a:font script="Thaa" typeface="MV Boli"/>
+        <a:font script="Deva" typeface="Mangal"/>
+        <a:font script="Telu" typeface="Gautami"/>
+        <a:font script="Taml" typeface="Latha"/>
+        <a:font script="Syrc" typeface="Estrangelo Edessa"/>
+        <a:font script="Orya" typeface="Kalinga"/>
+        <a:font script="Mlym" typeface="Kartika"/>
+        <a:font script="Laoo" typeface="DokChampa"/>
+        <a:font script="Sinh" typeface="Iskoola Pota"/>
+        <a:font script="Mong" typeface="Mongolian Baiti"/>
+        <a:font script="Viet" typeface="Arial"/>
+        <a:font script="Uigh" typeface="Microsoft Uighur"/>
+        <a:font script="Geor" typeface="Sylfaen"/>
+        <a:font script="Armn" typeface="Arial"/>
+        <a:font script="Bugi" typeface="Leelawadee UI"/>
+        <a:font script="Bopo" typeface="Microsoft JhengHei"/>
+        <a:font script="Java" typeface="Javanese Text"/>
+        <a:font script="Lisu" typeface="Segoe UI"/>
+        <a:font script="Mymr" typeface="Myanmar Text"/>
+        <a:font script="Nkoo" typeface="Ebrima"/>
+        <a:font script="Olck" typeface="Nirmala UI"/>
+        <a:font script="Osma" typeface="Ebrima"/>
+        <a:font script="Phag" typeface="Phagspa"/>
+        <a:font script="Syrn" typeface="Estrangelo Edessa"/>
+        <a:font script="Syrj" typeface="Estrangelo Edessa"/>
+        <a:font script="Syre" typeface="Estrangelo Edessa"/>
+        <a:font script="Sora" typeface="Nirmala UI"/>
+        <a:font script="Tale" typeface="Microsoft Tai Le"/>
+        <a:font script="Talu" typeface="Microsoft New Tai Lue"/>
+        <a:font script="Tfng" typeface="Ebrima"/>
+      </a:minorFont>
+    </a:fontScheme>
+    <a:fmtScheme name="Office">
+      <a:fillStyleLst>
+        <a:solidFill>
+          <a:schemeClr val="phClr"/>
+        </a:solidFill>
+        <a:gradFill rotWithShape="1">
+          <a:gsLst>
+            <a:gs pos="0">
+              <a:schemeClr val="phClr">
+                <a:lumMod val="110000"/>
+                <a:satMod val="105000"/>
+                <a:tint val="67000"/>
+              </a:schemeClr>
+            </a:gs>
+            <a:gs pos="50000">
+              <a:schemeClr val="phClr">
+                <a:lumMod val="105000"/>
+                <a:satMod val="103000"/>
+                <a:tint val="73000"/>
+              </a:schemeClr>
+            </a:gs>
+            <a:gs pos="100000">
+              <a:schemeClr val="phClr">
+                <a:lumMod val="105000"/>
+                <a:satMod val="109000"/>
+                <a:tint val="81000"/>
+              </a:schemeClr>
+            </a:gs>
+          </a:gsLst>
+          <a:lin ang="5400000" scaled="0"/>
+        </a:gradFill>
+        <a:gradFill rotWithShape="1">
+          <a:gsLst>
+            <a:gs pos="0">
+              <a:schemeClr val="phClr">
+                <a:satMod val="103000"/>
+                <a:lumMod val="102000"/>
+                <a:tint val="94000"/>
+              </a:schemeClr>
+            </a:gs>
+            <a:gs pos="50000">
+              <a:schemeClr val="phClr">
+                <a:satMod val="110000"/>
+                <a:lumMod val="100000"/>
+                <a:shade val="100000"/>
+              </a:schemeClr>
+            </a:gs>
+            <a:gs pos="100000">
+              <a:schemeClr val="phClr">
+                <a:lumMod val="99000"/>
+                <a:satMod val="120000"/>
+                <a:shade val="78000"/>
+              </a:schemeClr>
+            </a:gs>
+          </a:gsLst>
+          <a:lin ang="5400000" scaled="0"/>
+        </a:gradFill>
+      </a:fillStyleLst>
+      <a:lnStyleLst>
+        <a:ln w="6350" cap="flat" cmpd="sng" algn="ctr">
+          <a:solidFill>
+            <a:schemeClr val="phClr"/>
+          </a:solidFill>
+          <a:prstDash val="solid"/>
+          <a:miter lim="800000"/>
+        </a:ln>
+        <a:ln w="12700" cap="flat" cmpd="sng" algn="ctr">
+          <a:solidFill>
+            <a:schemeClr val="phClr"/>
+          </a:solidFill>
+          <a:prstDash val="solid"/>
+          <a:miter lim="800000"/>
+        </a:ln>
+        <a:ln w="19050" cap="flat" cmpd="sng" algn="ctr">
+          <a:solidFill>
+            <a:schemeClr val="phClr"/>
+          </a:solidFill>
+          <a:prstDash val="solid"/>
+          <a:miter lim="800000"/>
+        </a:ln>
+      </a:lnStyleLst>
+      <a:effectStyleLst>
+        <a:effectStyle>
+          <a:effectLst/>
+        </a:effectStyle>
+        <a:effectStyle>
+          <a:effectLst/>
+        </a:effectStyle>
+        <a:effectStyle>
+          <a:effectLst>
+            <a:outerShdw blurRad="57150" dist="19050" dir="5400000" algn="ctr" rotWithShape="0">
+              <a:srgbClr val="000000">
+                <a:alpha val="63000"/>
+              </a:srgbClr>
+            </a:outerShdw>
+          </a:effectLst>
+        </a:effectStyle>
+      </a:effectStyleLst>
+      <a:bgFillStyleLst>
+        <a:solidFill>
+          <a:schemeClr val="phClr"/>
+        </a:solidFill>
+        <a:solidFill>
+          <a:schemeClr val="phClr">
+            <a:tint val="95000"/>
+            <a:satMod val="170000"/>
+          </a:schemeClr>
+        </a:solidFill>
+        <a:gradFill rotWithShape="1">
+          <a:gsLst>
+            <a:gs pos="0">
+              <a:schemeClr val="phClr">
+                <a:tint val="93000"/>
+                <a:satMod val="150000"/>
+                <a:shade val="98000"/>
+                <a:lumMod val="102000"/>
+              </a:schemeClr>
+            </a:gs>
+            <a:gs pos="50000">
+              <a:schemeClr val="phClr">
+                <a:tint val="98000"/>
+                <a:satMod val="130000"/>
+                <a:shade val="90000"/>
+                <a:lumMod val="103000"/>
+              </a:schemeClr>
+            </a:gs>
+            <a:gs pos="100000">
+              <a:schemeClr val="phClr">
+                <a:shade val="63000"/>
+                <a:satMod val="120000"/>
+              </a:schemeClr>
+            </a:gs>
+          </a:gsLst>
+          <a:lin ang="5400000" scaled="0"/>
+        </a:gradFill>
+      </a:bgFillStyleLst>
+    </a:fmtScheme>
+  </a:themeElements>
+  <a:objectDefaults/>
+  <a:extraClrSchemeLst/>
+  <a:extLst>
+    <a:ext uri="{05A4C25C-085E-4340-85A3-A5531E510DB2}">
+      <thm15:themeFamily xmlns:thm15="http://schemas.microsoft.com/office/thememl/2012/main" name="Office Theme" id="{62F939B6-93AF-4DB8-9C6B-D6C7DFDC589F}" vid="{4A3C46E8-61CC-4603-A589-7422A47A8E4A}"/>
+    </a:ext>
+  </a:extLst>
+</a:theme>
 </file>
</xml_diff>